<commit_message>
updated slides with flow
</commit_message>
<xml_diff>
--- a/Counter_Malign_Information/4-Implement-For_Instructors/Lesson_Plans/Lesson_06-Countering_Malign_Information/Audio_Visual-Counter-Malign_Information/Instructor-Lesson_Slide-Countering_Malign_Information.pptx
+++ b/Counter_Malign_Information/4-Implement-For_Instructors/Lesson_Plans/Lesson_06-Countering_Malign_Information/Audio_Visual-Counter-Malign_Information/Instructor-Lesson_Slide-Countering_Malign_Information.pptx
@@ -6,16 +6,33 @@
     <p:sldMasterId id="2147483675" r:id="rId2"/>
   </p:sldMasterIdLst>
   <p:notesMasterIdLst>
-    <p:notesMasterId r:id="rId10"/>
+    <p:notesMasterId r:id="rId27"/>
   </p:notesMasterIdLst>
   <p:sldIdLst>
     <p:sldId id="620" r:id="rId3"/>
-    <p:sldId id="621" r:id="rId4"/>
-    <p:sldId id="383" r:id="rId5"/>
-    <p:sldId id="269" r:id="rId6"/>
-    <p:sldId id="270" r:id="rId7"/>
-    <p:sldId id="271" r:id="rId8"/>
-    <p:sldId id="272" r:id="rId9"/>
+    <p:sldId id="383" r:id="rId4"/>
+    <p:sldId id="624" r:id="rId5"/>
+    <p:sldId id="621" r:id="rId6"/>
+    <p:sldId id="622" r:id="rId7"/>
+    <p:sldId id="623" r:id="rId8"/>
+    <p:sldId id="633" r:id="rId9"/>
+    <p:sldId id="634" r:id="rId10"/>
+    <p:sldId id="625" r:id="rId11"/>
+    <p:sldId id="626" r:id="rId12"/>
+    <p:sldId id="635" r:id="rId13"/>
+    <p:sldId id="636" r:id="rId14"/>
+    <p:sldId id="627" r:id="rId15"/>
+    <p:sldId id="628" r:id="rId16"/>
+    <p:sldId id="637" r:id="rId17"/>
+    <p:sldId id="638" r:id="rId18"/>
+    <p:sldId id="629" r:id="rId19"/>
+    <p:sldId id="630" r:id="rId20"/>
+    <p:sldId id="632" r:id="rId21"/>
+    <p:sldId id="631" r:id="rId22"/>
+    <p:sldId id="269" r:id="rId23"/>
+    <p:sldId id="270" r:id="rId24"/>
+    <p:sldId id="271" r:id="rId25"/>
+    <p:sldId id="272" r:id="rId26"/>
   </p:sldIdLst>
   <p:sldSz cx="12192000" cy="6858000"/>
   <p:notesSz cx="6858000" cy="9144000"/>
@@ -709,18 +726,308 @@
           <a:lstStyle/>
           <a:p>
             <a:r>
-              <a:rPr lang="en-US" dirty="0"/>
-              <a:t>Start by creating a slide master that is in English. As needed duplicate and translate slides into target language. Color English slides in Yellow and target language slides in white. </a:t>
-            </a:r>
-            <a:br>
-              <a:rPr lang="en-US" dirty="0"/>
-            </a:br>
-            <a:br>
-              <a:rPr lang="en-US" dirty="0"/>
-            </a:br>
-            <a:r>
-              <a:rPr lang="en-US" dirty="0"/>
-              <a:t>The example below uses Spanish as a theoretical target language. </a:t>
+              <a:rPr lang="en-US" b="0" dirty="0">
+                <a:solidFill>
+                  <a:srgbClr val="6796E6"/>
+                </a:solidFill>
+                <a:effectLst/>
+                <a:highlight>
+                  <a:srgbClr val="1F1F1F"/>
+                </a:highlight>
+                <a:latin typeface="Menlo" panose="020B0609030804020204" pitchFamily="49" charset="0"/>
+              </a:rPr>
+              <a:t>1.</a:t>
+            </a:r>
+            <a:r>
+              <a:rPr lang="en-US" b="0" dirty="0">
+                <a:solidFill>
+                  <a:srgbClr val="CCCCCC"/>
+                </a:solidFill>
+                <a:effectLst/>
+                <a:highlight>
+                  <a:srgbClr val="1F1F1F"/>
+                </a:highlight>
+                <a:latin typeface="Menlo" panose="020B0609030804020204" pitchFamily="49" charset="0"/>
+              </a:rPr>
+              <a:t> </a:t>
+            </a:r>
+            <a:r>
+              <a:rPr lang="en-US" b="0" i="1" dirty="0">
+                <a:solidFill>
+                  <a:srgbClr val="CCCCCC"/>
+                </a:solidFill>
+                <a:effectLst/>
+                <a:highlight>
+                  <a:srgbClr val="1F1F1F"/>
+                </a:highlight>
+                <a:latin typeface="Menlo" panose="020B0609030804020204" pitchFamily="49" charset="0"/>
+              </a:rPr>
+              <a:t>_Present students with a simulated scenario where a rumor is spreading rapidly._</a:t>
+            </a:r>
+            <a:r>
+              <a:rPr lang="en-US" b="0" dirty="0">
+                <a:solidFill>
+                  <a:srgbClr val="CCCCCC"/>
+                </a:solidFill>
+                <a:effectLst/>
+                <a:highlight>
+                  <a:srgbClr val="1F1F1F"/>
+                </a:highlight>
+                <a:latin typeface="Menlo" panose="020B0609030804020204" pitchFamily="49" charset="0"/>
+              </a:rPr>
+              <a:t> (12 minutes)</a:t>
+            </a:r>
+          </a:p>
+          <a:p>
+            <a:r>
+              <a:rPr lang="en-US" b="0" dirty="0">
+                <a:solidFill>
+                  <a:srgbClr val="6796E6"/>
+                </a:solidFill>
+                <a:effectLst/>
+                <a:highlight>
+                  <a:srgbClr val="1F1F1F"/>
+                </a:highlight>
+                <a:latin typeface="Menlo" panose="020B0609030804020204" pitchFamily="49" charset="0"/>
+              </a:rPr>
+              <a:t>2.</a:t>
+            </a:r>
+            <a:r>
+              <a:rPr lang="en-US" b="0" dirty="0">
+                <a:solidFill>
+                  <a:srgbClr val="CCCCCC"/>
+                </a:solidFill>
+                <a:effectLst/>
+                <a:highlight>
+                  <a:srgbClr val="1F1F1F"/>
+                </a:highlight>
+                <a:latin typeface="Menlo" panose="020B0609030804020204" pitchFamily="49" charset="0"/>
+              </a:rPr>
+              <a:t> Steps: </a:t>
+            </a:r>
+          </a:p>
+          <a:p>
+            <a:pPr lvl="1"/>
+            <a:r>
+              <a:rPr lang="en-US" b="0" dirty="0">
+                <a:solidFill>
+                  <a:srgbClr val="6796E6"/>
+                </a:solidFill>
+                <a:effectLst/>
+                <a:highlight>
+                  <a:srgbClr val="1F1F1F"/>
+                </a:highlight>
+                <a:latin typeface="Menlo" panose="020B0609030804020204" pitchFamily="49" charset="0"/>
+              </a:rPr>
+              <a:t>1.</a:t>
+            </a:r>
+            <a:r>
+              <a:rPr lang="en-US" b="0" dirty="0">
+                <a:solidFill>
+                  <a:srgbClr val="CCCCCC"/>
+                </a:solidFill>
+                <a:effectLst/>
+                <a:highlight>
+                  <a:srgbClr val="1F1F1F"/>
+                </a:highlight>
+                <a:latin typeface="Menlo" panose="020B0609030804020204" pitchFamily="49" charset="0"/>
+              </a:rPr>
+              <a:t> Instruct 3 students to leave the room. Outside of the room the students will be given instruction to spread misinformation about a specific topic.</a:t>
+            </a:r>
+          </a:p>
+          <a:p>
+            <a:pPr lvl="1"/>
+            <a:r>
+              <a:rPr lang="en-US" b="0" dirty="0">
+                <a:solidFill>
+                  <a:srgbClr val="6796E6"/>
+                </a:solidFill>
+                <a:effectLst/>
+                <a:highlight>
+                  <a:srgbClr val="1F1F1F"/>
+                </a:highlight>
+                <a:latin typeface="Menlo" panose="020B0609030804020204" pitchFamily="49" charset="0"/>
+              </a:rPr>
+              <a:t>1.</a:t>
+            </a:r>
+            <a:r>
+              <a:rPr lang="en-US" b="0" dirty="0">
+                <a:solidFill>
+                  <a:srgbClr val="CCCCCC"/>
+                </a:solidFill>
+                <a:effectLst/>
+                <a:highlight>
+                  <a:srgbClr val="1F1F1F"/>
+                </a:highlight>
+                <a:latin typeface="Menlo" panose="020B0609030804020204" pitchFamily="49" charset="0"/>
+              </a:rPr>
+              <a:t> Instruct 1 student to return to the room and and to not leave the room until instructed to do so by the instructor.</a:t>
+            </a:r>
+          </a:p>
+          <a:p>
+            <a:r>
+              <a:rPr lang="en-US" b="0" dirty="0">
+                <a:solidFill>
+                  <a:srgbClr val="6796E6"/>
+                </a:solidFill>
+                <a:effectLst/>
+                <a:highlight>
+                  <a:srgbClr val="1F1F1F"/>
+                </a:highlight>
+                <a:latin typeface="Menlo" panose="020B0609030804020204" pitchFamily="49" charset="0"/>
+              </a:rPr>
+              <a:t>2.</a:t>
+            </a:r>
+            <a:r>
+              <a:rPr lang="en-US" b="0" dirty="0">
+                <a:solidFill>
+                  <a:srgbClr val="CCCCCC"/>
+                </a:solidFill>
+                <a:effectLst/>
+                <a:highlight>
+                  <a:srgbClr val="1F1F1F"/>
+                </a:highlight>
+                <a:latin typeface="Menlo" panose="020B0609030804020204" pitchFamily="49" charset="0"/>
+              </a:rPr>
+              <a:t> Instruct 2 students to go to the common area and begin spreading the misinformation they were given.</a:t>
+            </a:r>
+          </a:p>
+          <a:p>
+            <a:r>
+              <a:rPr lang="en-US" b="0" dirty="0">
+                <a:solidFill>
+                  <a:srgbClr val="6796E6"/>
+                </a:solidFill>
+                <a:effectLst/>
+                <a:highlight>
+                  <a:srgbClr val="1F1F1F"/>
+                </a:highlight>
+                <a:latin typeface="Menlo" panose="020B0609030804020204" pitchFamily="49" charset="0"/>
+              </a:rPr>
+              <a:t>2.</a:t>
+            </a:r>
+            <a:r>
+              <a:rPr lang="en-US" b="0" dirty="0">
+                <a:solidFill>
+                  <a:srgbClr val="CCCCCC"/>
+                </a:solidFill>
+                <a:effectLst/>
+                <a:highlight>
+                  <a:srgbClr val="1F1F1F"/>
+                </a:highlight>
+                <a:latin typeface="Menlo" panose="020B0609030804020204" pitchFamily="49" charset="0"/>
+              </a:rPr>
+              <a:t> The remaining students will be asked about their day and other small talk to create a relaxed environment.</a:t>
+            </a:r>
+          </a:p>
+          <a:p>
+            <a:r>
+              <a:rPr lang="en-US" b="0" dirty="0">
+                <a:solidFill>
+                  <a:srgbClr val="6796E6"/>
+                </a:solidFill>
+                <a:effectLst/>
+                <a:highlight>
+                  <a:srgbClr val="1F1F1F"/>
+                </a:highlight>
+                <a:latin typeface="Menlo" panose="020B0609030804020204" pitchFamily="49" charset="0"/>
+              </a:rPr>
+              <a:t>3.</a:t>
+            </a:r>
+            <a:r>
+              <a:rPr lang="en-US" b="0" dirty="0">
+                <a:solidFill>
+                  <a:srgbClr val="CCCCCC"/>
+                </a:solidFill>
+                <a:effectLst/>
+                <a:highlight>
+                  <a:srgbClr val="1F1F1F"/>
+                </a:highlight>
+                <a:latin typeface="Menlo" panose="020B0609030804020204" pitchFamily="49" charset="0"/>
+              </a:rPr>
+              <a:t> The 3 students will return to the room and begin spreading the misinformation they were given trying to get people to rush out of the room.</a:t>
+            </a:r>
+          </a:p>
+          <a:p>
+            <a:r>
+              <a:rPr lang="en-US" b="0" dirty="0">
+                <a:solidFill>
+                  <a:srgbClr val="6796E6"/>
+                </a:solidFill>
+                <a:effectLst/>
+                <a:highlight>
+                  <a:srgbClr val="1F1F1F"/>
+                </a:highlight>
+                <a:latin typeface="Menlo" panose="020B0609030804020204" pitchFamily="49" charset="0"/>
+              </a:rPr>
+              <a:t>4.</a:t>
+            </a:r>
+            <a:r>
+              <a:rPr lang="en-US" b="0" dirty="0">
+                <a:solidFill>
+                  <a:srgbClr val="CCCCCC"/>
+                </a:solidFill>
+                <a:effectLst/>
+                <a:highlight>
+                  <a:srgbClr val="1F1F1F"/>
+                </a:highlight>
+                <a:latin typeface="Menlo" panose="020B0609030804020204" pitchFamily="49" charset="0"/>
+              </a:rPr>
+              <a:t> Students that leave the room will be caught by an assistant instructor and asked to return to the room to discuss what they experienced.</a:t>
+            </a:r>
+          </a:p>
+          <a:p>
+            <a:r>
+              <a:rPr lang="en-US" b="0" dirty="0">
+                <a:solidFill>
+                  <a:srgbClr val="6796E6"/>
+                </a:solidFill>
+                <a:effectLst/>
+                <a:highlight>
+                  <a:srgbClr val="1F1F1F"/>
+                </a:highlight>
+                <a:latin typeface="Menlo" panose="020B0609030804020204" pitchFamily="49" charset="0"/>
+              </a:rPr>
+              <a:t>3.</a:t>
+            </a:r>
+            <a:r>
+              <a:rPr lang="en-US" b="0" dirty="0">
+                <a:solidFill>
+                  <a:srgbClr val="CCCCCC"/>
+                </a:solidFill>
+                <a:effectLst/>
+                <a:highlight>
+                  <a:srgbClr val="1F1F1F"/>
+                </a:highlight>
+                <a:latin typeface="Menlo" panose="020B0609030804020204" pitchFamily="49" charset="0"/>
+              </a:rPr>
+              <a:t> </a:t>
+            </a:r>
+            <a:r>
+              <a:rPr lang="en-US" b="0" i="1" dirty="0">
+                <a:solidFill>
+                  <a:srgbClr val="CCCCCC"/>
+                </a:solidFill>
+                <a:effectLst/>
+                <a:highlight>
+                  <a:srgbClr val="1F1F1F"/>
+                </a:highlight>
+                <a:latin typeface="Menlo" panose="020B0609030804020204" pitchFamily="49" charset="0"/>
+              </a:rPr>
+              <a:t>_Ask students "What did you observe in the scenario?"_</a:t>
+            </a:r>
+            <a:r>
+              <a:rPr lang="en-US" b="0" dirty="0">
+                <a:solidFill>
+                  <a:srgbClr val="CCCCCC"/>
+                </a:solidFill>
+                <a:effectLst/>
+                <a:highlight>
+                  <a:srgbClr val="1F1F1F"/>
+                </a:highlight>
+                <a:latin typeface="Menlo" panose="020B0609030804020204" pitchFamily="49" charset="0"/>
+              </a:rPr>
+              <a:t> (7 minutes) </a:t>
             </a:r>
           </a:p>
         </p:txBody>
@@ -764,7 +1071,464 @@
     </p:spTree>
     <p:extLst>
       <p:ext uri="{BB962C8B-B14F-4D97-AF65-F5344CB8AC3E}">
+        <p14:creationId xmlns:p14="http://schemas.microsoft.com/office/powerpoint/2010/main" val="1743029316"/>
+      </p:ext>
+    </p:extLst>
+  </p:cSld>
+  <p:clrMapOvr>
+    <a:masterClrMapping/>
+  </p:clrMapOvr>
+</p:notes>
+</file>
+
+<file path=ppt/notesSlides/notesSlide3.xml><?xml version="1.0" encoding="utf-8"?>
+<p:notes xmlns:a="http://schemas.openxmlformats.org/drawingml/2006/main" xmlns:r="http://schemas.openxmlformats.org/officeDocument/2006/relationships" xmlns:p="http://schemas.openxmlformats.org/presentationml/2006/main">
+  <p:cSld>
+    <p:spTree>
+      <p:nvGrpSpPr>
+        <p:cNvPr id="1" name=""/>
+        <p:cNvGrpSpPr/>
+        <p:nvPr/>
+      </p:nvGrpSpPr>
+      <p:grpSpPr>
+        <a:xfrm>
+          <a:off x="0" y="0"/>
+          <a:ext cx="0" cy="0"/>
+          <a:chOff x="0" y="0"/>
+          <a:chExt cx="0" cy="0"/>
+        </a:xfrm>
+      </p:grpSpPr>
+      <p:sp>
+        <p:nvSpPr>
+          <p:cNvPr id="2" name="Slide Image Placeholder 1"/>
+          <p:cNvSpPr>
+            <a:spLocks noGrp="1" noRot="1" noChangeAspect="1"/>
+          </p:cNvSpPr>
+          <p:nvPr>
+            <p:ph type="sldImg"/>
+          </p:nvPr>
+        </p:nvSpPr>
+        <p:spPr>
+          <a:xfrm>
+            <a:off x="382588" y="695325"/>
+            <a:ext cx="6092825" cy="3427413"/>
+          </a:xfrm>
+        </p:spPr>
+      </p:sp>
+      <p:sp>
+        <p:nvSpPr>
+          <p:cNvPr id="3" name="Notes Placeholder 2"/>
+          <p:cNvSpPr>
+            <a:spLocks noGrp="1"/>
+          </p:cNvSpPr>
+          <p:nvPr>
+            <p:ph type="body" idx="1"/>
+          </p:nvPr>
+        </p:nvSpPr>
+        <p:spPr/>
+        <p:txBody>
+          <a:bodyPr/>
+          <a:lstStyle/>
+          <a:p>
+            <a:r>
+              <a:rPr lang="en-US" dirty="0"/>
+              <a:t>Start by creating a slide master that is in English. As needed duplicate and translate slides into target language. Color English slides in Yellow and target language slides in white. </a:t>
+            </a:r>
+            <a:br>
+              <a:rPr lang="en-US" dirty="0"/>
+            </a:br>
+            <a:br>
+              <a:rPr lang="en-US" dirty="0"/>
+            </a:br>
+            <a:r>
+              <a:rPr lang="en-US" dirty="0"/>
+              <a:t>The example below uses Spanish as a theoretical target language. </a:t>
+            </a:r>
+          </a:p>
+        </p:txBody>
+      </p:sp>
+      <p:sp>
+        <p:nvSpPr>
+          <p:cNvPr id="4" name="Slide Number Placeholder 3"/>
+          <p:cNvSpPr>
+            <a:spLocks noGrp="1"/>
+          </p:cNvSpPr>
+          <p:nvPr>
+            <p:ph type="sldNum" idx="8"/>
+          </p:nvPr>
+        </p:nvSpPr>
+        <p:spPr/>
+        <p:txBody>
+          <a:bodyPr/>
+          <a:lstStyle/>
+          <a:p>
+            <a:pPr indent="0" algn="r">
+              <a:buNone/>
+            </a:pPr>
+            <a:fld id="{96D071C0-0F6A-4E5C-B3E5-B824FE66220F}" type="slidenum">
+              <a:rPr lang="en-US" sz="1400" b="0" strike="noStrike" spc="-1" smtClean="0">
+                <a:solidFill>
+                  <a:srgbClr val="000000"/>
+                </a:solidFill>
+                <a:latin typeface="Times New Roman"/>
+              </a:rPr>
+              <a:t>4</a:t>
+            </a:fld>
+            <a:endParaRPr lang="en-US" sz="1400" b="0" strike="noStrike" spc="-1">
+              <a:solidFill>
+                <a:srgbClr val="000000"/>
+              </a:solidFill>
+              <a:latin typeface="Times New Roman"/>
+            </a:endParaRPr>
+          </a:p>
+        </p:txBody>
+      </p:sp>
+    </p:spTree>
+    <p:extLst>
+      <p:ext uri="{BB962C8B-B14F-4D97-AF65-F5344CB8AC3E}">
         <p14:creationId xmlns:p14="http://schemas.microsoft.com/office/powerpoint/2010/main" val="2282271852"/>
+      </p:ext>
+    </p:extLst>
+  </p:cSld>
+  <p:clrMapOvr>
+    <a:masterClrMapping/>
+  </p:clrMapOvr>
+</p:notes>
+</file>
+
+<file path=ppt/notesSlides/notesSlide4.xml><?xml version="1.0" encoding="utf-8"?>
+<p:notes xmlns:a="http://schemas.openxmlformats.org/drawingml/2006/main" xmlns:r="http://schemas.openxmlformats.org/officeDocument/2006/relationships" xmlns:p="http://schemas.openxmlformats.org/presentationml/2006/main">
+  <p:cSld>
+    <p:spTree>
+      <p:nvGrpSpPr>
+        <p:cNvPr id="1" name=""/>
+        <p:cNvGrpSpPr/>
+        <p:nvPr/>
+      </p:nvGrpSpPr>
+      <p:grpSpPr>
+        <a:xfrm>
+          <a:off x="0" y="0"/>
+          <a:ext cx="0" cy="0"/>
+          <a:chOff x="0" y="0"/>
+          <a:chExt cx="0" cy="0"/>
+        </a:xfrm>
+      </p:grpSpPr>
+      <p:sp>
+        <p:nvSpPr>
+          <p:cNvPr id="2" name="Slide Image Placeholder 1"/>
+          <p:cNvSpPr>
+            <a:spLocks noGrp="1" noRot="1" noChangeAspect="1"/>
+          </p:cNvSpPr>
+          <p:nvPr>
+            <p:ph type="sldImg"/>
+          </p:nvPr>
+        </p:nvSpPr>
+        <p:spPr>
+          <a:xfrm>
+            <a:off x="382588" y="695325"/>
+            <a:ext cx="6092825" cy="3427413"/>
+          </a:xfrm>
+        </p:spPr>
+      </p:sp>
+      <p:sp>
+        <p:nvSpPr>
+          <p:cNvPr id="3" name="Notes Placeholder 2"/>
+          <p:cNvSpPr>
+            <a:spLocks noGrp="1"/>
+          </p:cNvSpPr>
+          <p:nvPr>
+            <p:ph type="body" idx="1"/>
+          </p:nvPr>
+        </p:nvSpPr>
+        <p:spPr/>
+        <p:txBody>
+          <a:bodyPr/>
+          <a:lstStyle/>
+          <a:p>
+            <a:r>
+              <a:rPr lang="en-US" sz="1200" b="1" dirty="0">
+                <a:effectLst/>
+                <a:latin typeface="Arial" panose="020B0604020202020204" pitchFamily="34" charset="0"/>
+              </a:rPr>
+              <a:t>How We'll Do It: </a:t>
+            </a:r>
+            <a:r>
+              <a:rPr lang="en-US" sz="1200" dirty="0">
+                <a:effectLst/>
+                <a:latin typeface="ArialMT"/>
+              </a:rPr>
+              <a:t>By sharing your experiences and expertise, we'll develop and implement counter strategies.</a:t>
+            </a:r>
+          </a:p>
+          <a:p>
+            <a:r>
+              <a:rPr lang="en-US" sz="1200" b="1" dirty="0">
+                <a:effectLst/>
+                <a:latin typeface="Arial" panose="020B0604020202020204" pitchFamily="34" charset="0"/>
+              </a:rPr>
+              <a:t>What You'll Have: </a:t>
+            </a:r>
+            <a:r>
+              <a:rPr lang="en-US" sz="1200" dirty="0">
+                <a:effectLst/>
+                <a:latin typeface="ArialMT"/>
+              </a:rPr>
+              <a:t>The skills to counter misinformation and disinformation, ensuring accurate information is spread and false information is reduced by 80%. </a:t>
+            </a:r>
+            <a:endParaRPr lang="en-US" dirty="0"/>
+          </a:p>
+          <a:p>
+            <a:endParaRPr lang="en-US" dirty="0"/>
+          </a:p>
+        </p:txBody>
+      </p:sp>
+      <p:sp>
+        <p:nvSpPr>
+          <p:cNvPr id="4" name="Slide Number Placeholder 3"/>
+          <p:cNvSpPr>
+            <a:spLocks noGrp="1"/>
+          </p:cNvSpPr>
+          <p:nvPr>
+            <p:ph type="sldNum" idx="8"/>
+          </p:nvPr>
+        </p:nvSpPr>
+        <p:spPr/>
+        <p:txBody>
+          <a:bodyPr/>
+          <a:lstStyle/>
+          <a:p>
+            <a:pPr indent="0" algn="r">
+              <a:buNone/>
+            </a:pPr>
+            <a:fld id="{96D071C0-0F6A-4E5C-B3E5-B824FE66220F}" type="slidenum">
+              <a:rPr lang="en-US" sz="1400" b="0" strike="noStrike" spc="-1" smtClean="0">
+                <a:solidFill>
+                  <a:srgbClr val="000000"/>
+                </a:solidFill>
+                <a:latin typeface="Times New Roman"/>
+              </a:rPr>
+              <a:t>5</a:t>
+            </a:fld>
+            <a:endParaRPr lang="en-US" sz="1400" b="0" strike="noStrike" spc="-1">
+              <a:solidFill>
+                <a:srgbClr val="000000"/>
+              </a:solidFill>
+              <a:latin typeface="Times New Roman"/>
+            </a:endParaRPr>
+          </a:p>
+        </p:txBody>
+      </p:sp>
+    </p:spTree>
+    <p:extLst>
+      <p:ext uri="{BB962C8B-B14F-4D97-AF65-F5344CB8AC3E}">
+        <p14:creationId xmlns:p14="http://schemas.microsoft.com/office/powerpoint/2010/main" val="3297278724"/>
+      </p:ext>
+    </p:extLst>
+  </p:cSld>
+  <p:clrMapOvr>
+    <a:masterClrMapping/>
+  </p:clrMapOvr>
+</p:notes>
+</file>
+
+<file path=ppt/notesSlides/notesSlide5.xml><?xml version="1.0" encoding="utf-8"?>
+<p:notes xmlns:a="http://schemas.openxmlformats.org/drawingml/2006/main" xmlns:r="http://schemas.openxmlformats.org/officeDocument/2006/relationships" xmlns:p="http://schemas.openxmlformats.org/presentationml/2006/main">
+  <p:cSld>
+    <p:spTree>
+      <p:nvGrpSpPr>
+        <p:cNvPr id="1" name=""/>
+        <p:cNvGrpSpPr/>
+        <p:nvPr/>
+      </p:nvGrpSpPr>
+      <p:grpSpPr>
+        <a:xfrm>
+          <a:off x="0" y="0"/>
+          <a:ext cx="0" cy="0"/>
+          <a:chOff x="0" y="0"/>
+          <a:chExt cx="0" cy="0"/>
+        </a:xfrm>
+      </p:grpSpPr>
+      <p:sp>
+        <p:nvSpPr>
+          <p:cNvPr id="2" name="Slide Image Placeholder 1"/>
+          <p:cNvSpPr>
+            <a:spLocks noGrp="1" noRot="1" noChangeAspect="1"/>
+          </p:cNvSpPr>
+          <p:nvPr>
+            <p:ph type="sldImg"/>
+          </p:nvPr>
+        </p:nvSpPr>
+        <p:spPr>
+          <a:xfrm>
+            <a:off x="382588" y="695325"/>
+            <a:ext cx="6092825" cy="3427413"/>
+          </a:xfrm>
+        </p:spPr>
+      </p:sp>
+      <p:sp>
+        <p:nvSpPr>
+          <p:cNvPr id="3" name="Notes Placeholder 2"/>
+          <p:cNvSpPr>
+            <a:spLocks noGrp="1"/>
+          </p:cNvSpPr>
+          <p:nvPr>
+            <p:ph type="body" idx="1"/>
+          </p:nvPr>
+        </p:nvSpPr>
+        <p:spPr/>
+        <p:txBody>
+          <a:bodyPr/>
+          <a:lstStyle/>
+          <a:p>
+            <a:r>
+              <a:rPr lang="en-US" dirty="0"/>
+              <a:t>This is a brain storming session where ideas should be brought by students. Instructor should help students refine their goals by asking appropriate questions about would that goal help you achieve your greater organization and mission goals. </a:t>
+            </a:r>
+          </a:p>
+        </p:txBody>
+      </p:sp>
+      <p:sp>
+        <p:nvSpPr>
+          <p:cNvPr id="4" name="Slide Number Placeholder 3"/>
+          <p:cNvSpPr>
+            <a:spLocks noGrp="1"/>
+          </p:cNvSpPr>
+          <p:nvPr>
+            <p:ph type="sldNum" idx="8"/>
+          </p:nvPr>
+        </p:nvSpPr>
+        <p:spPr/>
+        <p:txBody>
+          <a:bodyPr/>
+          <a:lstStyle/>
+          <a:p>
+            <a:pPr indent="0" algn="r">
+              <a:buNone/>
+            </a:pPr>
+            <a:fld id="{96D071C0-0F6A-4E5C-B3E5-B824FE66220F}" type="slidenum">
+              <a:rPr lang="en-US" sz="1400" b="0" strike="noStrike" spc="-1" smtClean="0">
+                <a:solidFill>
+                  <a:srgbClr val="000000"/>
+                </a:solidFill>
+                <a:latin typeface="Times New Roman"/>
+              </a:rPr>
+              <a:t>6</a:t>
+            </a:fld>
+            <a:endParaRPr lang="en-US" sz="1400" b="0" strike="noStrike" spc="-1">
+              <a:solidFill>
+                <a:srgbClr val="000000"/>
+              </a:solidFill>
+              <a:latin typeface="Times New Roman"/>
+            </a:endParaRPr>
+          </a:p>
+        </p:txBody>
+      </p:sp>
+    </p:spTree>
+    <p:extLst>
+      <p:ext uri="{BB962C8B-B14F-4D97-AF65-F5344CB8AC3E}">
+        <p14:creationId xmlns:p14="http://schemas.microsoft.com/office/powerpoint/2010/main" val="2749563859"/>
+      </p:ext>
+    </p:extLst>
+  </p:cSld>
+  <p:clrMapOvr>
+    <a:masterClrMapping/>
+  </p:clrMapOvr>
+</p:notes>
+</file>
+
+<file path=ppt/notesSlides/notesSlide6.xml><?xml version="1.0" encoding="utf-8"?>
+<p:notes xmlns:a="http://schemas.openxmlformats.org/drawingml/2006/main" xmlns:r="http://schemas.openxmlformats.org/officeDocument/2006/relationships" xmlns:p="http://schemas.openxmlformats.org/presentationml/2006/main">
+  <p:cSld>
+    <p:spTree>
+      <p:nvGrpSpPr>
+        <p:cNvPr id="1" name=""/>
+        <p:cNvGrpSpPr/>
+        <p:nvPr/>
+      </p:nvGrpSpPr>
+      <p:grpSpPr>
+        <a:xfrm>
+          <a:off x="0" y="0"/>
+          <a:ext cx="0" cy="0"/>
+          <a:chOff x="0" y="0"/>
+          <a:chExt cx="0" cy="0"/>
+        </a:xfrm>
+      </p:grpSpPr>
+      <p:sp>
+        <p:nvSpPr>
+          <p:cNvPr id="2" name="Slide Image Placeholder 1"/>
+          <p:cNvSpPr>
+            <a:spLocks noGrp="1" noRot="1" noChangeAspect="1"/>
+          </p:cNvSpPr>
+          <p:nvPr>
+            <p:ph type="sldImg"/>
+          </p:nvPr>
+        </p:nvSpPr>
+        <p:spPr>
+          <a:xfrm>
+            <a:off x="382588" y="695325"/>
+            <a:ext cx="6092825" cy="3427413"/>
+          </a:xfrm>
+        </p:spPr>
+      </p:sp>
+      <p:sp>
+        <p:nvSpPr>
+          <p:cNvPr id="3" name="Notes Placeholder 2"/>
+          <p:cNvSpPr>
+            <a:spLocks noGrp="1"/>
+          </p:cNvSpPr>
+          <p:nvPr>
+            <p:ph type="body" idx="1"/>
+          </p:nvPr>
+        </p:nvSpPr>
+        <p:spPr/>
+        <p:txBody>
+          <a:bodyPr/>
+          <a:lstStyle/>
+          <a:p>
+            <a:endParaRPr lang="en-US" dirty="0"/>
+          </a:p>
+        </p:txBody>
+      </p:sp>
+      <p:sp>
+        <p:nvSpPr>
+          <p:cNvPr id="4" name="Slide Number Placeholder 3"/>
+          <p:cNvSpPr>
+            <a:spLocks noGrp="1"/>
+          </p:cNvSpPr>
+          <p:nvPr>
+            <p:ph type="sldNum" idx="8"/>
+          </p:nvPr>
+        </p:nvSpPr>
+        <p:spPr/>
+        <p:txBody>
+          <a:bodyPr/>
+          <a:lstStyle/>
+          <a:p>
+            <a:pPr indent="0" algn="r">
+              <a:buNone/>
+            </a:pPr>
+            <a:fld id="{96D071C0-0F6A-4E5C-B3E5-B824FE66220F}" type="slidenum">
+              <a:rPr lang="en-US" sz="1400" b="0" strike="noStrike" spc="-1" smtClean="0">
+                <a:solidFill>
+                  <a:srgbClr val="000000"/>
+                </a:solidFill>
+                <a:latin typeface="Times New Roman"/>
+              </a:rPr>
+              <a:t>13</a:t>
+            </a:fld>
+            <a:endParaRPr lang="en-US" sz="1400" b="0" strike="noStrike" spc="-1">
+              <a:solidFill>
+                <a:srgbClr val="000000"/>
+              </a:solidFill>
+              <a:latin typeface="Times New Roman"/>
+            </a:endParaRPr>
+          </a:p>
+        </p:txBody>
+      </p:sp>
+    </p:spTree>
+    <p:extLst>
+      <p:ext uri="{BB962C8B-B14F-4D97-AF65-F5344CB8AC3E}">
+        <p14:creationId xmlns:p14="http://schemas.microsoft.com/office/powerpoint/2010/main" val="4240478554"/>
       </p:ext>
     </p:extLst>
   </p:cSld>
@@ -921,7 +1685,7 @@
           <a:p>
             <a:fld id="{19E3F066-8095-7A47-8BBF-FB45577C0028}" type="datetimeFigureOut">
               <a:rPr lang="en-US" smtClean="0"/>
-              <a:t>6/19/24</a:t>
+              <a:t>6/23/24</a:t>
             </a:fld>
             <a:endParaRPr lang="en-US"/>
           </a:p>
@@ -1119,7 +1883,7 @@
           <a:p>
             <a:fld id="{19E3F066-8095-7A47-8BBF-FB45577C0028}" type="datetimeFigureOut">
               <a:rPr lang="en-US" smtClean="0"/>
-              <a:t>6/19/24</a:t>
+              <a:t>6/23/24</a:t>
             </a:fld>
             <a:endParaRPr lang="en-US"/>
           </a:p>
@@ -1327,7 +2091,7 @@
           <a:p>
             <a:fld id="{19E3F066-8095-7A47-8BBF-FB45577C0028}" type="datetimeFigureOut">
               <a:rPr lang="en-US" smtClean="0"/>
-              <a:t>6/19/24</a:t>
+              <a:t>6/23/24</a:t>
             </a:fld>
             <a:endParaRPr lang="en-US"/>
           </a:p>
@@ -1977,7 +2741,7 @@
           <a:p>
             <a:fld id="{19E3F066-8095-7A47-8BBF-FB45577C0028}" type="datetimeFigureOut">
               <a:rPr lang="en-US" smtClean="0"/>
-              <a:t>6/19/24</a:t>
+              <a:t>6/23/24</a:t>
             </a:fld>
             <a:endParaRPr lang="en-US"/>
           </a:p>
@@ -2252,7 +3016,7 @@
           <a:p>
             <a:fld id="{19E3F066-8095-7A47-8BBF-FB45577C0028}" type="datetimeFigureOut">
               <a:rPr lang="en-US" smtClean="0"/>
-              <a:t>6/19/24</a:t>
+              <a:t>6/23/24</a:t>
             </a:fld>
             <a:endParaRPr lang="en-US"/>
           </a:p>
@@ -2517,7 +3281,7 @@
           <a:p>
             <a:fld id="{19E3F066-8095-7A47-8BBF-FB45577C0028}" type="datetimeFigureOut">
               <a:rPr lang="en-US" smtClean="0"/>
-              <a:t>6/19/24</a:t>
+              <a:t>6/23/24</a:t>
             </a:fld>
             <a:endParaRPr lang="en-US"/>
           </a:p>
@@ -2929,7 +3693,7 @@
           <a:p>
             <a:fld id="{19E3F066-8095-7A47-8BBF-FB45577C0028}" type="datetimeFigureOut">
               <a:rPr lang="en-US" smtClean="0"/>
-              <a:t>6/19/24</a:t>
+              <a:t>6/23/24</a:t>
             </a:fld>
             <a:endParaRPr lang="en-US"/>
           </a:p>
@@ -3070,7 +3834,7 @@
           <a:p>
             <a:fld id="{19E3F066-8095-7A47-8BBF-FB45577C0028}" type="datetimeFigureOut">
               <a:rPr lang="en-US" smtClean="0"/>
-              <a:t>6/19/24</a:t>
+              <a:t>6/23/24</a:t>
             </a:fld>
             <a:endParaRPr lang="en-US"/>
           </a:p>
@@ -3183,7 +3947,7 @@
           <a:p>
             <a:fld id="{19E3F066-8095-7A47-8BBF-FB45577C0028}" type="datetimeFigureOut">
               <a:rPr lang="en-US" smtClean="0"/>
-              <a:t>6/19/24</a:t>
+              <a:t>6/23/24</a:t>
             </a:fld>
             <a:endParaRPr lang="en-US"/>
           </a:p>
@@ -3494,7 +4258,7 @@
           <a:p>
             <a:fld id="{19E3F066-8095-7A47-8BBF-FB45577C0028}" type="datetimeFigureOut">
               <a:rPr lang="en-US" smtClean="0"/>
-              <a:t>6/19/24</a:t>
+              <a:t>6/23/24</a:t>
             </a:fld>
             <a:endParaRPr lang="en-US"/>
           </a:p>
@@ -3782,7 +4546,7 @@
           <a:p>
             <a:fld id="{19E3F066-8095-7A47-8BBF-FB45577C0028}" type="datetimeFigureOut">
               <a:rPr lang="en-US" smtClean="0"/>
-              <a:t>6/19/24</a:t>
+              <a:t>6/23/24</a:t>
             </a:fld>
             <a:endParaRPr lang="en-US"/>
           </a:p>
@@ -4023,7 +4787,7 @@
           <a:p>
             <a:fld id="{19E3F066-8095-7A47-8BBF-FB45577C0028}" type="datetimeFigureOut">
               <a:rPr lang="en-US" smtClean="0"/>
-              <a:t>6/19/24</a:t>
+              <a:t>6/23/24</a:t>
             </a:fld>
             <a:endParaRPr lang="en-US"/>
           </a:p>
@@ -4488,7 +5252,7 @@
           <a:p>
             <a:fld id="{9530ACA4-BD8C-D448-95CA-FC1634E9A82C}" type="datetimeFigureOut">
               <a:rPr lang="en-US" smtClean="0"/>
-              <a:t>6/19/24</a:t>
+              <a:t>6/23/24</a:t>
             </a:fld>
             <a:endParaRPr lang="en-US"/>
           </a:p>
@@ -4938,7 +5702,7 @@
                 <a:latin typeface="Arial" panose="020B0604020202020204" pitchFamily="34" charset="0"/>
                 <a:cs typeface="Arial" panose="020B0604020202020204" pitchFamily="34" charset="0"/>
               </a:rPr>
-              <a:t>{Lesson}</a:t>
+              <a:t>Countering Malign Information</a:t>
             </a:r>
           </a:p>
           <a:p>
@@ -5015,7 +5779,7 @@
           </a:ln>
           <a:extLst>
             <a:ext uri="{C572A759-6A51-4108-AA02-DFA0A04FC94B}">
-              <ma14:wrappingTextBoxFlag xmlns:ma14="http://schemas.microsoft.com/office/mac/drawingml/2011/main" xmlns:a14="http://schemas.microsoft.com/office/drawing/2010/main" xmlns:m="http://schemas.openxmlformats.org/officeDocument/2006/math" xmlns="" val="1"/>
+              <ma14:wrappingTextBoxFlag xmlns="" xmlns:m="http://schemas.openxmlformats.org/officeDocument/2006/math" xmlns:a14="http://schemas.microsoft.com/office/drawing/2010/main" xmlns:ma14="http://schemas.microsoft.com/office/mac/drawingml/2011/main" val="1"/>
             </a:ext>
           </a:extLst>
         </p:spPr>
@@ -5062,7 +5826,7 @@
           </a:ln>
           <a:extLst>
             <a:ext uri="{C572A759-6A51-4108-AA02-DFA0A04FC94B}">
-              <ma14:wrappingTextBoxFlag xmlns:ma14="http://schemas.microsoft.com/office/mac/drawingml/2011/main" xmlns:a14="http://schemas.microsoft.com/office/drawing/2010/main" xmlns:m="http://schemas.openxmlformats.org/officeDocument/2006/math" xmlns="" val="1"/>
+              <ma14:wrappingTextBoxFlag xmlns="" xmlns:m="http://schemas.openxmlformats.org/officeDocument/2006/math" xmlns:a14="http://schemas.microsoft.com/office/drawing/2010/main" xmlns:ma14="http://schemas.microsoft.com/office/mac/drawingml/2011/main" val="1"/>
             </a:ext>
           </a:extLst>
         </p:spPr>
@@ -5109,7 +5873,7 @@
           </a:ln>
           <a:extLst>
             <a:ext uri="{C572A759-6A51-4108-AA02-DFA0A04FC94B}">
-              <ma14:wrappingTextBoxFlag xmlns:ma14="http://schemas.microsoft.com/office/mac/drawingml/2011/main" xmlns:a14="http://schemas.microsoft.com/office/drawing/2010/main" xmlns:m="http://schemas.openxmlformats.org/officeDocument/2006/math" xmlns="" val="1"/>
+              <ma14:wrappingTextBoxFlag xmlns="" xmlns:m="http://schemas.openxmlformats.org/officeDocument/2006/math" xmlns:a14="http://schemas.microsoft.com/office/drawing/2010/main" xmlns:ma14="http://schemas.microsoft.com/office/mac/drawingml/2011/main" val="1"/>
             </a:ext>
           </a:extLst>
         </p:spPr>
@@ -5156,7 +5920,7 @@
           </a:ln>
           <a:extLst>
             <a:ext uri="{C572A759-6A51-4108-AA02-DFA0A04FC94B}">
-              <ma14:wrappingTextBoxFlag xmlns:ma14="http://schemas.microsoft.com/office/mac/drawingml/2011/main" xmlns:a14="http://schemas.microsoft.com/office/drawing/2010/main" xmlns:m="http://schemas.openxmlformats.org/officeDocument/2006/math" xmlns="" val="1"/>
+              <ma14:wrappingTextBoxFlag xmlns="" xmlns:m="http://schemas.openxmlformats.org/officeDocument/2006/math" xmlns:a14="http://schemas.microsoft.com/office/drawing/2010/main" xmlns:ma14="http://schemas.microsoft.com/office/mac/drawingml/2011/main" val="1"/>
             </a:ext>
           </a:extLst>
         </p:spPr>
@@ -5178,6 +5942,1254 @@
     <p:extLst>
       <p:ext uri="{BB962C8B-B14F-4D97-AF65-F5344CB8AC3E}">
         <p14:creationId xmlns:p14="http://schemas.microsoft.com/office/powerpoint/2010/main" val="1561663183"/>
+      </p:ext>
+    </p:extLst>
+  </p:cSld>
+  <p:clrMapOvr>
+    <a:masterClrMapping/>
+  </p:clrMapOvr>
+</p:sld>
+</file>
+
+<file path=ppt/slides/slide10.xml><?xml version="1.0" encoding="utf-8"?>
+<p:sld xmlns:a="http://schemas.openxmlformats.org/drawingml/2006/main" xmlns:r="http://schemas.openxmlformats.org/officeDocument/2006/relationships" xmlns:p="http://schemas.openxmlformats.org/presentationml/2006/main">
+  <p:cSld>
+    <p:spTree>
+      <p:nvGrpSpPr>
+        <p:cNvPr id="1" name=""/>
+        <p:cNvGrpSpPr/>
+        <p:nvPr/>
+      </p:nvGrpSpPr>
+      <p:grpSpPr>
+        <a:xfrm>
+          <a:off x="0" y="0"/>
+          <a:ext cx="0" cy="0"/>
+          <a:chOff x="0" y="0"/>
+          <a:chExt cx="0" cy="0"/>
+        </a:xfrm>
+      </p:grpSpPr>
+      <p:sp>
+        <p:nvSpPr>
+          <p:cNvPr id="2" name="Title 1">
+            <a:extLst>
+              <a:ext uri="{FF2B5EF4-FFF2-40B4-BE49-F238E27FC236}">
+                <a16:creationId xmlns:a16="http://schemas.microsoft.com/office/drawing/2014/main" id="{0E7CCAEB-D84E-456D-3B6B-2E9573C73F98}"/>
+              </a:ext>
+            </a:extLst>
+          </p:cNvPr>
+          <p:cNvSpPr>
+            <a:spLocks noGrp="1"/>
+          </p:cNvSpPr>
+          <p:nvPr>
+            <p:ph type="title"/>
+          </p:nvPr>
+        </p:nvSpPr>
+        <p:spPr/>
+        <p:txBody>
+          <a:bodyPr/>
+          <a:lstStyle/>
+          <a:p>
+            <a:r>
+              <a:rPr lang="en-US" dirty="0"/>
+              <a:t>Presenting Strategies (30 Minutes)</a:t>
+            </a:r>
+          </a:p>
+        </p:txBody>
+      </p:sp>
+      <p:sp>
+        <p:nvSpPr>
+          <p:cNvPr id="3" name="Content Placeholder 2">
+            <a:extLst>
+              <a:ext uri="{FF2B5EF4-FFF2-40B4-BE49-F238E27FC236}">
+                <a16:creationId xmlns:a16="http://schemas.microsoft.com/office/drawing/2014/main" id="{0A5EC664-EFAD-501E-02EA-4124C835D47B}"/>
+              </a:ext>
+            </a:extLst>
+          </p:cNvPr>
+          <p:cNvSpPr>
+            <a:spLocks noGrp="1"/>
+          </p:cNvSpPr>
+          <p:nvPr>
+            <p:ph idx="1"/>
+          </p:nvPr>
+        </p:nvSpPr>
+        <p:spPr/>
+        <p:txBody>
+          <a:bodyPr/>
+          <a:lstStyle/>
+          <a:p>
+            <a:r>
+              <a:rPr lang="en-US" dirty="0"/>
+              <a:t>Present your developed counter strategy to the class.</a:t>
+            </a:r>
+          </a:p>
+          <a:p>
+            <a:r>
+              <a:rPr lang="en-US" dirty="0"/>
+              <a:t>Discuss the strengths and weaknesses of each strategy.</a:t>
+            </a:r>
+          </a:p>
+        </p:txBody>
+      </p:sp>
+    </p:spTree>
+    <p:extLst>
+      <p:ext uri="{BB962C8B-B14F-4D97-AF65-F5344CB8AC3E}">
+        <p14:creationId xmlns:p14="http://schemas.microsoft.com/office/powerpoint/2010/main" val="1013176652"/>
+      </p:ext>
+    </p:extLst>
+  </p:cSld>
+  <p:clrMapOvr>
+    <a:masterClrMapping/>
+  </p:clrMapOvr>
+</p:sld>
+</file>
+
+<file path=ppt/slides/slide11.xml><?xml version="1.0" encoding="utf-8"?>
+<p:sld xmlns:a="http://schemas.openxmlformats.org/drawingml/2006/main" xmlns:r="http://schemas.openxmlformats.org/officeDocument/2006/relationships" xmlns:p="http://schemas.openxmlformats.org/presentationml/2006/main">
+  <p:cSld>
+    <p:spTree>
+      <p:nvGrpSpPr>
+        <p:cNvPr id="1" name=""/>
+        <p:cNvGrpSpPr/>
+        <p:nvPr/>
+      </p:nvGrpSpPr>
+      <p:grpSpPr>
+        <a:xfrm>
+          <a:off x="0" y="0"/>
+          <a:ext cx="0" cy="0"/>
+          <a:chOff x="0" y="0"/>
+          <a:chExt cx="0" cy="0"/>
+        </a:xfrm>
+      </p:grpSpPr>
+      <p:sp>
+        <p:nvSpPr>
+          <p:cNvPr id="193" name="Title 2"/>
+          <p:cNvSpPr txBox="1">
+            <a:spLocks noGrp="1"/>
+          </p:cNvSpPr>
+          <p:nvPr>
+            <p:ph type="title" idx="4294967295"/>
+          </p:nvPr>
+        </p:nvSpPr>
+        <p:spPr>
+          <a:xfrm>
+            <a:off x="2154607" y="2531859"/>
+            <a:ext cx="3658054" cy="1786516"/>
+          </a:xfrm>
+          <a:prstGeom prst="rect">
+            <a:avLst/>
+          </a:prstGeom>
+        </p:spPr>
+        <p:txBody>
+          <a:bodyPr anchor="t"/>
+          <a:lstStyle>
+            <a:lvl1pPr>
+              <a:defRPr sz="4800" b="0">
+                <a:solidFill>
+                  <a:srgbClr val="44546A"/>
+                </a:solidFill>
+                <a:latin typeface="Calibri Light"/>
+                <a:ea typeface="Calibri Light"/>
+                <a:cs typeface="Calibri Light"/>
+                <a:sym typeface="Calibri Light"/>
+              </a:defRPr>
+            </a:lvl1pPr>
+          </a:lstStyle>
+          <a:p>
+            <a:r>
+              <a:t>TAKE A BREAK</a:t>
+            </a:r>
+          </a:p>
+        </p:txBody>
+      </p:sp>
+      <p:pic>
+        <p:nvPicPr>
+          <p:cNvPr id="194" name="Graphic 13" descr="Graphic 13"/>
+          <p:cNvPicPr>
+            <a:picLocks noChangeAspect="1"/>
+          </p:cNvPicPr>
+          <p:nvPr/>
+        </p:nvPicPr>
+        <p:blipFill>
+          <a:blip r:embed="rId2"/>
+          <a:stretch>
+            <a:fillRect/>
+          </a:stretch>
+        </p:blipFill>
+        <p:spPr>
+          <a:xfrm>
+            <a:off x="6379342" y="-259377"/>
+            <a:ext cx="5029201" cy="5029201"/>
+          </a:xfrm>
+          <a:prstGeom prst="rect">
+            <a:avLst/>
+          </a:prstGeom>
+          <a:ln w="12700">
+            <a:miter lim="400000"/>
+          </a:ln>
+        </p:spPr>
+      </p:pic>
+      <p:sp>
+        <p:nvSpPr>
+          <p:cNvPr id="195" name="TextBox 1"/>
+          <p:cNvSpPr txBox="1"/>
+          <p:nvPr/>
+        </p:nvSpPr>
+        <p:spPr>
+          <a:xfrm>
+            <a:off x="3715415" y="5405718"/>
+            <a:ext cx="3986136" cy="634118"/>
+          </a:xfrm>
+          <a:prstGeom prst="rect">
+            <a:avLst/>
+          </a:prstGeom>
+          <a:ln w="12700">
+            <a:miter lim="400000"/>
+          </a:ln>
+          <a:extLst>
+            <a:ext uri="{C572A759-6A51-4108-AA02-DFA0A04FC94B}">
+              <ma14:wrappingTextBoxFlag xmlns="" xmlns:m="http://schemas.openxmlformats.org/officeDocument/2006/math" xmlns:a14="http://schemas.microsoft.com/office/drawing/2010/main" xmlns:ma14="http://schemas.microsoft.com/office/mac/drawingml/2011/main" val="1"/>
+            </a:ext>
+          </a:extLst>
+        </p:spPr>
+        <p:txBody>
+          <a:bodyPr wrap="none" lIns="45719" rIns="45719">
+            <a:spAutoFit/>
+          </a:bodyPr>
+          <a:lstStyle>
+            <a:lvl1pPr>
+              <a:defRPr sz="4200" b="1"/>
+            </a:lvl1pPr>
+          </a:lstStyle>
+          <a:p>
+            <a:r>
+              <a:t>Return By: XX:XX </a:t>
+            </a:r>
+          </a:p>
+        </p:txBody>
+      </p:sp>
+      <p:sp>
+        <p:nvSpPr>
+          <p:cNvPr id="196" name="Slide Number"/>
+          <p:cNvSpPr txBox="1">
+            <a:spLocks noGrp="1"/>
+          </p:cNvSpPr>
+          <p:nvPr>
+            <p:ph type="sldNum" sz="quarter" idx="2"/>
+          </p:nvPr>
+        </p:nvSpPr>
+        <p:spPr>
+          <a:prstGeom prst="rect">
+            <a:avLst/>
+          </a:prstGeom>
+          <a:extLst>
+            <a:ext uri="{C572A759-6A51-4108-AA02-DFA0A04FC94B}">
+              <ma14:wrappingTextBoxFlag xmlns="" xmlns:m="http://schemas.openxmlformats.org/officeDocument/2006/math" xmlns:a14="http://schemas.microsoft.com/office/drawing/2010/main" xmlns:ma14="http://schemas.microsoft.com/office/mac/drawingml/2011/main" val="1"/>
+            </a:ext>
+          </a:extLst>
+        </p:spPr>
+        <p:txBody>
+          <a:bodyPr/>
+          <a:lstStyle/>
+          <a:p>
+            <a:fld id="{86CB4B4D-7CA3-9044-876B-883B54F8677D}" type="slidenum">
+              <a:rPr/>
+              <a:t>11</a:t>
+            </a:fld>
+            <a:endParaRPr/>
+          </a:p>
+        </p:txBody>
+      </p:sp>
+    </p:spTree>
+    <p:extLst>
+      <p:ext uri="{BB962C8B-B14F-4D97-AF65-F5344CB8AC3E}">
+        <p14:creationId xmlns:p14="http://schemas.microsoft.com/office/powerpoint/2010/main" val="984507533"/>
+      </p:ext>
+    </p:extLst>
+  </p:cSld>
+  <p:clrMapOvr>
+    <a:masterClrMapping/>
+  </p:clrMapOvr>
+  <mc:AlternateContent xmlns:mc="http://schemas.openxmlformats.org/markup-compatibility/2006" xmlns:p14="http://schemas.microsoft.com/office/powerpoint/2010/main">
+    <mc:Choice Requires="p14">
+      <p:transition spd="slow" p14:dur="1200">
+        <p:push dir="u"/>
+      </p:transition>
+    </mc:Choice>
+    <mc:Fallback xmlns="" xmlns:m="http://schemas.openxmlformats.org/officeDocument/2006/math" xmlns:a14="http://schemas.microsoft.com/office/drawing/2010/main">
+      <p:transition spd="slow">
+        <p:fade/>
+      </p:transition>
+    </mc:Fallback>
+  </mc:AlternateContent>
+</p:sld>
+</file>
+
+<file path=ppt/slides/slide12.xml><?xml version="1.0" encoding="utf-8"?>
+<p:sld xmlns:a="http://schemas.openxmlformats.org/drawingml/2006/main" xmlns:r="http://schemas.openxmlformats.org/officeDocument/2006/relationships" xmlns:p="http://schemas.openxmlformats.org/presentationml/2006/main">
+  <p:cSld>
+    <p:spTree>
+      <p:nvGrpSpPr>
+        <p:cNvPr id="1" name=""/>
+        <p:cNvGrpSpPr/>
+        <p:nvPr/>
+      </p:nvGrpSpPr>
+      <p:grpSpPr>
+        <a:xfrm>
+          <a:off x="0" y="0"/>
+          <a:ext cx="0" cy="0"/>
+          <a:chOff x="0" y="0"/>
+          <a:chExt cx="0" cy="0"/>
+        </a:xfrm>
+      </p:grpSpPr>
+      <p:sp>
+        <p:nvSpPr>
+          <p:cNvPr id="198" name="Title 2"/>
+          <p:cNvSpPr txBox="1">
+            <a:spLocks noGrp="1"/>
+          </p:cNvSpPr>
+          <p:nvPr>
+            <p:ph type="title" idx="4294967295"/>
+          </p:nvPr>
+        </p:nvSpPr>
+        <p:spPr>
+          <a:xfrm>
+            <a:off x="2154607" y="2531859"/>
+            <a:ext cx="3658054" cy="1786516"/>
+          </a:xfrm>
+          <a:prstGeom prst="rect">
+            <a:avLst/>
+          </a:prstGeom>
+        </p:spPr>
+        <p:txBody>
+          <a:bodyPr anchor="t"/>
+          <a:lstStyle>
+            <a:lvl1pPr>
+              <a:defRPr sz="4800" b="0">
+                <a:solidFill>
+                  <a:srgbClr val="44546A"/>
+                </a:solidFill>
+                <a:latin typeface="Calibri Light"/>
+                <a:ea typeface="Calibri Light"/>
+                <a:cs typeface="Calibri Light"/>
+                <a:sym typeface="Calibri Light"/>
+              </a:defRPr>
+            </a:lvl1pPr>
+          </a:lstStyle>
+          <a:p>
+            <a:r>
+              <a:t>TOMAR UN DESCANSO</a:t>
+            </a:r>
+          </a:p>
+        </p:txBody>
+      </p:sp>
+      <p:pic>
+        <p:nvPicPr>
+          <p:cNvPr id="199" name="Graphic 13" descr="Graphic 13"/>
+          <p:cNvPicPr>
+            <a:picLocks noChangeAspect="1"/>
+          </p:cNvPicPr>
+          <p:nvPr/>
+        </p:nvPicPr>
+        <p:blipFill>
+          <a:blip r:embed="rId2"/>
+          <a:stretch>
+            <a:fillRect/>
+          </a:stretch>
+        </p:blipFill>
+        <p:spPr>
+          <a:xfrm>
+            <a:off x="6379342" y="-259377"/>
+            <a:ext cx="5029201" cy="5029201"/>
+          </a:xfrm>
+          <a:prstGeom prst="rect">
+            <a:avLst/>
+          </a:prstGeom>
+          <a:ln w="12700">
+            <a:miter lim="400000"/>
+          </a:ln>
+        </p:spPr>
+      </p:pic>
+      <p:sp>
+        <p:nvSpPr>
+          <p:cNvPr id="200" name="TextBox 1"/>
+          <p:cNvSpPr txBox="1"/>
+          <p:nvPr/>
+        </p:nvSpPr>
+        <p:spPr>
+          <a:xfrm>
+            <a:off x="3715415" y="5405718"/>
+            <a:ext cx="4111933" cy="634118"/>
+          </a:xfrm>
+          <a:prstGeom prst="rect">
+            <a:avLst/>
+          </a:prstGeom>
+          <a:ln w="12700">
+            <a:miter lim="400000"/>
+          </a:ln>
+          <a:extLst>
+            <a:ext uri="{C572A759-6A51-4108-AA02-DFA0A04FC94B}">
+              <ma14:wrappingTextBoxFlag xmlns="" xmlns:m="http://schemas.openxmlformats.org/officeDocument/2006/math" xmlns:a14="http://schemas.microsoft.com/office/drawing/2010/main" xmlns:ma14="http://schemas.microsoft.com/office/mac/drawingml/2011/main" val="1"/>
+            </a:ext>
+          </a:extLst>
+        </p:spPr>
+        <p:txBody>
+          <a:bodyPr wrap="none" lIns="45719" rIns="45719">
+            <a:spAutoFit/>
+          </a:bodyPr>
+          <a:lstStyle>
+            <a:lvl1pPr>
+              <a:defRPr sz="4200" b="1"/>
+            </a:lvl1pPr>
+          </a:lstStyle>
+          <a:p>
+            <a:r>
+              <a:t>Volver por: XX:XX </a:t>
+            </a:r>
+          </a:p>
+        </p:txBody>
+      </p:sp>
+      <p:sp>
+        <p:nvSpPr>
+          <p:cNvPr id="201" name="Slide Number"/>
+          <p:cNvSpPr txBox="1">
+            <a:spLocks noGrp="1"/>
+          </p:cNvSpPr>
+          <p:nvPr>
+            <p:ph type="sldNum" sz="quarter" idx="2"/>
+          </p:nvPr>
+        </p:nvSpPr>
+        <p:spPr>
+          <a:prstGeom prst="rect">
+            <a:avLst/>
+          </a:prstGeom>
+          <a:extLst>
+            <a:ext uri="{C572A759-6A51-4108-AA02-DFA0A04FC94B}">
+              <ma14:wrappingTextBoxFlag xmlns="" xmlns:m="http://schemas.openxmlformats.org/officeDocument/2006/math" xmlns:a14="http://schemas.microsoft.com/office/drawing/2010/main" xmlns:ma14="http://schemas.microsoft.com/office/mac/drawingml/2011/main" val="1"/>
+            </a:ext>
+          </a:extLst>
+        </p:spPr>
+        <p:txBody>
+          <a:bodyPr/>
+          <a:lstStyle/>
+          <a:p>
+            <a:fld id="{86CB4B4D-7CA3-9044-876B-883B54F8677D}" type="slidenum">
+              <a:t>12</a:t>
+            </a:fld>
+            <a:endParaRPr/>
+          </a:p>
+        </p:txBody>
+      </p:sp>
+    </p:spTree>
+    <p:extLst>
+      <p:ext uri="{BB962C8B-B14F-4D97-AF65-F5344CB8AC3E}">
+        <p14:creationId xmlns:p14="http://schemas.microsoft.com/office/powerpoint/2010/main" val="1389875916"/>
+      </p:ext>
+    </p:extLst>
+  </p:cSld>
+  <p:clrMapOvr>
+    <a:masterClrMapping/>
+  </p:clrMapOvr>
+  <p:transition spd="med"/>
+</p:sld>
+</file>
+
+<file path=ppt/slides/slide13.xml><?xml version="1.0" encoding="utf-8"?>
+<p:sld xmlns:a="http://schemas.openxmlformats.org/drawingml/2006/main" xmlns:r="http://schemas.openxmlformats.org/officeDocument/2006/relationships" xmlns:p="http://schemas.openxmlformats.org/presentationml/2006/main">
+  <p:cSld>
+    <p:spTree>
+      <p:nvGrpSpPr>
+        <p:cNvPr id="1" name=""/>
+        <p:cNvGrpSpPr/>
+        <p:nvPr/>
+      </p:nvGrpSpPr>
+      <p:grpSpPr>
+        <a:xfrm>
+          <a:off x="0" y="0"/>
+          <a:ext cx="0" cy="0"/>
+          <a:chOff x="0" y="0"/>
+          <a:chExt cx="0" cy="0"/>
+        </a:xfrm>
+      </p:grpSpPr>
+      <p:sp>
+        <p:nvSpPr>
+          <p:cNvPr id="2" name="Title 1">
+            <a:extLst>
+              <a:ext uri="{FF2B5EF4-FFF2-40B4-BE49-F238E27FC236}">
+                <a16:creationId xmlns:a16="http://schemas.microsoft.com/office/drawing/2014/main" id="{0E7CCAEB-D84E-456D-3B6B-2E9573C73F98}"/>
+              </a:ext>
+            </a:extLst>
+          </p:cNvPr>
+          <p:cNvSpPr>
+            <a:spLocks noGrp="1"/>
+          </p:cNvSpPr>
+          <p:nvPr>
+            <p:ph type="title"/>
+          </p:nvPr>
+        </p:nvSpPr>
+        <p:spPr/>
+        <p:txBody>
+          <a:bodyPr/>
+          <a:lstStyle/>
+          <a:p>
+            <a:r>
+              <a:rPr lang="en-US" dirty="0"/>
+              <a:t>Refine TTPs (20 Minutes)</a:t>
+            </a:r>
+          </a:p>
+        </p:txBody>
+      </p:sp>
+      <p:sp>
+        <p:nvSpPr>
+          <p:cNvPr id="3" name="Content Placeholder 2">
+            <a:extLst>
+              <a:ext uri="{FF2B5EF4-FFF2-40B4-BE49-F238E27FC236}">
+                <a16:creationId xmlns:a16="http://schemas.microsoft.com/office/drawing/2014/main" id="{0A5EC664-EFAD-501E-02EA-4124C835D47B}"/>
+              </a:ext>
+            </a:extLst>
+          </p:cNvPr>
+          <p:cNvSpPr>
+            <a:spLocks noGrp="1"/>
+          </p:cNvSpPr>
+          <p:nvPr>
+            <p:ph idx="1"/>
+          </p:nvPr>
+        </p:nvSpPr>
+        <p:spPr/>
+        <p:txBody>
+          <a:bodyPr/>
+          <a:lstStyle/>
+          <a:p>
+            <a:r>
+              <a:rPr lang="en-US" dirty="0"/>
+              <a:t>Develop a counter strategy for a given scenario. </a:t>
+            </a:r>
+          </a:p>
+          <a:p>
+            <a:r>
+              <a:rPr lang="en-US" dirty="0"/>
+              <a:t>Work in groups to brainstorm and outline your TTPs.</a:t>
+            </a:r>
+          </a:p>
+        </p:txBody>
+      </p:sp>
+    </p:spTree>
+    <p:extLst>
+      <p:ext uri="{BB962C8B-B14F-4D97-AF65-F5344CB8AC3E}">
+        <p14:creationId xmlns:p14="http://schemas.microsoft.com/office/powerpoint/2010/main" val="1023214734"/>
+      </p:ext>
+    </p:extLst>
+  </p:cSld>
+  <p:clrMapOvr>
+    <a:masterClrMapping/>
+  </p:clrMapOvr>
+</p:sld>
+</file>
+
+<file path=ppt/slides/slide14.xml><?xml version="1.0" encoding="utf-8"?>
+<p:sld xmlns:a="http://schemas.openxmlformats.org/drawingml/2006/main" xmlns:r="http://schemas.openxmlformats.org/officeDocument/2006/relationships" xmlns:p="http://schemas.openxmlformats.org/presentationml/2006/main">
+  <p:cSld>
+    <p:spTree>
+      <p:nvGrpSpPr>
+        <p:cNvPr id="1" name=""/>
+        <p:cNvGrpSpPr/>
+        <p:nvPr/>
+      </p:nvGrpSpPr>
+      <p:grpSpPr>
+        <a:xfrm>
+          <a:off x="0" y="0"/>
+          <a:ext cx="0" cy="0"/>
+          <a:chOff x="0" y="0"/>
+          <a:chExt cx="0" cy="0"/>
+        </a:xfrm>
+      </p:grpSpPr>
+      <p:sp>
+        <p:nvSpPr>
+          <p:cNvPr id="2" name="Title 1">
+            <a:extLst>
+              <a:ext uri="{FF2B5EF4-FFF2-40B4-BE49-F238E27FC236}">
+                <a16:creationId xmlns:a16="http://schemas.microsoft.com/office/drawing/2014/main" id="{0E7CCAEB-D84E-456D-3B6B-2E9573C73F98}"/>
+              </a:ext>
+            </a:extLst>
+          </p:cNvPr>
+          <p:cNvSpPr>
+            <a:spLocks noGrp="1"/>
+          </p:cNvSpPr>
+          <p:nvPr>
+            <p:ph type="title"/>
+          </p:nvPr>
+        </p:nvSpPr>
+        <p:spPr/>
+        <p:txBody>
+          <a:bodyPr/>
+          <a:lstStyle/>
+          <a:p>
+            <a:r>
+              <a:rPr lang="en-US" dirty="0"/>
+              <a:t>Final TTP Presentation (30 Minutes)</a:t>
+            </a:r>
+          </a:p>
+        </p:txBody>
+      </p:sp>
+      <p:sp>
+        <p:nvSpPr>
+          <p:cNvPr id="3" name="Content Placeholder 2">
+            <a:extLst>
+              <a:ext uri="{FF2B5EF4-FFF2-40B4-BE49-F238E27FC236}">
+                <a16:creationId xmlns:a16="http://schemas.microsoft.com/office/drawing/2014/main" id="{0A5EC664-EFAD-501E-02EA-4124C835D47B}"/>
+              </a:ext>
+            </a:extLst>
+          </p:cNvPr>
+          <p:cNvSpPr>
+            <a:spLocks noGrp="1"/>
+          </p:cNvSpPr>
+          <p:nvPr>
+            <p:ph idx="1"/>
+          </p:nvPr>
+        </p:nvSpPr>
+        <p:spPr/>
+        <p:txBody>
+          <a:bodyPr/>
+          <a:lstStyle/>
+          <a:p>
+            <a:r>
+              <a:rPr lang="en-US" dirty="0"/>
+              <a:t>Present your developed counter strategy to the class.</a:t>
+            </a:r>
+          </a:p>
+          <a:p>
+            <a:r>
+              <a:rPr lang="en-US" dirty="0"/>
+              <a:t>Discuss the strengths and weaknesses of each strategy.</a:t>
+            </a:r>
+          </a:p>
+        </p:txBody>
+      </p:sp>
+    </p:spTree>
+    <p:extLst>
+      <p:ext uri="{BB962C8B-B14F-4D97-AF65-F5344CB8AC3E}">
+        <p14:creationId xmlns:p14="http://schemas.microsoft.com/office/powerpoint/2010/main" val="451572762"/>
+      </p:ext>
+    </p:extLst>
+  </p:cSld>
+  <p:clrMapOvr>
+    <a:masterClrMapping/>
+  </p:clrMapOvr>
+</p:sld>
+</file>
+
+<file path=ppt/slides/slide15.xml><?xml version="1.0" encoding="utf-8"?>
+<p:sld xmlns:a="http://schemas.openxmlformats.org/drawingml/2006/main" xmlns:r="http://schemas.openxmlformats.org/officeDocument/2006/relationships" xmlns:p="http://schemas.openxmlformats.org/presentationml/2006/main">
+  <p:cSld>
+    <p:spTree>
+      <p:nvGrpSpPr>
+        <p:cNvPr id="1" name=""/>
+        <p:cNvGrpSpPr/>
+        <p:nvPr/>
+      </p:nvGrpSpPr>
+      <p:grpSpPr>
+        <a:xfrm>
+          <a:off x="0" y="0"/>
+          <a:ext cx="0" cy="0"/>
+          <a:chOff x="0" y="0"/>
+          <a:chExt cx="0" cy="0"/>
+        </a:xfrm>
+      </p:grpSpPr>
+      <p:sp>
+        <p:nvSpPr>
+          <p:cNvPr id="193" name="Title 2"/>
+          <p:cNvSpPr txBox="1">
+            <a:spLocks noGrp="1"/>
+          </p:cNvSpPr>
+          <p:nvPr>
+            <p:ph type="title" idx="4294967295"/>
+          </p:nvPr>
+        </p:nvSpPr>
+        <p:spPr>
+          <a:xfrm>
+            <a:off x="2154607" y="2531859"/>
+            <a:ext cx="3658054" cy="1786516"/>
+          </a:xfrm>
+          <a:prstGeom prst="rect">
+            <a:avLst/>
+          </a:prstGeom>
+        </p:spPr>
+        <p:txBody>
+          <a:bodyPr anchor="t"/>
+          <a:lstStyle>
+            <a:lvl1pPr>
+              <a:defRPr sz="4800" b="0">
+                <a:solidFill>
+                  <a:srgbClr val="44546A"/>
+                </a:solidFill>
+                <a:latin typeface="Calibri Light"/>
+                <a:ea typeface="Calibri Light"/>
+                <a:cs typeface="Calibri Light"/>
+                <a:sym typeface="Calibri Light"/>
+              </a:defRPr>
+            </a:lvl1pPr>
+          </a:lstStyle>
+          <a:p>
+            <a:r>
+              <a:t>TAKE A BREAK</a:t>
+            </a:r>
+          </a:p>
+        </p:txBody>
+      </p:sp>
+      <p:pic>
+        <p:nvPicPr>
+          <p:cNvPr id="194" name="Graphic 13" descr="Graphic 13"/>
+          <p:cNvPicPr>
+            <a:picLocks noChangeAspect="1"/>
+          </p:cNvPicPr>
+          <p:nvPr/>
+        </p:nvPicPr>
+        <p:blipFill>
+          <a:blip r:embed="rId2"/>
+          <a:stretch>
+            <a:fillRect/>
+          </a:stretch>
+        </p:blipFill>
+        <p:spPr>
+          <a:xfrm>
+            <a:off x="6379342" y="-259377"/>
+            <a:ext cx="5029201" cy="5029201"/>
+          </a:xfrm>
+          <a:prstGeom prst="rect">
+            <a:avLst/>
+          </a:prstGeom>
+          <a:ln w="12700">
+            <a:miter lim="400000"/>
+          </a:ln>
+        </p:spPr>
+      </p:pic>
+      <p:sp>
+        <p:nvSpPr>
+          <p:cNvPr id="195" name="TextBox 1"/>
+          <p:cNvSpPr txBox="1"/>
+          <p:nvPr/>
+        </p:nvSpPr>
+        <p:spPr>
+          <a:xfrm>
+            <a:off x="3715415" y="5405718"/>
+            <a:ext cx="3986136" cy="634118"/>
+          </a:xfrm>
+          <a:prstGeom prst="rect">
+            <a:avLst/>
+          </a:prstGeom>
+          <a:ln w="12700">
+            <a:miter lim="400000"/>
+          </a:ln>
+          <a:extLst>
+            <a:ext uri="{C572A759-6A51-4108-AA02-DFA0A04FC94B}">
+              <ma14:wrappingTextBoxFlag xmlns="" xmlns:m="http://schemas.openxmlformats.org/officeDocument/2006/math" xmlns:a14="http://schemas.microsoft.com/office/drawing/2010/main" xmlns:ma14="http://schemas.microsoft.com/office/mac/drawingml/2011/main" val="1"/>
+            </a:ext>
+          </a:extLst>
+        </p:spPr>
+        <p:txBody>
+          <a:bodyPr wrap="none" lIns="45719" rIns="45719">
+            <a:spAutoFit/>
+          </a:bodyPr>
+          <a:lstStyle>
+            <a:lvl1pPr>
+              <a:defRPr sz="4200" b="1"/>
+            </a:lvl1pPr>
+          </a:lstStyle>
+          <a:p>
+            <a:r>
+              <a:t>Return By: XX:XX </a:t>
+            </a:r>
+          </a:p>
+        </p:txBody>
+      </p:sp>
+      <p:sp>
+        <p:nvSpPr>
+          <p:cNvPr id="196" name="Slide Number"/>
+          <p:cNvSpPr txBox="1">
+            <a:spLocks noGrp="1"/>
+          </p:cNvSpPr>
+          <p:nvPr>
+            <p:ph type="sldNum" sz="quarter" idx="2"/>
+          </p:nvPr>
+        </p:nvSpPr>
+        <p:spPr>
+          <a:prstGeom prst="rect">
+            <a:avLst/>
+          </a:prstGeom>
+          <a:extLst>
+            <a:ext uri="{C572A759-6A51-4108-AA02-DFA0A04FC94B}">
+              <ma14:wrappingTextBoxFlag xmlns="" xmlns:m="http://schemas.openxmlformats.org/officeDocument/2006/math" xmlns:a14="http://schemas.microsoft.com/office/drawing/2010/main" xmlns:ma14="http://schemas.microsoft.com/office/mac/drawingml/2011/main" val="1"/>
+            </a:ext>
+          </a:extLst>
+        </p:spPr>
+        <p:txBody>
+          <a:bodyPr/>
+          <a:lstStyle/>
+          <a:p>
+            <a:fld id="{86CB4B4D-7CA3-9044-876B-883B54F8677D}" type="slidenum">
+              <a:rPr/>
+              <a:t>15</a:t>
+            </a:fld>
+            <a:endParaRPr/>
+          </a:p>
+        </p:txBody>
+      </p:sp>
+    </p:spTree>
+    <p:extLst>
+      <p:ext uri="{BB962C8B-B14F-4D97-AF65-F5344CB8AC3E}">
+        <p14:creationId xmlns:p14="http://schemas.microsoft.com/office/powerpoint/2010/main" val="2109483714"/>
+      </p:ext>
+    </p:extLst>
+  </p:cSld>
+  <p:clrMapOvr>
+    <a:masterClrMapping/>
+  </p:clrMapOvr>
+  <mc:AlternateContent xmlns:mc="http://schemas.openxmlformats.org/markup-compatibility/2006" xmlns:p14="http://schemas.microsoft.com/office/powerpoint/2010/main">
+    <mc:Choice Requires="p14">
+      <p:transition spd="slow" p14:dur="1200">
+        <p:push dir="u"/>
+      </p:transition>
+    </mc:Choice>
+    <mc:Fallback xmlns="" xmlns:m="http://schemas.openxmlformats.org/officeDocument/2006/math" xmlns:a14="http://schemas.microsoft.com/office/drawing/2010/main">
+      <p:transition spd="slow">
+        <p:fade/>
+      </p:transition>
+    </mc:Fallback>
+  </mc:AlternateContent>
+</p:sld>
+</file>
+
+<file path=ppt/slides/slide16.xml><?xml version="1.0" encoding="utf-8"?>
+<p:sld xmlns:a="http://schemas.openxmlformats.org/drawingml/2006/main" xmlns:r="http://schemas.openxmlformats.org/officeDocument/2006/relationships" xmlns:p="http://schemas.openxmlformats.org/presentationml/2006/main">
+  <p:cSld>
+    <p:spTree>
+      <p:nvGrpSpPr>
+        <p:cNvPr id="1" name=""/>
+        <p:cNvGrpSpPr/>
+        <p:nvPr/>
+      </p:nvGrpSpPr>
+      <p:grpSpPr>
+        <a:xfrm>
+          <a:off x="0" y="0"/>
+          <a:ext cx="0" cy="0"/>
+          <a:chOff x="0" y="0"/>
+          <a:chExt cx="0" cy="0"/>
+        </a:xfrm>
+      </p:grpSpPr>
+      <p:sp>
+        <p:nvSpPr>
+          <p:cNvPr id="198" name="Title 2"/>
+          <p:cNvSpPr txBox="1">
+            <a:spLocks noGrp="1"/>
+          </p:cNvSpPr>
+          <p:nvPr>
+            <p:ph type="title" idx="4294967295"/>
+          </p:nvPr>
+        </p:nvSpPr>
+        <p:spPr>
+          <a:xfrm>
+            <a:off x="2154607" y="2531859"/>
+            <a:ext cx="3658054" cy="1786516"/>
+          </a:xfrm>
+          <a:prstGeom prst="rect">
+            <a:avLst/>
+          </a:prstGeom>
+        </p:spPr>
+        <p:txBody>
+          <a:bodyPr anchor="t"/>
+          <a:lstStyle>
+            <a:lvl1pPr>
+              <a:defRPr sz="4800" b="0">
+                <a:solidFill>
+                  <a:srgbClr val="44546A"/>
+                </a:solidFill>
+                <a:latin typeface="Calibri Light"/>
+                <a:ea typeface="Calibri Light"/>
+                <a:cs typeface="Calibri Light"/>
+                <a:sym typeface="Calibri Light"/>
+              </a:defRPr>
+            </a:lvl1pPr>
+          </a:lstStyle>
+          <a:p>
+            <a:r>
+              <a:t>TOMAR UN DESCANSO</a:t>
+            </a:r>
+          </a:p>
+        </p:txBody>
+      </p:sp>
+      <p:pic>
+        <p:nvPicPr>
+          <p:cNvPr id="199" name="Graphic 13" descr="Graphic 13"/>
+          <p:cNvPicPr>
+            <a:picLocks noChangeAspect="1"/>
+          </p:cNvPicPr>
+          <p:nvPr/>
+        </p:nvPicPr>
+        <p:blipFill>
+          <a:blip r:embed="rId2"/>
+          <a:stretch>
+            <a:fillRect/>
+          </a:stretch>
+        </p:blipFill>
+        <p:spPr>
+          <a:xfrm>
+            <a:off x="6379342" y="-259377"/>
+            <a:ext cx="5029201" cy="5029201"/>
+          </a:xfrm>
+          <a:prstGeom prst="rect">
+            <a:avLst/>
+          </a:prstGeom>
+          <a:ln w="12700">
+            <a:miter lim="400000"/>
+          </a:ln>
+        </p:spPr>
+      </p:pic>
+      <p:sp>
+        <p:nvSpPr>
+          <p:cNvPr id="200" name="TextBox 1"/>
+          <p:cNvSpPr txBox="1"/>
+          <p:nvPr/>
+        </p:nvSpPr>
+        <p:spPr>
+          <a:xfrm>
+            <a:off x="3715415" y="5405718"/>
+            <a:ext cx="4111933" cy="634118"/>
+          </a:xfrm>
+          <a:prstGeom prst="rect">
+            <a:avLst/>
+          </a:prstGeom>
+          <a:ln w="12700">
+            <a:miter lim="400000"/>
+          </a:ln>
+          <a:extLst>
+            <a:ext uri="{C572A759-6A51-4108-AA02-DFA0A04FC94B}">
+              <ma14:wrappingTextBoxFlag xmlns="" xmlns:m="http://schemas.openxmlformats.org/officeDocument/2006/math" xmlns:a14="http://schemas.microsoft.com/office/drawing/2010/main" xmlns:ma14="http://schemas.microsoft.com/office/mac/drawingml/2011/main" val="1"/>
+            </a:ext>
+          </a:extLst>
+        </p:spPr>
+        <p:txBody>
+          <a:bodyPr wrap="none" lIns="45719" rIns="45719">
+            <a:spAutoFit/>
+          </a:bodyPr>
+          <a:lstStyle>
+            <a:lvl1pPr>
+              <a:defRPr sz="4200" b="1"/>
+            </a:lvl1pPr>
+          </a:lstStyle>
+          <a:p>
+            <a:r>
+              <a:t>Volver por: XX:XX </a:t>
+            </a:r>
+          </a:p>
+        </p:txBody>
+      </p:sp>
+      <p:sp>
+        <p:nvSpPr>
+          <p:cNvPr id="201" name="Slide Number"/>
+          <p:cNvSpPr txBox="1">
+            <a:spLocks noGrp="1"/>
+          </p:cNvSpPr>
+          <p:nvPr>
+            <p:ph type="sldNum" sz="quarter" idx="2"/>
+          </p:nvPr>
+        </p:nvSpPr>
+        <p:spPr>
+          <a:prstGeom prst="rect">
+            <a:avLst/>
+          </a:prstGeom>
+          <a:extLst>
+            <a:ext uri="{C572A759-6A51-4108-AA02-DFA0A04FC94B}">
+              <ma14:wrappingTextBoxFlag xmlns="" xmlns:m="http://schemas.openxmlformats.org/officeDocument/2006/math" xmlns:a14="http://schemas.microsoft.com/office/drawing/2010/main" xmlns:ma14="http://schemas.microsoft.com/office/mac/drawingml/2011/main" val="1"/>
+            </a:ext>
+          </a:extLst>
+        </p:spPr>
+        <p:txBody>
+          <a:bodyPr/>
+          <a:lstStyle/>
+          <a:p>
+            <a:fld id="{86CB4B4D-7CA3-9044-876B-883B54F8677D}" type="slidenum">
+              <a:t>16</a:t>
+            </a:fld>
+            <a:endParaRPr/>
+          </a:p>
+        </p:txBody>
+      </p:sp>
+    </p:spTree>
+    <p:extLst>
+      <p:ext uri="{BB962C8B-B14F-4D97-AF65-F5344CB8AC3E}">
+        <p14:creationId xmlns:p14="http://schemas.microsoft.com/office/powerpoint/2010/main" val="3235858406"/>
+      </p:ext>
+    </p:extLst>
+  </p:cSld>
+  <p:clrMapOvr>
+    <a:masterClrMapping/>
+  </p:clrMapOvr>
+  <p:transition spd="med"/>
+</p:sld>
+</file>
+
+<file path=ppt/slides/slide17.xml><?xml version="1.0" encoding="utf-8"?>
+<p:sld xmlns:a="http://schemas.openxmlformats.org/drawingml/2006/main" xmlns:r="http://schemas.openxmlformats.org/officeDocument/2006/relationships" xmlns:p="http://schemas.openxmlformats.org/presentationml/2006/main">
+  <p:cSld>
+    <p:spTree>
+      <p:nvGrpSpPr>
+        <p:cNvPr id="1" name=""/>
+        <p:cNvGrpSpPr/>
+        <p:nvPr/>
+      </p:nvGrpSpPr>
+      <p:grpSpPr>
+        <a:xfrm>
+          <a:off x="0" y="0"/>
+          <a:ext cx="0" cy="0"/>
+          <a:chOff x="0" y="0"/>
+          <a:chExt cx="0" cy="0"/>
+        </a:xfrm>
+      </p:grpSpPr>
+      <p:sp>
+        <p:nvSpPr>
+          <p:cNvPr id="2" name="Title 1">
+            <a:extLst>
+              <a:ext uri="{FF2B5EF4-FFF2-40B4-BE49-F238E27FC236}">
+                <a16:creationId xmlns:a16="http://schemas.microsoft.com/office/drawing/2014/main" id="{0E7CCAEB-D84E-456D-3B6B-2E9573C73F98}"/>
+              </a:ext>
+            </a:extLst>
+          </p:cNvPr>
+          <p:cNvSpPr>
+            <a:spLocks noGrp="1"/>
+          </p:cNvSpPr>
+          <p:nvPr>
+            <p:ph type="title"/>
+          </p:nvPr>
+        </p:nvSpPr>
+        <p:spPr/>
+        <p:txBody>
+          <a:bodyPr/>
+          <a:lstStyle/>
+          <a:p>
+            <a:r>
+              <a:rPr lang="en-US" dirty="0"/>
+              <a:t>Combine TTPs</a:t>
+            </a:r>
+          </a:p>
+        </p:txBody>
+      </p:sp>
+      <p:sp>
+        <p:nvSpPr>
+          <p:cNvPr id="3" name="Content Placeholder 2">
+            <a:extLst>
+              <a:ext uri="{FF2B5EF4-FFF2-40B4-BE49-F238E27FC236}">
+                <a16:creationId xmlns:a16="http://schemas.microsoft.com/office/drawing/2014/main" id="{0A5EC664-EFAD-501E-02EA-4124C835D47B}"/>
+              </a:ext>
+            </a:extLst>
+          </p:cNvPr>
+          <p:cNvSpPr>
+            <a:spLocks noGrp="1"/>
+          </p:cNvSpPr>
+          <p:nvPr>
+            <p:ph idx="1"/>
+          </p:nvPr>
+        </p:nvSpPr>
+        <p:spPr/>
+        <p:txBody>
+          <a:bodyPr/>
+          <a:lstStyle/>
+          <a:p>
+            <a:r>
+              <a:rPr lang="en-US" dirty="0"/>
+              <a:t>Groups will combine strategies to a main strategy. </a:t>
+            </a:r>
+          </a:p>
+        </p:txBody>
+      </p:sp>
+    </p:spTree>
+    <p:extLst>
+      <p:ext uri="{BB962C8B-B14F-4D97-AF65-F5344CB8AC3E}">
+        <p14:creationId xmlns:p14="http://schemas.microsoft.com/office/powerpoint/2010/main" val="3588947859"/>
+      </p:ext>
+    </p:extLst>
+  </p:cSld>
+  <p:clrMapOvr>
+    <a:masterClrMapping/>
+  </p:clrMapOvr>
+</p:sld>
+</file>
+
+<file path=ppt/slides/slide18.xml><?xml version="1.0" encoding="utf-8"?>
+<p:sld xmlns:a="http://schemas.openxmlformats.org/drawingml/2006/main" xmlns:r="http://schemas.openxmlformats.org/officeDocument/2006/relationships" xmlns:p="http://schemas.openxmlformats.org/presentationml/2006/main">
+  <p:cSld>
+    <p:spTree>
+      <p:nvGrpSpPr>
+        <p:cNvPr id="1" name=""/>
+        <p:cNvGrpSpPr/>
+        <p:nvPr/>
+      </p:nvGrpSpPr>
+      <p:grpSpPr>
+        <a:xfrm>
+          <a:off x="0" y="0"/>
+          <a:ext cx="0" cy="0"/>
+          <a:chOff x="0" y="0"/>
+          <a:chExt cx="0" cy="0"/>
+        </a:xfrm>
+      </p:grpSpPr>
+      <p:sp>
+        <p:nvSpPr>
+          <p:cNvPr id="2" name="Title 1">
+            <a:extLst>
+              <a:ext uri="{FF2B5EF4-FFF2-40B4-BE49-F238E27FC236}">
+                <a16:creationId xmlns:a16="http://schemas.microsoft.com/office/drawing/2014/main" id="{0E7CCAEB-D84E-456D-3B6B-2E9573C73F98}"/>
+              </a:ext>
+            </a:extLst>
+          </p:cNvPr>
+          <p:cNvSpPr>
+            <a:spLocks noGrp="1"/>
+          </p:cNvSpPr>
+          <p:nvPr>
+            <p:ph type="title"/>
+          </p:nvPr>
+        </p:nvSpPr>
+        <p:spPr/>
+        <p:txBody>
+          <a:bodyPr/>
+          <a:lstStyle/>
+          <a:p>
+            <a:r>
+              <a:rPr lang="en-US" dirty="0"/>
+              <a:t>Practical Exercise</a:t>
+            </a:r>
+          </a:p>
+        </p:txBody>
+      </p:sp>
+      <p:sp>
+        <p:nvSpPr>
+          <p:cNvPr id="3" name="Content Placeholder 2">
+            <a:extLst>
+              <a:ext uri="{FF2B5EF4-FFF2-40B4-BE49-F238E27FC236}">
+                <a16:creationId xmlns:a16="http://schemas.microsoft.com/office/drawing/2014/main" id="{0A5EC664-EFAD-501E-02EA-4124C835D47B}"/>
+              </a:ext>
+            </a:extLst>
+          </p:cNvPr>
+          <p:cNvSpPr>
+            <a:spLocks noGrp="1"/>
+          </p:cNvSpPr>
+          <p:nvPr>
+            <p:ph idx="1"/>
+          </p:nvPr>
+        </p:nvSpPr>
+        <p:spPr/>
+        <p:txBody>
+          <a:bodyPr/>
+          <a:lstStyle/>
+          <a:p>
+            <a:r>
+              <a:rPr lang="en-US" dirty="0"/>
+              <a:t>Groups will combine strategies to a main strategy. </a:t>
+            </a:r>
+          </a:p>
+        </p:txBody>
+      </p:sp>
+    </p:spTree>
+    <p:extLst>
+      <p:ext uri="{BB962C8B-B14F-4D97-AF65-F5344CB8AC3E}">
+        <p14:creationId xmlns:p14="http://schemas.microsoft.com/office/powerpoint/2010/main" val="1965678674"/>
+      </p:ext>
+    </p:extLst>
+  </p:cSld>
+  <p:clrMapOvr>
+    <a:masterClrMapping/>
+  </p:clrMapOvr>
+</p:sld>
+</file>
+
+<file path=ppt/slides/slide19.xml><?xml version="1.0" encoding="utf-8"?>
+<p:sld xmlns:a="http://schemas.openxmlformats.org/drawingml/2006/main" xmlns:r="http://schemas.openxmlformats.org/officeDocument/2006/relationships" xmlns:p="http://schemas.openxmlformats.org/presentationml/2006/main">
+  <p:cSld>
+    <p:spTree>
+      <p:nvGrpSpPr>
+        <p:cNvPr id="1" name=""/>
+        <p:cNvGrpSpPr/>
+        <p:nvPr/>
+      </p:nvGrpSpPr>
+      <p:grpSpPr>
+        <a:xfrm>
+          <a:off x="0" y="0"/>
+          <a:ext cx="0" cy="0"/>
+          <a:chOff x="0" y="0"/>
+          <a:chExt cx="0" cy="0"/>
+        </a:xfrm>
+      </p:grpSpPr>
+      <p:sp>
+        <p:nvSpPr>
+          <p:cNvPr id="2" name="Title 1">
+            <a:extLst>
+              <a:ext uri="{FF2B5EF4-FFF2-40B4-BE49-F238E27FC236}">
+                <a16:creationId xmlns:a16="http://schemas.microsoft.com/office/drawing/2014/main" id="{0E7CCAEB-D84E-456D-3B6B-2E9573C73F98}"/>
+              </a:ext>
+            </a:extLst>
+          </p:cNvPr>
+          <p:cNvSpPr>
+            <a:spLocks noGrp="1"/>
+          </p:cNvSpPr>
+          <p:nvPr>
+            <p:ph type="title"/>
+          </p:nvPr>
+        </p:nvSpPr>
+        <p:spPr/>
+        <p:txBody>
+          <a:bodyPr/>
+          <a:lstStyle/>
+          <a:p>
+            <a:r>
+              <a:rPr lang="en-US" dirty="0"/>
+              <a:t>Check on Learning</a:t>
+            </a:r>
+          </a:p>
+        </p:txBody>
+      </p:sp>
+      <p:sp>
+        <p:nvSpPr>
+          <p:cNvPr id="3" name="Content Placeholder 2">
+            <a:extLst>
+              <a:ext uri="{FF2B5EF4-FFF2-40B4-BE49-F238E27FC236}">
+                <a16:creationId xmlns:a16="http://schemas.microsoft.com/office/drawing/2014/main" id="{0A5EC664-EFAD-501E-02EA-4124C835D47B}"/>
+              </a:ext>
+            </a:extLst>
+          </p:cNvPr>
+          <p:cNvSpPr>
+            <a:spLocks noGrp="1"/>
+          </p:cNvSpPr>
+          <p:nvPr>
+            <p:ph idx="1"/>
+          </p:nvPr>
+        </p:nvSpPr>
+        <p:spPr/>
+        <p:txBody>
+          <a:bodyPr>
+            <a:normAutofit/>
+          </a:bodyPr>
+          <a:lstStyle/>
+          <a:p>
+            <a:r>
+              <a:rPr lang="en-US" dirty="0"/>
+              <a:t>What are the key components of an effective counter strategy?</a:t>
+            </a:r>
+          </a:p>
+          <a:p>
+            <a:r>
+              <a:rPr lang="en-US" dirty="0"/>
+              <a:t>Why is it important to counter misinformation quickly?</a:t>
+            </a:r>
+          </a:p>
+          <a:p>
+            <a:r>
+              <a:rPr lang="en-US" dirty="0"/>
+              <a:t>What techniques can be used to counter misinformation?</a:t>
+            </a:r>
+          </a:p>
+        </p:txBody>
+      </p:sp>
+    </p:spTree>
+    <p:extLst>
+      <p:ext uri="{BB962C8B-B14F-4D97-AF65-F5344CB8AC3E}">
+        <p14:creationId xmlns:p14="http://schemas.microsoft.com/office/powerpoint/2010/main" val="3285697388"/>
       </p:ext>
     </p:extLst>
   </p:cSld>
@@ -5206,57 +7218,18 @@
       </p:grpSpPr>
       <p:sp>
         <p:nvSpPr>
-          <p:cNvPr id="2" name="Content Placeholder 1">
-            <a:extLst>
-              <a:ext uri="{FF2B5EF4-FFF2-40B4-BE49-F238E27FC236}">
-                <a16:creationId xmlns:a16="http://schemas.microsoft.com/office/drawing/2014/main" id="{7C1822AB-D5F0-D579-A820-812EE3C83EDD}"/>
-              </a:ext>
-            </a:extLst>
-          </p:cNvPr>
-          <p:cNvSpPr>
-            <a:spLocks noGrp="1"/>
-          </p:cNvSpPr>
-          <p:nvPr>
-            <p:ph/>
-          </p:nvPr>
-        </p:nvSpPr>
-        <p:spPr>
-          <a:xfrm>
-            <a:off x="375127" y="2963211"/>
-            <a:ext cx="11441743" cy="1061102"/>
-          </a:xfrm>
-        </p:spPr>
-        <p:txBody>
-          <a:bodyPr/>
-          <a:lstStyle/>
-          <a:p>
-            <a:pPr marL="0" indent="0" algn="ctr">
-              <a:buNone/>
-            </a:pPr>
-            <a:r>
-              <a:rPr lang="en-US" sz="6000" dirty="0">
-                <a:latin typeface="Arial" panose="020B0604020202020204" pitchFamily="34" charset="0"/>
-                <a:cs typeface="Arial" panose="020B0604020202020204" pitchFamily="34" charset="0"/>
-              </a:rPr>
-              <a:t>{Lesson}</a:t>
-            </a:r>
-          </a:p>
-        </p:txBody>
-      </p:sp>
-      <p:sp>
-        <p:nvSpPr>
-          <p:cNvPr id="3" name="Text Placeholder 2">
-            <a:extLst>
-              <a:ext uri="{FF2B5EF4-FFF2-40B4-BE49-F238E27FC236}">
-                <a16:creationId xmlns:a16="http://schemas.microsoft.com/office/drawing/2014/main" id="{D94C7E47-63B7-8E9D-6345-B12B99DBCE2B}"/>
-              </a:ext>
-            </a:extLst>
-          </p:cNvPr>
-          <p:cNvSpPr>
-            <a:spLocks noGrp="1"/>
-          </p:cNvSpPr>
-          <p:nvPr>
-            <p:ph type="body" sz="quarter" idx="10"/>
+          <p:cNvPr id="2" name="Title 1">
+            <a:extLst>
+              <a:ext uri="{FF2B5EF4-FFF2-40B4-BE49-F238E27FC236}">
+                <a16:creationId xmlns:a16="http://schemas.microsoft.com/office/drawing/2014/main" id="{0E7CCAEB-D84E-456D-3B6B-2E9573C73F98}"/>
+              </a:ext>
+            </a:extLst>
+          </p:cNvPr>
+          <p:cNvSpPr>
+            <a:spLocks noGrp="1"/>
+          </p:cNvSpPr>
+          <p:nvPr>
+            <p:ph type="title"/>
           </p:nvPr>
         </p:nvSpPr>
         <p:spPr/>
@@ -5264,14 +7237,45 @@
           <a:bodyPr/>
           <a:lstStyle/>
           <a:p>
-            <a:endParaRPr lang="en-US"/>
+            <a:r>
+              <a:rPr lang="en-US" dirty="0"/>
+              <a:t>Exercise</a:t>
+            </a:r>
+          </a:p>
+        </p:txBody>
+      </p:sp>
+      <p:sp>
+        <p:nvSpPr>
+          <p:cNvPr id="3" name="Content Placeholder 2">
+            <a:extLst>
+              <a:ext uri="{FF2B5EF4-FFF2-40B4-BE49-F238E27FC236}">
+                <a16:creationId xmlns:a16="http://schemas.microsoft.com/office/drawing/2014/main" id="{0A5EC664-EFAD-501E-02EA-4124C835D47B}"/>
+              </a:ext>
+            </a:extLst>
+          </p:cNvPr>
+          <p:cNvSpPr>
+            <a:spLocks noGrp="1"/>
+          </p:cNvSpPr>
+          <p:nvPr>
+            <p:ph idx="1"/>
+          </p:nvPr>
+        </p:nvSpPr>
+        <p:spPr/>
+        <p:txBody>
+          <a:bodyPr/>
+          <a:lstStyle/>
+          <a:p>
+            <a:r>
+              <a:rPr lang="en-US" dirty="0"/>
+              <a:t>Students selected report to your designated areas. </a:t>
+            </a:r>
           </a:p>
         </p:txBody>
       </p:sp>
     </p:spTree>
     <p:extLst>
       <p:ext uri="{BB962C8B-B14F-4D97-AF65-F5344CB8AC3E}">
-        <p14:creationId xmlns:p14="http://schemas.microsoft.com/office/powerpoint/2010/main" val="2329516533"/>
+        <p14:creationId xmlns:p14="http://schemas.microsoft.com/office/powerpoint/2010/main" val="2792640674"/>
       </p:ext>
     </p:extLst>
   </p:cSld>
@@ -5281,7 +7285,7 @@
 </p:sld>
 </file>
 
-<file path=ppt/slides/slide3.xml><?xml version="1.0" encoding="utf-8"?>
+<file path=ppt/slides/slide20.xml><?xml version="1.0" encoding="utf-8"?>
 <p:sld xmlns:a="http://schemas.openxmlformats.org/drawingml/2006/main" xmlns:r="http://schemas.openxmlformats.org/officeDocument/2006/relationships" xmlns:p="http://schemas.openxmlformats.org/presentationml/2006/main">
   <p:cSld>
     <p:spTree>
@@ -5319,7 +7323,10 @@
           <a:bodyPr/>
           <a:lstStyle/>
           <a:p>
-            <a:endParaRPr lang="en-US"/>
+            <a:r>
+              <a:rPr lang="en-US" dirty="0"/>
+              <a:t>Check on Learning: Rapid Fire</a:t>
+            </a:r>
           </a:p>
         </p:txBody>
       </p:sp>
@@ -5341,17 +7348,46 @@
         </p:nvSpPr>
         <p:spPr/>
         <p:txBody>
-          <a:bodyPr/>
-          <a:lstStyle/>
-          <a:p>
-            <a:endParaRPr lang="en-US"/>
+          <a:bodyPr>
+            <a:normAutofit lnSpcReduction="10000"/>
+          </a:bodyPr>
+          <a:lstStyle/>
+          <a:p>
+            <a:r>
+              <a:rPr lang="en-US" dirty="0"/>
+              <a:t>What would you do if the misinformation was being spread by a high-ranking official? </a:t>
+            </a:r>
+          </a:p>
+          <a:p>
+            <a:r>
+              <a:rPr lang="en-US" dirty="0"/>
+              <a:t>What would you do if the misinformation was being spread by a foreign government?</a:t>
+            </a:r>
+          </a:p>
+          <a:p>
+            <a:r>
+              <a:rPr lang="en-US" dirty="0"/>
+              <a:t>What would you do if the misinformation was being spread by both a foreign government and a high-ranking official?</a:t>
+            </a:r>
+          </a:p>
+          <a:p>
+            <a:r>
+              <a:rPr lang="en-US" dirty="0"/>
+              <a:t>What would you do if your family was being targeted by the misinformation? </a:t>
+            </a:r>
+          </a:p>
+          <a:p>
+            <a:r>
+              <a:rPr lang="en-US" dirty="0"/>
+              <a:t>What would you do if the misinformation was being spread by a friend?</a:t>
+            </a:r>
           </a:p>
         </p:txBody>
       </p:sp>
     </p:spTree>
     <p:extLst>
       <p:ext uri="{BB962C8B-B14F-4D97-AF65-F5344CB8AC3E}">
-        <p14:creationId xmlns:p14="http://schemas.microsoft.com/office/powerpoint/2010/main" val="2792640674"/>
+        <p14:creationId xmlns:p14="http://schemas.microsoft.com/office/powerpoint/2010/main" val="1720366697"/>
       </p:ext>
     </p:extLst>
   </p:cSld>
@@ -5361,7 +7397,7 @@
 </p:sld>
 </file>
 
-<file path=ppt/slides/slide4.xml><?xml version="1.0" encoding="utf-8"?>
+<file path=ppt/slides/slide21.xml><?xml version="1.0" encoding="utf-8"?>
 <p:sld xmlns:a="http://schemas.openxmlformats.org/drawingml/2006/main" xmlns:r="http://schemas.openxmlformats.org/officeDocument/2006/relationships" xmlns:p="http://schemas.openxmlformats.org/presentationml/2006/main">
   <p:cSld>
     <p:bg>
@@ -5458,7 +7494,7 @@
           </a:prstGeom>
           <a:extLst>
             <a:ext uri="{C572A759-6A51-4108-AA02-DFA0A04FC94B}">
-              <ma14:wrappingTextBoxFlag xmlns:ma14="http://schemas.microsoft.com/office/mac/drawingml/2011/main" xmlns:a14="http://schemas.microsoft.com/office/drawing/2010/main" xmlns:m="http://schemas.openxmlformats.org/officeDocument/2006/math" xmlns="" val="1"/>
+              <ma14:wrappingTextBoxFlag xmlns="" xmlns:m="http://schemas.openxmlformats.org/officeDocument/2006/math" xmlns:a14="http://schemas.microsoft.com/office/drawing/2010/main" xmlns:ma14="http://schemas.microsoft.com/office/mac/drawingml/2011/main" val="1"/>
             </a:ext>
           </a:extLst>
         </p:spPr>
@@ -5467,7 +7503,7 @@
           <a:lstStyle/>
           <a:p>
             <a:fld id="{86CB4B4D-7CA3-9044-876B-883B54F8677D}" type="slidenum">
-              <a:t>4</a:t>
+              <a:t>21</a:t>
             </a:fld>
             <a:endParaRPr/>
           </a:p>
@@ -5482,7 +7518,7 @@
 </p:sld>
 </file>
 
-<file path=ppt/slides/slide5.xml><?xml version="1.0" encoding="utf-8"?>
+<file path=ppt/slides/slide22.xml><?xml version="1.0" encoding="utf-8"?>
 <p:sld xmlns:a="http://schemas.openxmlformats.org/drawingml/2006/main" xmlns:r="http://schemas.openxmlformats.org/officeDocument/2006/relationships" xmlns:p="http://schemas.openxmlformats.org/presentationml/2006/main">
   <p:cSld>
     <p:spTree>
@@ -5571,7 +7607,7 @@
           </a:prstGeom>
           <a:extLst>
             <a:ext uri="{C572A759-6A51-4108-AA02-DFA0A04FC94B}">
-              <ma14:wrappingTextBoxFlag xmlns:ma14="http://schemas.microsoft.com/office/mac/drawingml/2011/main" xmlns:a14="http://schemas.microsoft.com/office/drawing/2010/main" xmlns:m="http://schemas.openxmlformats.org/officeDocument/2006/math" xmlns="" val="1"/>
+              <ma14:wrappingTextBoxFlag xmlns="" xmlns:m="http://schemas.openxmlformats.org/officeDocument/2006/math" xmlns:a14="http://schemas.microsoft.com/office/drawing/2010/main" xmlns:ma14="http://schemas.microsoft.com/office/mac/drawingml/2011/main" val="1"/>
             </a:ext>
           </a:extLst>
         </p:spPr>
@@ -5580,7 +7616,7 @@
           <a:lstStyle/>
           <a:p>
             <a:fld id="{86CB4B4D-7CA3-9044-876B-883B54F8677D}" type="slidenum">
-              <a:t>5</a:t>
+              <a:t>22</a:t>
             </a:fld>
             <a:endParaRPr/>
           </a:p>
@@ -5597,7 +7633,7 @@
         <p:push dir="u"/>
       </p:transition>
     </mc:Choice>
-    <mc:Fallback xmlns:a14="http://schemas.microsoft.com/office/drawing/2010/main" xmlns:m="http://schemas.openxmlformats.org/officeDocument/2006/math" xmlns="">
+    <mc:Fallback xmlns="" xmlns:m="http://schemas.openxmlformats.org/officeDocument/2006/math" xmlns:a14="http://schemas.microsoft.com/office/drawing/2010/main">
       <p:transition spd="slow">
         <p:fade/>
       </p:transition>
@@ -5606,7 +7642,7 @@
 </p:sld>
 </file>
 
-<file path=ppt/slides/slide6.xml><?xml version="1.0" encoding="utf-8"?>
+<file path=ppt/slides/slide23.xml><?xml version="1.0" encoding="utf-8"?>
 <p:sld xmlns:a="http://schemas.openxmlformats.org/drawingml/2006/main" xmlns:r="http://schemas.openxmlformats.org/officeDocument/2006/relationships" xmlns:p="http://schemas.openxmlformats.org/presentationml/2006/main">
   <p:cSld>
     <p:bg>
@@ -5718,7 +7754,7 @@
           </a:ln>
           <a:extLst>
             <a:ext uri="{C572A759-6A51-4108-AA02-DFA0A04FC94B}">
-              <ma14:wrappingTextBoxFlag xmlns:ma14="http://schemas.microsoft.com/office/mac/drawingml/2011/main" xmlns:a14="http://schemas.microsoft.com/office/drawing/2010/main" xmlns:m="http://schemas.openxmlformats.org/officeDocument/2006/math" xmlns="" val="1"/>
+              <ma14:wrappingTextBoxFlag xmlns="" xmlns:m="http://schemas.openxmlformats.org/officeDocument/2006/math" xmlns:a14="http://schemas.microsoft.com/office/drawing/2010/main" xmlns:ma14="http://schemas.microsoft.com/office/mac/drawingml/2011/main" val="1"/>
             </a:ext>
           </a:extLst>
         </p:spPr>
@@ -5754,7 +7790,7 @@
           </a:prstGeom>
           <a:extLst>
             <a:ext uri="{C572A759-6A51-4108-AA02-DFA0A04FC94B}">
-              <ma14:wrappingTextBoxFlag xmlns:ma14="http://schemas.microsoft.com/office/mac/drawingml/2011/main" xmlns:a14="http://schemas.microsoft.com/office/drawing/2010/main" xmlns:m="http://schemas.openxmlformats.org/officeDocument/2006/math" xmlns="" val="1"/>
+              <ma14:wrappingTextBoxFlag xmlns="" xmlns:m="http://schemas.openxmlformats.org/officeDocument/2006/math" xmlns:a14="http://schemas.microsoft.com/office/drawing/2010/main" xmlns:ma14="http://schemas.microsoft.com/office/mac/drawingml/2011/main" val="1"/>
             </a:ext>
           </a:extLst>
         </p:spPr>
@@ -5764,7 +7800,7 @@
           <a:p>
             <a:fld id="{86CB4B4D-7CA3-9044-876B-883B54F8677D}" type="slidenum">
               <a:rPr/>
-              <a:t>6</a:t>
+              <a:t>23</a:t>
             </a:fld>
             <a:endParaRPr/>
           </a:p>
@@ -5781,7 +7817,7 @@
         <p:push dir="u"/>
       </p:transition>
     </mc:Choice>
-    <mc:Fallback xmlns:a14="http://schemas.microsoft.com/office/drawing/2010/main" xmlns:m="http://schemas.openxmlformats.org/officeDocument/2006/math" xmlns="">
+    <mc:Fallback xmlns="" xmlns:m="http://schemas.openxmlformats.org/officeDocument/2006/math" xmlns:a14="http://schemas.microsoft.com/office/drawing/2010/main">
       <p:transition spd="slow">
         <p:fade/>
       </p:transition>
@@ -5790,7 +7826,7 @@
 </p:sld>
 </file>
 
-<file path=ppt/slides/slide7.xml><?xml version="1.0" encoding="utf-8"?>
+<file path=ppt/slides/slide24.xml><?xml version="1.0" encoding="utf-8"?>
 <p:sld xmlns:a="http://schemas.openxmlformats.org/drawingml/2006/main" xmlns:r="http://schemas.openxmlformats.org/officeDocument/2006/relationships" xmlns:p="http://schemas.openxmlformats.org/presentationml/2006/main">
   <p:cSld>
     <p:spTree>
@@ -5894,7 +7930,7 @@
           </a:ln>
           <a:extLst>
             <a:ext uri="{C572A759-6A51-4108-AA02-DFA0A04FC94B}">
-              <ma14:wrappingTextBoxFlag xmlns:ma14="http://schemas.microsoft.com/office/mac/drawingml/2011/main" xmlns:a14="http://schemas.microsoft.com/office/drawing/2010/main" xmlns:m="http://schemas.openxmlformats.org/officeDocument/2006/math" xmlns="" val="1"/>
+              <ma14:wrappingTextBoxFlag xmlns="" xmlns:m="http://schemas.openxmlformats.org/officeDocument/2006/math" xmlns:a14="http://schemas.microsoft.com/office/drawing/2010/main" xmlns:ma14="http://schemas.microsoft.com/office/mac/drawingml/2011/main" val="1"/>
             </a:ext>
           </a:extLst>
         </p:spPr>
@@ -5930,7 +7966,7 @@
           </a:prstGeom>
           <a:extLst>
             <a:ext uri="{C572A759-6A51-4108-AA02-DFA0A04FC94B}">
-              <ma14:wrappingTextBoxFlag xmlns:ma14="http://schemas.microsoft.com/office/mac/drawingml/2011/main" xmlns:a14="http://schemas.microsoft.com/office/drawing/2010/main" xmlns:m="http://schemas.openxmlformats.org/officeDocument/2006/math" xmlns="" val="1"/>
+              <ma14:wrappingTextBoxFlag xmlns="" xmlns:m="http://schemas.openxmlformats.org/officeDocument/2006/math" xmlns:a14="http://schemas.microsoft.com/office/drawing/2010/main" xmlns:ma14="http://schemas.microsoft.com/office/mac/drawingml/2011/main" val="1"/>
             </a:ext>
           </a:extLst>
         </p:spPr>
@@ -5939,7 +7975,7 @@
           <a:lstStyle/>
           <a:p>
             <a:fld id="{86CB4B4D-7CA3-9044-876B-883B54F8677D}" type="slidenum">
-              <a:t>7</a:t>
+              <a:t>24</a:t>
             </a:fld>
             <a:endParaRPr/>
           </a:p>
@@ -5951,6 +7987,936 @@
     <a:masterClrMapping/>
   </p:clrMapOvr>
   <p:transition spd="med"/>
+</p:sld>
+</file>
+
+<file path=ppt/slides/slide3.xml><?xml version="1.0" encoding="utf-8"?>
+<p:sld xmlns:a="http://schemas.openxmlformats.org/drawingml/2006/main" xmlns:r="http://schemas.openxmlformats.org/officeDocument/2006/relationships" xmlns:p="http://schemas.openxmlformats.org/presentationml/2006/main">
+  <p:cSld>
+    <p:spTree>
+      <p:nvGrpSpPr>
+        <p:cNvPr id="1" name=""/>
+        <p:cNvGrpSpPr/>
+        <p:nvPr/>
+      </p:nvGrpSpPr>
+      <p:grpSpPr>
+        <a:xfrm>
+          <a:off x="0" y="0"/>
+          <a:ext cx="0" cy="0"/>
+          <a:chOff x="0" y="0"/>
+          <a:chExt cx="0" cy="0"/>
+        </a:xfrm>
+      </p:grpSpPr>
+      <p:sp>
+        <p:nvSpPr>
+          <p:cNvPr id="2" name="Title 1">
+            <a:extLst>
+              <a:ext uri="{FF2B5EF4-FFF2-40B4-BE49-F238E27FC236}">
+                <a16:creationId xmlns:a16="http://schemas.microsoft.com/office/drawing/2014/main" id="{0E7CCAEB-D84E-456D-3B6B-2E9573C73F98}"/>
+              </a:ext>
+            </a:extLst>
+          </p:cNvPr>
+          <p:cNvSpPr>
+            <a:spLocks noGrp="1"/>
+          </p:cNvSpPr>
+          <p:nvPr>
+            <p:ph type="title"/>
+          </p:nvPr>
+        </p:nvSpPr>
+        <p:spPr/>
+        <p:txBody>
+          <a:bodyPr/>
+          <a:lstStyle/>
+          <a:p>
+            <a:r>
+              <a:rPr lang="en-US" dirty="0"/>
+              <a:t>Reflection</a:t>
+            </a:r>
+          </a:p>
+        </p:txBody>
+      </p:sp>
+      <p:sp>
+        <p:nvSpPr>
+          <p:cNvPr id="3" name="Content Placeholder 2">
+            <a:extLst>
+              <a:ext uri="{FF2B5EF4-FFF2-40B4-BE49-F238E27FC236}">
+                <a16:creationId xmlns:a16="http://schemas.microsoft.com/office/drawing/2014/main" id="{0A5EC664-EFAD-501E-02EA-4124C835D47B}"/>
+              </a:ext>
+            </a:extLst>
+          </p:cNvPr>
+          <p:cNvSpPr>
+            <a:spLocks noGrp="1"/>
+          </p:cNvSpPr>
+          <p:nvPr>
+            <p:ph idx="1"/>
+          </p:nvPr>
+        </p:nvSpPr>
+        <p:spPr/>
+        <p:txBody>
+          <a:bodyPr/>
+          <a:lstStyle/>
+          <a:p>
+            <a:r>
+              <a:rPr lang="en-US" dirty="0"/>
+              <a:t>What did you observe in the scenario?</a:t>
+            </a:r>
+          </a:p>
+          <a:p>
+            <a:r>
+              <a:rPr lang="en-US" dirty="0"/>
+              <a:t>How did the misinformation spread?</a:t>
+            </a:r>
+          </a:p>
+          <a:p>
+            <a:r>
+              <a:rPr lang="en-US" dirty="0"/>
+              <a:t>What were the immediate reactions?</a:t>
+            </a:r>
+          </a:p>
+        </p:txBody>
+      </p:sp>
+    </p:spTree>
+    <p:extLst>
+      <p:ext uri="{BB962C8B-B14F-4D97-AF65-F5344CB8AC3E}">
+        <p14:creationId xmlns:p14="http://schemas.microsoft.com/office/powerpoint/2010/main" val="1480791089"/>
+      </p:ext>
+    </p:extLst>
+  </p:cSld>
+  <p:clrMapOvr>
+    <a:masterClrMapping/>
+  </p:clrMapOvr>
+</p:sld>
+</file>
+
+<file path=ppt/slides/slide4.xml><?xml version="1.0" encoding="utf-8"?>
+<p:sld xmlns:a="http://schemas.openxmlformats.org/drawingml/2006/main" xmlns:r="http://schemas.openxmlformats.org/officeDocument/2006/relationships" xmlns:p="http://schemas.openxmlformats.org/presentationml/2006/main">
+  <p:cSld>
+    <p:spTree>
+      <p:nvGrpSpPr>
+        <p:cNvPr id="1" name=""/>
+        <p:cNvGrpSpPr/>
+        <p:nvPr/>
+      </p:nvGrpSpPr>
+      <p:grpSpPr>
+        <a:xfrm>
+          <a:off x="0" y="0"/>
+          <a:ext cx="0" cy="0"/>
+          <a:chOff x="0" y="0"/>
+          <a:chExt cx="0" cy="0"/>
+        </a:xfrm>
+      </p:grpSpPr>
+      <p:sp>
+        <p:nvSpPr>
+          <p:cNvPr id="2" name="Content Placeholder 1">
+            <a:extLst>
+              <a:ext uri="{FF2B5EF4-FFF2-40B4-BE49-F238E27FC236}">
+                <a16:creationId xmlns:a16="http://schemas.microsoft.com/office/drawing/2014/main" id="{7C1822AB-D5F0-D579-A820-812EE3C83EDD}"/>
+              </a:ext>
+            </a:extLst>
+          </p:cNvPr>
+          <p:cNvSpPr>
+            <a:spLocks noGrp="1"/>
+          </p:cNvSpPr>
+          <p:nvPr>
+            <p:ph/>
+          </p:nvPr>
+        </p:nvSpPr>
+        <p:spPr>
+          <a:xfrm>
+            <a:off x="375127" y="2963211"/>
+            <a:ext cx="11441743" cy="1061102"/>
+          </a:xfrm>
+        </p:spPr>
+        <p:txBody>
+          <a:bodyPr/>
+          <a:lstStyle/>
+          <a:p>
+            <a:pPr marL="0" indent="0" algn="ctr">
+              <a:buNone/>
+            </a:pPr>
+            <a:r>
+              <a:rPr lang="en-US" sz="6000" dirty="0">
+                <a:latin typeface="Arial" panose="020B0604020202020204" pitchFamily="34" charset="0"/>
+                <a:cs typeface="Arial" panose="020B0604020202020204" pitchFamily="34" charset="0"/>
+              </a:rPr>
+              <a:t>Countering Malign Information</a:t>
+            </a:r>
+          </a:p>
+        </p:txBody>
+      </p:sp>
+      <p:sp>
+        <p:nvSpPr>
+          <p:cNvPr id="3" name="Text Placeholder 2">
+            <a:extLst>
+              <a:ext uri="{FF2B5EF4-FFF2-40B4-BE49-F238E27FC236}">
+                <a16:creationId xmlns:a16="http://schemas.microsoft.com/office/drawing/2014/main" id="{D94C7E47-63B7-8E9D-6345-B12B99DBCE2B}"/>
+              </a:ext>
+            </a:extLst>
+          </p:cNvPr>
+          <p:cNvSpPr>
+            <a:spLocks noGrp="1"/>
+          </p:cNvSpPr>
+          <p:nvPr>
+            <p:ph type="body" sz="quarter" idx="10"/>
+          </p:nvPr>
+        </p:nvSpPr>
+        <p:spPr/>
+        <p:txBody>
+          <a:bodyPr/>
+          <a:lstStyle/>
+          <a:p>
+            <a:endParaRPr lang="en-US"/>
+          </a:p>
+        </p:txBody>
+      </p:sp>
+    </p:spTree>
+    <p:extLst>
+      <p:ext uri="{BB962C8B-B14F-4D97-AF65-F5344CB8AC3E}">
+        <p14:creationId xmlns:p14="http://schemas.microsoft.com/office/powerpoint/2010/main" val="2329516533"/>
+      </p:ext>
+    </p:extLst>
+  </p:cSld>
+  <p:clrMapOvr>
+    <a:masterClrMapping/>
+  </p:clrMapOvr>
+</p:sld>
+</file>
+
+<file path=ppt/slides/slide5.xml><?xml version="1.0" encoding="utf-8"?>
+<p:sld xmlns:a="http://schemas.openxmlformats.org/drawingml/2006/main" xmlns:r="http://schemas.openxmlformats.org/officeDocument/2006/relationships" xmlns:p="http://schemas.openxmlformats.org/presentationml/2006/main">
+  <p:cSld>
+    <p:bg>
+      <p:bgRef idx="1001">
+        <a:schemeClr val="bg1"/>
+      </p:bgRef>
+    </p:bg>
+    <p:spTree>
+      <p:nvGrpSpPr>
+        <p:cNvPr id="1" name=""/>
+        <p:cNvGrpSpPr/>
+        <p:nvPr/>
+      </p:nvGrpSpPr>
+      <p:grpSpPr>
+        <a:xfrm>
+          <a:off x="0" y="0"/>
+          <a:ext cx="0" cy="0"/>
+          <a:chOff x="0" y="0"/>
+          <a:chExt cx="0" cy="0"/>
+        </a:xfrm>
+      </p:grpSpPr>
+      <p:sp>
+        <p:nvSpPr>
+          <p:cNvPr id="2" name="Title 1">
+            <a:extLst>
+              <a:ext uri="{FF2B5EF4-FFF2-40B4-BE49-F238E27FC236}">
+                <a16:creationId xmlns:a16="http://schemas.microsoft.com/office/drawing/2014/main" id="{0E7CCAEB-D84E-456D-3B6B-2E9573C73F98}"/>
+              </a:ext>
+            </a:extLst>
+          </p:cNvPr>
+          <p:cNvSpPr>
+            <a:spLocks noGrp="1"/>
+          </p:cNvSpPr>
+          <p:nvPr>
+            <p:ph type="title"/>
+          </p:nvPr>
+        </p:nvSpPr>
+        <p:spPr/>
+        <p:txBody>
+          <a:bodyPr/>
+          <a:lstStyle/>
+          <a:p>
+            <a:r>
+              <a:rPr lang="en-US" dirty="0"/>
+              <a:t>Lesson Objectives</a:t>
+            </a:r>
+          </a:p>
+        </p:txBody>
+      </p:sp>
+      <p:sp>
+        <p:nvSpPr>
+          <p:cNvPr id="3" name="Content Placeholder 2">
+            <a:extLst>
+              <a:ext uri="{FF2B5EF4-FFF2-40B4-BE49-F238E27FC236}">
+                <a16:creationId xmlns:a16="http://schemas.microsoft.com/office/drawing/2014/main" id="{0A5EC664-EFAD-501E-02EA-4124C835D47B}"/>
+              </a:ext>
+            </a:extLst>
+          </p:cNvPr>
+          <p:cNvSpPr>
+            <a:spLocks noGrp="1"/>
+          </p:cNvSpPr>
+          <p:nvPr>
+            <p:ph idx="1"/>
+          </p:nvPr>
+        </p:nvSpPr>
+        <p:spPr/>
+        <p:txBody>
+          <a:bodyPr>
+            <a:normAutofit/>
+          </a:bodyPr>
+          <a:lstStyle/>
+          <a:p>
+            <a:r>
+              <a:rPr lang="en-US" b="1" dirty="0">
+                <a:effectLst/>
+                <a:latin typeface="Calibri" panose="020F0502020204030204" pitchFamily="34" charset="0"/>
+                <a:cs typeface="Calibri" panose="020F0502020204030204" pitchFamily="34" charset="0"/>
+              </a:rPr>
+              <a:t>Goal: </a:t>
+            </a:r>
+            <a:r>
+              <a:rPr lang="en-US" dirty="0">
+                <a:effectLst/>
+                <a:latin typeface="Calibri" panose="020F0502020204030204" pitchFamily="34" charset="0"/>
+                <a:cs typeface="Calibri" panose="020F0502020204030204" pitchFamily="34" charset="0"/>
+              </a:rPr>
+              <a:t>Develop TTPs to counter misinformation and disinformation effectively. </a:t>
+            </a:r>
+            <a:endParaRPr lang="en-US" dirty="0">
+              <a:latin typeface="Calibri" panose="020F0502020204030204" pitchFamily="34" charset="0"/>
+              <a:cs typeface="Calibri" panose="020F0502020204030204" pitchFamily="34" charset="0"/>
+            </a:endParaRPr>
+          </a:p>
+        </p:txBody>
+      </p:sp>
+    </p:spTree>
+    <p:extLst>
+      <p:ext uri="{BB962C8B-B14F-4D97-AF65-F5344CB8AC3E}">
+        <p14:creationId xmlns:p14="http://schemas.microsoft.com/office/powerpoint/2010/main" val="1075049808"/>
+      </p:ext>
+    </p:extLst>
+  </p:cSld>
+  <p:clrMapOvr>
+    <a:overrideClrMapping bg1="lt1" tx1="dk1" bg2="lt2" tx2="dk2" accent1="accent1" accent2="accent2" accent3="accent3" accent4="accent4" accent5="accent5" accent6="accent6" hlink="hlink" folHlink="folHlink"/>
+  </p:clrMapOvr>
+</p:sld>
+</file>
+
+<file path=ppt/slides/slide6.xml><?xml version="1.0" encoding="utf-8"?>
+<p:sld xmlns:a="http://schemas.openxmlformats.org/drawingml/2006/main" xmlns:r="http://schemas.openxmlformats.org/officeDocument/2006/relationships" xmlns:p="http://schemas.openxmlformats.org/presentationml/2006/main">
+  <p:cSld>
+    <p:spTree>
+      <p:nvGrpSpPr>
+        <p:cNvPr id="1" name=""/>
+        <p:cNvGrpSpPr/>
+        <p:nvPr/>
+      </p:nvGrpSpPr>
+      <p:grpSpPr>
+        <a:xfrm>
+          <a:off x="0" y="0"/>
+          <a:ext cx="0" cy="0"/>
+          <a:chOff x="0" y="0"/>
+          <a:chExt cx="0" cy="0"/>
+        </a:xfrm>
+      </p:grpSpPr>
+      <p:sp>
+        <p:nvSpPr>
+          <p:cNvPr id="2" name="Title 1">
+            <a:extLst>
+              <a:ext uri="{FF2B5EF4-FFF2-40B4-BE49-F238E27FC236}">
+                <a16:creationId xmlns:a16="http://schemas.microsoft.com/office/drawing/2014/main" id="{0E7CCAEB-D84E-456D-3B6B-2E9573C73F98}"/>
+              </a:ext>
+            </a:extLst>
+          </p:cNvPr>
+          <p:cNvSpPr>
+            <a:spLocks noGrp="1"/>
+          </p:cNvSpPr>
+          <p:nvPr>
+            <p:ph type="title"/>
+          </p:nvPr>
+        </p:nvSpPr>
+        <p:spPr/>
+        <p:txBody>
+          <a:bodyPr/>
+          <a:lstStyle/>
+          <a:p>
+            <a:r>
+              <a:rPr lang="en-US" dirty="0"/>
+              <a:t>Setting Your Goals</a:t>
+            </a:r>
+          </a:p>
+        </p:txBody>
+      </p:sp>
+      <p:sp>
+        <p:nvSpPr>
+          <p:cNvPr id="3" name="Content Placeholder 2">
+            <a:extLst>
+              <a:ext uri="{FF2B5EF4-FFF2-40B4-BE49-F238E27FC236}">
+                <a16:creationId xmlns:a16="http://schemas.microsoft.com/office/drawing/2014/main" id="{0A5EC664-EFAD-501E-02EA-4124C835D47B}"/>
+              </a:ext>
+            </a:extLst>
+          </p:cNvPr>
+          <p:cNvSpPr>
+            <a:spLocks noGrp="1"/>
+          </p:cNvSpPr>
+          <p:nvPr>
+            <p:ph idx="1"/>
+          </p:nvPr>
+        </p:nvSpPr>
+        <p:spPr/>
+        <p:txBody>
+          <a:bodyPr/>
+          <a:lstStyle/>
+          <a:p>
+            <a:r>
+              <a:rPr lang="en-US" dirty="0"/>
+              <a:t>Define what malign information looks like in your context.</a:t>
+            </a:r>
+          </a:p>
+          <a:p>
+            <a:r>
+              <a:rPr lang="en-US" dirty="0"/>
+              <a:t>Identify your goals when countering this information.</a:t>
+            </a:r>
+          </a:p>
+          <a:p>
+            <a:r>
+              <a:rPr lang="en-US" dirty="0"/>
+              <a:t>Discuss the importance of these goals in maintaining accurate information flow.</a:t>
+            </a:r>
+          </a:p>
+        </p:txBody>
+      </p:sp>
+    </p:spTree>
+    <p:extLst>
+      <p:ext uri="{BB962C8B-B14F-4D97-AF65-F5344CB8AC3E}">
+        <p14:creationId xmlns:p14="http://schemas.microsoft.com/office/powerpoint/2010/main" val="3365648032"/>
+      </p:ext>
+    </p:extLst>
+  </p:cSld>
+  <p:clrMapOvr>
+    <a:masterClrMapping/>
+  </p:clrMapOvr>
+</p:sld>
+</file>
+
+<file path=ppt/slides/slide7.xml><?xml version="1.0" encoding="utf-8"?>
+<p:sld xmlns:a="http://schemas.openxmlformats.org/drawingml/2006/main" xmlns:r="http://schemas.openxmlformats.org/officeDocument/2006/relationships" xmlns:p="http://schemas.openxmlformats.org/presentationml/2006/main">
+  <p:cSld>
+    <p:spTree>
+      <p:nvGrpSpPr>
+        <p:cNvPr id="1" name=""/>
+        <p:cNvGrpSpPr/>
+        <p:nvPr/>
+      </p:nvGrpSpPr>
+      <p:grpSpPr>
+        <a:xfrm>
+          <a:off x="0" y="0"/>
+          <a:ext cx="0" cy="0"/>
+          <a:chOff x="0" y="0"/>
+          <a:chExt cx="0" cy="0"/>
+        </a:xfrm>
+      </p:grpSpPr>
+      <p:sp>
+        <p:nvSpPr>
+          <p:cNvPr id="193" name="Title 2"/>
+          <p:cNvSpPr txBox="1">
+            <a:spLocks noGrp="1"/>
+          </p:cNvSpPr>
+          <p:nvPr>
+            <p:ph type="title" idx="4294967295"/>
+          </p:nvPr>
+        </p:nvSpPr>
+        <p:spPr>
+          <a:xfrm>
+            <a:off x="2154607" y="2531859"/>
+            <a:ext cx="3658054" cy="1786516"/>
+          </a:xfrm>
+          <a:prstGeom prst="rect">
+            <a:avLst/>
+          </a:prstGeom>
+        </p:spPr>
+        <p:txBody>
+          <a:bodyPr anchor="t"/>
+          <a:lstStyle>
+            <a:lvl1pPr>
+              <a:defRPr sz="4800" b="0">
+                <a:solidFill>
+                  <a:srgbClr val="44546A"/>
+                </a:solidFill>
+                <a:latin typeface="Calibri Light"/>
+                <a:ea typeface="Calibri Light"/>
+                <a:cs typeface="Calibri Light"/>
+                <a:sym typeface="Calibri Light"/>
+              </a:defRPr>
+            </a:lvl1pPr>
+          </a:lstStyle>
+          <a:p>
+            <a:r>
+              <a:t>TAKE A BREAK</a:t>
+            </a:r>
+          </a:p>
+        </p:txBody>
+      </p:sp>
+      <p:pic>
+        <p:nvPicPr>
+          <p:cNvPr id="194" name="Graphic 13" descr="Graphic 13"/>
+          <p:cNvPicPr>
+            <a:picLocks noChangeAspect="1"/>
+          </p:cNvPicPr>
+          <p:nvPr/>
+        </p:nvPicPr>
+        <p:blipFill>
+          <a:blip r:embed="rId2"/>
+          <a:stretch>
+            <a:fillRect/>
+          </a:stretch>
+        </p:blipFill>
+        <p:spPr>
+          <a:xfrm>
+            <a:off x="6379342" y="-259377"/>
+            <a:ext cx="5029201" cy="5029201"/>
+          </a:xfrm>
+          <a:prstGeom prst="rect">
+            <a:avLst/>
+          </a:prstGeom>
+          <a:ln w="12700">
+            <a:miter lim="400000"/>
+          </a:ln>
+        </p:spPr>
+      </p:pic>
+      <p:sp>
+        <p:nvSpPr>
+          <p:cNvPr id="195" name="TextBox 1"/>
+          <p:cNvSpPr txBox="1"/>
+          <p:nvPr/>
+        </p:nvSpPr>
+        <p:spPr>
+          <a:xfrm>
+            <a:off x="3715415" y="5405718"/>
+            <a:ext cx="3986136" cy="634118"/>
+          </a:xfrm>
+          <a:prstGeom prst="rect">
+            <a:avLst/>
+          </a:prstGeom>
+          <a:ln w="12700">
+            <a:miter lim="400000"/>
+          </a:ln>
+          <a:extLst>
+            <a:ext uri="{C572A759-6A51-4108-AA02-DFA0A04FC94B}">
+              <ma14:wrappingTextBoxFlag xmlns="" xmlns:m="http://schemas.openxmlformats.org/officeDocument/2006/math" xmlns:a14="http://schemas.microsoft.com/office/drawing/2010/main" xmlns:ma14="http://schemas.microsoft.com/office/mac/drawingml/2011/main" val="1"/>
+            </a:ext>
+          </a:extLst>
+        </p:spPr>
+        <p:txBody>
+          <a:bodyPr wrap="none" lIns="45719" rIns="45719">
+            <a:spAutoFit/>
+          </a:bodyPr>
+          <a:lstStyle>
+            <a:lvl1pPr>
+              <a:defRPr sz="4200" b="1"/>
+            </a:lvl1pPr>
+          </a:lstStyle>
+          <a:p>
+            <a:r>
+              <a:t>Return By: XX:XX </a:t>
+            </a:r>
+          </a:p>
+        </p:txBody>
+      </p:sp>
+      <p:sp>
+        <p:nvSpPr>
+          <p:cNvPr id="196" name="Slide Number"/>
+          <p:cNvSpPr txBox="1">
+            <a:spLocks noGrp="1"/>
+          </p:cNvSpPr>
+          <p:nvPr>
+            <p:ph type="sldNum" sz="quarter" idx="2"/>
+          </p:nvPr>
+        </p:nvSpPr>
+        <p:spPr>
+          <a:prstGeom prst="rect">
+            <a:avLst/>
+          </a:prstGeom>
+          <a:extLst>
+            <a:ext uri="{C572A759-6A51-4108-AA02-DFA0A04FC94B}">
+              <ma14:wrappingTextBoxFlag xmlns="" xmlns:m="http://schemas.openxmlformats.org/officeDocument/2006/math" xmlns:a14="http://schemas.microsoft.com/office/drawing/2010/main" xmlns:ma14="http://schemas.microsoft.com/office/mac/drawingml/2011/main" val="1"/>
+            </a:ext>
+          </a:extLst>
+        </p:spPr>
+        <p:txBody>
+          <a:bodyPr/>
+          <a:lstStyle/>
+          <a:p>
+            <a:fld id="{86CB4B4D-7CA3-9044-876B-883B54F8677D}" type="slidenum">
+              <a:rPr/>
+              <a:t>7</a:t>
+            </a:fld>
+            <a:endParaRPr/>
+          </a:p>
+        </p:txBody>
+      </p:sp>
+    </p:spTree>
+    <p:extLst>
+      <p:ext uri="{BB962C8B-B14F-4D97-AF65-F5344CB8AC3E}">
+        <p14:creationId xmlns:p14="http://schemas.microsoft.com/office/powerpoint/2010/main" val="4200951038"/>
+      </p:ext>
+    </p:extLst>
+  </p:cSld>
+  <p:clrMapOvr>
+    <a:masterClrMapping/>
+  </p:clrMapOvr>
+  <mc:AlternateContent xmlns:mc="http://schemas.openxmlformats.org/markup-compatibility/2006" xmlns:p14="http://schemas.microsoft.com/office/powerpoint/2010/main">
+    <mc:Choice Requires="p14">
+      <p:transition spd="slow" p14:dur="1200">
+        <p:push dir="u"/>
+      </p:transition>
+    </mc:Choice>
+    <mc:Fallback xmlns="" xmlns:m="http://schemas.openxmlformats.org/officeDocument/2006/math" xmlns:a14="http://schemas.microsoft.com/office/drawing/2010/main">
+      <p:transition spd="slow">
+        <p:fade/>
+      </p:transition>
+    </mc:Fallback>
+  </mc:AlternateContent>
+</p:sld>
+</file>
+
+<file path=ppt/slides/slide8.xml><?xml version="1.0" encoding="utf-8"?>
+<p:sld xmlns:a="http://schemas.openxmlformats.org/drawingml/2006/main" xmlns:r="http://schemas.openxmlformats.org/officeDocument/2006/relationships" xmlns:p="http://schemas.openxmlformats.org/presentationml/2006/main">
+  <p:cSld>
+    <p:spTree>
+      <p:nvGrpSpPr>
+        <p:cNvPr id="1" name=""/>
+        <p:cNvGrpSpPr/>
+        <p:nvPr/>
+      </p:nvGrpSpPr>
+      <p:grpSpPr>
+        <a:xfrm>
+          <a:off x="0" y="0"/>
+          <a:ext cx="0" cy="0"/>
+          <a:chOff x="0" y="0"/>
+          <a:chExt cx="0" cy="0"/>
+        </a:xfrm>
+      </p:grpSpPr>
+      <p:sp>
+        <p:nvSpPr>
+          <p:cNvPr id="198" name="Title 2"/>
+          <p:cNvSpPr txBox="1">
+            <a:spLocks noGrp="1"/>
+          </p:cNvSpPr>
+          <p:nvPr>
+            <p:ph type="title" idx="4294967295"/>
+          </p:nvPr>
+        </p:nvSpPr>
+        <p:spPr>
+          <a:xfrm>
+            <a:off x="2154607" y="2531859"/>
+            <a:ext cx="3658054" cy="1786516"/>
+          </a:xfrm>
+          <a:prstGeom prst="rect">
+            <a:avLst/>
+          </a:prstGeom>
+        </p:spPr>
+        <p:txBody>
+          <a:bodyPr anchor="t"/>
+          <a:lstStyle>
+            <a:lvl1pPr>
+              <a:defRPr sz="4800" b="0">
+                <a:solidFill>
+                  <a:srgbClr val="44546A"/>
+                </a:solidFill>
+                <a:latin typeface="Calibri Light"/>
+                <a:ea typeface="Calibri Light"/>
+                <a:cs typeface="Calibri Light"/>
+                <a:sym typeface="Calibri Light"/>
+              </a:defRPr>
+            </a:lvl1pPr>
+          </a:lstStyle>
+          <a:p>
+            <a:r>
+              <a:t>TOMAR UN DESCANSO</a:t>
+            </a:r>
+          </a:p>
+        </p:txBody>
+      </p:sp>
+      <p:pic>
+        <p:nvPicPr>
+          <p:cNvPr id="199" name="Graphic 13" descr="Graphic 13"/>
+          <p:cNvPicPr>
+            <a:picLocks noChangeAspect="1"/>
+          </p:cNvPicPr>
+          <p:nvPr/>
+        </p:nvPicPr>
+        <p:blipFill>
+          <a:blip r:embed="rId2"/>
+          <a:stretch>
+            <a:fillRect/>
+          </a:stretch>
+        </p:blipFill>
+        <p:spPr>
+          <a:xfrm>
+            <a:off x="6379342" y="-259377"/>
+            <a:ext cx="5029201" cy="5029201"/>
+          </a:xfrm>
+          <a:prstGeom prst="rect">
+            <a:avLst/>
+          </a:prstGeom>
+          <a:ln w="12700">
+            <a:miter lim="400000"/>
+          </a:ln>
+        </p:spPr>
+      </p:pic>
+      <p:sp>
+        <p:nvSpPr>
+          <p:cNvPr id="200" name="TextBox 1"/>
+          <p:cNvSpPr txBox="1"/>
+          <p:nvPr/>
+        </p:nvSpPr>
+        <p:spPr>
+          <a:xfrm>
+            <a:off x="3715415" y="5405718"/>
+            <a:ext cx="4111933" cy="634118"/>
+          </a:xfrm>
+          <a:prstGeom prst="rect">
+            <a:avLst/>
+          </a:prstGeom>
+          <a:ln w="12700">
+            <a:miter lim="400000"/>
+          </a:ln>
+          <a:extLst>
+            <a:ext uri="{C572A759-6A51-4108-AA02-DFA0A04FC94B}">
+              <ma14:wrappingTextBoxFlag xmlns="" xmlns:m="http://schemas.openxmlformats.org/officeDocument/2006/math" xmlns:a14="http://schemas.microsoft.com/office/drawing/2010/main" xmlns:ma14="http://schemas.microsoft.com/office/mac/drawingml/2011/main" val="1"/>
+            </a:ext>
+          </a:extLst>
+        </p:spPr>
+        <p:txBody>
+          <a:bodyPr wrap="none" lIns="45719" rIns="45719">
+            <a:spAutoFit/>
+          </a:bodyPr>
+          <a:lstStyle>
+            <a:lvl1pPr>
+              <a:defRPr sz="4200" b="1"/>
+            </a:lvl1pPr>
+          </a:lstStyle>
+          <a:p>
+            <a:r>
+              <a:t>Volver por: XX:XX </a:t>
+            </a:r>
+          </a:p>
+        </p:txBody>
+      </p:sp>
+      <p:sp>
+        <p:nvSpPr>
+          <p:cNvPr id="201" name="Slide Number"/>
+          <p:cNvSpPr txBox="1">
+            <a:spLocks noGrp="1"/>
+          </p:cNvSpPr>
+          <p:nvPr>
+            <p:ph type="sldNum" sz="quarter" idx="2"/>
+          </p:nvPr>
+        </p:nvSpPr>
+        <p:spPr>
+          <a:prstGeom prst="rect">
+            <a:avLst/>
+          </a:prstGeom>
+          <a:extLst>
+            <a:ext uri="{C572A759-6A51-4108-AA02-DFA0A04FC94B}">
+              <ma14:wrappingTextBoxFlag xmlns="" xmlns:m="http://schemas.openxmlformats.org/officeDocument/2006/math" xmlns:a14="http://schemas.microsoft.com/office/drawing/2010/main" xmlns:ma14="http://schemas.microsoft.com/office/mac/drawingml/2011/main" val="1"/>
+            </a:ext>
+          </a:extLst>
+        </p:spPr>
+        <p:txBody>
+          <a:bodyPr/>
+          <a:lstStyle/>
+          <a:p>
+            <a:fld id="{86CB4B4D-7CA3-9044-876B-883B54F8677D}" type="slidenum">
+              <a:t>8</a:t>
+            </a:fld>
+            <a:endParaRPr/>
+          </a:p>
+        </p:txBody>
+      </p:sp>
+    </p:spTree>
+    <p:extLst>
+      <p:ext uri="{BB962C8B-B14F-4D97-AF65-F5344CB8AC3E}">
+        <p14:creationId xmlns:p14="http://schemas.microsoft.com/office/powerpoint/2010/main" val="1046359596"/>
+      </p:ext>
+    </p:extLst>
+  </p:cSld>
+  <p:clrMapOvr>
+    <a:masterClrMapping/>
+  </p:clrMapOvr>
+  <p:transition spd="med"/>
+</p:sld>
+</file>
+
+<file path=ppt/slides/slide9.xml><?xml version="1.0" encoding="utf-8"?>
+<p:sld xmlns:a="http://schemas.openxmlformats.org/drawingml/2006/main" xmlns:r="http://schemas.openxmlformats.org/officeDocument/2006/relationships" xmlns:p="http://schemas.openxmlformats.org/presentationml/2006/main">
+  <p:cSld>
+    <p:spTree>
+      <p:nvGrpSpPr>
+        <p:cNvPr id="1" name=""/>
+        <p:cNvGrpSpPr/>
+        <p:nvPr/>
+      </p:nvGrpSpPr>
+      <p:grpSpPr>
+        <a:xfrm>
+          <a:off x="0" y="0"/>
+          <a:ext cx="0" cy="0"/>
+          <a:chOff x="0" y="0"/>
+          <a:chExt cx="0" cy="0"/>
+        </a:xfrm>
+      </p:grpSpPr>
+      <p:sp>
+        <p:nvSpPr>
+          <p:cNvPr id="2" name="Title 1">
+            <a:extLst>
+              <a:ext uri="{FF2B5EF4-FFF2-40B4-BE49-F238E27FC236}">
+                <a16:creationId xmlns:a16="http://schemas.microsoft.com/office/drawing/2014/main" id="{0E7CCAEB-D84E-456D-3B6B-2E9573C73F98}"/>
+              </a:ext>
+            </a:extLst>
+          </p:cNvPr>
+          <p:cNvSpPr>
+            <a:spLocks noGrp="1"/>
+          </p:cNvSpPr>
+          <p:nvPr>
+            <p:ph type="title"/>
+          </p:nvPr>
+        </p:nvSpPr>
+        <p:spPr/>
+        <p:txBody>
+          <a:bodyPr/>
+          <a:lstStyle/>
+          <a:p>
+            <a:r>
+              <a:rPr lang="en-US" dirty="0"/>
+              <a:t>Develop TTPs (20 Minutes)</a:t>
+            </a:r>
+          </a:p>
+        </p:txBody>
+      </p:sp>
+      <p:sp>
+        <p:nvSpPr>
+          <p:cNvPr id="3" name="Content Placeholder 2">
+            <a:extLst>
+              <a:ext uri="{FF2B5EF4-FFF2-40B4-BE49-F238E27FC236}">
+                <a16:creationId xmlns:a16="http://schemas.microsoft.com/office/drawing/2014/main" id="{0A5EC664-EFAD-501E-02EA-4124C835D47B}"/>
+              </a:ext>
+            </a:extLst>
+          </p:cNvPr>
+          <p:cNvSpPr>
+            <a:spLocks noGrp="1"/>
+          </p:cNvSpPr>
+          <p:nvPr>
+            <p:ph idx="1"/>
+          </p:nvPr>
+        </p:nvSpPr>
+        <p:spPr>
+          <a:xfrm>
+            <a:off x="838200" y="1825625"/>
+            <a:ext cx="10515600" cy="1139248"/>
+          </a:xfrm>
+        </p:spPr>
+        <p:txBody>
+          <a:bodyPr/>
+          <a:lstStyle/>
+          <a:p>
+            <a:r>
+              <a:rPr lang="en-US" dirty="0"/>
+              <a:t>Develop a counter strategy for a given scenario. </a:t>
+            </a:r>
+          </a:p>
+          <a:p>
+            <a:r>
+              <a:rPr lang="en-US" dirty="0"/>
+              <a:t>Work in groups to brainstorm and outline your TTPs.</a:t>
+            </a:r>
+          </a:p>
+        </p:txBody>
+      </p:sp>
+      <p:sp>
+        <p:nvSpPr>
+          <p:cNvPr id="4" name="TextBox 3">
+            <a:extLst>
+              <a:ext uri="{FF2B5EF4-FFF2-40B4-BE49-F238E27FC236}">
+                <a16:creationId xmlns:a16="http://schemas.microsoft.com/office/drawing/2014/main" id="{F2E718C6-32F5-6193-852B-D07BBF930FD7}"/>
+              </a:ext>
+            </a:extLst>
+          </p:cNvPr>
+          <p:cNvSpPr txBox="1"/>
+          <p:nvPr/>
+        </p:nvSpPr>
+        <p:spPr>
+          <a:xfrm>
+            <a:off x="387927" y="2964873"/>
+            <a:ext cx="5334000" cy="646331"/>
+          </a:xfrm>
+          <a:prstGeom prst="rect">
+            <a:avLst/>
+          </a:prstGeom>
+          <a:noFill/>
+        </p:spPr>
+        <p:txBody>
+          <a:bodyPr wrap="square" rtlCol="0">
+            <a:spAutoFit/>
+          </a:bodyPr>
+          <a:lstStyle/>
+          <a:p>
+            <a:r>
+              <a:rPr lang="en-US" dirty="0"/>
+              <a:t>Scenario 1:</a:t>
+            </a:r>
+          </a:p>
+          <a:p>
+            <a:pPr marL="285750" indent="-285750">
+              <a:buFont typeface="Arial" panose="020B0604020202020204" pitchFamily="34" charset="0"/>
+              <a:buChar char="•"/>
+            </a:pPr>
+            <a:endParaRPr lang="en-US" dirty="0"/>
+          </a:p>
+        </p:txBody>
+      </p:sp>
+      <p:sp>
+        <p:nvSpPr>
+          <p:cNvPr id="5" name="TextBox 4">
+            <a:extLst>
+              <a:ext uri="{FF2B5EF4-FFF2-40B4-BE49-F238E27FC236}">
+                <a16:creationId xmlns:a16="http://schemas.microsoft.com/office/drawing/2014/main" id="{0B9E14C4-BE62-051A-9961-9694EF2A3C02}"/>
+              </a:ext>
+            </a:extLst>
+          </p:cNvPr>
+          <p:cNvSpPr txBox="1"/>
+          <p:nvPr/>
+        </p:nvSpPr>
+        <p:spPr>
+          <a:xfrm>
+            <a:off x="6483929" y="2964873"/>
+            <a:ext cx="5334000" cy="646331"/>
+          </a:xfrm>
+          <a:prstGeom prst="rect">
+            <a:avLst/>
+          </a:prstGeom>
+          <a:noFill/>
+        </p:spPr>
+        <p:txBody>
+          <a:bodyPr wrap="square" rtlCol="0">
+            <a:spAutoFit/>
+          </a:bodyPr>
+          <a:lstStyle/>
+          <a:p>
+            <a:r>
+              <a:rPr lang="en-US" dirty="0"/>
+              <a:t>Scenario 2:</a:t>
+            </a:r>
+          </a:p>
+          <a:p>
+            <a:pPr marL="285750" indent="-285750">
+              <a:buFont typeface="Arial" panose="020B0604020202020204" pitchFamily="34" charset="0"/>
+              <a:buChar char="•"/>
+            </a:pPr>
+            <a:endParaRPr lang="en-US" dirty="0"/>
+          </a:p>
+        </p:txBody>
+      </p:sp>
+    </p:spTree>
+    <p:extLst>
+      <p:ext uri="{BB962C8B-B14F-4D97-AF65-F5344CB8AC3E}">
+        <p14:creationId xmlns:p14="http://schemas.microsoft.com/office/powerpoint/2010/main" val="3537485946"/>
+      </p:ext>
+    </p:extLst>
+  </p:cSld>
+  <p:clrMapOvr>
+    <a:masterClrMapping/>
+  </p:clrMapOvr>
 </p:sld>
 </file>
 
@@ -6770,4 +9736,47 @@
   <a:objectDefaults/>
   <a:extraClrSchemeLst/>
 </a:theme>
+</file>
+
+<file path=ppt/theme/themeOverride1.xml><?xml version="1.0" encoding="utf-8"?>
+<a:themeOverride xmlns:a="http://schemas.openxmlformats.org/drawingml/2006/main">
+  <a:clrScheme name="Office">
+    <a:dk1>
+      <a:sysClr val="windowText" lastClr="000000"/>
+    </a:dk1>
+    <a:lt1>
+      <a:sysClr val="window" lastClr="FFFFFF"/>
+    </a:lt1>
+    <a:dk2>
+      <a:srgbClr val="44546A"/>
+    </a:dk2>
+    <a:lt2>
+      <a:srgbClr val="E7E6E6"/>
+    </a:lt2>
+    <a:accent1>
+      <a:srgbClr val="4472C4"/>
+    </a:accent1>
+    <a:accent2>
+      <a:srgbClr val="ED7D31"/>
+    </a:accent2>
+    <a:accent3>
+      <a:srgbClr val="A5A5A5"/>
+    </a:accent3>
+    <a:accent4>
+      <a:srgbClr val="FFC000"/>
+    </a:accent4>
+    <a:accent5>
+      <a:srgbClr val="5B9BD5"/>
+    </a:accent5>
+    <a:accent6>
+      <a:srgbClr val="70AD47"/>
+    </a:accent6>
+    <a:hlink>
+      <a:srgbClr val="0563C1"/>
+    </a:hlink>
+    <a:folHlink>
+      <a:srgbClr val="954F72"/>
+    </a:folHlink>
+  </a:clrScheme>
+</a:themeOverride>
 </file>
</xml_diff>

<commit_message>
added mention to the handout
</commit_message>
<xml_diff>
--- a/Counter_Malign_Information/4-Implement-For_Instructors/Lesson_Plans/Lesson_06-Countering_Malign_Information/Audio_Visual-Counter-Malign_Information/Instructor-Lesson_Slide-Countering_Malign_Information.pptx
+++ b/Counter_Malign_Information/4-Implement-For_Instructors/Lesson_Plans/Lesson_06-Countering_Malign_Information/Audio_Visual-Counter-Malign_Information/Instructor-Lesson_Slide-Countering_Malign_Information.pptx
@@ -7081,8 +7081,19 @@
           <a:p>
             <a:r>
               <a:rPr lang="en-US" dirty="0"/>
-              <a:t>Groups will combine strategies to a main strategy. </a:t>
-            </a:r>
+              <a:t>Groups will combine strategies to a main strategy.</a:t>
+            </a:r>
+          </a:p>
+          <a:p>
+            <a:r>
+              <a:rPr lang="en-US" dirty="0"/>
+              <a:t>Follow instructions from </a:t>
+            </a:r>
+            <a:r>
+              <a:rPr lang="en-US"/>
+              <a:t>the handout. </a:t>
+            </a:r>
+            <a:endParaRPr lang="en-US" dirty="0"/>
           </a:p>
         </p:txBody>
       </p:sp>

</xml_diff>

<commit_message>
created duplicates to translate
</commit_message>
<xml_diff>
--- a/Counter_Malign_Information/4-Implement-For_Instructors/Lesson_Plans/Lesson_06-Countering_Malign_Information/Audio_Visual-Counter-Malign_Information/Instructor-Lesson_Slide-Countering_Malign_Information.pptx
+++ b/Counter_Malign_Information/4-Implement-For_Instructors/Lesson_Plans/Lesson_06-Countering_Malign_Information/Audio_Visual-Counter-Malign_Information/Instructor-Lesson_Slide-Countering_Malign_Information.pptx
@@ -6,33 +6,46 @@
     <p:sldMasterId id="2147483675" r:id="rId2"/>
   </p:sldMasterIdLst>
   <p:notesMasterIdLst>
-    <p:notesMasterId r:id="rId27"/>
+    <p:notesMasterId r:id="rId40"/>
   </p:notesMasterIdLst>
   <p:sldIdLst>
     <p:sldId id="620" r:id="rId3"/>
     <p:sldId id="383" r:id="rId4"/>
-    <p:sldId id="624" r:id="rId5"/>
-    <p:sldId id="621" r:id="rId6"/>
-    <p:sldId id="622" r:id="rId7"/>
-    <p:sldId id="623" r:id="rId8"/>
-    <p:sldId id="633" r:id="rId9"/>
-    <p:sldId id="634" r:id="rId10"/>
-    <p:sldId id="625" r:id="rId11"/>
-    <p:sldId id="626" r:id="rId12"/>
-    <p:sldId id="635" r:id="rId13"/>
-    <p:sldId id="636" r:id="rId14"/>
-    <p:sldId id="627" r:id="rId15"/>
-    <p:sldId id="628" r:id="rId16"/>
-    <p:sldId id="637" r:id="rId17"/>
-    <p:sldId id="638" r:id="rId18"/>
-    <p:sldId id="629" r:id="rId19"/>
-    <p:sldId id="630" r:id="rId20"/>
-    <p:sldId id="632" r:id="rId21"/>
-    <p:sldId id="631" r:id="rId22"/>
-    <p:sldId id="269" r:id="rId23"/>
-    <p:sldId id="270" r:id="rId24"/>
-    <p:sldId id="271" r:id="rId25"/>
-    <p:sldId id="272" r:id="rId26"/>
+    <p:sldId id="639" r:id="rId5"/>
+    <p:sldId id="624" r:id="rId6"/>
+    <p:sldId id="640" r:id="rId7"/>
+    <p:sldId id="621" r:id="rId8"/>
+    <p:sldId id="641" r:id="rId9"/>
+    <p:sldId id="622" r:id="rId10"/>
+    <p:sldId id="642" r:id="rId11"/>
+    <p:sldId id="623" r:id="rId12"/>
+    <p:sldId id="643" r:id="rId13"/>
+    <p:sldId id="633" r:id="rId14"/>
+    <p:sldId id="634" r:id="rId15"/>
+    <p:sldId id="625" r:id="rId16"/>
+    <p:sldId id="644" r:id="rId17"/>
+    <p:sldId id="626" r:id="rId18"/>
+    <p:sldId id="645" r:id="rId19"/>
+    <p:sldId id="635" r:id="rId20"/>
+    <p:sldId id="636" r:id="rId21"/>
+    <p:sldId id="627" r:id="rId22"/>
+    <p:sldId id="646" r:id="rId23"/>
+    <p:sldId id="628" r:id="rId24"/>
+    <p:sldId id="647" r:id="rId25"/>
+    <p:sldId id="637" r:id="rId26"/>
+    <p:sldId id="638" r:id="rId27"/>
+    <p:sldId id="629" r:id="rId28"/>
+    <p:sldId id="648" r:id="rId29"/>
+    <p:sldId id="630" r:id="rId30"/>
+    <p:sldId id="649" r:id="rId31"/>
+    <p:sldId id="632" r:id="rId32"/>
+    <p:sldId id="650" r:id="rId33"/>
+    <p:sldId id="631" r:id="rId34"/>
+    <p:sldId id="651" r:id="rId35"/>
+    <p:sldId id="269" r:id="rId36"/>
+    <p:sldId id="270" r:id="rId37"/>
+    <p:sldId id="271" r:id="rId38"/>
+    <p:sldId id="272" r:id="rId39"/>
   </p:sldIdLst>
   <p:sldSz cx="12192000" cy="6858000"/>
   <p:notesSz cx="6858000" cy="9144000"/>
@@ -676,6 +689,210 @@
 </p:notes>
 </file>
 
+<file path=ppt/notesSlides/notesSlide10.xml><?xml version="1.0" encoding="utf-8"?>
+<p:notes xmlns:a="http://schemas.openxmlformats.org/drawingml/2006/main" xmlns:r="http://schemas.openxmlformats.org/officeDocument/2006/relationships" xmlns:p="http://schemas.openxmlformats.org/presentationml/2006/main">
+  <p:cSld>
+    <p:spTree>
+      <p:nvGrpSpPr>
+        <p:cNvPr id="1" name=""/>
+        <p:cNvGrpSpPr/>
+        <p:nvPr/>
+      </p:nvGrpSpPr>
+      <p:grpSpPr>
+        <a:xfrm>
+          <a:off x="0" y="0"/>
+          <a:ext cx="0" cy="0"/>
+          <a:chOff x="0" y="0"/>
+          <a:chExt cx="0" cy="0"/>
+        </a:xfrm>
+      </p:grpSpPr>
+      <p:sp>
+        <p:nvSpPr>
+          <p:cNvPr id="2" name="Slide Image Placeholder 1"/>
+          <p:cNvSpPr>
+            <a:spLocks noGrp="1" noRot="1" noChangeAspect="1"/>
+          </p:cNvSpPr>
+          <p:nvPr>
+            <p:ph type="sldImg"/>
+          </p:nvPr>
+        </p:nvSpPr>
+        <p:spPr>
+          <a:xfrm>
+            <a:off x="382588" y="695325"/>
+            <a:ext cx="6092825" cy="3427413"/>
+          </a:xfrm>
+        </p:spPr>
+      </p:sp>
+      <p:sp>
+        <p:nvSpPr>
+          <p:cNvPr id="3" name="Notes Placeholder 2"/>
+          <p:cNvSpPr>
+            <a:spLocks noGrp="1"/>
+          </p:cNvSpPr>
+          <p:nvPr>
+            <p:ph type="body" idx="1"/>
+          </p:nvPr>
+        </p:nvSpPr>
+        <p:spPr/>
+        <p:txBody>
+          <a:bodyPr/>
+          <a:lstStyle/>
+          <a:p>
+            <a:endParaRPr lang="en-US" dirty="0"/>
+          </a:p>
+        </p:txBody>
+      </p:sp>
+      <p:sp>
+        <p:nvSpPr>
+          <p:cNvPr id="4" name="Slide Number Placeholder 3"/>
+          <p:cNvSpPr>
+            <a:spLocks noGrp="1"/>
+          </p:cNvSpPr>
+          <p:nvPr>
+            <p:ph type="sldNum" idx="8"/>
+          </p:nvPr>
+        </p:nvSpPr>
+        <p:spPr/>
+        <p:txBody>
+          <a:bodyPr/>
+          <a:lstStyle/>
+          <a:p>
+            <a:pPr indent="0" algn="r">
+              <a:buNone/>
+            </a:pPr>
+            <a:fld id="{96D071C0-0F6A-4E5C-B3E5-B824FE66220F}" type="slidenum">
+              <a:rPr lang="en-US" sz="1400" b="0" strike="noStrike" spc="-1" smtClean="0">
+                <a:solidFill>
+                  <a:srgbClr val="000000"/>
+                </a:solidFill>
+                <a:latin typeface="Times New Roman"/>
+              </a:rPr>
+              <a:t>20</a:t>
+            </a:fld>
+            <a:endParaRPr lang="en-US" sz="1400" b="0" strike="noStrike" spc="-1">
+              <a:solidFill>
+                <a:srgbClr val="000000"/>
+              </a:solidFill>
+              <a:latin typeface="Times New Roman"/>
+            </a:endParaRPr>
+          </a:p>
+        </p:txBody>
+      </p:sp>
+    </p:spTree>
+    <p:extLst>
+      <p:ext uri="{BB962C8B-B14F-4D97-AF65-F5344CB8AC3E}">
+        <p14:creationId xmlns:p14="http://schemas.microsoft.com/office/powerpoint/2010/main" val="4240478554"/>
+      </p:ext>
+    </p:extLst>
+  </p:cSld>
+  <p:clrMapOvr>
+    <a:masterClrMapping/>
+  </p:clrMapOvr>
+</p:notes>
+</file>
+
+<file path=ppt/notesSlides/notesSlide11.xml><?xml version="1.0" encoding="utf-8"?>
+<p:notes xmlns:a="http://schemas.openxmlformats.org/drawingml/2006/main" xmlns:r="http://schemas.openxmlformats.org/officeDocument/2006/relationships" xmlns:p="http://schemas.openxmlformats.org/presentationml/2006/main">
+  <p:cSld>
+    <p:spTree>
+      <p:nvGrpSpPr>
+        <p:cNvPr id="1" name=""/>
+        <p:cNvGrpSpPr/>
+        <p:nvPr/>
+      </p:nvGrpSpPr>
+      <p:grpSpPr>
+        <a:xfrm>
+          <a:off x="0" y="0"/>
+          <a:ext cx="0" cy="0"/>
+          <a:chOff x="0" y="0"/>
+          <a:chExt cx="0" cy="0"/>
+        </a:xfrm>
+      </p:grpSpPr>
+      <p:sp>
+        <p:nvSpPr>
+          <p:cNvPr id="2" name="Slide Image Placeholder 1"/>
+          <p:cNvSpPr>
+            <a:spLocks noGrp="1" noRot="1" noChangeAspect="1"/>
+          </p:cNvSpPr>
+          <p:nvPr>
+            <p:ph type="sldImg"/>
+          </p:nvPr>
+        </p:nvSpPr>
+        <p:spPr>
+          <a:xfrm>
+            <a:off x="382588" y="695325"/>
+            <a:ext cx="6092825" cy="3427413"/>
+          </a:xfrm>
+        </p:spPr>
+      </p:sp>
+      <p:sp>
+        <p:nvSpPr>
+          <p:cNvPr id="3" name="Notes Placeholder 2"/>
+          <p:cNvSpPr>
+            <a:spLocks noGrp="1"/>
+          </p:cNvSpPr>
+          <p:nvPr>
+            <p:ph type="body" idx="1"/>
+          </p:nvPr>
+        </p:nvSpPr>
+        <p:spPr/>
+        <p:txBody>
+          <a:bodyPr/>
+          <a:lstStyle/>
+          <a:p>
+            <a:endParaRPr lang="en-US" dirty="0"/>
+          </a:p>
+        </p:txBody>
+      </p:sp>
+      <p:sp>
+        <p:nvSpPr>
+          <p:cNvPr id="4" name="Slide Number Placeholder 3"/>
+          <p:cNvSpPr>
+            <a:spLocks noGrp="1"/>
+          </p:cNvSpPr>
+          <p:nvPr>
+            <p:ph type="sldNum" idx="8"/>
+          </p:nvPr>
+        </p:nvSpPr>
+        <p:spPr/>
+        <p:txBody>
+          <a:bodyPr/>
+          <a:lstStyle/>
+          <a:p>
+            <a:pPr indent="0" algn="r">
+              <a:buNone/>
+            </a:pPr>
+            <a:fld id="{96D071C0-0F6A-4E5C-B3E5-B824FE66220F}" type="slidenum">
+              <a:rPr lang="en-US" sz="1400" b="0" strike="noStrike" spc="-1" smtClean="0">
+                <a:solidFill>
+                  <a:srgbClr val="000000"/>
+                </a:solidFill>
+                <a:latin typeface="Times New Roman"/>
+              </a:rPr>
+              <a:t>21</a:t>
+            </a:fld>
+            <a:endParaRPr lang="en-US" sz="1400" b="0" strike="noStrike" spc="-1">
+              <a:solidFill>
+                <a:srgbClr val="000000"/>
+              </a:solidFill>
+              <a:latin typeface="Times New Roman"/>
+            </a:endParaRPr>
+          </a:p>
+        </p:txBody>
+      </p:sp>
+    </p:spTree>
+    <p:extLst>
+      <p:ext uri="{BB962C8B-B14F-4D97-AF65-F5344CB8AC3E}">
+        <p14:creationId xmlns:p14="http://schemas.microsoft.com/office/powerpoint/2010/main" val="1962923131"/>
+      </p:ext>
+    </p:extLst>
+  </p:cSld>
+  <p:clrMapOvr>
+    <a:masterClrMapping/>
+  </p:clrMapOvr>
+</p:notes>
+</file>
+
 <file path=ppt/notesSlides/notesSlide2.xml><?xml version="1.0" encoding="utf-8"?>
 <p:notes xmlns:a="http://schemas.openxmlformats.org/drawingml/2006/main" xmlns:r="http://schemas.openxmlformats.org/officeDocument/2006/relationships" xmlns:p="http://schemas.openxmlformats.org/presentationml/2006/main">
   <p:cSld>
@@ -1131,18 +1348,308 @@
           <a:lstStyle/>
           <a:p>
             <a:r>
-              <a:rPr lang="en-US" dirty="0"/>
-              <a:t>Start by creating a slide master that is in English. As needed duplicate and translate slides into target language. Color English slides in Yellow and target language slides in white. </a:t>
-            </a:r>
-            <a:br>
-              <a:rPr lang="en-US" dirty="0"/>
-            </a:br>
-            <a:br>
-              <a:rPr lang="en-US" dirty="0"/>
-            </a:br>
-            <a:r>
-              <a:rPr lang="en-US" dirty="0"/>
-              <a:t>The example below uses Spanish as a theoretical target language. </a:t>
+              <a:rPr lang="en-US" b="0" dirty="0">
+                <a:solidFill>
+                  <a:srgbClr val="6796E6"/>
+                </a:solidFill>
+                <a:effectLst/>
+                <a:highlight>
+                  <a:srgbClr val="1F1F1F"/>
+                </a:highlight>
+                <a:latin typeface="Menlo" panose="020B0609030804020204" pitchFamily="49" charset="0"/>
+              </a:rPr>
+              <a:t>1.</a:t>
+            </a:r>
+            <a:r>
+              <a:rPr lang="en-US" b="0" dirty="0">
+                <a:solidFill>
+                  <a:srgbClr val="CCCCCC"/>
+                </a:solidFill>
+                <a:effectLst/>
+                <a:highlight>
+                  <a:srgbClr val="1F1F1F"/>
+                </a:highlight>
+                <a:latin typeface="Menlo" panose="020B0609030804020204" pitchFamily="49" charset="0"/>
+              </a:rPr>
+              <a:t> </a:t>
+            </a:r>
+            <a:r>
+              <a:rPr lang="en-US" b="0" i="1" dirty="0">
+                <a:solidFill>
+                  <a:srgbClr val="CCCCCC"/>
+                </a:solidFill>
+                <a:effectLst/>
+                <a:highlight>
+                  <a:srgbClr val="1F1F1F"/>
+                </a:highlight>
+                <a:latin typeface="Menlo" panose="020B0609030804020204" pitchFamily="49" charset="0"/>
+              </a:rPr>
+              <a:t>_Present students with a simulated scenario where a rumor is spreading rapidly._</a:t>
+            </a:r>
+            <a:r>
+              <a:rPr lang="en-US" b="0" dirty="0">
+                <a:solidFill>
+                  <a:srgbClr val="CCCCCC"/>
+                </a:solidFill>
+                <a:effectLst/>
+                <a:highlight>
+                  <a:srgbClr val="1F1F1F"/>
+                </a:highlight>
+                <a:latin typeface="Menlo" panose="020B0609030804020204" pitchFamily="49" charset="0"/>
+              </a:rPr>
+              <a:t> (12 minutes)</a:t>
+            </a:r>
+          </a:p>
+          <a:p>
+            <a:r>
+              <a:rPr lang="en-US" b="0" dirty="0">
+                <a:solidFill>
+                  <a:srgbClr val="6796E6"/>
+                </a:solidFill>
+                <a:effectLst/>
+                <a:highlight>
+                  <a:srgbClr val="1F1F1F"/>
+                </a:highlight>
+                <a:latin typeface="Menlo" panose="020B0609030804020204" pitchFamily="49" charset="0"/>
+              </a:rPr>
+              <a:t>2.</a:t>
+            </a:r>
+            <a:r>
+              <a:rPr lang="en-US" b="0" dirty="0">
+                <a:solidFill>
+                  <a:srgbClr val="CCCCCC"/>
+                </a:solidFill>
+                <a:effectLst/>
+                <a:highlight>
+                  <a:srgbClr val="1F1F1F"/>
+                </a:highlight>
+                <a:latin typeface="Menlo" panose="020B0609030804020204" pitchFamily="49" charset="0"/>
+              </a:rPr>
+              <a:t> Steps: </a:t>
+            </a:r>
+          </a:p>
+          <a:p>
+            <a:pPr lvl="1"/>
+            <a:r>
+              <a:rPr lang="en-US" b="0" dirty="0">
+                <a:solidFill>
+                  <a:srgbClr val="6796E6"/>
+                </a:solidFill>
+                <a:effectLst/>
+                <a:highlight>
+                  <a:srgbClr val="1F1F1F"/>
+                </a:highlight>
+                <a:latin typeface="Menlo" panose="020B0609030804020204" pitchFamily="49" charset="0"/>
+              </a:rPr>
+              <a:t>1.</a:t>
+            </a:r>
+            <a:r>
+              <a:rPr lang="en-US" b="0" dirty="0">
+                <a:solidFill>
+                  <a:srgbClr val="CCCCCC"/>
+                </a:solidFill>
+                <a:effectLst/>
+                <a:highlight>
+                  <a:srgbClr val="1F1F1F"/>
+                </a:highlight>
+                <a:latin typeface="Menlo" panose="020B0609030804020204" pitchFamily="49" charset="0"/>
+              </a:rPr>
+              <a:t> Instruct 3 students to leave the room. Outside of the room the students will be given instruction to spread misinformation about a specific topic.</a:t>
+            </a:r>
+          </a:p>
+          <a:p>
+            <a:pPr lvl="1"/>
+            <a:r>
+              <a:rPr lang="en-US" b="0" dirty="0">
+                <a:solidFill>
+                  <a:srgbClr val="6796E6"/>
+                </a:solidFill>
+                <a:effectLst/>
+                <a:highlight>
+                  <a:srgbClr val="1F1F1F"/>
+                </a:highlight>
+                <a:latin typeface="Menlo" panose="020B0609030804020204" pitchFamily="49" charset="0"/>
+              </a:rPr>
+              <a:t>1.</a:t>
+            </a:r>
+            <a:r>
+              <a:rPr lang="en-US" b="0" dirty="0">
+                <a:solidFill>
+                  <a:srgbClr val="CCCCCC"/>
+                </a:solidFill>
+                <a:effectLst/>
+                <a:highlight>
+                  <a:srgbClr val="1F1F1F"/>
+                </a:highlight>
+                <a:latin typeface="Menlo" panose="020B0609030804020204" pitchFamily="49" charset="0"/>
+              </a:rPr>
+              <a:t> Instruct 1 student to return to the room and and to not leave the room until instructed to do so by the instructor.</a:t>
+            </a:r>
+          </a:p>
+          <a:p>
+            <a:r>
+              <a:rPr lang="en-US" b="0" dirty="0">
+                <a:solidFill>
+                  <a:srgbClr val="6796E6"/>
+                </a:solidFill>
+                <a:effectLst/>
+                <a:highlight>
+                  <a:srgbClr val="1F1F1F"/>
+                </a:highlight>
+                <a:latin typeface="Menlo" panose="020B0609030804020204" pitchFamily="49" charset="0"/>
+              </a:rPr>
+              <a:t>2.</a:t>
+            </a:r>
+            <a:r>
+              <a:rPr lang="en-US" b="0" dirty="0">
+                <a:solidFill>
+                  <a:srgbClr val="CCCCCC"/>
+                </a:solidFill>
+                <a:effectLst/>
+                <a:highlight>
+                  <a:srgbClr val="1F1F1F"/>
+                </a:highlight>
+                <a:latin typeface="Menlo" panose="020B0609030804020204" pitchFamily="49" charset="0"/>
+              </a:rPr>
+              <a:t> Instruct 2 students to go to the common area and begin spreading the misinformation they were given.</a:t>
+            </a:r>
+          </a:p>
+          <a:p>
+            <a:r>
+              <a:rPr lang="en-US" b="0" dirty="0">
+                <a:solidFill>
+                  <a:srgbClr val="6796E6"/>
+                </a:solidFill>
+                <a:effectLst/>
+                <a:highlight>
+                  <a:srgbClr val="1F1F1F"/>
+                </a:highlight>
+                <a:latin typeface="Menlo" panose="020B0609030804020204" pitchFamily="49" charset="0"/>
+              </a:rPr>
+              <a:t>2.</a:t>
+            </a:r>
+            <a:r>
+              <a:rPr lang="en-US" b="0" dirty="0">
+                <a:solidFill>
+                  <a:srgbClr val="CCCCCC"/>
+                </a:solidFill>
+                <a:effectLst/>
+                <a:highlight>
+                  <a:srgbClr val="1F1F1F"/>
+                </a:highlight>
+                <a:latin typeface="Menlo" panose="020B0609030804020204" pitchFamily="49" charset="0"/>
+              </a:rPr>
+              <a:t> The remaining students will be asked about their day and other small talk to create a relaxed environment.</a:t>
+            </a:r>
+          </a:p>
+          <a:p>
+            <a:r>
+              <a:rPr lang="en-US" b="0" dirty="0">
+                <a:solidFill>
+                  <a:srgbClr val="6796E6"/>
+                </a:solidFill>
+                <a:effectLst/>
+                <a:highlight>
+                  <a:srgbClr val="1F1F1F"/>
+                </a:highlight>
+                <a:latin typeface="Menlo" panose="020B0609030804020204" pitchFamily="49" charset="0"/>
+              </a:rPr>
+              <a:t>3.</a:t>
+            </a:r>
+            <a:r>
+              <a:rPr lang="en-US" b="0" dirty="0">
+                <a:solidFill>
+                  <a:srgbClr val="CCCCCC"/>
+                </a:solidFill>
+                <a:effectLst/>
+                <a:highlight>
+                  <a:srgbClr val="1F1F1F"/>
+                </a:highlight>
+                <a:latin typeface="Menlo" panose="020B0609030804020204" pitchFamily="49" charset="0"/>
+              </a:rPr>
+              <a:t> The 3 students will return to the room and begin spreading the misinformation they were given trying to get people to rush out of the room.</a:t>
+            </a:r>
+          </a:p>
+          <a:p>
+            <a:r>
+              <a:rPr lang="en-US" b="0" dirty="0">
+                <a:solidFill>
+                  <a:srgbClr val="6796E6"/>
+                </a:solidFill>
+                <a:effectLst/>
+                <a:highlight>
+                  <a:srgbClr val="1F1F1F"/>
+                </a:highlight>
+                <a:latin typeface="Menlo" panose="020B0609030804020204" pitchFamily="49" charset="0"/>
+              </a:rPr>
+              <a:t>4.</a:t>
+            </a:r>
+            <a:r>
+              <a:rPr lang="en-US" b="0" dirty="0">
+                <a:solidFill>
+                  <a:srgbClr val="CCCCCC"/>
+                </a:solidFill>
+                <a:effectLst/>
+                <a:highlight>
+                  <a:srgbClr val="1F1F1F"/>
+                </a:highlight>
+                <a:latin typeface="Menlo" panose="020B0609030804020204" pitchFamily="49" charset="0"/>
+              </a:rPr>
+              <a:t> Students that leave the room will be caught by an assistant instructor and asked to return to the room to discuss what they experienced.</a:t>
+            </a:r>
+          </a:p>
+          <a:p>
+            <a:r>
+              <a:rPr lang="en-US" b="0" dirty="0">
+                <a:solidFill>
+                  <a:srgbClr val="6796E6"/>
+                </a:solidFill>
+                <a:effectLst/>
+                <a:highlight>
+                  <a:srgbClr val="1F1F1F"/>
+                </a:highlight>
+                <a:latin typeface="Menlo" panose="020B0609030804020204" pitchFamily="49" charset="0"/>
+              </a:rPr>
+              <a:t>3.</a:t>
+            </a:r>
+            <a:r>
+              <a:rPr lang="en-US" b="0" dirty="0">
+                <a:solidFill>
+                  <a:srgbClr val="CCCCCC"/>
+                </a:solidFill>
+                <a:effectLst/>
+                <a:highlight>
+                  <a:srgbClr val="1F1F1F"/>
+                </a:highlight>
+                <a:latin typeface="Menlo" panose="020B0609030804020204" pitchFamily="49" charset="0"/>
+              </a:rPr>
+              <a:t> </a:t>
+            </a:r>
+            <a:r>
+              <a:rPr lang="en-US" b="0" i="1" dirty="0">
+                <a:solidFill>
+                  <a:srgbClr val="CCCCCC"/>
+                </a:solidFill>
+                <a:effectLst/>
+                <a:highlight>
+                  <a:srgbClr val="1F1F1F"/>
+                </a:highlight>
+                <a:latin typeface="Menlo" panose="020B0609030804020204" pitchFamily="49" charset="0"/>
+              </a:rPr>
+              <a:t>_Ask students "What did you observe in the scenario?"_</a:t>
+            </a:r>
+            <a:r>
+              <a:rPr lang="en-US" b="0" dirty="0">
+                <a:solidFill>
+                  <a:srgbClr val="CCCCCC"/>
+                </a:solidFill>
+                <a:effectLst/>
+                <a:highlight>
+                  <a:srgbClr val="1F1F1F"/>
+                </a:highlight>
+                <a:latin typeface="Menlo" panose="020B0609030804020204" pitchFamily="49" charset="0"/>
+              </a:rPr>
+              <a:t> (7 minutes) </a:t>
             </a:r>
           </a:p>
         </p:txBody>
@@ -1172,7 +1679,7 @@
                 </a:solidFill>
                 <a:latin typeface="Times New Roman"/>
               </a:rPr>
-              <a:t>4</a:t>
+              <a:t>3</a:t>
             </a:fld>
             <a:endParaRPr lang="en-US" sz="1400" b="0" strike="noStrike" spc="-1">
               <a:solidFill>
@@ -1186,7 +1693,7 @@
     </p:spTree>
     <p:extLst>
       <p:ext uri="{BB962C8B-B14F-4D97-AF65-F5344CB8AC3E}">
-        <p14:creationId xmlns:p14="http://schemas.microsoft.com/office/powerpoint/2010/main" val="2282271852"/>
+        <p14:creationId xmlns:p14="http://schemas.microsoft.com/office/powerpoint/2010/main" val="97730141"/>
       </p:ext>
     </p:extLst>
   </p:cSld>
@@ -1246,39 +1753,19 @@
           <a:lstStyle/>
           <a:p>
             <a:r>
-              <a:rPr lang="en-US" sz="1200" b="1" dirty="0">
-                <a:effectLst/>
-                <a:latin typeface="Arial" panose="020B0604020202020204" pitchFamily="34" charset="0"/>
-              </a:rPr>
-              <a:t>How We'll Do It: </a:t>
-            </a:r>
-            <a:r>
-              <a:rPr lang="en-US" sz="1200" dirty="0">
-                <a:effectLst/>
-                <a:latin typeface="ArialMT"/>
-              </a:rPr>
-              <a:t>By sharing your experiences and expertise, we'll develop and implement counter strategies.</a:t>
-            </a:r>
-          </a:p>
-          <a:p>
-            <a:r>
-              <a:rPr lang="en-US" sz="1200" b="1" dirty="0">
-                <a:effectLst/>
-                <a:latin typeface="Arial" panose="020B0604020202020204" pitchFamily="34" charset="0"/>
-              </a:rPr>
-              <a:t>What You'll Have: </a:t>
-            </a:r>
-            <a:r>
-              <a:rPr lang="en-US" sz="1200" dirty="0">
-                <a:effectLst/>
-                <a:latin typeface="ArialMT"/>
-              </a:rPr>
-              <a:t>The skills to counter misinformation and disinformation, ensuring accurate information is spread and false information is reduced by 80%. </a:t>
-            </a:r>
-            <a:endParaRPr lang="en-US" dirty="0"/>
-          </a:p>
-          <a:p>
-            <a:endParaRPr lang="en-US" dirty="0"/>
+              <a:rPr lang="en-US" dirty="0"/>
+              <a:t>Start by creating a slide master that is in English. As needed duplicate and translate slides into target language. Color English slides in Yellow and target language slides in white. </a:t>
+            </a:r>
+            <a:br>
+              <a:rPr lang="en-US" dirty="0"/>
+            </a:br>
+            <a:br>
+              <a:rPr lang="en-US" dirty="0"/>
+            </a:br>
+            <a:r>
+              <a:rPr lang="en-US" dirty="0"/>
+              <a:t>The example below uses Spanish as a theoretical target language. </a:t>
+            </a:r>
           </a:p>
         </p:txBody>
       </p:sp>
@@ -1307,7 +1794,7 @@
                 </a:solidFill>
                 <a:latin typeface="Times New Roman"/>
               </a:rPr>
-              <a:t>5</a:t>
+              <a:t>6</a:t>
             </a:fld>
             <a:endParaRPr lang="en-US" sz="1400" b="0" strike="noStrike" spc="-1">
               <a:solidFill>
@@ -1321,7 +1808,7 @@
     </p:spTree>
     <p:extLst>
       <p:ext uri="{BB962C8B-B14F-4D97-AF65-F5344CB8AC3E}">
-        <p14:creationId xmlns:p14="http://schemas.microsoft.com/office/powerpoint/2010/main" val="3297278724"/>
+        <p14:creationId xmlns:p14="http://schemas.microsoft.com/office/powerpoint/2010/main" val="2282271852"/>
       </p:ext>
     </p:extLst>
   </p:cSld>
@@ -1382,7 +1869,17 @@
           <a:p>
             <a:r>
               <a:rPr lang="en-US" dirty="0"/>
-              <a:t>This is a brain storming session where ideas should be brought by students. Instructor should help students refine their goals by asking appropriate questions about would that goal help you achieve your greater organization and mission goals. </a:t>
+              <a:t>Start by creating a slide master that is in English. As needed duplicate and translate slides into target language. Color English slides in Yellow and target language slides in white. </a:t>
+            </a:r>
+            <a:br>
+              <a:rPr lang="en-US" dirty="0"/>
+            </a:br>
+            <a:br>
+              <a:rPr lang="en-US" dirty="0"/>
+            </a:br>
+            <a:r>
+              <a:rPr lang="en-US" dirty="0"/>
+              <a:t>The example below uses Spanish as a theoretical target language. </a:t>
             </a:r>
           </a:p>
         </p:txBody>
@@ -1412,7 +1909,7 @@
                 </a:solidFill>
                 <a:latin typeface="Times New Roman"/>
               </a:rPr>
-              <a:t>6</a:t>
+              <a:t>7</a:t>
             </a:fld>
             <a:endParaRPr lang="en-US" sz="1400" b="0" strike="noStrike" spc="-1">
               <a:solidFill>
@@ -1426,7 +1923,7 @@
     </p:spTree>
     <p:extLst>
       <p:ext uri="{BB962C8B-B14F-4D97-AF65-F5344CB8AC3E}">
-        <p14:creationId xmlns:p14="http://schemas.microsoft.com/office/powerpoint/2010/main" val="2749563859"/>
+        <p14:creationId xmlns:p14="http://schemas.microsoft.com/office/powerpoint/2010/main" val="2327406950"/>
       </p:ext>
     </p:extLst>
   </p:cSld>
@@ -1485,6 +1982,39 @@
           <a:bodyPr/>
           <a:lstStyle/>
           <a:p>
+            <a:r>
+              <a:rPr lang="en-US" sz="1200" b="1" dirty="0">
+                <a:effectLst/>
+                <a:latin typeface="Arial" panose="020B0604020202020204" pitchFamily="34" charset="0"/>
+              </a:rPr>
+              <a:t>How We'll Do It: </a:t>
+            </a:r>
+            <a:r>
+              <a:rPr lang="en-US" sz="1200" dirty="0">
+                <a:effectLst/>
+                <a:latin typeface="ArialMT"/>
+              </a:rPr>
+              <a:t>By sharing your experiences and expertise, we'll develop and implement counter strategies.</a:t>
+            </a:r>
+          </a:p>
+          <a:p>
+            <a:r>
+              <a:rPr lang="en-US" sz="1200" b="1" dirty="0">
+                <a:effectLst/>
+                <a:latin typeface="Arial" panose="020B0604020202020204" pitchFamily="34" charset="0"/>
+              </a:rPr>
+              <a:t>What You'll Have: </a:t>
+            </a:r>
+            <a:r>
+              <a:rPr lang="en-US" sz="1200" dirty="0">
+                <a:effectLst/>
+                <a:latin typeface="ArialMT"/>
+              </a:rPr>
+              <a:t>The skills to counter misinformation and disinformation, ensuring accurate information is spread and false information is reduced by 80%. </a:t>
+            </a:r>
+            <a:endParaRPr lang="en-US" dirty="0"/>
+          </a:p>
+          <a:p>
             <a:endParaRPr lang="en-US" dirty="0"/>
           </a:p>
         </p:txBody>
@@ -1514,7 +2044,7 @@
                 </a:solidFill>
                 <a:latin typeface="Times New Roman"/>
               </a:rPr>
-              <a:t>13</a:t>
+              <a:t>8</a:t>
             </a:fld>
             <a:endParaRPr lang="en-US" sz="1400" b="0" strike="noStrike" spc="-1">
               <a:solidFill>
@@ -1528,7 +2058,352 @@
     </p:spTree>
     <p:extLst>
       <p:ext uri="{BB962C8B-B14F-4D97-AF65-F5344CB8AC3E}">
-        <p14:creationId xmlns:p14="http://schemas.microsoft.com/office/powerpoint/2010/main" val="4240478554"/>
+        <p14:creationId xmlns:p14="http://schemas.microsoft.com/office/powerpoint/2010/main" val="3297278724"/>
+      </p:ext>
+    </p:extLst>
+  </p:cSld>
+  <p:clrMapOvr>
+    <a:masterClrMapping/>
+  </p:clrMapOvr>
+</p:notes>
+</file>
+
+<file path=ppt/notesSlides/notesSlide7.xml><?xml version="1.0" encoding="utf-8"?>
+<p:notes xmlns:a="http://schemas.openxmlformats.org/drawingml/2006/main" xmlns:r="http://schemas.openxmlformats.org/officeDocument/2006/relationships" xmlns:p="http://schemas.openxmlformats.org/presentationml/2006/main">
+  <p:cSld>
+    <p:spTree>
+      <p:nvGrpSpPr>
+        <p:cNvPr id="1" name=""/>
+        <p:cNvGrpSpPr/>
+        <p:nvPr/>
+      </p:nvGrpSpPr>
+      <p:grpSpPr>
+        <a:xfrm>
+          <a:off x="0" y="0"/>
+          <a:ext cx="0" cy="0"/>
+          <a:chOff x="0" y="0"/>
+          <a:chExt cx="0" cy="0"/>
+        </a:xfrm>
+      </p:grpSpPr>
+      <p:sp>
+        <p:nvSpPr>
+          <p:cNvPr id="2" name="Slide Image Placeholder 1"/>
+          <p:cNvSpPr>
+            <a:spLocks noGrp="1" noRot="1" noChangeAspect="1"/>
+          </p:cNvSpPr>
+          <p:nvPr>
+            <p:ph type="sldImg"/>
+          </p:nvPr>
+        </p:nvSpPr>
+        <p:spPr>
+          <a:xfrm>
+            <a:off x="382588" y="695325"/>
+            <a:ext cx="6092825" cy="3427413"/>
+          </a:xfrm>
+        </p:spPr>
+      </p:sp>
+      <p:sp>
+        <p:nvSpPr>
+          <p:cNvPr id="3" name="Notes Placeholder 2"/>
+          <p:cNvSpPr>
+            <a:spLocks noGrp="1"/>
+          </p:cNvSpPr>
+          <p:nvPr>
+            <p:ph type="body" idx="1"/>
+          </p:nvPr>
+        </p:nvSpPr>
+        <p:spPr/>
+        <p:txBody>
+          <a:bodyPr/>
+          <a:lstStyle/>
+          <a:p>
+            <a:r>
+              <a:rPr lang="en-US" sz="1200" b="1" dirty="0">
+                <a:effectLst/>
+                <a:latin typeface="Arial" panose="020B0604020202020204" pitchFamily="34" charset="0"/>
+              </a:rPr>
+              <a:t>How We'll Do It: </a:t>
+            </a:r>
+            <a:r>
+              <a:rPr lang="en-US" sz="1200" dirty="0">
+                <a:effectLst/>
+                <a:latin typeface="ArialMT"/>
+              </a:rPr>
+              <a:t>By sharing your experiences and expertise, we'll develop and implement counter strategies.</a:t>
+            </a:r>
+          </a:p>
+          <a:p>
+            <a:r>
+              <a:rPr lang="en-US" sz="1200" b="1" dirty="0">
+                <a:effectLst/>
+                <a:latin typeface="Arial" panose="020B0604020202020204" pitchFamily="34" charset="0"/>
+              </a:rPr>
+              <a:t>What You'll Have: </a:t>
+            </a:r>
+            <a:r>
+              <a:rPr lang="en-US" sz="1200" dirty="0">
+                <a:effectLst/>
+                <a:latin typeface="ArialMT"/>
+              </a:rPr>
+              <a:t>The skills to counter misinformation and disinformation, ensuring accurate information is spread and false information is reduced by 80%. </a:t>
+            </a:r>
+            <a:endParaRPr lang="en-US" dirty="0"/>
+          </a:p>
+          <a:p>
+            <a:endParaRPr lang="en-US" dirty="0"/>
+          </a:p>
+        </p:txBody>
+      </p:sp>
+      <p:sp>
+        <p:nvSpPr>
+          <p:cNvPr id="4" name="Slide Number Placeholder 3"/>
+          <p:cNvSpPr>
+            <a:spLocks noGrp="1"/>
+          </p:cNvSpPr>
+          <p:nvPr>
+            <p:ph type="sldNum" idx="8"/>
+          </p:nvPr>
+        </p:nvSpPr>
+        <p:spPr/>
+        <p:txBody>
+          <a:bodyPr/>
+          <a:lstStyle/>
+          <a:p>
+            <a:pPr indent="0" algn="r">
+              <a:buNone/>
+            </a:pPr>
+            <a:fld id="{96D071C0-0F6A-4E5C-B3E5-B824FE66220F}" type="slidenum">
+              <a:rPr lang="en-US" sz="1400" b="0" strike="noStrike" spc="-1" smtClean="0">
+                <a:solidFill>
+                  <a:srgbClr val="000000"/>
+                </a:solidFill>
+                <a:latin typeface="Times New Roman"/>
+              </a:rPr>
+              <a:t>9</a:t>
+            </a:fld>
+            <a:endParaRPr lang="en-US" sz="1400" b="0" strike="noStrike" spc="-1">
+              <a:solidFill>
+                <a:srgbClr val="000000"/>
+              </a:solidFill>
+              <a:latin typeface="Times New Roman"/>
+            </a:endParaRPr>
+          </a:p>
+        </p:txBody>
+      </p:sp>
+    </p:spTree>
+    <p:extLst>
+      <p:ext uri="{BB962C8B-B14F-4D97-AF65-F5344CB8AC3E}">
+        <p14:creationId xmlns:p14="http://schemas.microsoft.com/office/powerpoint/2010/main" val="553683457"/>
+      </p:ext>
+    </p:extLst>
+  </p:cSld>
+  <p:clrMapOvr>
+    <a:masterClrMapping/>
+  </p:clrMapOvr>
+</p:notes>
+</file>
+
+<file path=ppt/notesSlides/notesSlide8.xml><?xml version="1.0" encoding="utf-8"?>
+<p:notes xmlns:a="http://schemas.openxmlformats.org/drawingml/2006/main" xmlns:r="http://schemas.openxmlformats.org/officeDocument/2006/relationships" xmlns:p="http://schemas.openxmlformats.org/presentationml/2006/main">
+  <p:cSld>
+    <p:spTree>
+      <p:nvGrpSpPr>
+        <p:cNvPr id="1" name=""/>
+        <p:cNvGrpSpPr/>
+        <p:nvPr/>
+      </p:nvGrpSpPr>
+      <p:grpSpPr>
+        <a:xfrm>
+          <a:off x="0" y="0"/>
+          <a:ext cx="0" cy="0"/>
+          <a:chOff x="0" y="0"/>
+          <a:chExt cx="0" cy="0"/>
+        </a:xfrm>
+      </p:grpSpPr>
+      <p:sp>
+        <p:nvSpPr>
+          <p:cNvPr id="2" name="Slide Image Placeholder 1"/>
+          <p:cNvSpPr>
+            <a:spLocks noGrp="1" noRot="1" noChangeAspect="1"/>
+          </p:cNvSpPr>
+          <p:nvPr>
+            <p:ph type="sldImg"/>
+          </p:nvPr>
+        </p:nvSpPr>
+        <p:spPr>
+          <a:xfrm>
+            <a:off x="382588" y="695325"/>
+            <a:ext cx="6092825" cy="3427413"/>
+          </a:xfrm>
+        </p:spPr>
+      </p:sp>
+      <p:sp>
+        <p:nvSpPr>
+          <p:cNvPr id="3" name="Notes Placeholder 2"/>
+          <p:cNvSpPr>
+            <a:spLocks noGrp="1"/>
+          </p:cNvSpPr>
+          <p:nvPr>
+            <p:ph type="body" idx="1"/>
+          </p:nvPr>
+        </p:nvSpPr>
+        <p:spPr/>
+        <p:txBody>
+          <a:bodyPr/>
+          <a:lstStyle/>
+          <a:p>
+            <a:r>
+              <a:rPr lang="en-US" dirty="0"/>
+              <a:t>This is a brain storming session where ideas should be brought by students. Instructor should help students refine their goals by asking appropriate questions about would that goal help you achieve your greater organization and mission goals. </a:t>
+            </a:r>
+          </a:p>
+        </p:txBody>
+      </p:sp>
+      <p:sp>
+        <p:nvSpPr>
+          <p:cNvPr id="4" name="Slide Number Placeholder 3"/>
+          <p:cNvSpPr>
+            <a:spLocks noGrp="1"/>
+          </p:cNvSpPr>
+          <p:nvPr>
+            <p:ph type="sldNum" idx="8"/>
+          </p:nvPr>
+        </p:nvSpPr>
+        <p:spPr/>
+        <p:txBody>
+          <a:bodyPr/>
+          <a:lstStyle/>
+          <a:p>
+            <a:pPr indent="0" algn="r">
+              <a:buNone/>
+            </a:pPr>
+            <a:fld id="{96D071C0-0F6A-4E5C-B3E5-B824FE66220F}" type="slidenum">
+              <a:rPr lang="en-US" sz="1400" b="0" strike="noStrike" spc="-1" smtClean="0">
+                <a:solidFill>
+                  <a:srgbClr val="000000"/>
+                </a:solidFill>
+                <a:latin typeface="Times New Roman"/>
+              </a:rPr>
+              <a:t>10</a:t>
+            </a:fld>
+            <a:endParaRPr lang="en-US" sz="1400" b="0" strike="noStrike" spc="-1">
+              <a:solidFill>
+                <a:srgbClr val="000000"/>
+              </a:solidFill>
+              <a:latin typeface="Times New Roman"/>
+            </a:endParaRPr>
+          </a:p>
+        </p:txBody>
+      </p:sp>
+    </p:spTree>
+    <p:extLst>
+      <p:ext uri="{BB962C8B-B14F-4D97-AF65-F5344CB8AC3E}">
+        <p14:creationId xmlns:p14="http://schemas.microsoft.com/office/powerpoint/2010/main" val="2749563859"/>
+      </p:ext>
+    </p:extLst>
+  </p:cSld>
+  <p:clrMapOvr>
+    <a:masterClrMapping/>
+  </p:clrMapOvr>
+</p:notes>
+</file>
+
+<file path=ppt/notesSlides/notesSlide9.xml><?xml version="1.0" encoding="utf-8"?>
+<p:notes xmlns:a="http://schemas.openxmlformats.org/drawingml/2006/main" xmlns:r="http://schemas.openxmlformats.org/officeDocument/2006/relationships" xmlns:p="http://schemas.openxmlformats.org/presentationml/2006/main">
+  <p:cSld>
+    <p:spTree>
+      <p:nvGrpSpPr>
+        <p:cNvPr id="1" name=""/>
+        <p:cNvGrpSpPr/>
+        <p:nvPr/>
+      </p:nvGrpSpPr>
+      <p:grpSpPr>
+        <a:xfrm>
+          <a:off x="0" y="0"/>
+          <a:ext cx="0" cy="0"/>
+          <a:chOff x="0" y="0"/>
+          <a:chExt cx="0" cy="0"/>
+        </a:xfrm>
+      </p:grpSpPr>
+      <p:sp>
+        <p:nvSpPr>
+          <p:cNvPr id="2" name="Slide Image Placeholder 1"/>
+          <p:cNvSpPr>
+            <a:spLocks noGrp="1" noRot="1" noChangeAspect="1"/>
+          </p:cNvSpPr>
+          <p:nvPr>
+            <p:ph type="sldImg"/>
+          </p:nvPr>
+        </p:nvSpPr>
+        <p:spPr>
+          <a:xfrm>
+            <a:off x="382588" y="695325"/>
+            <a:ext cx="6092825" cy="3427413"/>
+          </a:xfrm>
+        </p:spPr>
+      </p:sp>
+      <p:sp>
+        <p:nvSpPr>
+          <p:cNvPr id="3" name="Notes Placeholder 2"/>
+          <p:cNvSpPr>
+            <a:spLocks noGrp="1"/>
+          </p:cNvSpPr>
+          <p:nvPr>
+            <p:ph type="body" idx="1"/>
+          </p:nvPr>
+        </p:nvSpPr>
+        <p:spPr/>
+        <p:txBody>
+          <a:bodyPr/>
+          <a:lstStyle/>
+          <a:p>
+            <a:r>
+              <a:rPr lang="en-US" dirty="0"/>
+              <a:t>This is a brain storming session where ideas should be brought by students. Instructor should help students refine their goals by asking appropriate questions about would that goal help you achieve your greater organization and mission goals. </a:t>
+            </a:r>
+          </a:p>
+        </p:txBody>
+      </p:sp>
+      <p:sp>
+        <p:nvSpPr>
+          <p:cNvPr id="4" name="Slide Number Placeholder 3"/>
+          <p:cNvSpPr>
+            <a:spLocks noGrp="1"/>
+          </p:cNvSpPr>
+          <p:nvPr>
+            <p:ph type="sldNum" idx="8"/>
+          </p:nvPr>
+        </p:nvSpPr>
+        <p:spPr/>
+        <p:txBody>
+          <a:bodyPr/>
+          <a:lstStyle/>
+          <a:p>
+            <a:pPr indent="0" algn="r">
+              <a:buNone/>
+            </a:pPr>
+            <a:fld id="{96D071C0-0F6A-4E5C-B3E5-B824FE66220F}" type="slidenum">
+              <a:rPr lang="en-US" sz="1400" b="0" strike="noStrike" spc="-1" smtClean="0">
+                <a:solidFill>
+                  <a:srgbClr val="000000"/>
+                </a:solidFill>
+                <a:latin typeface="Times New Roman"/>
+              </a:rPr>
+              <a:t>11</a:t>
+            </a:fld>
+            <a:endParaRPr lang="en-US" sz="1400" b="0" strike="noStrike" spc="-1">
+              <a:solidFill>
+                <a:srgbClr val="000000"/>
+              </a:solidFill>
+              <a:latin typeface="Times New Roman"/>
+            </a:endParaRPr>
+          </a:p>
+        </p:txBody>
+      </p:sp>
+    </p:spTree>
+    <p:extLst>
+      <p:ext uri="{BB962C8B-B14F-4D97-AF65-F5344CB8AC3E}">
+        <p14:creationId xmlns:p14="http://schemas.microsoft.com/office/powerpoint/2010/main" val="1113057065"/>
       </p:ext>
     </p:extLst>
   </p:cSld>
@@ -5779,7 +6654,7 @@
           </a:ln>
           <a:extLst>
             <a:ext uri="{C572A759-6A51-4108-AA02-DFA0A04FC94B}">
-              <ma14:wrappingTextBoxFlag xmlns="" xmlns:m="http://schemas.openxmlformats.org/officeDocument/2006/math" xmlns:a14="http://schemas.microsoft.com/office/drawing/2010/main" xmlns:ma14="http://schemas.microsoft.com/office/mac/drawingml/2011/main" val="1"/>
+              <ma14:wrappingTextBoxFlag xmlns:ma14="http://schemas.microsoft.com/office/mac/drawingml/2011/main" xmlns:a14="http://schemas.microsoft.com/office/drawing/2010/main" xmlns:m="http://schemas.openxmlformats.org/officeDocument/2006/math" xmlns="" val="1"/>
             </a:ext>
           </a:extLst>
         </p:spPr>
@@ -5826,7 +6701,7 @@
           </a:ln>
           <a:extLst>
             <a:ext uri="{C572A759-6A51-4108-AA02-DFA0A04FC94B}">
-              <ma14:wrappingTextBoxFlag xmlns="" xmlns:m="http://schemas.openxmlformats.org/officeDocument/2006/math" xmlns:a14="http://schemas.microsoft.com/office/drawing/2010/main" xmlns:ma14="http://schemas.microsoft.com/office/mac/drawingml/2011/main" val="1"/>
+              <ma14:wrappingTextBoxFlag xmlns:ma14="http://schemas.microsoft.com/office/mac/drawingml/2011/main" xmlns:a14="http://schemas.microsoft.com/office/drawing/2010/main" xmlns:m="http://schemas.openxmlformats.org/officeDocument/2006/math" xmlns="" val="1"/>
             </a:ext>
           </a:extLst>
         </p:spPr>
@@ -5873,7 +6748,7 @@
           </a:ln>
           <a:extLst>
             <a:ext uri="{C572A759-6A51-4108-AA02-DFA0A04FC94B}">
-              <ma14:wrappingTextBoxFlag xmlns="" xmlns:m="http://schemas.openxmlformats.org/officeDocument/2006/math" xmlns:a14="http://schemas.microsoft.com/office/drawing/2010/main" xmlns:ma14="http://schemas.microsoft.com/office/mac/drawingml/2011/main" val="1"/>
+              <ma14:wrappingTextBoxFlag xmlns:ma14="http://schemas.microsoft.com/office/mac/drawingml/2011/main" xmlns:a14="http://schemas.microsoft.com/office/drawing/2010/main" xmlns:m="http://schemas.openxmlformats.org/officeDocument/2006/math" xmlns="" val="1"/>
             </a:ext>
           </a:extLst>
         </p:spPr>
@@ -5920,7 +6795,7 @@
           </a:ln>
           <a:extLst>
             <a:ext uri="{C572A759-6A51-4108-AA02-DFA0A04FC94B}">
-              <ma14:wrappingTextBoxFlag xmlns="" xmlns:m="http://schemas.openxmlformats.org/officeDocument/2006/math" xmlns:a14="http://schemas.microsoft.com/office/drawing/2010/main" xmlns:ma14="http://schemas.microsoft.com/office/mac/drawingml/2011/main" val="1"/>
+              <ma14:wrappingTextBoxFlag xmlns:ma14="http://schemas.microsoft.com/office/mac/drawingml/2011/main" xmlns:a14="http://schemas.microsoft.com/office/drawing/2010/main" xmlns:m="http://schemas.openxmlformats.org/officeDocument/2006/math" xmlns="" val="1"/>
             </a:ext>
           </a:extLst>
         </p:spPr>
@@ -5954,6 +6829,14 @@
 <file path=ppt/slides/slide10.xml><?xml version="1.0" encoding="utf-8"?>
 <p:sld xmlns:a="http://schemas.openxmlformats.org/drawingml/2006/main" xmlns:r="http://schemas.openxmlformats.org/officeDocument/2006/relationships" xmlns:p="http://schemas.openxmlformats.org/presentationml/2006/main">
   <p:cSld>
+    <p:bg>
+      <p:bgPr>
+        <a:solidFill>
+          <a:srgbClr val="FFFF00"/>
+        </a:solidFill>
+        <a:effectLst/>
+      </p:bgPr>
+    </p:bg>
     <p:spTree>
       <p:nvGrpSpPr>
         <p:cNvPr id="1" name=""/>
@@ -5991,7 +6874,7 @@
           <a:p>
             <a:r>
               <a:rPr lang="en-US" dirty="0"/>
-              <a:t>Presenting Strategies (30 Minutes)</a:t>
+              <a:t>Setting Your Goals</a:t>
             </a:r>
           </a:p>
         </p:txBody>
@@ -6019,13 +6902,19 @@
           <a:p>
             <a:r>
               <a:rPr lang="en-US" dirty="0"/>
-              <a:t>Present your developed counter strategy to the class.</a:t>
+              <a:t>Define what malign information looks like in your context.</a:t>
             </a:r>
           </a:p>
           <a:p>
             <a:r>
               <a:rPr lang="en-US" dirty="0"/>
-              <a:t>Discuss the strengths and weaknesses of each strategy.</a:t>
+              <a:t>Identify your goals when countering this information.</a:t>
+            </a:r>
+          </a:p>
+          <a:p>
+            <a:r>
+              <a:rPr lang="en-US" dirty="0"/>
+              <a:t>Discuss the importance of these goals in maintaining accurate information flow.</a:t>
             </a:r>
           </a:p>
         </p:txBody>
@@ -6033,7 +6922,7 @@
     </p:spTree>
     <p:extLst>
       <p:ext uri="{BB962C8B-B14F-4D97-AF65-F5344CB8AC3E}">
-        <p14:creationId xmlns:p14="http://schemas.microsoft.com/office/powerpoint/2010/main" val="1013176652"/>
+        <p14:creationId xmlns:p14="http://schemas.microsoft.com/office/powerpoint/2010/main" val="3365648032"/>
       </p:ext>
     </p:extLst>
   </p:cSld>
@@ -6046,6 +6935,112 @@
 <file path=ppt/slides/slide11.xml><?xml version="1.0" encoding="utf-8"?>
 <p:sld xmlns:a="http://schemas.openxmlformats.org/drawingml/2006/main" xmlns:r="http://schemas.openxmlformats.org/officeDocument/2006/relationships" xmlns:p="http://schemas.openxmlformats.org/presentationml/2006/main">
   <p:cSld>
+    <p:spTree>
+      <p:nvGrpSpPr>
+        <p:cNvPr id="1" name=""/>
+        <p:cNvGrpSpPr/>
+        <p:nvPr/>
+      </p:nvGrpSpPr>
+      <p:grpSpPr>
+        <a:xfrm>
+          <a:off x="0" y="0"/>
+          <a:ext cx="0" cy="0"/>
+          <a:chOff x="0" y="0"/>
+          <a:chExt cx="0" cy="0"/>
+        </a:xfrm>
+      </p:grpSpPr>
+      <p:sp>
+        <p:nvSpPr>
+          <p:cNvPr id="2" name="Title 1">
+            <a:extLst>
+              <a:ext uri="{FF2B5EF4-FFF2-40B4-BE49-F238E27FC236}">
+                <a16:creationId xmlns:a16="http://schemas.microsoft.com/office/drawing/2014/main" id="{0E7CCAEB-D84E-456D-3B6B-2E9573C73F98}"/>
+              </a:ext>
+            </a:extLst>
+          </p:cNvPr>
+          <p:cNvSpPr>
+            <a:spLocks noGrp="1"/>
+          </p:cNvSpPr>
+          <p:nvPr>
+            <p:ph type="title"/>
+          </p:nvPr>
+        </p:nvSpPr>
+        <p:spPr/>
+        <p:txBody>
+          <a:bodyPr/>
+          <a:lstStyle/>
+          <a:p>
+            <a:r>
+              <a:rPr lang="en-US" dirty="0"/>
+              <a:t>Setting Your Goals</a:t>
+            </a:r>
+          </a:p>
+        </p:txBody>
+      </p:sp>
+      <p:sp>
+        <p:nvSpPr>
+          <p:cNvPr id="3" name="Content Placeholder 2">
+            <a:extLst>
+              <a:ext uri="{FF2B5EF4-FFF2-40B4-BE49-F238E27FC236}">
+                <a16:creationId xmlns:a16="http://schemas.microsoft.com/office/drawing/2014/main" id="{0A5EC664-EFAD-501E-02EA-4124C835D47B}"/>
+              </a:ext>
+            </a:extLst>
+          </p:cNvPr>
+          <p:cNvSpPr>
+            <a:spLocks noGrp="1"/>
+          </p:cNvSpPr>
+          <p:nvPr>
+            <p:ph idx="1"/>
+          </p:nvPr>
+        </p:nvSpPr>
+        <p:spPr/>
+        <p:txBody>
+          <a:bodyPr/>
+          <a:lstStyle/>
+          <a:p>
+            <a:r>
+              <a:rPr lang="en-US" dirty="0"/>
+              <a:t>Define what malign information looks like in your context.</a:t>
+            </a:r>
+          </a:p>
+          <a:p>
+            <a:r>
+              <a:rPr lang="en-US" dirty="0"/>
+              <a:t>Identify your goals when countering this information.</a:t>
+            </a:r>
+          </a:p>
+          <a:p>
+            <a:r>
+              <a:rPr lang="en-US" dirty="0"/>
+              <a:t>Discuss the importance of these goals in maintaining accurate information flow.</a:t>
+            </a:r>
+          </a:p>
+        </p:txBody>
+      </p:sp>
+    </p:spTree>
+    <p:extLst>
+      <p:ext uri="{BB962C8B-B14F-4D97-AF65-F5344CB8AC3E}">
+        <p14:creationId xmlns:p14="http://schemas.microsoft.com/office/powerpoint/2010/main" val="4121297196"/>
+      </p:ext>
+    </p:extLst>
+  </p:cSld>
+  <p:clrMapOvr>
+    <a:masterClrMapping/>
+  </p:clrMapOvr>
+</p:sld>
+</file>
+
+<file path=ppt/slides/slide12.xml><?xml version="1.0" encoding="utf-8"?>
+<p:sld xmlns:a="http://schemas.openxmlformats.org/drawingml/2006/main" xmlns:r="http://schemas.openxmlformats.org/officeDocument/2006/relationships" xmlns:p="http://schemas.openxmlformats.org/presentationml/2006/main">
+  <p:cSld>
+    <p:bg>
+      <p:bgPr>
+        <a:solidFill>
+          <a:srgbClr val="FFFF00"/>
+        </a:solidFill>
+        <a:effectLst/>
+      </p:bgPr>
+    </p:bg>
     <p:spTree>
       <p:nvGrpSpPr>
         <p:cNvPr id="1" name=""/>
@@ -6147,7 +7142,7 @@
           </a:ln>
           <a:extLst>
             <a:ext uri="{C572A759-6A51-4108-AA02-DFA0A04FC94B}">
-              <ma14:wrappingTextBoxFlag xmlns="" xmlns:m="http://schemas.openxmlformats.org/officeDocument/2006/math" xmlns:a14="http://schemas.microsoft.com/office/drawing/2010/main" xmlns:ma14="http://schemas.microsoft.com/office/mac/drawingml/2011/main" val="1"/>
+              <ma14:wrappingTextBoxFlag xmlns:ma14="http://schemas.microsoft.com/office/mac/drawingml/2011/main" xmlns:a14="http://schemas.microsoft.com/office/drawing/2010/main" xmlns:m="http://schemas.openxmlformats.org/officeDocument/2006/math" xmlns="" val="1"/>
             </a:ext>
           </a:extLst>
         </p:spPr>
@@ -6183,7 +7178,7 @@
           </a:prstGeom>
           <a:extLst>
             <a:ext uri="{C572A759-6A51-4108-AA02-DFA0A04FC94B}">
-              <ma14:wrappingTextBoxFlag xmlns="" xmlns:m="http://schemas.openxmlformats.org/officeDocument/2006/math" xmlns:a14="http://schemas.microsoft.com/office/drawing/2010/main" xmlns:ma14="http://schemas.microsoft.com/office/mac/drawingml/2011/main" val="1"/>
+              <ma14:wrappingTextBoxFlag xmlns:ma14="http://schemas.microsoft.com/office/mac/drawingml/2011/main" xmlns:a14="http://schemas.microsoft.com/office/drawing/2010/main" xmlns:m="http://schemas.openxmlformats.org/officeDocument/2006/math" xmlns="" val="1"/>
             </a:ext>
           </a:extLst>
         </p:spPr>
@@ -6193,7 +7188,7 @@
           <a:p>
             <a:fld id="{86CB4B4D-7CA3-9044-876B-883B54F8677D}" type="slidenum">
               <a:rPr/>
-              <a:t>11</a:t>
+              <a:t>12</a:t>
             </a:fld>
             <a:endParaRPr/>
           </a:p>
@@ -6202,7 +7197,7 @@
     </p:spTree>
     <p:extLst>
       <p:ext uri="{BB962C8B-B14F-4D97-AF65-F5344CB8AC3E}">
-        <p14:creationId xmlns:p14="http://schemas.microsoft.com/office/powerpoint/2010/main" val="984507533"/>
+        <p14:creationId xmlns:p14="http://schemas.microsoft.com/office/powerpoint/2010/main" val="4200951038"/>
       </p:ext>
     </p:extLst>
   </p:cSld>
@@ -6215,7 +7210,7 @@
         <p:push dir="u"/>
       </p:transition>
     </mc:Choice>
-    <mc:Fallback xmlns="" xmlns:m="http://schemas.openxmlformats.org/officeDocument/2006/math" xmlns:a14="http://schemas.microsoft.com/office/drawing/2010/main">
+    <mc:Fallback xmlns:a14="http://schemas.microsoft.com/office/drawing/2010/main" xmlns:m="http://schemas.openxmlformats.org/officeDocument/2006/math" xmlns="">
       <p:transition spd="slow">
         <p:fade/>
       </p:transition>
@@ -6224,7 +7219,7 @@
 </p:sld>
 </file>
 
-<file path=ppt/slides/slide12.xml><?xml version="1.0" encoding="utf-8"?>
+<file path=ppt/slides/slide13.xml><?xml version="1.0" encoding="utf-8"?>
 <p:sld xmlns:a="http://schemas.openxmlformats.org/drawingml/2006/main" xmlns:r="http://schemas.openxmlformats.org/officeDocument/2006/relationships" xmlns:p="http://schemas.openxmlformats.org/presentationml/2006/main">
   <p:cSld>
     <p:spTree>
@@ -6328,7 +7323,7 @@
           </a:ln>
           <a:extLst>
             <a:ext uri="{C572A759-6A51-4108-AA02-DFA0A04FC94B}">
-              <ma14:wrappingTextBoxFlag xmlns="" xmlns:m="http://schemas.openxmlformats.org/officeDocument/2006/math" xmlns:a14="http://schemas.microsoft.com/office/drawing/2010/main" xmlns:ma14="http://schemas.microsoft.com/office/mac/drawingml/2011/main" val="1"/>
+              <ma14:wrappingTextBoxFlag xmlns:ma14="http://schemas.microsoft.com/office/mac/drawingml/2011/main" xmlns:a14="http://schemas.microsoft.com/office/drawing/2010/main" xmlns:m="http://schemas.openxmlformats.org/officeDocument/2006/math" xmlns="" val="1"/>
             </a:ext>
           </a:extLst>
         </p:spPr>
@@ -6364,7 +7359,7 @@
           </a:prstGeom>
           <a:extLst>
             <a:ext uri="{C572A759-6A51-4108-AA02-DFA0A04FC94B}">
-              <ma14:wrappingTextBoxFlag xmlns="" xmlns:m="http://schemas.openxmlformats.org/officeDocument/2006/math" xmlns:a14="http://schemas.microsoft.com/office/drawing/2010/main" xmlns:ma14="http://schemas.microsoft.com/office/mac/drawingml/2011/main" val="1"/>
+              <ma14:wrappingTextBoxFlag xmlns:ma14="http://schemas.microsoft.com/office/mac/drawingml/2011/main" xmlns:a14="http://schemas.microsoft.com/office/drawing/2010/main" xmlns:m="http://schemas.openxmlformats.org/officeDocument/2006/math" xmlns="" val="1"/>
             </a:ext>
           </a:extLst>
         </p:spPr>
@@ -6373,7 +7368,7 @@
           <a:lstStyle/>
           <a:p>
             <a:fld id="{86CB4B4D-7CA3-9044-876B-883B54F8677D}" type="slidenum">
-              <a:t>12</a:t>
+              <a:t>13</a:t>
             </a:fld>
             <a:endParaRPr/>
           </a:p>
@@ -6382,7 +7377,7 @@
     </p:spTree>
     <p:extLst>
       <p:ext uri="{BB962C8B-B14F-4D97-AF65-F5344CB8AC3E}">
-        <p14:creationId xmlns:p14="http://schemas.microsoft.com/office/powerpoint/2010/main" val="1389875916"/>
+        <p14:creationId xmlns:p14="http://schemas.microsoft.com/office/powerpoint/2010/main" val="1046359596"/>
       </p:ext>
     </p:extLst>
   </p:cSld>
@@ -6393,7 +7388,196 @@
 </p:sld>
 </file>
 
-<file path=ppt/slides/slide13.xml><?xml version="1.0" encoding="utf-8"?>
+<file path=ppt/slides/slide14.xml><?xml version="1.0" encoding="utf-8"?>
+<p:sld xmlns:a="http://schemas.openxmlformats.org/drawingml/2006/main" xmlns:r="http://schemas.openxmlformats.org/officeDocument/2006/relationships" xmlns:p="http://schemas.openxmlformats.org/presentationml/2006/main">
+  <p:cSld>
+    <p:bg>
+      <p:bgPr>
+        <a:solidFill>
+          <a:srgbClr val="FFFF00"/>
+        </a:solidFill>
+        <a:effectLst/>
+      </p:bgPr>
+    </p:bg>
+    <p:spTree>
+      <p:nvGrpSpPr>
+        <p:cNvPr id="1" name=""/>
+        <p:cNvGrpSpPr/>
+        <p:nvPr/>
+      </p:nvGrpSpPr>
+      <p:grpSpPr>
+        <a:xfrm>
+          <a:off x="0" y="0"/>
+          <a:ext cx="0" cy="0"/>
+          <a:chOff x="0" y="0"/>
+          <a:chExt cx="0" cy="0"/>
+        </a:xfrm>
+      </p:grpSpPr>
+      <p:sp>
+        <p:nvSpPr>
+          <p:cNvPr id="2" name="Title 1">
+            <a:extLst>
+              <a:ext uri="{FF2B5EF4-FFF2-40B4-BE49-F238E27FC236}">
+                <a16:creationId xmlns:a16="http://schemas.microsoft.com/office/drawing/2014/main" id="{0E7CCAEB-D84E-456D-3B6B-2E9573C73F98}"/>
+              </a:ext>
+            </a:extLst>
+          </p:cNvPr>
+          <p:cNvSpPr>
+            <a:spLocks noGrp="1"/>
+          </p:cNvSpPr>
+          <p:nvPr>
+            <p:ph type="title"/>
+          </p:nvPr>
+        </p:nvSpPr>
+        <p:spPr/>
+        <p:txBody>
+          <a:bodyPr/>
+          <a:lstStyle/>
+          <a:p>
+            <a:r>
+              <a:rPr lang="en-US" dirty="0"/>
+              <a:t>Develop TTPs (20 Minutes)</a:t>
+            </a:r>
+          </a:p>
+        </p:txBody>
+      </p:sp>
+      <p:sp>
+        <p:nvSpPr>
+          <p:cNvPr id="3" name="Content Placeholder 2">
+            <a:extLst>
+              <a:ext uri="{FF2B5EF4-FFF2-40B4-BE49-F238E27FC236}">
+                <a16:creationId xmlns:a16="http://schemas.microsoft.com/office/drawing/2014/main" id="{0A5EC664-EFAD-501E-02EA-4124C835D47B}"/>
+              </a:ext>
+            </a:extLst>
+          </p:cNvPr>
+          <p:cNvSpPr>
+            <a:spLocks noGrp="1"/>
+          </p:cNvSpPr>
+          <p:nvPr>
+            <p:ph idx="1"/>
+          </p:nvPr>
+        </p:nvSpPr>
+        <p:spPr>
+          <a:xfrm>
+            <a:off x="838200" y="1825625"/>
+            <a:ext cx="10515600" cy="1139248"/>
+          </a:xfrm>
+        </p:spPr>
+        <p:txBody>
+          <a:bodyPr/>
+          <a:lstStyle/>
+          <a:p>
+            <a:r>
+              <a:rPr lang="en-US" dirty="0"/>
+              <a:t>Develop a counter strategy for a given scenario. </a:t>
+            </a:r>
+          </a:p>
+          <a:p>
+            <a:r>
+              <a:rPr lang="en-US" dirty="0"/>
+              <a:t>Work in groups to brainstorm and outline your TTPs.</a:t>
+            </a:r>
+          </a:p>
+        </p:txBody>
+      </p:sp>
+      <p:sp>
+        <p:nvSpPr>
+          <p:cNvPr id="4" name="TextBox 3">
+            <a:extLst>
+              <a:ext uri="{FF2B5EF4-FFF2-40B4-BE49-F238E27FC236}">
+                <a16:creationId xmlns:a16="http://schemas.microsoft.com/office/drawing/2014/main" id="{F2E718C6-32F5-6193-852B-D07BBF930FD7}"/>
+              </a:ext>
+            </a:extLst>
+          </p:cNvPr>
+          <p:cNvSpPr txBox="1"/>
+          <p:nvPr/>
+        </p:nvSpPr>
+        <p:spPr>
+          <a:xfrm>
+            <a:off x="387927" y="2964873"/>
+            <a:ext cx="5334000" cy="646331"/>
+          </a:xfrm>
+          <a:prstGeom prst="rect">
+            <a:avLst/>
+          </a:prstGeom>
+          <a:noFill/>
+        </p:spPr>
+        <p:txBody>
+          <a:bodyPr wrap="square" rtlCol="0">
+            <a:spAutoFit/>
+          </a:bodyPr>
+          <a:lstStyle/>
+          <a:p>
+            <a:r>
+              <a:rPr lang="en-US" dirty="0"/>
+              <a:t>Scenario 1:</a:t>
+            </a:r>
+          </a:p>
+          <a:p>
+            <a:pPr marL="285750" indent="-285750">
+              <a:buFont typeface="Arial" panose="020B0604020202020204" pitchFamily="34" charset="0"/>
+              <a:buChar char="•"/>
+            </a:pPr>
+            <a:endParaRPr lang="en-US" dirty="0"/>
+          </a:p>
+        </p:txBody>
+      </p:sp>
+      <p:sp>
+        <p:nvSpPr>
+          <p:cNvPr id="5" name="TextBox 4">
+            <a:extLst>
+              <a:ext uri="{FF2B5EF4-FFF2-40B4-BE49-F238E27FC236}">
+                <a16:creationId xmlns:a16="http://schemas.microsoft.com/office/drawing/2014/main" id="{0B9E14C4-BE62-051A-9961-9694EF2A3C02}"/>
+              </a:ext>
+            </a:extLst>
+          </p:cNvPr>
+          <p:cNvSpPr txBox="1"/>
+          <p:nvPr/>
+        </p:nvSpPr>
+        <p:spPr>
+          <a:xfrm>
+            <a:off x="6483929" y="2964873"/>
+            <a:ext cx="5334000" cy="646331"/>
+          </a:xfrm>
+          <a:prstGeom prst="rect">
+            <a:avLst/>
+          </a:prstGeom>
+          <a:noFill/>
+        </p:spPr>
+        <p:txBody>
+          <a:bodyPr wrap="square" rtlCol="0">
+            <a:spAutoFit/>
+          </a:bodyPr>
+          <a:lstStyle/>
+          <a:p>
+            <a:r>
+              <a:rPr lang="en-US" dirty="0"/>
+              <a:t>Scenario 2:</a:t>
+            </a:r>
+          </a:p>
+          <a:p>
+            <a:pPr marL="285750" indent="-285750">
+              <a:buFont typeface="Arial" panose="020B0604020202020204" pitchFamily="34" charset="0"/>
+              <a:buChar char="•"/>
+            </a:pPr>
+            <a:endParaRPr lang="en-US" dirty="0"/>
+          </a:p>
+        </p:txBody>
+      </p:sp>
+    </p:spTree>
+    <p:extLst>
+      <p:ext uri="{BB962C8B-B14F-4D97-AF65-F5344CB8AC3E}">
+        <p14:creationId xmlns:p14="http://schemas.microsoft.com/office/powerpoint/2010/main" val="3537485946"/>
+      </p:ext>
+    </p:extLst>
+  </p:cSld>
+  <p:clrMapOvr>
+    <a:masterClrMapping/>
+  </p:clrMapOvr>
+</p:sld>
+</file>
+
+<file path=ppt/slides/slide15.xml><?xml version="1.0" encoding="utf-8"?>
 <p:sld xmlns:a="http://schemas.openxmlformats.org/drawingml/2006/main" xmlns:r="http://schemas.openxmlformats.org/officeDocument/2006/relationships" xmlns:p="http://schemas.openxmlformats.org/presentationml/2006/main">
   <p:cSld>
     <p:spTree>
@@ -6433,7 +7617,7 @@
           <a:p>
             <a:r>
               <a:rPr lang="en-US" dirty="0"/>
-              <a:t>Refine TTPs (20 Minutes)</a:t>
+              <a:t>Develop TTPs (20 Minutes)</a:t>
             </a:r>
           </a:p>
         </p:txBody>
@@ -6454,7 +7638,12 @@
             <p:ph idx="1"/>
           </p:nvPr>
         </p:nvSpPr>
-        <p:spPr/>
+        <p:spPr>
+          <a:xfrm>
+            <a:off x="838200" y="1825625"/>
+            <a:ext cx="10515600" cy="1139248"/>
+          </a:xfrm>
+        </p:spPr>
         <p:txBody>
           <a:bodyPr/>
           <a:lstStyle/>
@@ -6469,13 +7658,97 @@
               <a:rPr lang="en-US" dirty="0"/>
               <a:t>Work in groups to brainstorm and outline your TTPs.</a:t>
             </a:r>
+          </a:p>
+        </p:txBody>
+      </p:sp>
+      <p:sp>
+        <p:nvSpPr>
+          <p:cNvPr id="4" name="TextBox 3">
+            <a:extLst>
+              <a:ext uri="{FF2B5EF4-FFF2-40B4-BE49-F238E27FC236}">
+                <a16:creationId xmlns:a16="http://schemas.microsoft.com/office/drawing/2014/main" id="{F2E718C6-32F5-6193-852B-D07BBF930FD7}"/>
+              </a:ext>
+            </a:extLst>
+          </p:cNvPr>
+          <p:cNvSpPr txBox="1"/>
+          <p:nvPr/>
+        </p:nvSpPr>
+        <p:spPr>
+          <a:xfrm>
+            <a:off x="387927" y="2964873"/>
+            <a:ext cx="5334000" cy="646331"/>
+          </a:xfrm>
+          <a:prstGeom prst="rect">
+            <a:avLst/>
+          </a:prstGeom>
+          <a:noFill/>
+        </p:spPr>
+        <p:txBody>
+          <a:bodyPr wrap="square" rtlCol="0">
+            <a:spAutoFit/>
+          </a:bodyPr>
+          <a:lstStyle/>
+          <a:p>
+            <a:r>
+              <a:rPr lang="en-US" dirty="0"/>
+              <a:t>Scenario 1:</a:t>
+            </a:r>
+          </a:p>
+          <a:p>
+            <a:pPr marL="285750" indent="-285750">
+              <a:buFont typeface="Arial" panose="020B0604020202020204" pitchFamily="34" charset="0"/>
+              <a:buChar char="•"/>
+            </a:pPr>
+            <a:endParaRPr lang="en-US" dirty="0"/>
+          </a:p>
+        </p:txBody>
+      </p:sp>
+      <p:sp>
+        <p:nvSpPr>
+          <p:cNvPr id="5" name="TextBox 4">
+            <a:extLst>
+              <a:ext uri="{FF2B5EF4-FFF2-40B4-BE49-F238E27FC236}">
+                <a16:creationId xmlns:a16="http://schemas.microsoft.com/office/drawing/2014/main" id="{0B9E14C4-BE62-051A-9961-9694EF2A3C02}"/>
+              </a:ext>
+            </a:extLst>
+          </p:cNvPr>
+          <p:cNvSpPr txBox="1"/>
+          <p:nvPr/>
+        </p:nvSpPr>
+        <p:spPr>
+          <a:xfrm>
+            <a:off x="6483929" y="2964873"/>
+            <a:ext cx="5334000" cy="646331"/>
+          </a:xfrm>
+          <a:prstGeom prst="rect">
+            <a:avLst/>
+          </a:prstGeom>
+          <a:noFill/>
+        </p:spPr>
+        <p:txBody>
+          <a:bodyPr wrap="square" rtlCol="0">
+            <a:spAutoFit/>
+          </a:bodyPr>
+          <a:lstStyle/>
+          <a:p>
+            <a:r>
+              <a:rPr lang="en-US" dirty="0"/>
+              <a:t>Scenario 2:</a:t>
+            </a:r>
+          </a:p>
+          <a:p>
+            <a:pPr marL="285750" indent="-285750">
+              <a:buFont typeface="Arial" panose="020B0604020202020204" pitchFamily="34" charset="0"/>
+              <a:buChar char="•"/>
+            </a:pPr>
+            <a:endParaRPr lang="en-US" dirty="0"/>
           </a:p>
         </p:txBody>
       </p:sp>
     </p:spTree>
     <p:extLst>
       <p:ext uri="{BB962C8B-B14F-4D97-AF65-F5344CB8AC3E}">
-        <p14:creationId xmlns:p14="http://schemas.microsoft.com/office/powerpoint/2010/main" val="1023214734"/>
+        <p14:creationId xmlns:p14="http://schemas.microsoft.com/office/powerpoint/2010/main" val="2528406466"/>
       </p:ext>
     </p:extLst>
   </p:cSld>
@@ -6485,7 +7758,107 @@
 </p:sld>
 </file>
 
-<file path=ppt/slides/slide14.xml><?xml version="1.0" encoding="utf-8"?>
+<file path=ppt/slides/slide16.xml><?xml version="1.0" encoding="utf-8"?>
+<p:sld xmlns:a="http://schemas.openxmlformats.org/drawingml/2006/main" xmlns:r="http://schemas.openxmlformats.org/officeDocument/2006/relationships" xmlns:p="http://schemas.openxmlformats.org/presentationml/2006/main">
+  <p:cSld>
+    <p:bg>
+      <p:bgPr>
+        <a:solidFill>
+          <a:srgbClr val="FFFF00"/>
+        </a:solidFill>
+        <a:effectLst/>
+      </p:bgPr>
+    </p:bg>
+    <p:spTree>
+      <p:nvGrpSpPr>
+        <p:cNvPr id="1" name=""/>
+        <p:cNvGrpSpPr/>
+        <p:nvPr/>
+      </p:nvGrpSpPr>
+      <p:grpSpPr>
+        <a:xfrm>
+          <a:off x="0" y="0"/>
+          <a:ext cx="0" cy="0"/>
+          <a:chOff x="0" y="0"/>
+          <a:chExt cx="0" cy="0"/>
+        </a:xfrm>
+      </p:grpSpPr>
+      <p:sp>
+        <p:nvSpPr>
+          <p:cNvPr id="2" name="Title 1">
+            <a:extLst>
+              <a:ext uri="{FF2B5EF4-FFF2-40B4-BE49-F238E27FC236}">
+                <a16:creationId xmlns:a16="http://schemas.microsoft.com/office/drawing/2014/main" id="{0E7CCAEB-D84E-456D-3B6B-2E9573C73F98}"/>
+              </a:ext>
+            </a:extLst>
+          </p:cNvPr>
+          <p:cNvSpPr>
+            <a:spLocks noGrp="1"/>
+          </p:cNvSpPr>
+          <p:nvPr>
+            <p:ph type="title"/>
+          </p:nvPr>
+        </p:nvSpPr>
+        <p:spPr/>
+        <p:txBody>
+          <a:bodyPr/>
+          <a:lstStyle/>
+          <a:p>
+            <a:r>
+              <a:rPr lang="en-US" dirty="0"/>
+              <a:t>Presenting Strategies (30 Minutes)</a:t>
+            </a:r>
+          </a:p>
+        </p:txBody>
+      </p:sp>
+      <p:sp>
+        <p:nvSpPr>
+          <p:cNvPr id="3" name="Content Placeholder 2">
+            <a:extLst>
+              <a:ext uri="{FF2B5EF4-FFF2-40B4-BE49-F238E27FC236}">
+                <a16:creationId xmlns:a16="http://schemas.microsoft.com/office/drawing/2014/main" id="{0A5EC664-EFAD-501E-02EA-4124C835D47B}"/>
+              </a:ext>
+            </a:extLst>
+          </p:cNvPr>
+          <p:cNvSpPr>
+            <a:spLocks noGrp="1"/>
+          </p:cNvSpPr>
+          <p:nvPr>
+            <p:ph idx="1"/>
+          </p:nvPr>
+        </p:nvSpPr>
+        <p:spPr/>
+        <p:txBody>
+          <a:bodyPr/>
+          <a:lstStyle/>
+          <a:p>
+            <a:r>
+              <a:rPr lang="en-US" dirty="0"/>
+              <a:t>Present your developed counter strategy to the class.</a:t>
+            </a:r>
+          </a:p>
+          <a:p>
+            <a:r>
+              <a:rPr lang="en-US" dirty="0"/>
+              <a:t>Discuss the strengths and weaknesses of each strategy.</a:t>
+            </a:r>
+          </a:p>
+        </p:txBody>
+      </p:sp>
+    </p:spTree>
+    <p:extLst>
+      <p:ext uri="{BB962C8B-B14F-4D97-AF65-F5344CB8AC3E}">
+        <p14:creationId xmlns:p14="http://schemas.microsoft.com/office/powerpoint/2010/main" val="1013176652"/>
+      </p:ext>
+    </p:extLst>
+  </p:cSld>
+  <p:clrMapOvr>
+    <a:masterClrMapping/>
+  </p:clrMapOvr>
+</p:sld>
+</file>
+
+<file path=ppt/slides/slide17.xml><?xml version="1.0" encoding="utf-8"?>
 <p:sld xmlns:a="http://schemas.openxmlformats.org/drawingml/2006/main" xmlns:r="http://schemas.openxmlformats.org/officeDocument/2006/relationships" xmlns:p="http://schemas.openxmlformats.org/presentationml/2006/main">
   <p:cSld>
     <p:spTree>
@@ -6525,7 +7898,7 @@
           <a:p>
             <a:r>
               <a:rPr lang="en-US" dirty="0"/>
-              <a:t>Final TTP Presentation (30 Minutes)</a:t>
+              <a:t>Presenting Strategies (30 Minutes)</a:t>
             </a:r>
           </a:p>
         </p:txBody>
@@ -6567,7 +7940,7 @@
     </p:spTree>
     <p:extLst>
       <p:ext uri="{BB962C8B-B14F-4D97-AF65-F5344CB8AC3E}">
-        <p14:creationId xmlns:p14="http://schemas.microsoft.com/office/powerpoint/2010/main" val="451572762"/>
+        <p14:creationId xmlns:p14="http://schemas.microsoft.com/office/powerpoint/2010/main" val="1820905495"/>
       </p:ext>
     </p:extLst>
   </p:cSld>
@@ -6577,9 +7950,17 @@
 </p:sld>
 </file>
 
-<file path=ppt/slides/slide15.xml><?xml version="1.0" encoding="utf-8"?>
+<file path=ppt/slides/slide18.xml><?xml version="1.0" encoding="utf-8"?>
 <p:sld xmlns:a="http://schemas.openxmlformats.org/drawingml/2006/main" xmlns:r="http://schemas.openxmlformats.org/officeDocument/2006/relationships" xmlns:p="http://schemas.openxmlformats.org/presentationml/2006/main">
   <p:cSld>
+    <p:bg>
+      <p:bgPr>
+        <a:solidFill>
+          <a:srgbClr val="FFFF00"/>
+        </a:solidFill>
+        <a:effectLst/>
+      </p:bgPr>
+    </p:bg>
     <p:spTree>
       <p:nvGrpSpPr>
         <p:cNvPr id="1" name=""/>
@@ -6681,7 +8062,7 @@
           </a:ln>
           <a:extLst>
             <a:ext uri="{C572A759-6A51-4108-AA02-DFA0A04FC94B}">
-              <ma14:wrappingTextBoxFlag xmlns="" xmlns:m="http://schemas.openxmlformats.org/officeDocument/2006/math" xmlns:a14="http://schemas.microsoft.com/office/drawing/2010/main" xmlns:ma14="http://schemas.microsoft.com/office/mac/drawingml/2011/main" val="1"/>
+              <ma14:wrappingTextBoxFlag xmlns:ma14="http://schemas.microsoft.com/office/mac/drawingml/2011/main" xmlns:a14="http://schemas.microsoft.com/office/drawing/2010/main" xmlns:m="http://schemas.openxmlformats.org/officeDocument/2006/math" xmlns="" val="1"/>
             </a:ext>
           </a:extLst>
         </p:spPr>
@@ -6717,7 +8098,7 @@
           </a:prstGeom>
           <a:extLst>
             <a:ext uri="{C572A759-6A51-4108-AA02-DFA0A04FC94B}">
-              <ma14:wrappingTextBoxFlag xmlns="" xmlns:m="http://schemas.openxmlformats.org/officeDocument/2006/math" xmlns:a14="http://schemas.microsoft.com/office/drawing/2010/main" xmlns:ma14="http://schemas.microsoft.com/office/mac/drawingml/2011/main" val="1"/>
+              <ma14:wrappingTextBoxFlag xmlns:ma14="http://schemas.microsoft.com/office/mac/drawingml/2011/main" xmlns:a14="http://schemas.microsoft.com/office/drawing/2010/main" xmlns:m="http://schemas.openxmlformats.org/officeDocument/2006/math" xmlns="" val="1"/>
             </a:ext>
           </a:extLst>
         </p:spPr>
@@ -6727,7 +8108,7 @@
           <a:p>
             <a:fld id="{86CB4B4D-7CA3-9044-876B-883B54F8677D}" type="slidenum">
               <a:rPr/>
-              <a:t>15</a:t>
+              <a:t>18</a:t>
             </a:fld>
             <a:endParaRPr/>
           </a:p>
@@ -6736,7 +8117,7 @@
     </p:spTree>
     <p:extLst>
       <p:ext uri="{BB962C8B-B14F-4D97-AF65-F5344CB8AC3E}">
-        <p14:creationId xmlns:p14="http://schemas.microsoft.com/office/powerpoint/2010/main" val="2109483714"/>
+        <p14:creationId xmlns:p14="http://schemas.microsoft.com/office/powerpoint/2010/main" val="984507533"/>
       </p:ext>
     </p:extLst>
   </p:cSld>
@@ -6749,7 +8130,7 @@
         <p:push dir="u"/>
       </p:transition>
     </mc:Choice>
-    <mc:Fallback xmlns="" xmlns:m="http://schemas.openxmlformats.org/officeDocument/2006/math" xmlns:a14="http://schemas.microsoft.com/office/drawing/2010/main">
+    <mc:Fallback xmlns:a14="http://schemas.microsoft.com/office/drawing/2010/main" xmlns:m="http://schemas.openxmlformats.org/officeDocument/2006/math" xmlns="">
       <p:transition spd="slow">
         <p:fade/>
       </p:transition>
@@ -6758,7 +8139,7 @@
 </p:sld>
 </file>
 
-<file path=ppt/slides/slide16.xml><?xml version="1.0" encoding="utf-8"?>
+<file path=ppt/slides/slide19.xml><?xml version="1.0" encoding="utf-8"?>
 <p:sld xmlns:a="http://schemas.openxmlformats.org/drawingml/2006/main" xmlns:r="http://schemas.openxmlformats.org/officeDocument/2006/relationships" xmlns:p="http://schemas.openxmlformats.org/presentationml/2006/main">
   <p:cSld>
     <p:spTree>
@@ -6862,7 +8243,7 @@
           </a:ln>
           <a:extLst>
             <a:ext uri="{C572A759-6A51-4108-AA02-DFA0A04FC94B}">
-              <ma14:wrappingTextBoxFlag xmlns="" xmlns:m="http://schemas.openxmlformats.org/officeDocument/2006/math" xmlns:a14="http://schemas.microsoft.com/office/drawing/2010/main" xmlns:ma14="http://schemas.microsoft.com/office/mac/drawingml/2011/main" val="1"/>
+              <ma14:wrappingTextBoxFlag xmlns:ma14="http://schemas.microsoft.com/office/mac/drawingml/2011/main" xmlns:a14="http://schemas.microsoft.com/office/drawing/2010/main" xmlns:m="http://schemas.openxmlformats.org/officeDocument/2006/math" xmlns="" val="1"/>
             </a:ext>
           </a:extLst>
         </p:spPr>
@@ -6898,7 +8279,7 @@
           </a:prstGeom>
           <a:extLst>
             <a:ext uri="{C572A759-6A51-4108-AA02-DFA0A04FC94B}">
-              <ma14:wrappingTextBoxFlag xmlns="" xmlns:m="http://schemas.openxmlformats.org/officeDocument/2006/math" xmlns:a14="http://schemas.microsoft.com/office/drawing/2010/main" xmlns:ma14="http://schemas.microsoft.com/office/mac/drawingml/2011/main" val="1"/>
+              <ma14:wrappingTextBoxFlag xmlns:ma14="http://schemas.microsoft.com/office/mac/drawingml/2011/main" xmlns:a14="http://schemas.microsoft.com/office/drawing/2010/main" xmlns:m="http://schemas.openxmlformats.org/officeDocument/2006/math" xmlns="" val="1"/>
             </a:ext>
           </a:extLst>
         </p:spPr>
@@ -6907,7 +8288,7 @@
           <a:lstStyle/>
           <a:p>
             <a:fld id="{86CB4B4D-7CA3-9044-876B-883B54F8677D}" type="slidenum">
-              <a:t>16</a:t>
+              <a:t>19</a:t>
             </a:fld>
             <a:endParaRPr/>
           </a:p>
@@ -6916,7 +8297,7 @@
     </p:spTree>
     <p:extLst>
       <p:ext uri="{BB962C8B-B14F-4D97-AF65-F5344CB8AC3E}">
-        <p14:creationId xmlns:p14="http://schemas.microsoft.com/office/powerpoint/2010/main" val="3235858406"/>
+        <p14:creationId xmlns:p14="http://schemas.microsoft.com/office/powerpoint/2010/main" val="1389875916"/>
       </p:ext>
     </p:extLst>
   </p:cSld>
@@ -6927,7 +8308,198 @@
 </p:sld>
 </file>
 
-<file path=ppt/slides/slide17.xml><?xml version="1.0" encoding="utf-8"?>
+<file path=ppt/slides/slide2.xml><?xml version="1.0" encoding="utf-8"?>
+<p:sld xmlns:a="http://schemas.openxmlformats.org/drawingml/2006/main" xmlns:r="http://schemas.openxmlformats.org/officeDocument/2006/relationships" xmlns:p="http://schemas.openxmlformats.org/presentationml/2006/main">
+  <p:cSld>
+    <p:bg>
+      <p:bgPr>
+        <a:solidFill>
+          <a:srgbClr val="FFFF00"/>
+        </a:solidFill>
+        <a:effectLst/>
+      </p:bgPr>
+    </p:bg>
+    <p:spTree>
+      <p:nvGrpSpPr>
+        <p:cNvPr id="1" name=""/>
+        <p:cNvGrpSpPr/>
+        <p:nvPr/>
+      </p:nvGrpSpPr>
+      <p:grpSpPr>
+        <a:xfrm>
+          <a:off x="0" y="0"/>
+          <a:ext cx="0" cy="0"/>
+          <a:chOff x="0" y="0"/>
+          <a:chExt cx="0" cy="0"/>
+        </a:xfrm>
+      </p:grpSpPr>
+      <p:sp>
+        <p:nvSpPr>
+          <p:cNvPr id="2" name="Title 1">
+            <a:extLst>
+              <a:ext uri="{FF2B5EF4-FFF2-40B4-BE49-F238E27FC236}">
+                <a16:creationId xmlns:a16="http://schemas.microsoft.com/office/drawing/2014/main" id="{0E7CCAEB-D84E-456D-3B6B-2E9573C73F98}"/>
+              </a:ext>
+            </a:extLst>
+          </p:cNvPr>
+          <p:cNvSpPr>
+            <a:spLocks noGrp="1"/>
+          </p:cNvSpPr>
+          <p:nvPr>
+            <p:ph type="title"/>
+          </p:nvPr>
+        </p:nvSpPr>
+        <p:spPr/>
+        <p:txBody>
+          <a:bodyPr/>
+          <a:lstStyle/>
+          <a:p>
+            <a:endParaRPr lang="en-US" dirty="0"/>
+          </a:p>
+        </p:txBody>
+      </p:sp>
+      <p:sp>
+        <p:nvSpPr>
+          <p:cNvPr id="3" name="Content Placeholder 2">
+            <a:extLst>
+              <a:ext uri="{FF2B5EF4-FFF2-40B4-BE49-F238E27FC236}">
+                <a16:creationId xmlns:a16="http://schemas.microsoft.com/office/drawing/2014/main" id="{0A5EC664-EFAD-501E-02EA-4124C835D47B}"/>
+              </a:ext>
+            </a:extLst>
+          </p:cNvPr>
+          <p:cNvSpPr>
+            <a:spLocks noGrp="1"/>
+          </p:cNvSpPr>
+          <p:nvPr>
+            <p:ph idx="1"/>
+          </p:nvPr>
+        </p:nvSpPr>
+        <p:spPr/>
+        <p:txBody>
+          <a:bodyPr/>
+          <a:lstStyle/>
+          <a:p>
+            <a:r>
+              <a:rPr lang="en-US" dirty="0"/>
+              <a:t>Participants selected report to your designated areas. </a:t>
+            </a:r>
+          </a:p>
+        </p:txBody>
+      </p:sp>
+    </p:spTree>
+    <p:extLst>
+      <p:ext uri="{BB962C8B-B14F-4D97-AF65-F5344CB8AC3E}">
+        <p14:creationId xmlns:p14="http://schemas.microsoft.com/office/powerpoint/2010/main" val="2792640674"/>
+      </p:ext>
+    </p:extLst>
+  </p:cSld>
+  <p:clrMapOvr>
+    <a:masterClrMapping/>
+  </p:clrMapOvr>
+</p:sld>
+</file>
+
+<file path=ppt/slides/slide20.xml><?xml version="1.0" encoding="utf-8"?>
+<p:sld xmlns:a="http://schemas.openxmlformats.org/drawingml/2006/main" xmlns:r="http://schemas.openxmlformats.org/officeDocument/2006/relationships" xmlns:p="http://schemas.openxmlformats.org/presentationml/2006/main">
+  <p:cSld>
+    <p:bg>
+      <p:bgPr>
+        <a:solidFill>
+          <a:srgbClr val="FFFF00"/>
+        </a:solidFill>
+        <a:effectLst/>
+      </p:bgPr>
+    </p:bg>
+    <p:spTree>
+      <p:nvGrpSpPr>
+        <p:cNvPr id="1" name=""/>
+        <p:cNvGrpSpPr/>
+        <p:nvPr/>
+      </p:nvGrpSpPr>
+      <p:grpSpPr>
+        <a:xfrm>
+          <a:off x="0" y="0"/>
+          <a:ext cx="0" cy="0"/>
+          <a:chOff x="0" y="0"/>
+          <a:chExt cx="0" cy="0"/>
+        </a:xfrm>
+      </p:grpSpPr>
+      <p:sp>
+        <p:nvSpPr>
+          <p:cNvPr id="2" name="Title 1">
+            <a:extLst>
+              <a:ext uri="{FF2B5EF4-FFF2-40B4-BE49-F238E27FC236}">
+                <a16:creationId xmlns:a16="http://schemas.microsoft.com/office/drawing/2014/main" id="{0E7CCAEB-D84E-456D-3B6B-2E9573C73F98}"/>
+              </a:ext>
+            </a:extLst>
+          </p:cNvPr>
+          <p:cNvSpPr>
+            <a:spLocks noGrp="1"/>
+          </p:cNvSpPr>
+          <p:nvPr>
+            <p:ph type="title"/>
+          </p:nvPr>
+        </p:nvSpPr>
+        <p:spPr/>
+        <p:txBody>
+          <a:bodyPr/>
+          <a:lstStyle/>
+          <a:p>
+            <a:r>
+              <a:rPr lang="en-US" dirty="0"/>
+              <a:t>Refine TTPs (20 Minutes)</a:t>
+            </a:r>
+          </a:p>
+        </p:txBody>
+      </p:sp>
+      <p:sp>
+        <p:nvSpPr>
+          <p:cNvPr id="3" name="Content Placeholder 2">
+            <a:extLst>
+              <a:ext uri="{FF2B5EF4-FFF2-40B4-BE49-F238E27FC236}">
+                <a16:creationId xmlns:a16="http://schemas.microsoft.com/office/drawing/2014/main" id="{0A5EC664-EFAD-501E-02EA-4124C835D47B}"/>
+              </a:ext>
+            </a:extLst>
+          </p:cNvPr>
+          <p:cNvSpPr>
+            <a:spLocks noGrp="1"/>
+          </p:cNvSpPr>
+          <p:nvPr>
+            <p:ph idx="1"/>
+          </p:nvPr>
+        </p:nvSpPr>
+        <p:spPr/>
+        <p:txBody>
+          <a:bodyPr/>
+          <a:lstStyle/>
+          <a:p>
+            <a:r>
+              <a:rPr lang="en-US" dirty="0"/>
+              <a:t>Develop a counter strategy for a given scenario. </a:t>
+            </a:r>
+          </a:p>
+          <a:p>
+            <a:r>
+              <a:rPr lang="en-US" dirty="0"/>
+              <a:t>Work in groups to brainstorm and outline your TTPs.</a:t>
+            </a:r>
+          </a:p>
+        </p:txBody>
+      </p:sp>
+    </p:spTree>
+    <p:extLst>
+      <p:ext uri="{BB962C8B-B14F-4D97-AF65-F5344CB8AC3E}">
+        <p14:creationId xmlns:p14="http://schemas.microsoft.com/office/powerpoint/2010/main" val="1023214734"/>
+      </p:ext>
+    </p:extLst>
+  </p:cSld>
+  <p:clrMapOvr>
+    <a:masterClrMapping/>
+  </p:clrMapOvr>
+</p:sld>
+</file>
+
+<file path=ppt/slides/slide21.xml><?xml version="1.0" encoding="utf-8"?>
 <p:sld xmlns:a="http://schemas.openxmlformats.org/drawingml/2006/main" xmlns:r="http://schemas.openxmlformats.org/officeDocument/2006/relationships" xmlns:p="http://schemas.openxmlformats.org/presentationml/2006/main">
   <p:cSld>
     <p:spTree>
@@ -6967,7 +8539,7 @@
           <a:p>
             <a:r>
               <a:rPr lang="en-US" dirty="0"/>
-              <a:t>Combine TTPs</a:t>
+              <a:t>Refine TTPs (20 Minutes)</a:t>
             </a:r>
           </a:p>
         </p:txBody>
@@ -6995,7 +8567,13 @@
           <a:p>
             <a:r>
               <a:rPr lang="en-US" dirty="0"/>
-              <a:t>Groups will combine strategies to a main strategy. </a:t>
+              <a:t>Develop a counter strategy for a given scenario. </a:t>
+            </a:r>
+          </a:p>
+          <a:p>
+            <a:r>
+              <a:rPr lang="en-US" dirty="0"/>
+              <a:t>Work in groups to brainstorm and outline your TTPs.</a:t>
             </a:r>
           </a:p>
         </p:txBody>
@@ -7003,7 +8581,7 @@
     </p:spTree>
     <p:extLst>
       <p:ext uri="{BB962C8B-B14F-4D97-AF65-F5344CB8AC3E}">
-        <p14:creationId xmlns:p14="http://schemas.microsoft.com/office/powerpoint/2010/main" val="3588947859"/>
+        <p14:creationId xmlns:p14="http://schemas.microsoft.com/office/powerpoint/2010/main" val="437031992"/>
       </p:ext>
     </p:extLst>
   </p:cSld>
@@ -7013,7 +8591,107 @@
 </p:sld>
 </file>
 
-<file path=ppt/slides/slide18.xml><?xml version="1.0" encoding="utf-8"?>
+<file path=ppt/slides/slide22.xml><?xml version="1.0" encoding="utf-8"?>
+<p:sld xmlns:a="http://schemas.openxmlformats.org/drawingml/2006/main" xmlns:r="http://schemas.openxmlformats.org/officeDocument/2006/relationships" xmlns:p="http://schemas.openxmlformats.org/presentationml/2006/main">
+  <p:cSld>
+    <p:bg>
+      <p:bgPr>
+        <a:solidFill>
+          <a:srgbClr val="FFFF00"/>
+        </a:solidFill>
+        <a:effectLst/>
+      </p:bgPr>
+    </p:bg>
+    <p:spTree>
+      <p:nvGrpSpPr>
+        <p:cNvPr id="1" name=""/>
+        <p:cNvGrpSpPr/>
+        <p:nvPr/>
+      </p:nvGrpSpPr>
+      <p:grpSpPr>
+        <a:xfrm>
+          <a:off x="0" y="0"/>
+          <a:ext cx="0" cy="0"/>
+          <a:chOff x="0" y="0"/>
+          <a:chExt cx="0" cy="0"/>
+        </a:xfrm>
+      </p:grpSpPr>
+      <p:sp>
+        <p:nvSpPr>
+          <p:cNvPr id="2" name="Title 1">
+            <a:extLst>
+              <a:ext uri="{FF2B5EF4-FFF2-40B4-BE49-F238E27FC236}">
+                <a16:creationId xmlns:a16="http://schemas.microsoft.com/office/drawing/2014/main" id="{0E7CCAEB-D84E-456D-3B6B-2E9573C73F98}"/>
+              </a:ext>
+            </a:extLst>
+          </p:cNvPr>
+          <p:cNvSpPr>
+            <a:spLocks noGrp="1"/>
+          </p:cNvSpPr>
+          <p:nvPr>
+            <p:ph type="title"/>
+          </p:nvPr>
+        </p:nvSpPr>
+        <p:spPr/>
+        <p:txBody>
+          <a:bodyPr/>
+          <a:lstStyle/>
+          <a:p>
+            <a:r>
+              <a:rPr lang="en-US" dirty="0"/>
+              <a:t>Final TTP Presentation (30 Minutes)</a:t>
+            </a:r>
+          </a:p>
+        </p:txBody>
+      </p:sp>
+      <p:sp>
+        <p:nvSpPr>
+          <p:cNvPr id="3" name="Content Placeholder 2">
+            <a:extLst>
+              <a:ext uri="{FF2B5EF4-FFF2-40B4-BE49-F238E27FC236}">
+                <a16:creationId xmlns:a16="http://schemas.microsoft.com/office/drawing/2014/main" id="{0A5EC664-EFAD-501E-02EA-4124C835D47B}"/>
+              </a:ext>
+            </a:extLst>
+          </p:cNvPr>
+          <p:cNvSpPr>
+            <a:spLocks noGrp="1"/>
+          </p:cNvSpPr>
+          <p:nvPr>
+            <p:ph idx="1"/>
+          </p:nvPr>
+        </p:nvSpPr>
+        <p:spPr/>
+        <p:txBody>
+          <a:bodyPr/>
+          <a:lstStyle/>
+          <a:p>
+            <a:r>
+              <a:rPr lang="en-US" dirty="0"/>
+              <a:t>Present your developed counter strategy to the class.</a:t>
+            </a:r>
+          </a:p>
+          <a:p>
+            <a:r>
+              <a:rPr lang="en-US" dirty="0"/>
+              <a:t>Discuss the strengths and weaknesses of each strategy.</a:t>
+            </a:r>
+          </a:p>
+        </p:txBody>
+      </p:sp>
+    </p:spTree>
+    <p:extLst>
+      <p:ext uri="{BB962C8B-B14F-4D97-AF65-F5344CB8AC3E}">
+        <p14:creationId xmlns:p14="http://schemas.microsoft.com/office/powerpoint/2010/main" val="451572762"/>
+      </p:ext>
+    </p:extLst>
+  </p:cSld>
+  <p:clrMapOvr>
+    <a:masterClrMapping/>
+  </p:clrMapOvr>
+</p:sld>
+</file>
+
+<file path=ppt/slides/slide23.xml><?xml version="1.0" encoding="utf-8"?>
 <p:sld xmlns:a="http://schemas.openxmlformats.org/drawingml/2006/main" xmlns:r="http://schemas.openxmlformats.org/officeDocument/2006/relationships" xmlns:p="http://schemas.openxmlformats.org/presentationml/2006/main">
   <p:cSld>
     <p:spTree>
@@ -7053,7 +8731,7 @@
           <a:p>
             <a:r>
               <a:rPr lang="en-US" dirty="0"/>
-              <a:t>Practical Exercise</a:t>
+              <a:t>Final TTP Presentation (30 Minutes)</a:t>
             </a:r>
           </a:p>
         </p:txBody>
@@ -7081,26 +8759,21 @@
           <a:p>
             <a:r>
               <a:rPr lang="en-US" dirty="0"/>
-              <a:t>Groups will combine strategies to a main strategy.</a:t>
+              <a:t>Present your developed counter strategy to the class.</a:t>
             </a:r>
           </a:p>
           <a:p>
             <a:r>
               <a:rPr lang="en-US" dirty="0"/>
-              <a:t>Follow instructions from </a:t>
-            </a:r>
-            <a:r>
-              <a:rPr lang="en-US"/>
-              <a:t>the handout. </a:t>
-            </a:r>
-            <a:endParaRPr lang="en-US" dirty="0"/>
+              <a:t>Discuss the strengths and weaknesses of each strategy.</a:t>
+            </a:r>
           </a:p>
         </p:txBody>
       </p:sp>
     </p:spTree>
     <p:extLst>
       <p:ext uri="{BB962C8B-B14F-4D97-AF65-F5344CB8AC3E}">
-        <p14:creationId xmlns:p14="http://schemas.microsoft.com/office/powerpoint/2010/main" val="1965678674"/>
+        <p14:creationId xmlns:p14="http://schemas.microsoft.com/office/powerpoint/2010/main" val="3726517593"/>
       </p:ext>
     </p:extLst>
   </p:cSld>
@@ -7110,7 +8783,196 @@
 </p:sld>
 </file>
 
-<file path=ppt/slides/slide19.xml><?xml version="1.0" encoding="utf-8"?>
+<file path=ppt/slides/slide24.xml><?xml version="1.0" encoding="utf-8"?>
+<p:sld xmlns:a="http://schemas.openxmlformats.org/drawingml/2006/main" xmlns:r="http://schemas.openxmlformats.org/officeDocument/2006/relationships" xmlns:p="http://schemas.openxmlformats.org/presentationml/2006/main">
+  <p:cSld>
+    <p:bg>
+      <p:bgPr>
+        <a:solidFill>
+          <a:srgbClr val="FFFF00"/>
+        </a:solidFill>
+        <a:effectLst/>
+      </p:bgPr>
+    </p:bg>
+    <p:spTree>
+      <p:nvGrpSpPr>
+        <p:cNvPr id="1" name=""/>
+        <p:cNvGrpSpPr/>
+        <p:nvPr/>
+      </p:nvGrpSpPr>
+      <p:grpSpPr>
+        <a:xfrm>
+          <a:off x="0" y="0"/>
+          <a:ext cx="0" cy="0"/>
+          <a:chOff x="0" y="0"/>
+          <a:chExt cx="0" cy="0"/>
+        </a:xfrm>
+      </p:grpSpPr>
+      <p:sp>
+        <p:nvSpPr>
+          <p:cNvPr id="193" name="Title 2"/>
+          <p:cNvSpPr txBox="1">
+            <a:spLocks noGrp="1"/>
+          </p:cNvSpPr>
+          <p:nvPr>
+            <p:ph type="title" idx="4294967295"/>
+          </p:nvPr>
+        </p:nvSpPr>
+        <p:spPr>
+          <a:xfrm>
+            <a:off x="2154607" y="2531859"/>
+            <a:ext cx="3658054" cy="1786516"/>
+          </a:xfrm>
+          <a:prstGeom prst="rect">
+            <a:avLst/>
+          </a:prstGeom>
+        </p:spPr>
+        <p:txBody>
+          <a:bodyPr anchor="t"/>
+          <a:lstStyle>
+            <a:lvl1pPr>
+              <a:defRPr sz="4800" b="0">
+                <a:solidFill>
+                  <a:srgbClr val="44546A"/>
+                </a:solidFill>
+                <a:latin typeface="Calibri Light"/>
+                <a:ea typeface="Calibri Light"/>
+                <a:cs typeface="Calibri Light"/>
+                <a:sym typeface="Calibri Light"/>
+              </a:defRPr>
+            </a:lvl1pPr>
+          </a:lstStyle>
+          <a:p>
+            <a:r>
+              <a:t>TAKE A BREAK</a:t>
+            </a:r>
+          </a:p>
+        </p:txBody>
+      </p:sp>
+      <p:pic>
+        <p:nvPicPr>
+          <p:cNvPr id="194" name="Graphic 13" descr="Graphic 13"/>
+          <p:cNvPicPr>
+            <a:picLocks noChangeAspect="1"/>
+          </p:cNvPicPr>
+          <p:nvPr/>
+        </p:nvPicPr>
+        <p:blipFill>
+          <a:blip r:embed="rId2"/>
+          <a:stretch>
+            <a:fillRect/>
+          </a:stretch>
+        </p:blipFill>
+        <p:spPr>
+          <a:xfrm>
+            <a:off x="6379342" y="-259377"/>
+            <a:ext cx="5029201" cy="5029201"/>
+          </a:xfrm>
+          <a:prstGeom prst="rect">
+            <a:avLst/>
+          </a:prstGeom>
+          <a:ln w="12700">
+            <a:miter lim="400000"/>
+          </a:ln>
+        </p:spPr>
+      </p:pic>
+      <p:sp>
+        <p:nvSpPr>
+          <p:cNvPr id="195" name="TextBox 1"/>
+          <p:cNvSpPr txBox="1"/>
+          <p:nvPr/>
+        </p:nvSpPr>
+        <p:spPr>
+          <a:xfrm>
+            <a:off x="3715415" y="5405718"/>
+            <a:ext cx="3986136" cy="634118"/>
+          </a:xfrm>
+          <a:prstGeom prst="rect">
+            <a:avLst/>
+          </a:prstGeom>
+          <a:ln w="12700">
+            <a:miter lim="400000"/>
+          </a:ln>
+          <a:extLst>
+            <a:ext uri="{C572A759-6A51-4108-AA02-DFA0A04FC94B}">
+              <ma14:wrappingTextBoxFlag xmlns:ma14="http://schemas.microsoft.com/office/mac/drawingml/2011/main" xmlns:a14="http://schemas.microsoft.com/office/drawing/2010/main" xmlns:m="http://schemas.openxmlformats.org/officeDocument/2006/math" xmlns="" val="1"/>
+            </a:ext>
+          </a:extLst>
+        </p:spPr>
+        <p:txBody>
+          <a:bodyPr wrap="none" lIns="45719" rIns="45719">
+            <a:spAutoFit/>
+          </a:bodyPr>
+          <a:lstStyle>
+            <a:lvl1pPr>
+              <a:defRPr sz="4200" b="1"/>
+            </a:lvl1pPr>
+          </a:lstStyle>
+          <a:p>
+            <a:r>
+              <a:t>Return By: XX:XX </a:t>
+            </a:r>
+          </a:p>
+        </p:txBody>
+      </p:sp>
+      <p:sp>
+        <p:nvSpPr>
+          <p:cNvPr id="196" name="Slide Number"/>
+          <p:cNvSpPr txBox="1">
+            <a:spLocks noGrp="1"/>
+          </p:cNvSpPr>
+          <p:nvPr>
+            <p:ph type="sldNum" sz="quarter" idx="2"/>
+          </p:nvPr>
+        </p:nvSpPr>
+        <p:spPr>
+          <a:prstGeom prst="rect">
+            <a:avLst/>
+          </a:prstGeom>
+          <a:extLst>
+            <a:ext uri="{C572A759-6A51-4108-AA02-DFA0A04FC94B}">
+              <ma14:wrappingTextBoxFlag xmlns:ma14="http://schemas.microsoft.com/office/mac/drawingml/2011/main" xmlns:a14="http://schemas.microsoft.com/office/drawing/2010/main" xmlns:m="http://schemas.openxmlformats.org/officeDocument/2006/math" xmlns="" val="1"/>
+            </a:ext>
+          </a:extLst>
+        </p:spPr>
+        <p:txBody>
+          <a:bodyPr/>
+          <a:lstStyle/>
+          <a:p>
+            <a:fld id="{86CB4B4D-7CA3-9044-876B-883B54F8677D}" type="slidenum">
+              <a:rPr/>
+              <a:t>24</a:t>
+            </a:fld>
+            <a:endParaRPr/>
+          </a:p>
+        </p:txBody>
+      </p:sp>
+    </p:spTree>
+    <p:extLst>
+      <p:ext uri="{BB962C8B-B14F-4D97-AF65-F5344CB8AC3E}">
+        <p14:creationId xmlns:p14="http://schemas.microsoft.com/office/powerpoint/2010/main" val="2109483714"/>
+      </p:ext>
+    </p:extLst>
+  </p:cSld>
+  <p:clrMapOvr>
+    <a:masterClrMapping/>
+  </p:clrMapOvr>
+  <mc:AlternateContent xmlns:mc="http://schemas.openxmlformats.org/markup-compatibility/2006" xmlns:p14="http://schemas.microsoft.com/office/powerpoint/2010/main">
+    <mc:Choice Requires="p14">
+      <p:transition spd="slow" p14:dur="1200">
+        <p:push dir="u"/>
+      </p:transition>
+    </mc:Choice>
+    <mc:Fallback xmlns:a14="http://schemas.microsoft.com/office/drawing/2010/main" xmlns:m="http://schemas.openxmlformats.org/officeDocument/2006/math" xmlns="">
+      <p:transition spd="slow">
+        <p:fade/>
+      </p:transition>
+    </mc:Fallback>
+  </mc:AlternateContent>
+</p:sld>
+</file>
+
+<file path=ppt/slides/slide25.xml><?xml version="1.0" encoding="utf-8"?>
 <p:sld xmlns:a="http://schemas.openxmlformats.org/drawingml/2006/main" xmlns:r="http://schemas.openxmlformats.org/officeDocument/2006/relationships" xmlns:p="http://schemas.openxmlformats.org/presentationml/2006/main">
   <p:cSld>
     <p:spTree>
@@ -7129,78 +8991,241 @@
       </p:grpSpPr>
       <p:sp>
         <p:nvSpPr>
-          <p:cNvPr id="2" name="Title 1">
-            <a:extLst>
-              <a:ext uri="{FF2B5EF4-FFF2-40B4-BE49-F238E27FC236}">
-                <a16:creationId xmlns:a16="http://schemas.microsoft.com/office/drawing/2014/main" id="{0E7CCAEB-D84E-456D-3B6B-2E9573C73F98}"/>
-              </a:ext>
-            </a:extLst>
-          </p:cNvPr>
-          <p:cNvSpPr>
-            <a:spLocks noGrp="1"/>
-          </p:cNvSpPr>
-          <p:nvPr>
-            <p:ph type="title"/>
-          </p:nvPr>
-        </p:nvSpPr>
-        <p:spPr/>
-        <p:txBody>
-          <a:bodyPr/>
-          <a:lstStyle/>
-          <a:p>
-            <a:r>
-              <a:rPr lang="en-US" dirty="0"/>
-              <a:t>Check on Learning</a:t>
-            </a:r>
-          </a:p>
-        </p:txBody>
-      </p:sp>
-      <p:sp>
-        <p:nvSpPr>
-          <p:cNvPr id="3" name="Content Placeholder 2">
-            <a:extLst>
-              <a:ext uri="{FF2B5EF4-FFF2-40B4-BE49-F238E27FC236}">
-                <a16:creationId xmlns:a16="http://schemas.microsoft.com/office/drawing/2014/main" id="{0A5EC664-EFAD-501E-02EA-4124C835D47B}"/>
-              </a:ext>
-            </a:extLst>
-          </p:cNvPr>
-          <p:cNvSpPr>
-            <a:spLocks noGrp="1"/>
-          </p:cNvSpPr>
-          <p:nvPr>
-            <p:ph idx="1"/>
-          </p:nvPr>
-        </p:nvSpPr>
-        <p:spPr/>
-        <p:txBody>
-          <a:bodyPr>
-            <a:normAutofit/>
+          <p:cNvPr id="198" name="Title 2"/>
+          <p:cNvSpPr txBox="1">
+            <a:spLocks noGrp="1"/>
+          </p:cNvSpPr>
+          <p:nvPr>
+            <p:ph type="title" idx="4294967295"/>
+          </p:nvPr>
+        </p:nvSpPr>
+        <p:spPr>
+          <a:xfrm>
+            <a:off x="2154607" y="2531859"/>
+            <a:ext cx="3658054" cy="1786516"/>
+          </a:xfrm>
+          <a:prstGeom prst="rect">
+            <a:avLst/>
+          </a:prstGeom>
+        </p:spPr>
+        <p:txBody>
+          <a:bodyPr anchor="t"/>
+          <a:lstStyle>
+            <a:lvl1pPr>
+              <a:defRPr sz="4800" b="0">
+                <a:solidFill>
+                  <a:srgbClr val="44546A"/>
+                </a:solidFill>
+                <a:latin typeface="Calibri Light"/>
+                <a:ea typeface="Calibri Light"/>
+                <a:cs typeface="Calibri Light"/>
+                <a:sym typeface="Calibri Light"/>
+              </a:defRPr>
+            </a:lvl1pPr>
+          </a:lstStyle>
+          <a:p>
+            <a:r>
+              <a:t>TOMAR UN DESCANSO</a:t>
+            </a:r>
+          </a:p>
+        </p:txBody>
+      </p:sp>
+      <p:pic>
+        <p:nvPicPr>
+          <p:cNvPr id="199" name="Graphic 13" descr="Graphic 13"/>
+          <p:cNvPicPr>
+            <a:picLocks noChangeAspect="1"/>
+          </p:cNvPicPr>
+          <p:nvPr/>
+        </p:nvPicPr>
+        <p:blipFill>
+          <a:blip r:embed="rId2"/>
+          <a:stretch>
+            <a:fillRect/>
+          </a:stretch>
+        </p:blipFill>
+        <p:spPr>
+          <a:xfrm>
+            <a:off x="6379342" y="-259377"/>
+            <a:ext cx="5029201" cy="5029201"/>
+          </a:xfrm>
+          <a:prstGeom prst="rect">
+            <a:avLst/>
+          </a:prstGeom>
+          <a:ln w="12700">
+            <a:miter lim="400000"/>
+          </a:ln>
+        </p:spPr>
+      </p:pic>
+      <p:sp>
+        <p:nvSpPr>
+          <p:cNvPr id="200" name="TextBox 1"/>
+          <p:cNvSpPr txBox="1"/>
+          <p:nvPr/>
+        </p:nvSpPr>
+        <p:spPr>
+          <a:xfrm>
+            <a:off x="3715415" y="5405718"/>
+            <a:ext cx="4111933" cy="634118"/>
+          </a:xfrm>
+          <a:prstGeom prst="rect">
+            <a:avLst/>
+          </a:prstGeom>
+          <a:ln w="12700">
+            <a:miter lim="400000"/>
+          </a:ln>
+          <a:extLst>
+            <a:ext uri="{C572A759-6A51-4108-AA02-DFA0A04FC94B}">
+              <ma14:wrappingTextBoxFlag xmlns:ma14="http://schemas.microsoft.com/office/mac/drawingml/2011/main" xmlns:a14="http://schemas.microsoft.com/office/drawing/2010/main" xmlns:m="http://schemas.openxmlformats.org/officeDocument/2006/math" xmlns="" val="1"/>
+            </a:ext>
+          </a:extLst>
+        </p:spPr>
+        <p:txBody>
+          <a:bodyPr wrap="none" lIns="45719" rIns="45719">
+            <a:spAutoFit/>
           </a:bodyPr>
-          <a:lstStyle/>
-          <a:p>
-            <a:r>
-              <a:rPr lang="en-US" dirty="0"/>
-              <a:t>What are the key components of an effective counter strategy?</a:t>
-            </a:r>
-          </a:p>
-          <a:p>
-            <a:r>
-              <a:rPr lang="en-US" dirty="0"/>
-              <a:t>Why is it important to counter misinformation quickly?</a:t>
-            </a:r>
-          </a:p>
-          <a:p>
-            <a:r>
-              <a:rPr lang="en-US" dirty="0"/>
-              <a:t>What techniques can be used to counter misinformation?</a:t>
-            </a:r>
+          <a:lstStyle>
+            <a:lvl1pPr>
+              <a:defRPr sz="4200" b="1"/>
+            </a:lvl1pPr>
+          </a:lstStyle>
+          <a:p>
+            <a:r>
+              <a:t>Volver por: XX:XX </a:t>
+            </a:r>
+          </a:p>
+        </p:txBody>
+      </p:sp>
+      <p:sp>
+        <p:nvSpPr>
+          <p:cNvPr id="201" name="Slide Number"/>
+          <p:cNvSpPr txBox="1">
+            <a:spLocks noGrp="1"/>
+          </p:cNvSpPr>
+          <p:nvPr>
+            <p:ph type="sldNum" sz="quarter" idx="2"/>
+          </p:nvPr>
+        </p:nvSpPr>
+        <p:spPr>
+          <a:prstGeom prst="rect">
+            <a:avLst/>
+          </a:prstGeom>
+          <a:extLst>
+            <a:ext uri="{C572A759-6A51-4108-AA02-DFA0A04FC94B}">
+              <ma14:wrappingTextBoxFlag xmlns:ma14="http://schemas.microsoft.com/office/mac/drawingml/2011/main" xmlns:a14="http://schemas.microsoft.com/office/drawing/2010/main" xmlns:m="http://schemas.openxmlformats.org/officeDocument/2006/math" xmlns="" val="1"/>
+            </a:ext>
+          </a:extLst>
+        </p:spPr>
+        <p:txBody>
+          <a:bodyPr/>
+          <a:lstStyle/>
+          <a:p>
+            <a:fld id="{86CB4B4D-7CA3-9044-876B-883B54F8677D}" type="slidenum">
+              <a:t>25</a:t>
+            </a:fld>
+            <a:endParaRPr/>
           </a:p>
         </p:txBody>
       </p:sp>
     </p:spTree>
     <p:extLst>
       <p:ext uri="{BB962C8B-B14F-4D97-AF65-F5344CB8AC3E}">
-        <p14:creationId xmlns:p14="http://schemas.microsoft.com/office/powerpoint/2010/main" val="3285697388"/>
+        <p14:creationId xmlns:p14="http://schemas.microsoft.com/office/powerpoint/2010/main" val="3235858406"/>
+      </p:ext>
+    </p:extLst>
+  </p:cSld>
+  <p:clrMapOvr>
+    <a:masterClrMapping/>
+  </p:clrMapOvr>
+  <p:transition spd="med"/>
+</p:sld>
+</file>
+
+<file path=ppt/slides/slide26.xml><?xml version="1.0" encoding="utf-8"?>
+<p:sld xmlns:a="http://schemas.openxmlformats.org/drawingml/2006/main" xmlns:r="http://schemas.openxmlformats.org/officeDocument/2006/relationships" xmlns:p="http://schemas.openxmlformats.org/presentationml/2006/main">
+  <p:cSld>
+    <p:bg>
+      <p:bgPr>
+        <a:solidFill>
+          <a:srgbClr val="FFFF00"/>
+        </a:solidFill>
+        <a:effectLst/>
+      </p:bgPr>
+    </p:bg>
+    <p:spTree>
+      <p:nvGrpSpPr>
+        <p:cNvPr id="1" name=""/>
+        <p:cNvGrpSpPr/>
+        <p:nvPr/>
+      </p:nvGrpSpPr>
+      <p:grpSpPr>
+        <a:xfrm>
+          <a:off x="0" y="0"/>
+          <a:ext cx="0" cy="0"/>
+          <a:chOff x="0" y="0"/>
+          <a:chExt cx="0" cy="0"/>
+        </a:xfrm>
+      </p:grpSpPr>
+      <p:sp>
+        <p:nvSpPr>
+          <p:cNvPr id="2" name="Title 1">
+            <a:extLst>
+              <a:ext uri="{FF2B5EF4-FFF2-40B4-BE49-F238E27FC236}">
+                <a16:creationId xmlns:a16="http://schemas.microsoft.com/office/drawing/2014/main" id="{0E7CCAEB-D84E-456D-3B6B-2E9573C73F98}"/>
+              </a:ext>
+            </a:extLst>
+          </p:cNvPr>
+          <p:cNvSpPr>
+            <a:spLocks noGrp="1"/>
+          </p:cNvSpPr>
+          <p:nvPr>
+            <p:ph type="title"/>
+          </p:nvPr>
+        </p:nvSpPr>
+        <p:spPr/>
+        <p:txBody>
+          <a:bodyPr/>
+          <a:lstStyle/>
+          <a:p>
+            <a:r>
+              <a:rPr lang="en-US" dirty="0"/>
+              <a:t>Combine TTPs</a:t>
+            </a:r>
+          </a:p>
+        </p:txBody>
+      </p:sp>
+      <p:sp>
+        <p:nvSpPr>
+          <p:cNvPr id="3" name="Content Placeholder 2">
+            <a:extLst>
+              <a:ext uri="{FF2B5EF4-FFF2-40B4-BE49-F238E27FC236}">
+                <a16:creationId xmlns:a16="http://schemas.microsoft.com/office/drawing/2014/main" id="{0A5EC664-EFAD-501E-02EA-4124C835D47B}"/>
+              </a:ext>
+            </a:extLst>
+          </p:cNvPr>
+          <p:cNvSpPr>
+            <a:spLocks noGrp="1"/>
+          </p:cNvSpPr>
+          <p:nvPr>
+            <p:ph idx="1"/>
+          </p:nvPr>
+        </p:nvSpPr>
+        <p:spPr/>
+        <p:txBody>
+          <a:bodyPr/>
+          <a:lstStyle/>
+          <a:p>
+            <a:r>
+              <a:rPr lang="en-US" dirty="0"/>
+              <a:t>Groups will combine strategies to a main strategy. </a:t>
+            </a:r>
+          </a:p>
+        </p:txBody>
+      </p:sp>
+    </p:spTree>
+    <p:extLst>
+      <p:ext uri="{BB962C8B-B14F-4D97-AF65-F5344CB8AC3E}">
+        <p14:creationId xmlns:p14="http://schemas.microsoft.com/office/powerpoint/2010/main" val="3588947859"/>
       </p:ext>
     </p:extLst>
   </p:cSld>
@@ -7210,7 +9235,7 @@
 </p:sld>
 </file>
 
-<file path=ppt/slides/slide2.xml><?xml version="1.0" encoding="utf-8"?>
+<file path=ppt/slides/slide27.xml><?xml version="1.0" encoding="utf-8"?>
 <p:sld xmlns:a="http://schemas.openxmlformats.org/drawingml/2006/main" xmlns:r="http://schemas.openxmlformats.org/officeDocument/2006/relationships" xmlns:p="http://schemas.openxmlformats.org/presentationml/2006/main">
   <p:cSld>
     <p:spTree>
@@ -7250,7 +9275,7 @@
           <a:p>
             <a:r>
               <a:rPr lang="en-US" dirty="0"/>
-              <a:t>Exercise</a:t>
+              <a:t>Combine TTPs</a:t>
             </a:r>
           </a:p>
         </p:txBody>
@@ -7278,7 +9303,7 @@
           <a:p>
             <a:r>
               <a:rPr lang="en-US" dirty="0"/>
-              <a:t>Students selected report to your designated areas. </a:t>
+              <a:t>Groups will combine strategies to a main strategy. </a:t>
             </a:r>
           </a:p>
         </p:txBody>
@@ -7286,7 +9311,7 @@
     </p:spTree>
     <p:extLst>
       <p:ext uri="{BB962C8B-B14F-4D97-AF65-F5344CB8AC3E}">
-        <p14:creationId xmlns:p14="http://schemas.microsoft.com/office/powerpoint/2010/main" val="2792640674"/>
+        <p14:creationId xmlns:p14="http://schemas.microsoft.com/office/powerpoint/2010/main" val="386633960"/>
       </p:ext>
     </p:extLst>
   </p:cSld>
@@ -7296,7 +9321,112 @@
 </p:sld>
 </file>
 
-<file path=ppt/slides/slide20.xml><?xml version="1.0" encoding="utf-8"?>
+<file path=ppt/slides/slide28.xml><?xml version="1.0" encoding="utf-8"?>
+<p:sld xmlns:a="http://schemas.openxmlformats.org/drawingml/2006/main" xmlns:r="http://schemas.openxmlformats.org/officeDocument/2006/relationships" xmlns:p="http://schemas.openxmlformats.org/presentationml/2006/main">
+  <p:cSld>
+    <p:bg>
+      <p:bgPr>
+        <a:solidFill>
+          <a:srgbClr val="FFFF00"/>
+        </a:solidFill>
+        <a:effectLst/>
+      </p:bgPr>
+    </p:bg>
+    <p:spTree>
+      <p:nvGrpSpPr>
+        <p:cNvPr id="1" name=""/>
+        <p:cNvGrpSpPr/>
+        <p:nvPr/>
+      </p:nvGrpSpPr>
+      <p:grpSpPr>
+        <a:xfrm>
+          <a:off x="0" y="0"/>
+          <a:ext cx="0" cy="0"/>
+          <a:chOff x="0" y="0"/>
+          <a:chExt cx="0" cy="0"/>
+        </a:xfrm>
+      </p:grpSpPr>
+      <p:sp>
+        <p:nvSpPr>
+          <p:cNvPr id="2" name="Title 1">
+            <a:extLst>
+              <a:ext uri="{FF2B5EF4-FFF2-40B4-BE49-F238E27FC236}">
+                <a16:creationId xmlns:a16="http://schemas.microsoft.com/office/drawing/2014/main" id="{0E7CCAEB-D84E-456D-3B6B-2E9573C73F98}"/>
+              </a:ext>
+            </a:extLst>
+          </p:cNvPr>
+          <p:cNvSpPr>
+            <a:spLocks noGrp="1"/>
+          </p:cNvSpPr>
+          <p:nvPr>
+            <p:ph type="title"/>
+          </p:nvPr>
+        </p:nvSpPr>
+        <p:spPr/>
+        <p:txBody>
+          <a:bodyPr/>
+          <a:lstStyle/>
+          <a:p>
+            <a:r>
+              <a:rPr lang="en-US" dirty="0"/>
+              <a:t>Practical Exercise</a:t>
+            </a:r>
+          </a:p>
+        </p:txBody>
+      </p:sp>
+      <p:sp>
+        <p:nvSpPr>
+          <p:cNvPr id="3" name="Content Placeholder 2">
+            <a:extLst>
+              <a:ext uri="{FF2B5EF4-FFF2-40B4-BE49-F238E27FC236}">
+                <a16:creationId xmlns:a16="http://schemas.microsoft.com/office/drawing/2014/main" id="{0A5EC664-EFAD-501E-02EA-4124C835D47B}"/>
+              </a:ext>
+            </a:extLst>
+          </p:cNvPr>
+          <p:cNvSpPr>
+            <a:spLocks noGrp="1"/>
+          </p:cNvSpPr>
+          <p:nvPr>
+            <p:ph idx="1"/>
+          </p:nvPr>
+        </p:nvSpPr>
+        <p:spPr/>
+        <p:txBody>
+          <a:bodyPr/>
+          <a:lstStyle/>
+          <a:p>
+            <a:r>
+              <a:rPr lang="en-US" dirty="0"/>
+              <a:t>Groups will combine strategies to a main strategy.</a:t>
+            </a:r>
+          </a:p>
+          <a:p>
+            <a:r>
+              <a:rPr lang="en-US" dirty="0"/>
+              <a:t>Follow instructions from </a:t>
+            </a:r>
+            <a:r>
+              <a:rPr lang="en-US"/>
+              <a:t>the handout. </a:t>
+            </a:r>
+            <a:endParaRPr lang="en-US" dirty="0"/>
+          </a:p>
+        </p:txBody>
+      </p:sp>
+    </p:spTree>
+    <p:extLst>
+      <p:ext uri="{BB962C8B-B14F-4D97-AF65-F5344CB8AC3E}">
+        <p14:creationId xmlns:p14="http://schemas.microsoft.com/office/powerpoint/2010/main" val="1965678674"/>
+      </p:ext>
+    </p:extLst>
+  </p:cSld>
+  <p:clrMapOvr>
+    <a:masterClrMapping/>
+  </p:clrMapOvr>
+</p:sld>
+</file>
+
+<file path=ppt/slides/slide29.xml><?xml version="1.0" encoding="utf-8"?>
 <p:sld xmlns:a="http://schemas.openxmlformats.org/drawingml/2006/main" xmlns:r="http://schemas.openxmlformats.org/officeDocument/2006/relationships" xmlns:p="http://schemas.openxmlformats.org/presentationml/2006/main">
   <p:cSld>
     <p:spTree>
@@ -7336,6 +9466,442 @@
           <a:p>
             <a:r>
               <a:rPr lang="en-US" dirty="0"/>
+              <a:t>Practical Exercise</a:t>
+            </a:r>
+          </a:p>
+        </p:txBody>
+      </p:sp>
+      <p:sp>
+        <p:nvSpPr>
+          <p:cNvPr id="3" name="Content Placeholder 2">
+            <a:extLst>
+              <a:ext uri="{FF2B5EF4-FFF2-40B4-BE49-F238E27FC236}">
+                <a16:creationId xmlns:a16="http://schemas.microsoft.com/office/drawing/2014/main" id="{0A5EC664-EFAD-501E-02EA-4124C835D47B}"/>
+              </a:ext>
+            </a:extLst>
+          </p:cNvPr>
+          <p:cNvSpPr>
+            <a:spLocks noGrp="1"/>
+          </p:cNvSpPr>
+          <p:nvPr>
+            <p:ph idx="1"/>
+          </p:nvPr>
+        </p:nvSpPr>
+        <p:spPr/>
+        <p:txBody>
+          <a:bodyPr/>
+          <a:lstStyle/>
+          <a:p>
+            <a:r>
+              <a:rPr lang="en-US" dirty="0"/>
+              <a:t>Groups will combine strategies to a main strategy.</a:t>
+            </a:r>
+          </a:p>
+          <a:p>
+            <a:r>
+              <a:rPr lang="en-US" dirty="0"/>
+              <a:t>Follow instructions from </a:t>
+            </a:r>
+            <a:r>
+              <a:rPr lang="en-US"/>
+              <a:t>the handout. </a:t>
+            </a:r>
+            <a:endParaRPr lang="en-US" dirty="0"/>
+          </a:p>
+        </p:txBody>
+      </p:sp>
+    </p:spTree>
+    <p:extLst>
+      <p:ext uri="{BB962C8B-B14F-4D97-AF65-F5344CB8AC3E}">
+        <p14:creationId xmlns:p14="http://schemas.microsoft.com/office/powerpoint/2010/main" val="2161729560"/>
+      </p:ext>
+    </p:extLst>
+  </p:cSld>
+  <p:clrMapOvr>
+    <a:masterClrMapping/>
+  </p:clrMapOvr>
+</p:sld>
+</file>
+
+<file path=ppt/slides/slide3.xml><?xml version="1.0" encoding="utf-8"?>
+<p:sld xmlns:a="http://schemas.openxmlformats.org/drawingml/2006/main" xmlns:r="http://schemas.openxmlformats.org/officeDocument/2006/relationships" xmlns:p="http://schemas.openxmlformats.org/presentationml/2006/main">
+  <p:cSld>
+    <p:spTree>
+      <p:nvGrpSpPr>
+        <p:cNvPr id="1" name=""/>
+        <p:cNvGrpSpPr/>
+        <p:nvPr/>
+      </p:nvGrpSpPr>
+      <p:grpSpPr>
+        <a:xfrm>
+          <a:off x="0" y="0"/>
+          <a:ext cx="0" cy="0"/>
+          <a:chOff x="0" y="0"/>
+          <a:chExt cx="0" cy="0"/>
+        </a:xfrm>
+      </p:grpSpPr>
+      <p:sp>
+        <p:nvSpPr>
+          <p:cNvPr id="2" name="Title 1">
+            <a:extLst>
+              <a:ext uri="{FF2B5EF4-FFF2-40B4-BE49-F238E27FC236}">
+                <a16:creationId xmlns:a16="http://schemas.microsoft.com/office/drawing/2014/main" id="{0E7CCAEB-D84E-456D-3B6B-2E9573C73F98}"/>
+              </a:ext>
+            </a:extLst>
+          </p:cNvPr>
+          <p:cNvSpPr>
+            <a:spLocks noGrp="1"/>
+          </p:cNvSpPr>
+          <p:nvPr>
+            <p:ph type="title"/>
+          </p:nvPr>
+        </p:nvSpPr>
+        <p:spPr/>
+        <p:txBody>
+          <a:bodyPr/>
+          <a:lstStyle/>
+          <a:p>
+            <a:endParaRPr lang="en-US" dirty="0"/>
+          </a:p>
+        </p:txBody>
+      </p:sp>
+      <p:sp>
+        <p:nvSpPr>
+          <p:cNvPr id="3" name="Content Placeholder 2">
+            <a:extLst>
+              <a:ext uri="{FF2B5EF4-FFF2-40B4-BE49-F238E27FC236}">
+                <a16:creationId xmlns:a16="http://schemas.microsoft.com/office/drawing/2014/main" id="{0A5EC664-EFAD-501E-02EA-4124C835D47B}"/>
+              </a:ext>
+            </a:extLst>
+          </p:cNvPr>
+          <p:cNvSpPr>
+            <a:spLocks noGrp="1"/>
+          </p:cNvSpPr>
+          <p:nvPr>
+            <p:ph idx="1"/>
+          </p:nvPr>
+        </p:nvSpPr>
+        <p:spPr/>
+        <p:txBody>
+          <a:bodyPr/>
+          <a:lstStyle/>
+          <a:p>
+            <a:r>
+              <a:rPr lang="en-US" dirty="0"/>
+              <a:t>Los </a:t>
+            </a:r>
+            <a:r>
+              <a:rPr lang="en-US" dirty="0" err="1"/>
+              <a:t>participantes</a:t>
+            </a:r>
+            <a:r>
+              <a:rPr lang="en-US" dirty="0"/>
+              <a:t> </a:t>
+            </a:r>
+            <a:r>
+              <a:rPr lang="en-US" dirty="0" err="1"/>
+              <a:t>seleccionados</a:t>
+            </a:r>
+            <a:r>
+              <a:rPr lang="en-US" dirty="0"/>
+              <a:t> se </a:t>
+            </a:r>
+            <a:r>
+              <a:rPr lang="en-US" dirty="0" err="1"/>
+              <a:t>reportan</a:t>
+            </a:r>
+            <a:r>
+              <a:rPr lang="en-US" dirty="0"/>
+              <a:t> a sus </a:t>
+            </a:r>
+            <a:r>
+              <a:rPr lang="en-US" dirty="0" err="1"/>
+              <a:t>áreas</a:t>
+            </a:r>
+            <a:r>
+              <a:rPr lang="en-US" dirty="0"/>
+              <a:t> </a:t>
+            </a:r>
+            <a:r>
+              <a:rPr lang="en-US" dirty="0" err="1"/>
+              <a:t>designadas</a:t>
+            </a:r>
+            <a:r>
+              <a:rPr lang="en-US" dirty="0"/>
+              <a:t>.</a:t>
+            </a:r>
+          </a:p>
+        </p:txBody>
+      </p:sp>
+    </p:spTree>
+    <p:extLst>
+      <p:ext uri="{BB962C8B-B14F-4D97-AF65-F5344CB8AC3E}">
+        <p14:creationId xmlns:p14="http://schemas.microsoft.com/office/powerpoint/2010/main" val="3494876511"/>
+      </p:ext>
+    </p:extLst>
+  </p:cSld>
+  <p:clrMapOvr>
+    <a:masterClrMapping/>
+  </p:clrMapOvr>
+</p:sld>
+</file>
+
+<file path=ppt/slides/slide30.xml><?xml version="1.0" encoding="utf-8"?>
+<p:sld xmlns:a="http://schemas.openxmlformats.org/drawingml/2006/main" xmlns:r="http://schemas.openxmlformats.org/officeDocument/2006/relationships" xmlns:p="http://schemas.openxmlformats.org/presentationml/2006/main">
+  <p:cSld>
+    <p:bg>
+      <p:bgPr>
+        <a:solidFill>
+          <a:srgbClr val="FFFF00"/>
+        </a:solidFill>
+        <a:effectLst/>
+      </p:bgPr>
+    </p:bg>
+    <p:spTree>
+      <p:nvGrpSpPr>
+        <p:cNvPr id="1" name=""/>
+        <p:cNvGrpSpPr/>
+        <p:nvPr/>
+      </p:nvGrpSpPr>
+      <p:grpSpPr>
+        <a:xfrm>
+          <a:off x="0" y="0"/>
+          <a:ext cx="0" cy="0"/>
+          <a:chOff x="0" y="0"/>
+          <a:chExt cx="0" cy="0"/>
+        </a:xfrm>
+      </p:grpSpPr>
+      <p:sp>
+        <p:nvSpPr>
+          <p:cNvPr id="2" name="Title 1">
+            <a:extLst>
+              <a:ext uri="{FF2B5EF4-FFF2-40B4-BE49-F238E27FC236}">
+                <a16:creationId xmlns:a16="http://schemas.microsoft.com/office/drawing/2014/main" id="{0E7CCAEB-D84E-456D-3B6B-2E9573C73F98}"/>
+              </a:ext>
+            </a:extLst>
+          </p:cNvPr>
+          <p:cNvSpPr>
+            <a:spLocks noGrp="1"/>
+          </p:cNvSpPr>
+          <p:nvPr>
+            <p:ph type="title"/>
+          </p:nvPr>
+        </p:nvSpPr>
+        <p:spPr/>
+        <p:txBody>
+          <a:bodyPr/>
+          <a:lstStyle/>
+          <a:p>
+            <a:r>
+              <a:rPr lang="en-US" dirty="0"/>
+              <a:t>Check on Learning</a:t>
+            </a:r>
+          </a:p>
+        </p:txBody>
+      </p:sp>
+      <p:sp>
+        <p:nvSpPr>
+          <p:cNvPr id="3" name="Content Placeholder 2">
+            <a:extLst>
+              <a:ext uri="{FF2B5EF4-FFF2-40B4-BE49-F238E27FC236}">
+                <a16:creationId xmlns:a16="http://schemas.microsoft.com/office/drawing/2014/main" id="{0A5EC664-EFAD-501E-02EA-4124C835D47B}"/>
+              </a:ext>
+            </a:extLst>
+          </p:cNvPr>
+          <p:cNvSpPr>
+            <a:spLocks noGrp="1"/>
+          </p:cNvSpPr>
+          <p:nvPr>
+            <p:ph idx="1"/>
+          </p:nvPr>
+        </p:nvSpPr>
+        <p:spPr/>
+        <p:txBody>
+          <a:bodyPr>
+            <a:normAutofit/>
+          </a:bodyPr>
+          <a:lstStyle/>
+          <a:p>
+            <a:r>
+              <a:rPr lang="en-US" dirty="0"/>
+              <a:t>What are the key components of an effective counter strategy?</a:t>
+            </a:r>
+          </a:p>
+          <a:p>
+            <a:r>
+              <a:rPr lang="en-US" dirty="0"/>
+              <a:t>Why is it important to counter misinformation quickly?</a:t>
+            </a:r>
+          </a:p>
+          <a:p>
+            <a:r>
+              <a:rPr lang="en-US" dirty="0"/>
+              <a:t>What techniques can be used to counter misinformation?</a:t>
+            </a:r>
+          </a:p>
+        </p:txBody>
+      </p:sp>
+    </p:spTree>
+    <p:extLst>
+      <p:ext uri="{BB962C8B-B14F-4D97-AF65-F5344CB8AC3E}">
+        <p14:creationId xmlns:p14="http://schemas.microsoft.com/office/powerpoint/2010/main" val="3285697388"/>
+      </p:ext>
+    </p:extLst>
+  </p:cSld>
+  <p:clrMapOvr>
+    <a:masterClrMapping/>
+  </p:clrMapOvr>
+</p:sld>
+</file>
+
+<file path=ppt/slides/slide31.xml><?xml version="1.0" encoding="utf-8"?>
+<p:sld xmlns:a="http://schemas.openxmlformats.org/drawingml/2006/main" xmlns:r="http://schemas.openxmlformats.org/officeDocument/2006/relationships" xmlns:p="http://schemas.openxmlformats.org/presentationml/2006/main">
+  <p:cSld>
+    <p:spTree>
+      <p:nvGrpSpPr>
+        <p:cNvPr id="1" name=""/>
+        <p:cNvGrpSpPr/>
+        <p:nvPr/>
+      </p:nvGrpSpPr>
+      <p:grpSpPr>
+        <a:xfrm>
+          <a:off x="0" y="0"/>
+          <a:ext cx="0" cy="0"/>
+          <a:chOff x="0" y="0"/>
+          <a:chExt cx="0" cy="0"/>
+        </a:xfrm>
+      </p:grpSpPr>
+      <p:sp>
+        <p:nvSpPr>
+          <p:cNvPr id="2" name="Title 1">
+            <a:extLst>
+              <a:ext uri="{FF2B5EF4-FFF2-40B4-BE49-F238E27FC236}">
+                <a16:creationId xmlns:a16="http://schemas.microsoft.com/office/drawing/2014/main" id="{0E7CCAEB-D84E-456D-3B6B-2E9573C73F98}"/>
+              </a:ext>
+            </a:extLst>
+          </p:cNvPr>
+          <p:cNvSpPr>
+            <a:spLocks noGrp="1"/>
+          </p:cNvSpPr>
+          <p:nvPr>
+            <p:ph type="title"/>
+          </p:nvPr>
+        </p:nvSpPr>
+        <p:spPr/>
+        <p:txBody>
+          <a:bodyPr/>
+          <a:lstStyle/>
+          <a:p>
+            <a:r>
+              <a:rPr lang="en-US" dirty="0"/>
+              <a:t>Check on Learning</a:t>
+            </a:r>
+          </a:p>
+        </p:txBody>
+      </p:sp>
+      <p:sp>
+        <p:nvSpPr>
+          <p:cNvPr id="3" name="Content Placeholder 2">
+            <a:extLst>
+              <a:ext uri="{FF2B5EF4-FFF2-40B4-BE49-F238E27FC236}">
+                <a16:creationId xmlns:a16="http://schemas.microsoft.com/office/drawing/2014/main" id="{0A5EC664-EFAD-501E-02EA-4124C835D47B}"/>
+              </a:ext>
+            </a:extLst>
+          </p:cNvPr>
+          <p:cNvSpPr>
+            <a:spLocks noGrp="1"/>
+          </p:cNvSpPr>
+          <p:nvPr>
+            <p:ph idx="1"/>
+          </p:nvPr>
+        </p:nvSpPr>
+        <p:spPr/>
+        <p:txBody>
+          <a:bodyPr>
+            <a:normAutofit/>
+          </a:bodyPr>
+          <a:lstStyle/>
+          <a:p>
+            <a:r>
+              <a:rPr lang="en-US" dirty="0"/>
+              <a:t>What are the key components of an effective counter strategy?</a:t>
+            </a:r>
+          </a:p>
+          <a:p>
+            <a:r>
+              <a:rPr lang="en-US" dirty="0"/>
+              <a:t>Why is it important to counter misinformation quickly?</a:t>
+            </a:r>
+          </a:p>
+          <a:p>
+            <a:r>
+              <a:rPr lang="en-US" dirty="0"/>
+              <a:t>What techniques can be used to counter misinformation?</a:t>
+            </a:r>
+          </a:p>
+        </p:txBody>
+      </p:sp>
+    </p:spTree>
+    <p:extLst>
+      <p:ext uri="{BB962C8B-B14F-4D97-AF65-F5344CB8AC3E}">
+        <p14:creationId xmlns:p14="http://schemas.microsoft.com/office/powerpoint/2010/main" val="3909221739"/>
+      </p:ext>
+    </p:extLst>
+  </p:cSld>
+  <p:clrMapOvr>
+    <a:masterClrMapping/>
+  </p:clrMapOvr>
+</p:sld>
+</file>
+
+<file path=ppt/slides/slide32.xml><?xml version="1.0" encoding="utf-8"?>
+<p:sld xmlns:a="http://schemas.openxmlformats.org/drawingml/2006/main" xmlns:r="http://schemas.openxmlformats.org/officeDocument/2006/relationships" xmlns:p="http://schemas.openxmlformats.org/presentationml/2006/main">
+  <p:cSld>
+    <p:bg>
+      <p:bgPr>
+        <a:solidFill>
+          <a:srgbClr val="FFFF00"/>
+        </a:solidFill>
+        <a:effectLst/>
+      </p:bgPr>
+    </p:bg>
+    <p:spTree>
+      <p:nvGrpSpPr>
+        <p:cNvPr id="1" name=""/>
+        <p:cNvGrpSpPr/>
+        <p:nvPr/>
+      </p:nvGrpSpPr>
+      <p:grpSpPr>
+        <a:xfrm>
+          <a:off x="0" y="0"/>
+          <a:ext cx="0" cy="0"/>
+          <a:chOff x="0" y="0"/>
+          <a:chExt cx="0" cy="0"/>
+        </a:xfrm>
+      </p:grpSpPr>
+      <p:sp>
+        <p:nvSpPr>
+          <p:cNvPr id="2" name="Title 1">
+            <a:extLst>
+              <a:ext uri="{FF2B5EF4-FFF2-40B4-BE49-F238E27FC236}">
+                <a16:creationId xmlns:a16="http://schemas.microsoft.com/office/drawing/2014/main" id="{0E7CCAEB-D84E-456D-3B6B-2E9573C73F98}"/>
+              </a:ext>
+            </a:extLst>
+          </p:cNvPr>
+          <p:cNvSpPr>
+            <a:spLocks noGrp="1"/>
+          </p:cNvSpPr>
+          <p:nvPr>
+            <p:ph type="title"/>
+          </p:nvPr>
+        </p:nvSpPr>
+        <p:spPr/>
+        <p:txBody>
+          <a:bodyPr/>
+          <a:lstStyle/>
+          <a:p>
+            <a:r>
+              <a:rPr lang="en-US" dirty="0"/>
               <a:t>Check on Learning: Rapid Fire</a:t>
             </a:r>
           </a:p>
@@ -7408,7 +9974,119 @@
 </p:sld>
 </file>
 
-<file path=ppt/slides/slide21.xml><?xml version="1.0" encoding="utf-8"?>
+<file path=ppt/slides/slide33.xml><?xml version="1.0" encoding="utf-8"?>
+<p:sld xmlns:a="http://schemas.openxmlformats.org/drawingml/2006/main" xmlns:r="http://schemas.openxmlformats.org/officeDocument/2006/relationships" xmlns:p="http://schemas.openxmlformats.org/presentationml/2006/main">
+  <p:cSld>
+    <p:spTree>
+      <p:nvGrpSpPr>
+        <p:cNvPr id="1" name=""/>
+        <p:cNvGrpSpPr/>
+        <p:nvPr/>
+      </p:nvGrpSpPr>
+      <p:grpSpPr>
+        <a:xfrm>
+          <a:off x="0" y="0"/>
+          <a:ext cx="0" cy="0"/>
+          <a:chOff x="0" y="0"/>
+          <a:chExt cx="0" cy="0"/>
+        </a:xfrm>
+      </p:grpSpPr>
+      <p:sp>
+        <p:nvSpPr>
+          <p:cNvPr id="2" name="Title 1">
+            <a:extLst>
+              <a:ext uri="{FF2B5EF4-FFF2-40B4-BE49-F238E27FC236}">
+                <a16:creationId xmlns:a16="http://schemas.microsoft.com/office/drawing/2014/main" id="{0E7CCAEB-D84E-456D-3B6B-2E9573C73F98}"/>
+              </a:ext>
+            </a:extLst>
+          </p:cNvPr>
+          <p:cNvSpPr>
+            <a:spLocks noGrp="1"/>
+          </p:cNvSpPr>
+          <p:nvPr>
+            <p:ph type="title"/>
+          </p:nvPr>
+        </p:nvSpPr>
+        <p:spPr/>
+        <p:txBody>
+          <a:bodyPr/>
+          <a:lstStyle/>
+          <a:p>
+            <a:r>
+              <a:rPr lang="en-US" dirty="0"/>
+              <a:t>Check on Learning: Rapid Fire</a:t>
+            </a:r>
+          </a:p>
+        </p:txBody>
+      </p:sp>
+      <p:sp>
+        <p:nvSpPr>
+          <p:cNvPr id="3" name="Content Placeholder 2">
+            <a:extLst>
+              <a:ext uri="{FF2B5EF4-FFF2-40B4-BE49-F238E27FC236}">
+                <a16:creationId xmlns:a16="http://schemas.microsoft.com/office/drawing/2014/main" id="{0A5EC664-EFAD-501E-02EA-4124C835D47B}"/>
+              </a:ext>
+            </a:extLst>
+          </p:cNvPr>
+          <p:cNvSpPr>
+            <a:spLocks noGrp="1"/>
+          </p:cNvSpPr>
+          <p:nvPr>
+            <p:ph idx="1"/>
+          </p:nvPr>
+        </p:nvSpPr>
+        <p:spPr/>
+        <p:txBody>
+          <a:bodyPr>
+            <a:normAutofit lnSpcReduction="10000"/>
+          </a:bodyPr>
+          <a:lstStyle/>
+          <a:p>
+            <a:r>
+              <a:rPr lang="en-US" dirty="0"/>
+              <a:t>What would you do if the misinformation was being spread by a high-ranking official? </a:t>
+            </a:r>
+          </a:p>
+          <a:p>
+            <a:r>
+              <a:rPr lang="en-US" dirty="0"/>
+              <a:t>What would you do if the misinformation was being spread by a foreign government?</a:t>
+            </a:r>
+          </a:p>
+          <a:p>
+            <a:r>
+              <a:rPr lang="en-US" dirty="0"/>
+              <a:t>What would you do if the misinformation was being spread by both a foreign government and a high-ranking official?</a:t>
+            </a:r>
+          </a:p>
+          <a:p>
+            <a:r>
+              <a:rPr lang="en-US" dirty="0"/>
+              <a:t>What would you do if your family was being targeted by the misinformation? </a:t>
+            </a:r>
+          </a:p>
+          <a:p>
+            <a:r>
+              <a:rPr lang="en-US" dirty="0"/>
+              <a:t>What would you do if the misinformation was being spread by a friend?</a:t>
+            </a:r>
+          </a:p>
+        </p:txBody>
+      </p:sp>
+    </p:spTree>
+    <p:extLst>
+      <p:ext uri="{BB962C8B-B14F-4D97-AF65-F5344CB8AC3E}">
+        <p14:creationId xmlns:p14="http://schemas.microsoft.com/office/powerpoint/2010/main" val="2246607921"/>
+      </p:ext>
+    </p:extLst>
+  </p:cSld>
+  <p:clrMapOvr>
+    <a:masterClrMapping/>
+  </p:clrMapOvr>
+</p:sld>
+</file>
+
+<file path=ppt/slides/slide34.xml><?xml version="1.0" encoding="utf-8"?>
 <p:sld xmlns:a="http://schemas.openxmlformats.org/drawingml/2006/main" xmlns:r="http://schemas.openxmlformats.org/officeDocument/2006/relationships" xmlns:p="http://schemas.openxmlformats.org/presentationml/2006/main">
   <p:cSld>
     <p:bg>
@@ -7505,7 +10183,7 @@
           </a:prstGeom>
           <a:extLst>
             <a:ext uri="{C572A759-6A51-4108-AA02-DFA0A04FC94B}">
-              <ma14:wrappingTextBoxFlag xmlns="" xmlns:m="http://schemas.openxmlformats.org/officeDocument/2006/math" xmlns:a14="http://schemas.microsoft.com/office/drawing/2010/main" xmlns:ma14="http://schemas.microsoft.com/office/mac/drawingml/2011/main" val="1"/>
+              <ma14:wrappingTextBoxFlag xmlns:ma14="http://schemas.microsoft.com/office/mac/drawingml/2011/main" xmlns:a14="http://schemas.microsoft.com/office/drawing/2010/main" xmlns:m="http://schemas.openxmlformats.org/officeDocument/2006/math" xmlns="" val="1"/>
             </a:ext>
           </a:extLst>
         </p:spPr>
@@ -7514,7 +10192,7 @@
           <a:lstStyle/>
           <a:p>
             <a:fld id="{86CB4B4D-7CA3-9044-876B-883B54F8677D}" type="slidenum">
-              <a:t>21</a:t>
+              <a:t>34</a:t>
             </a:fld>
             <a:endParaRPr/>
           </a:p>
@@ -7529,7 +10207,7 @@
 </p:sld>
 </file>
 
-<file path=ppt/slides/slide22.xml><?xml version="1.0" encoding="utf-8"?>
+<file path=ppt/slides/slide35.xml><?xml version="1.0" encoding="utf-8"?>
 <p:sld xmlns:a="http://schemas.openxmlformats.org/drawingml/2006/main" xmlns:r="http://schemas.openxmlformats.org/officeDocument/2006/relationships" xmlns:p="http://schemas.openxmlformats.org/presentationml/2006/main">
   <p:cSld>
     <p:spTree>
@@ -7618,7 +10296,7 @@
           </a:prstGeom>
           <a:extLst>
             <a:ext uri="{C572A759-6A51-4108-AA02-DFA0A04FC94B}">
-              <ma14:wrappingTextBoxFlag xmlns="" xmlns:m="http://schemas.openxmlformats.org/officeDocument/2006/math" xmlns:a14="http://schemas.microsoft.com/office/drawing/2010/main" xmlns:ma14="http://schemas.microsoft.com/office/mac/drawingml/2011/main" val="1"/>
+              <ma14:wrappingTextBoxFlag xmlns:ma14="http://schemas.microsoft.com/office/mac/drawingml/2011/main" xmlns:a14="http://schemas.microsoft.com/office/drawing/2010/main" xmlns:m="http://schemas.openxmlformats.org/officeDocument/2006/math" xmlns="" val="1"/>
             </a:ext>
           </a:extLst>
         </p:spPr>
@@ -7627,7 +10305,7 @@
           <a:lstStyle/>
           <a:p>
             <a:fld id="{86CB4B4D-7CA3-9044-876B-883B54F8677D}" type="slidenum">
-              <a:t>22</a:t>
+              <a:t>35</a:t>
             </a:fld>
             <a:endParaRPr/>
           </a:p>
@@ -7644,7 +10322,7 @@
         <p:push dir="u"/>
       </p:transition>
     </mc:Choice>
-    <mc:Fallback xmlns="" xmlns:m="http://schemas.openxmlformats.org/officeDocument/2006/math" xmlns:a14="http://schemas.microsoft.com/office/drawing/2010/main">
+    <mc:Fallback xmlns:a14="http://schemas.microsoft.com/office/drawing/2010/main" xmlns:m="http://schemas.openxmlformats.org/officeDocument/2006/math" xmlns="">
       <p:transition spd="slow">
         <p:fade/>
       </p:transition>
@@ -7653,7 +10331,7 @@
 </p:sld>
 </file>
 
-<file path=ppt/slides/slide23.xml><?xml version="1.0" encoding="utf-8"?>
+<file path=ppt/slides/slide36.xml><?xml version="1.0" encoding="utf-8"?>
 <p:sld xmlns:a="http://schemas.openxmlformats.org/drawingml/2006/main" xmlns:r="http://schemas.openxmlformats.org/officeDocument/2006/relationships" xmlns:p="http://schemas.openxmlformats.org/presentationml/2006/main">
   <p:cSld>
     <p:bg>
@@ -7765,7 +10443,7 @@
           </a:ln>
           <a:extLst>
             <a:ext uri="{C572A759-6A51-4108-AA02-DFA0A04FC94B}">
-              <ma14:wrappingTextBoxFlag xmlns="" xmlns:m="http://schemas.openxmlformats.org/officeDocument/2006/math" xmlns:a14="http://schemas.microsoft.com/office/drawing/2010/main" xmlns:ma14="http://schemas.microsoft.com/office/mac/drawingml/2011/main" val="1"/>
+              <ma14:wrappingTextBoxFlag xmlns:ma14="http://schemas.microsoft.com/office/mac/drawingml/2011/main" xmlns:a14="http://schemas.microsoft.com/office/drawing/2010/main" xmlns:m="http://schemas.openxmlformats.org/officeDocument/2006/math" xmlns="" val="1"/>
             </a:ext>
           </a:extLst>
         </p:spPr>
@@ -7801,7 +10479,7 @@
           </a:prstGeom>
           <a:extLst>
             <a:ext uri="{C572A759-6A51-4108-AA02-DFA0A04FC94B}">
-              <ma14:wrappingTextBoxFlag xmlns="" xmlns:m="http://schemas.openxmlformats.org/officeDocument/2006/math" xmlns:a14="http://schemas.microsoft.com/office/drawing/2010/main" xmlns:ma14="http://schemas.microsoft.com/office/mac/drawingml/2011/main" val="1"/>
+              <ma14:wrappingTextBoxFlag xmlns:ma14="http://schemas.microsoft.com/office/mac/drawingml/2011/main" xmlns:a14="http://schemas.microsoft.com/office/drawing/2010/main" xmlns:m="http://schemas.openxmlformats.org/officeDocument/2006/math" xmlns="" val="1"/>
             </a:ext>
           </a:extLst>
         </p:spPr>
@@ -7811,7 +10489,7 @@
           <a:p>
             <a:fld id="{86CB4B4D-7CA3-9044-876B-883B54F8677D}" type="slidenum">
               <a:rPr/>
-              <a:t>23</a:t>
+              <a:t>36</a:t>
             </a:fld>
             <a:endParaRPr/>
           </a:p>
@@ -7828,7 +10506,7 @@
         <p:push dir="u"/>
       </p:transition>
     </mc:Choice>
-    <mc:Fallback xmlns="" xmlns:m="http://schemas.openxmlformats.org/officeDocument/2006/math" xmlns:a14="http://schemas.microsoft.com/office/drawing/2010/main">
+    <mc:Fallback xmlns:a14="http://schemas.microsoft.com/office/drawing/2010/main" xmlns:m="http://schemas.openxmlformats.org/officeDocument/2006/math" xmlns="">
       <p:transition spd="slow">
         <p:fade/>
       </p:transition>
@@ -7837,7 +10515,7 @@
 </p:sld>
 </file>
 
-<file path=ppt/slides/slide24.xml><?xml version="1.0" encoding="utf-8"?>
+<file path=ppt/slides/slide37.xml><?xml version="1.0" encoding="utf-8"?>
 <p:sld xmlns:a="http://schemas.openxmlformats.org/drawingml/2006/main" xmlns:r="http://schemas.openxmlformats.org/officeDocument/2006/relationships" xmlns:p="http://schemas.openxmlformats.org/presentationml/2006/main">
   <p:cSld>
     <p:spTree>
@@ -7941,7 +10619,7 @@
           </a:ln>
           <a:extLst>
             <a:ext uri="{C572A759-6A51-4108-AA02-DFA0A04FC94B}">
-              <ma14:wrappingTextBoxFlag xmlns="" xmlns:m="http://schemas.openxmlformats.org/officeDocument/2006/math" xmlns:a14="http://schemas.microsoft.com/office/drawing/2010/main" xmlns:ma14="http://schemas.microsoft.com/office/mac/drawingml/2011/main" val="1"/>
+              <ma14:wrappingTextBoxFlag xmlns:ma14="http://schemas.microsoft.com/office/mac/drawingml/2011/main" xmlns:a14="http://schemas.microsoft.com/office/drawing/2010/main" xmlns:m="http://schemas.openxmlformats.org/officeDocument/2006/math" xmlns="" val="1"/>
             </a:ext>
           </a:extLst>
         </p:spPr>
@@ -7977,7 +10655,7 @@
           </a:prstGeom>
           <a:extLst>
             <a:ext uri="{C572A759-6A51-4108-AA02-DFA0A04FC94B}">
-              <ma14:wrappingTextBoxFlag xmlns="" xmlns:m="http://schemas.openxmlformats.org/officeDocument/2006/math" xmlns:a14="http://schemas.microsoft.com/office/drawing/2010/main" xmlns:ma14="http://schemas.microsoft.com/office/mac/drawingml/2011/main" val="1"/>
+              <ma14:wrappingTextBoxFlag xmlns:ma14="http://schemas.microsoft.com/office/mac/drawingml/2011/main" xmlns:a14="http://schemas.microsoft.com/office/drawing/2010/main" xmlns:m="http://schemas.openxmlformats.org/officeDocument/2006/math" xmlns="" val="1"/>
             </a:ext>
           </a:extLst>
         </p:spPr>
@@ -7986,7 +10664,7 @@
           <a:lstStyle/>
           <a:p>
             <a:fld id="{86CB4B4D-7CA3-9044-876B-883B54F8677D}" type="slidenum">
-              <a:t>24</a:t>
+              <a:t>37</a:t>
             </a:fld>
             <a:endParaRPr/>
           </a:p>
@@ -8001,7 +10679,113 @@
 </p:sld>
 </file>
 
-<file path=ppt/slides/slide3.xml><?xml version="1.0" encoding="utf-8"?>
+<file path=ppt/slides/slide4.xml><?xml version="1.0" encoding="utf-8"?>
+<p:sld xmlns:a="http://schemas.openxmlformats.org/drawingml/2006/main" xmlns:r="http://schemas.openxmlformats.org/officeDocument/2006/relationships" xmlns:p="http://schemas.openxmlformats.org/presentationml/2006/main">
+  <p:cSld>
+    <p:bg>
+      <p:bgPr>
+        <a:solidFill>
+          <a:srgbClr val="FFFF00"/>
+        </a:solidFill>
+        <a:effectLst/>
+      </p:bgPr>
+    </p:bg>
+    <p:spTree>
+      <p:nvGrpSpPr>
+        <p:cNvPr id="1" name=""/>
+        <p:cNvGrpSpPr/>
+        <p:nvPr/>
+      </p:nvGrpSpPr>
+      <p:grpSpPr>
+        <a:xfrm>
+          <a:off x="0" y="0"/>
+          <a:ext cx="0" cy="0"/>
+          <a:chOff x="0" y="0"/>
+          <a:chExt cx="0" cy="0"/>
+        </a:xfrm>
+      </p:grpSpPr>
+      <p:sp>
+        <p:nvSpPr>
+          <p:cNvPr id="2" name="Title 1">
+            <a:extLst>
+              <a:ext uri="{FF2B5EF4-FFF2-40B4-BE49-F238E27FC236}">
+                <a16:creationId xmlns:a16="http://schemas.microsoft.com/office/drawing/2014/main" id="{0E7CCAEB-D84E-456D-3B6B-2E9573C73F98}"/>
+              </a:ext>
+            </a:extLst>
+          </p:cNvPr>
+          <p:cNvSpPr>
+            <a:spLocks noGrp="1"/>
+          </p:cNvSpPr>
+          <p:nvPr>
+            <p:ph type="title"/>
+          </p:nvPr>
+        </p:nvSpPr>
+        <p:spPr/>
+        <p:txBody>
+          <a:bodyPr/>
+          <a:lstStyle/>
+          <a:p>
+            <a:r>
+              <a:rPr lang="en-US" dirty="0"/>
+              <a:t>Reflection</a:t>
+            </a:r>
+          </a:p>
+        </p:txBody>
+      </p:sp>
+      <p:sp>
+        <p:nvSpPr>
+          <p:cNvPr id="3" name="Content Placeholder 2">
+            <a:extLst>
+              <a:ext uri="{FF2B5EF4-FFF2-40B4-BE49-F238E27FC236}">
+                <a16:creationId xmlns:a16="http://schemas.microsoft.com/office/drawing/2014/main" id="{0A5EC664-EFAD-501E-02EA-4124C835D47B}"/>
+              </a:ext>
+            </a:extLst>
+          </p:cNvPr>
+          <p:cNvSpPr>
+            <a:spLocks noGrp="1"/>
+          </p:cNvSpPr>
+          <p:nvPr>
+            <p:ph idx="1"/>
+          </p:nvPr>
+        </p:nvSpPr>
+        <p:spPr/>
+        <p:txBody>
+          <a:bodyPr/>
+          <a:lstStyle/>
+          <a:p>
+            <a:r>
+              <a:rPr lang="en-US" dirty="0"/>
+              <a:t>What did you observe in the scenario?</a:t>
+            </a:r>
+          </a:p>
+          <a:p>
+            <a:r>
+              <a:rPr lang="en-US" dirty="0"/>
+              <a:t>How did the misinformation spread?</a:t>
+            </a:r>
+          </a:p>
+          <a:p>
+            <a:r>
+              <a:rPr lang="en-US" dirty="0"/>
+              <a:t>What were the immediate reactions?</a:t>
+            </a:r>
+          </a:p>
+        </p:txBody>
+      </p:sp>
+    </p:spTree>
+    <p:extLst>
+      <p:ext uri="{BB962C8B-B14F-4D97-AF65-F5344CB8AC3E}">
+        <p14:creationId xmlns:p14="http://schemas.microsoft.com/office/powerpoint/2010/main" val="1480791089"/>
+      </p:ext>
+    </p:extLst>
+  </p:cSld>
+  <p:clrMapOvr>
+    <a:masterClrMapping/>
+  </p:clrMapOvr>
+</p:sld>
+</file>
+
+<file path=ppt/slides/slide5.xml><?xml version="1.0" encoding="utf-8"?>
 <p:sld xmlns:a="http://schemas.openxmlformats.org/drawingml/2006/main" xmlns:r="http://schemas.openxmlformats.org/officeDocument/2006/relationships" xmlns:p="http://schemas.openxmlformats.org/presentationml/2006/main">
   <p:cSld>
     <p:spTree>
@@ -8089,7 +10873,7 @@
     </p:spTree>
     <p:extLst>
       <p:ext uri="{BB962C8B-B14F-4D97-AF65-F5344CB8AC3E}">
-        <p14:creationId xmlns:p14="http://schemas.microsoft.com/office/powerpoint/2010/main" val="1480791089"/>
+        <p14:creationId xmlns:p14="http://schemas.microsoft.com/office/powerpoint/2010/main" val="3957362027"/>
       </p:ext>
     </p:extLst>
   </p:cSld>
@@ -8099,107 +10883,16 @@
 </p:sld>
 </file>
 
-<file path=ppt/slides/slide4.xml><?xml version="1.0" encoding="utf-8"?>
-<p:sld xmlns:a="http://schemas.openxmlformats.org/drawingml/2006/main" xmlns:r="http://schemas.openxmlformats.org/officeDocument/2006/relationships" xmlns:p="http://schemas.openxmlformats.org/presentationml/2006/main">
-  <p:cSld>
-    <p:spTree>
-      <p:nvGrpSpPr>
-        <p:cNvPr id="1" name=""/>
-        <p:cNvGrpSpPr/>
-        <p:nvPr/>
-      </p:nvGrpSpPr>
-      <p:grpSpPr>
-        <a:xfrm>
-          <a:off x="0" y="0"/>
-          <a:ext cx="0" cy="0"/>
-          <a:chOff x="0" y="0"/>
-          <a:chExt cx="0" cy="0"/>
-        </a:xfrm>
-      </p:grpSpPr>
-      <p:sp>
-        <p:nvSpPr>
-          <p:cNvPr id="2" name="Content Placeholder 1">
-            <a:extLst>
-              <a:ext uri="{FF2B5EF4-FFF2-40B4-BE49-F238E27FC236}">
-                <a16:creationId xmlns:a16="http://schemas.microsoft.com/office/drawing/2014/main" id="{7C1822AB-D5F0-D579-A820-812EE3C83EDD}"/>
-              </a:ext>
-            </a:extLst>
-          </p:cNvPr>
-          <p:cNvSpPr>
-            <a:spLocks noGrp="1"/>
-          </p:cNvSpPr>
-          <p:nvPr>
-            <p:ph/>
-          </p:nvPr>
-        </p:nvSpPr>
-        <p:spPr>
-          <a:xfrm>
-            <a:off x="375127" y="2963211"/>
-            <a:ext cx="11441743" cy="1061102"/>
-          </a:xfrm>
-        </p:spPr>
-        <p:txBody>
-          <a:bodyPr/>
-          <a:lstStyle/>
-          <a:p>
-            <a:pPr marL="0" indent="0" algn="ctr">
-              <a:buNone/>
-            </a:pPr>
-            <a:r>
-              <a:rPr lang="en-US" sz="6000" dirty="0">
-                <a:latin typeface="Arial" panose="020B0604020202020204" pitchFamily="34" charset="0"/>
-                <a:cs typeface="Arial" panose="020B0604020202020204" pitchFamily="34" charset="0"/>
-              </a:rPr>
-              <a:t>Countering Malign Information</a:t>
-            </a:r>
-          </a:p>
-        </p:txBody>
-      </p:sp>
-      <p:sp>
-        <p:nvSpPr>
-          <p:cNvPr id="3" name="Text Placeholder 2">
-            <a:extLst>
-              <a:ext uri="{FF2B5EF4-FFF2-40B4-BE49-F238E27FC236}">
-                <a16:creationId xmlns:a16="http://schemas.microsoft.com/office/drawing/2014/main" id="{D94C7E47-63B7-8E9D-6345-B12B99DBCE2B}"/>
-              </a:ext>
-            </a:extLst>
-          </p:cNvPr>
-          <p:cNvSpPr>
-            <a:spLocks noGrp="1"/>
-          </p:cNvSpPr>
-          <p:nvPr>
-            <p:ph type="body" sz="quarter" idx="10"/>
-          </p:nvPr>
-        </p:nvSpPr>
-        <p:spPr/>
-        <p:txBody>
-          <a:bodyPr/>
-          <a:lstStyle/>
-          <a:p>
-            <a:endParaRPr lang="en-US"/>
-          </a:p>
-        </p:txBody>
-      </p:sp>
-    </p:spTree>
-    <p:extLst>
-      <p:ext uri="{BB962C8B-B14F-4D97-AF65-F5344CB8AC3E}">
-        <p14:creationId xmlns:p14="http://schemas.microsoft.com/office/powerpoint/2010/main" val="2329516533"/>
-      </p:ext>
-    </p:extLst>
-  </p:cSld>
-  <p:clrMapOvr>
-    <a:masterClrMapping/>
-  </p:clrMapOvr>
-</p:sld>
-</file>
-
-<file path=ppt/slides/slide5.xml><?xml version="1.0" encoding="utf-8"?>
+<file path=ppt/slides/slide6.xml><?xml version="1.0" encoding="utf-8"?>
 <p:sld xmlns:a="http://schemas.openxmlformats.org/drawingml/2006/main" xmlns:r="http://schemas.openxmlformats.org/officeDocument/2006/relationships" xmlns:p="http://schemas.openxmlformats.org/presentationml/2006/main">
   <p:cSld>
     <p:bg>
-      <p:bgRef idx="1001">
-        <a:schemeClr val="bg1"/>
-      </p:bgRef>
+      <p:bgPr>
+        <a:solidFill>
+          <a:srgbClr val="FFFF00"/>
+        </a:solidFill>
+        <a:effectLst/>
+      </p:bgPr>
     </p:bg>
     <p:spTree>
       <p:nvGrpSpPr>
@@ -8217,18 +10910,57 @@
       </p:grpSpPr>
       <p:sp>
         <p:nvSpPr>
-          <p:cNvPr id="2" name="Title 1">
-            <a:extLst>
-              <a:ext uri="{FF2B5EF4-FFF2-40B4-BE49-F238E27FC236}">
-                <a16:creationId xmlns:a16="http://schemas.microsoft.com/office/drawing/2014/main" id="{0E7CCAEB-D84E-456D-3B6B-2E9573C73F98}"/>
-              </a:ext>
-            </a:extLst>
-          </p:cNvPr>
-          <p:cNvSpPr>
-            <a:spLocks noGrp="1"/>
-          </p:cNvSpPr>
-          <p:nvPr>
-            <p:ph type="title"/>
+          <p:cNvPr id="2" name="Content Placeholder 1">
+            <a:extLst>
+              <a:ext uri="{FF2B5EF4-FFF2-40B4-BE49-F238E27FC236}">
+                <a16:creationId xmlns:a16="http://schemas.microsoft.com/office/drawing/2014/main" id="{7C1822AB-D5F0-D579-A820-812EE3C83EDD}"/>
+              </a:ext>
+            </a:extLst>
+          </p:cNvPr>
+          <p:cNvSpPr>
+            <a:spLocks noGrp="1"/>
+          </p:cNvSpPr>
+          <p:nvPr>
+            <p:ph/>
+          </p:nvPr>
+        </p:nvSpPr>
+        <p:spPr>
+          <a:xfrm>
+            <a:off x="375127" y="2963211"/>
+            <a:ext cx="11441743" cy="1061102"/>
+          </a:xfrm>
+        </p:spPr>
+        <p:txBody>
+          <a:bodyPr/>
+          <a:lstStyle/>
+          <a:p>
+            <a:pPr marL="0" indent="0" algn="ctr">
+              <a:buNone/>
+            </a:pPr>
+            <a:r>
+              <a:rPr lang="en-US" sz="6000" dirty="0">
+                <a:latin typeface="Arial" panose="020B0604020202020204" pitchFamily="34" charset="0"/>
+                <a:cs typeface="Arial" panose="020B0604020202020204" pitchFamily="34" charset="0"/>
+              </a:rPr>
+              <a:t>Countering Malign Information</a:t>
+            </a:r>
+          </a:p>
+        </p:txBody>
+      </p:sp>
+      <p:sp>
+        <p:nvSpPr>
+          <p:cNvPr id="3" name="Text Placeholder 2">
+            <a:extLst>
+              <a:ext uri="{FF2B5EF4-FFF2-40B4-BE49-F238E27FC236}">
+                <a16:creationId xmlns:a16="http://schemas.microsoft.com/office/drawing/2014/main" id="{D94C7E47-63B7-8E9D-6345-B12B99DBCE2B}"/>
+              </a:ext>
+            </a:extLst>
+          </p:cNvPr>
+          <p:cNvSpPr>
+            <a:spLocks noGrp="1"/>
+          </p:cNvSpPr>
+          <p:nvPr>
+            <p:ph type="body" sz="quarter" idx="10"/>
           </p:nvPr>
         </p:nvSpPr>
         <p:spPr/>
@@ -8236,161 +10968,14 @@
           <a:bodyPr/>
           <a:lstStyle/>
           <a:p>
-            <a:r>
-              <a:rPr lang="en-US" dirty="0"/>
-              <a:t>Lesson Objectives</a:t>
-            </a:r>
-          </a:p>
-        </p:txBody>
-      </p:sp>
-      <p:sp>
-        <p:nvSpPr>
-          <p:cNvPr id="3" name="Content Placeholder 2">
-            <a:extLst>
-              <a:ext uri="{FF2B5EF4-FFF2-40B4-BE49-F238E27FC236}">
-                <a16:creationId xmlns:a16="http://schemas.microsoft.com/office/drawing/2014/main" id="{0A5EC664-EFAD-501E-02EA-4124C835D47B}"/>
-              </a:ext>
-            </a:extLst>
-          </p:cNvPr>
-          <p:cNvSpPr>
-            <a:spLocks noGrp="1"/>
-          </p:cNvSpPr>
-          <p:nvPr>
-            <p:ph idx="1"/>
-          </p:nvPr>
-        </p:nvSpPr>
-        <p:spPr/>
-        <p:txBody>
-          <a:bodyPr>
-            <a:normAutofit/>
-          </a:bodyPr>
-          <a:lstStyle/>
-          <a:p>
-            <a:r>
-              <a:rPr lang="en-US" b="1" dirty="0">
-                <a:effectLst/>
-                <a:latin typeface="Calibri" panose="020F0502020204030204" pitchFamily="34" charset="0"/>
-                <a:cs typeface="Calibri" panose="020F0502020204030204" pitchFamily="34" charset="0"/>
-              </a:rPr>
-              <a:t>Goal: </a:t>
-            </a:r>
-            <a:r>
-              <a:rPr lang="en-US" dirty="0">
-                <a:effectLst/>
-                <a:latin typeface="Calibri" panose="020F0502020204030204" pitchFamily="34" charset="0"/>
-                <a:cs typeface="Calibri" panose="020F0502020204030204" pitchFamily="34" charset="0"/>
-              </a:rPr>
-              <a:t>Develop TTPs to counter misinformation and disinformation effectively. </a:t>
-            </a:r>
-            <a:endParaRPr lang="en-US" dirty="0">
-              <a:latin typeface="Calibri" panose="020F0502020204030204" pitchFamily="34" charset="0"/>
-              <a:cs typeface="Calibri" panose="020F0502020204030204" pitchFamily="34" charset="0"/>
-            </a:endParaRPr>
+            <a:endParaRPr lang="en-US"/>
           </a:p>
         </p:txBody>
       </p:sp>
     </p:spTree>
     <p:extLst>
       <p:ext uri="{BB962C8B-B14F-4D97-AF65-F5344CB8AC3E}">
-        <p14:creationId xmlns:p14="http://schemas.microsoft.com/office/powerpoint/2010/main" val="1075049808"/>
-      </p:ext>
-    </p:extLst>
-  </p:cSld>
-  <p:clrMapOvr>
-    <a:overrideClrMapping bg1="lt1" tx1="dk1" bg2="lt2" tx2="dk2" accent1="accent1" accent2="accent2" accent3="accent3" accent4="accent4" accent5="accent5" accent6="accent6" hlink="hlink" folHlink="folHlink"/>
-  </p:clrMapOvr>
-</p:sld>
-</file>
-
-<file path=ppt/slides/slide6.xml><?xml version="1.0" encoding="utf-8"?>
-<p:sld xmlns:a="http://schemas.openxmlformats.org/drawingml/2006/main" xmlns:r="http://schemas.openxmlformats.org/officeDocument/2006/relationships" xmlns:p="http://schemas.openxmlformats.org/presentationml/2006/main">
-  <p:cSld>
-    <p:spTree>
-      <p:nvGrpSpPr>
-        <p:cNvPr id="1" name=""/>
-        <p:cNvGrpSpPr/>
-        <p:nvPr/>
-      </p:nvGrpSpPr>
-      <p:grpSpPr>
-        <a:xfrm>
-          <a:off x="0" y="0"/>
-          <a:ext cx="0" cy="0"/>
-          <a:chOff x="0" y="0"/>
-          <a:chExt cx="0" cy="0"/>
-        </a:xfrm>
-      </p:grpSpPr>
-      <p:sp>
-        <p:nvSpPr>
-          <p:cNvPr id="2" name="Title 1">
-            <a:extLst>
-              <a:ext uri="{FF2B5EF4-FFF2-40B4-BE49-F238E27FC236}">
-                <a16:creationId xmlns:a16="http://schemas.microsoft.com/office/drawing/2014/main" id="{0E7CCAEB-D84E-456D-3B6B-2E9573C73F98}"/>
-              </a:ext>
-            </a:extLst>
-          </p:cNvPr>
-          <p:cNvSpPr>
-            <a:spLocks noGrp="1"/>
-          </p:cNvSpPr>
-          <p:nvPr>
-            <p:ph type="title"/>
-          </p:nvPr>
-        </p:nvSpPr>
-        <p:spPr/>
-        <p:txBody>
-          <a:bodyPr/>
-          <a:lstStyle/>
-          <a:p>
-            <a:r>
-              <a:rPr lang="en-US" dirty="0"/>
-              <a:t>Setting Your Goals</a:t>
-            </a:r>
-          </a:p>
-        </p:txBody>
-      </p:sp>
-      <p:sp>
-        <p:nvSpPr>
-          <p:cNvPr id="3" name="Content Placeholder 2">
-            <a:extLst>
-              <a:ext uri="{FF2B5EF4-FFF2-40B4-BE49-F238E27FC236}">
-                <a16:creationId xmlns:a16="http://schemas.microsoft.com/office/drawing/2014/main" id="{0A5EC664-EFAD-501E-02EA-4124C835D47B}"/>
-              </a:ext>
-            </a:extLst>
-          </p:cNvPr>
-          <p:cNvSpPr>
-            <a:spLocks noGrp="1"/>
-          </p:cNvSpPr>
-          <p:nvPr>
-            <p:ph idx="1"/>
-          </p:nvPr>
-        </p:nvSpPr>
-        <p:spPr/>
-        <p:txBody>
-          <a:bodyPr/>
-          <a:lstStyle/>
-          <a:p>
-            <a:r>
-              <a:rPr lang="en-US" dirty="0"/>
-              <a:t>Define what malign information looks like in your context.</a:t>
-            </a:r>
-          </a:p>
-          <a:p>
-            <a:r>
-              <a:rPr lang="en-US" dirty="0"/>
-              <a:t>Identify your goals when countering this information.</a:t>
-            </a:r>
-          </a:p>
-          <a:p>
-            <a:r>
-              <a:rPr lang="en-US" dirty="0"/>
-              <a:t>Discuss the importance of these goals in maintaining accurate information flow.</a:t>
-            </a:r>
-          </a:p>
-        </p:txBody>
-      </p:sp>
-    </p:spTree>
-    <p:extLst>
-      <p:ext uri="{BB962C8B-B14F-4D97-AF65-F5344CB8AC3E}">
-        <p14:creationId xmlns:p14="http://schemas.microsoft.com/office/powerpoint/2010/main" val="3365648032"/>
+        <p14:creationId xmlns:p14="http://schemas.microsoft.com/office/powerpoint/2010/main" val="2329516533"/>
       </p:ext>
     </p:extLst>
   </p:cSld>
@@ -8419,171 +11004,92 @@
       </p:grpSpPr>
       <p:sp>
         <p:nvSpPr>
-          <p:cNvPr id="193" name="Title 2"/>
-          <p:cNvSpPr txBox="1">
-            <a:spLocks noGrp="1"/>
-          </p:cNvSpPr>
-          <p:nvPr>
-            <p:ph type="title" idx="4294967295"/>
+          <p:cNvPr id="2" name="Content Placeholder 1">
+            <a:extLst>
+              <a:ext uri="{FF2B5EF4-FFF2-40B4-BE49-F238E27FC236}">
+                <a16:creationId xmlns:a16="http://schemas.microsoft.com/office/drawing/2014/main" id="{7C1822AB-D5F0-D579-A820-812EE3C83EDD}"/>
+              </a:ext>
+            </a:extLst>
+          </p:cNvPr>
+          <p:cNvSpPr>
+            <a:spLocks noGrp="1"/>
+          </p:cNvSpPr>
+          <p:nvPr>
+            <p:ph/>
           </p:nvPr>
         </p:nvSpPr>
         <p:spPr>
           <a:xfrm>
-            <a:off x="2154607" y="2531859"/>
-            <a:ext cx="3658054" cy="1786516"/>
+            <a:off x="375127" y="2963211"/>
+            <a:ext cx="11441743" cy="1061102"/>
           </a:xfrm>
-          <a:prstGeom prst="rect">
-            <a:avLst/>
-          </a:prstGeom>
         </p:spPr>
         <p:txBody>
-          <a:bodyPr anchor="t"/>
-          <a:lstStyle>
-            <a:lvl1pPr>
-              <a:defRPr sz="4800" b="0">
-                <a:solidFill>
-                  <a:srgbClr val="44546A"/>
-                </a:solidFill>
-                <a:latin typeface="Calibri Light"/>
-                <a:ea typeface="Calibri Light"/>
-                <a:cs typeface="Calibri Light"/>
-                <a:sym typeface="Calibri Light"/>
-              </a:defRPr>
-            </a:lvl1pPr>
-          </a:lstStyle>
-          <a:p>
-            <a:r>
-              <a:t>TAKE A BREAK</a:t>
-            </a:r>
-          </a:p>
-        </p:txBody>
-      </p:sp>
-      <p:pic>
-        <p:nvPicPr>
-          <p:cNvPr id="194" name="Graphic 13" descr="Graphic 13"/>
-          <p:cNvPicPr>
-            <a:picLocks noChangeAspect="1"/>
-          </p:cNvPicPr>
-          <p:nvPr/>
-        </p:nvPicPr>
-        <p:blipFill>
-          <a:blip r:embed="rId2"/>
-          <a:stretch>
-            <a:fillRect/>
-          </a:stretch>
-        </p:blipFill>
-        <p:spPr>
-          <a:xfrm>
-            <a:off x="6379342" y="-259377"/>
-            <a:ext cx="5029201" cy="5029201"/>
-          </a:xfrm>
-          <a:prstGeom prst="rect">
-            <a:avLst/>
-          </a:prstGeom>
-          <a:ln w="12700">
-            <a:miter lim="400000"/>
-          </a:ln>
-        </p:spPr>
-      </p:pic>
-      <p:sp>
-        <p:nvSpPr>
-          <p:cNvPr id="195" name="TextBox 1"/>
-          <p:cNvSpPr txBox="1"/>
-          <p:nvPr/>
-        </p:nvSpPr>
-        <p:spPr>
-          <a:xfrm>
-            <a:off x="3715415" y="5405718"/>
-            <a:ext cx="3986136" cy="634118"/>
-          </a:xfrm>
-          <a:prstGeom prst="rect">
-            <a:avLst/>
-          </a:prstGeom>
-          <a:ln w="12700">
-            <a:miter lim="400000"/>
-          </a:ln>
-          <a:extLst>
-            <a:ext uri="{C572A759-6A51-4108-AA02-DFA0A04FC94B}">
-              <ma14:wrappingTextBoxFlag xmlns="" xmlns:m="http://schemas.openxmlformats.org/officeDocument/2006/math" xmlns:a14="http://schemas.microsoft.com/office/drawing/2010/main" xmlns:ma14="http://schemas.microsoft.com/office/mac/drawingml/2011/main" val="1"/>
-            </a:ext>
-          </a:extLst>
-        </p:spPr>
-        <p:txBody>
-          <a:bodyPr wrap="none" lIns="45719" rIns="45719">
-            <a:spAutoFit/>
-          </a:bodyPr>
-          <a:lstStyle>
-            <a:lvl1pPr>
-              <a:defRPr sz="4200" b="1"/>
-            </a:lvl1pPr>
-          </a:lstStyle>
-          <a:p>
-            <a:r>
-              <a:t>Return By: XX:XX </a:t>
-            </a:r>
-          </a:p>
-        </p:txBody>
-      </p:sp>
-      <p:sp>
-        <p:nvSpPr>
-          <p:cNvPr id="196" name="Slide Number"/>
-          <p:cNvSpPr txBox="1">
-            <a:spLocks noGrp="1"/>
-          </p:cNvSpPr>
-          <p:nvPr>
-            <p:ph type="sldNum" sz="quarter" idx="2"/>
-          </p:nvPr>
-        </p:nvSpPr>
-        <p:spPr>
-          <a:prstGeom prst="rect">
-            <a:avLst/>
-          </a:prstGeom>
-          <a:extLst>
-            <a:ext uri="{C572A759-6A51-4108-AA02-DFA0A04FC94B}">
-              <ma14:wrappingTextBoxFlag xmlns="" xmlns:m="http://schemas.openxmlformats.org/officeDocument/2006/math" xmlns:a14="http://schemas.microsoft.com/office/drawing/2010/main" xmlns:ma14="http://schemas.microsoft.com/office/mac/drawingml/2011/main" val="1"/>
-            </a:ext>
-          </a:extLst>
-        </p:spPr>
-        <p:txBody>
-          <a:bodyPr/>
-          <a:lstStyle/>
-          <a:p>
-            <a:fld id="{86CB4B4D-7CA3-9044-876B-883B54F8677D}" type="slidenum">
-              <a:rPr/>
-              <a:t>7</a:t>
-            </a:fld>
-            <a:endParaRPr/>
+          <a:bodyPr/>
+          <a:lstStyle/>
+          <a:p>
+            <a:pPr marL="0" indent="0" algn="ctr">
+              <a:buNone/>
+            </a:pPr>
+            <a:r>
+              <a:rPr lang="en-US" sz="6000" dirty="0">
+                <a:latin typeface="Arial" panose="020B0604020202020204" pitchFamily="34" charset="0"/>
+                <a:cs typeface="Arial" panose="020B0604020202020204" pitchFamily="34" charset="0"/>
+              </a:rPr>
+              <a:t>Countering Malign Information</a:t>
+            </a:r>
+          </a:p>
+        </p:txBody>
+      </p:sp>
+      <p:sp>
+        <p:nvSpPr>
+          <p:cNvPr id="3" name="Text Placeholder 2">
+            <a:extLst>
+              <a:ext uri="{FF2B5EF4-FFF2-40B4-BE49-F238E27FC236}">
+                <a16:creationId xmlns:a16="http://schemas.microsoft.com/office/drawing/2014/main" id="{D94C7E47-63B7-8E9D-6345-B12B99DBCE2B}"/>
+              </a:ext>
+            </a:extLst>
+          </p:cNvPr>
+          <p:cNvSpPr>
+            <a:spLocks noGrp="1"/>
+          </p:cNvSpPr>
+          <p:nvPr>
+            <p:ph type="body" sz="quarter" idx="10"/>
+          </p:nvPr>
+        </p:nvSpPr>
+        <p:spPr/>
+        <p:txBody>
+          <a:bodyPr/>
+          <a:lstStyle/>
+          <a:p>
+            <a:endParaRPr lang="en-US"/>
           </a:p>
         </p:txBody>
       </p:sp>
     </p:spTree>
     <p:extLst>
       <p:ext uri="{BB962C8B-B14F-4D97-AF65-F5344CB8AC3E}">
-        <p14:creationId xmlns:p14="http://schemas.microsoft.com/office/powerpoint/2010/main" val="4200951038"/>
+        <p14:creationId xmlns:p14="http://schemas.microsoft.com/office/powerpoint/2010/main" val="781281919"/>
       </p:ext>
     </p:extLst>
   </p:cSld>
   <p:clrMapOvr>
     <a:masterClrMapping/>
   </p:clrMapOvr>
-  <mc:AlternateContent xmlns:mc="http://schemas.openxmlformats.org/markup-compatibility/2006" xmlns:p14="http://schemas.microsoft.com/office/powerpoint/2010/main">
-    <mc:Choice Requires="p14">
-      <p:transition spd="slow" p14:dur="1200">
-        <p:push dir="u"/>
-      </p:transition>
-    </mc:Choice>
-    <mc:Fallback xmlns="" xmlns:m="http://schemas.openxmlformats.org/officeDocument/2006/math" xmlns:a14="http://schemas.microsoft.com/office/drawing/2010/main">
-      <p:transition spd="slow">
-        <p:fade/>
-      </p:transition>
-    </mc:Fallback>
-  </mc:AlternateContent>
 </p:sld>
 </file>
 
 <file path=ppt/slides/slide8.xml><?xml version="1.0" encoding="utf-8"?>
 <p:sld xmlns:a="http://schemas.openxmlformats.org/drawingml/2006/main" xmlns:r="http://schemas.openxmlformats.org/officeDocument/2006/relationships" xmlns:p="http://schemas.openxmlformats.org/presentationml/2006/main">
   <p:cSld>
+    <p:bg>
+      <p:bgPr>
+        <a:solidFill>
+          <a:srgbClr val="FFFF00"/>
+        </a:solidFill>
+        <a:effectLst/>
+      </p:bgPr>
+    </p:bg>
     <p:spTree>
       <p:nvGrpSpPr>
         <p:cNvPr id="1" name=""/>
@@ -8600,159 +11106,99 @@
       </p:grpSpPr>
       <p:sp>
         <p:nvSpPr>
-          <p:cNvPr id="198" name="Title 2"/>
-          <p:cNvSpPr txBox="1">
-            <a:spLocks noGrp="1"/>
-          </p:cNvSpPr>
-          <p:nvPr>
-            <p:ph type="title" idx="4294967295"/>
-          </p:nvPr>
-        </p:nvSpPr>
-        <p:spPr>
-          <a:xfrm>
-            <a:off x="2154607" y="2531859"/>
-            <a:ext cx="3658054" cy="1786516"/>
-          </a:xfrm>
-          <a:prstGeom prst="rect">
-            <a:avLst/>
-          </a:prstGeom>
-        </p:spPr>
-        <p:txBody>
-          <a:bodyPr anchor="t"/>
-          <a:lstStyle>
-            <a:lvl1pPr>
-              <a:defRPr sz="4800" b="0">
-                <a:solidFill>
-                  <a:srgbClr val="44546A"/>
-                </a:solidFill>
-                <a:latin typeface="Calibri Light"/>
-                <a:ea typeface="Calibri Light"/>
-                <a:cs typeface="Calibri Light"/>
-                <a:sym typeface="Calibri Light"/>
-              </a:defRPr>
-            </a:lvl1pPr>
-          </a:lstStyle>
-          <a:p>
-            <a:r>
-              <a:t>TOMAR UN DESCANSO</a:t>
-            </a:r>
-          </a:p>
-        </p:txBody>
-      </p:sp>
-      <p:pic>
-        <p:nvPicPr>
-          <p:cNvPr id="199" name="Graphic 13" descr="Graphic 13"/>
-          <p:cNvPicPr>
-            <a:picLocks noChangeAspect="1"/>
-          </p:cNvPicPr>
-          <p:nvPr/>
-        </p:nvPicPr>
-        <p:blipFill>
-          <a:blip r:embed="rId2"/>
-          <a:stretch>
-            <a:fillRect/>
-          </a:stretch>
-        </p:blipFill>
-        <p:spPr>
-          <a:xfrm>
-            <a:off x="6379342" y="-259377"/>
-            <a:ext cx="5029201" cy="5029201"/>
-          </a:xfrm>
-          <a:prstGeom prst="rect">
-            <a:avLst/>
-          </a:prstGeom>
-          <a:ln w="12700">
-            <a:miter lim="400000"/>
-          </a:ln>
-        </p:spPr>
-      </p:pic>
-      <p:sp>
-        <p:nvSpPr>
-          <p:cNvPr id="200" name="TextBox 1"/>
-          <p:cNvSpPr txBox="1"/>
-          <p:nvPr/>
-        </p:nvSpPr>
-        <p:spPr>
-          <a:xfrm>
-            <a:off x="3715415" y="5405718"/>
-            <a:ext cx="4111933" cy="634118"/>
-          </a:xfrm>
-          <a:prstGeom prst="rect">
-            <a:avLst/>
-          </a:prstGeom>
-          <a:ln w="12700">
-            <a:miter lim="400000"/>
-          </a:ln>
-          <a:extLst>
-            <a:ext uri="{C572A759-6A51-4108-AA02-DFA0A04FC94B}">
-              <ma14:wrappingTextBoxFlag xmlns="" xmlns:m="http://schemas.openxmlformats.org/officeDocument/2006/math" xmlns:a14="http://schemas.microsoft.com/office/drawing/2010/main" xmlns:ma14="http://schemas.microsoft.com/office/mac/drawingml/2011/main" val="1"/>
-            </a:ext>
-          </a:extLst>
-        </p:spPr>
-        <p:txBody>
-          <a:bodyPr wrap="none" lIns="45719" rIns="45719">
-            <a:spAutoFit/>
+          <p:cNvPr id="2" name="Title 1">
+            <a:extLst>
+              <a:ext uri="{FF2B5EF4-FFF2-40B4-BE49-F238E27FC236}">
+                <a16:creationId xmlns:a16="http://schemas.microsoft.com/office/drawing/2014/main" id="{0E7CCAEB-D84E-456D-3B6B-2E9573C73F98}"/>
+              </a:ext>
+            </a:extLst>
+          </p:cNvPr>
+          <p:cNvSpPr>
+            <a:spLocks noGrp="1"/>
+          </p:cNvSpPr>
+          <p:nvPr>
+            <p:ph type="title"/>
+          </p:nvPr>
+        </p:nvSpPr>
+        <p:spPr/>
+        <p:txBody>
+          <a:bodyPr/>
+          <a:lstStyle/>
+          <a:p>
+            <a:r>
+              <a:rPr lang="en-US" dirty="0"/>
+              <a:t>Lesson Objectives</a:t>
+            </a:r>
+          </a:p>
+        </p:txBody>
+      </p:sp>
+      <p:sp>
+        <p:nvSpPr>
+          <p:cNvPr id="3" name="Content Placeholder 2">
+            <a:extLst>
+              <a:ext uri="{FF2B5EF4-FFF2-40B4-BE49-F238E27FC236}">
+                <a16:creationId xmlns:a16="http://schemas.microsoft.com/office/drawing/2014/main" id="{0A5EC664-EFAD-501E-02EA-4124C835D47B}"/>
+              </a:ext>
+            </a:extLst>
+          </p:cNvPr>
+          <p:cNvSpPr>
+            <a:spLocks noGrp="1"/>
+          </p:cNvSpPr>
+          <p:nvPr>
+            <p:ph idx="1"/>
+          </p:nvPr>
+        </p:nvSpPr>
+        <p:spPr/>
+        <p:txBody>
+          <a:bodyPr>
+            <a:normAutofit/>
           </a:bodyPr>
-          <a:lstStyle>
-            <a:lvl1pPr>
-              <a:defRPr sz="4200" b="1"/>
-            </a:lvl1pPr>
-          </a:lstStyle>
-          <a:p>
-            <a:r>
-              <a:t>Volver por: XX:XX </a:t>
-            </a:r>
-          </a:p>
-        </p:txBody>
-      </p:sp>
-      <p:sp>
-        <p:nvSpPr>
-          <p:cNvPr id="201" name="Slide Number"/>
-          <p:cNvSpPr txBox="1">
-            <a:spLocks noGrp="1"/>
-          </p:cNvSpPr>
-          <p:nvPr>
-            <p:ph type="sldNum" sz="quarter" idx="2"/>
-          </p:nvPr>
-        </p:nvSpPr>
-        <p:spPr>
-          <a:prstGeom prst="rect">
-            <a:avLst/>
-          </a:prstGeom>
-          <a:extLst>
-            <a:ext uri="{C572A759-6A51-4108-AA02-DFA0A04FC94B}">
-              <ma14:wrappingTextBoxFlag xmlns="" xmlns:m="http://schemas.openxmlformats.org/officeDocument/2006/math" xmlns:a14="http://schemas.microsoft.com/office/drawing/2010/main" xmlns:ma14="http://schemas.microsoft.com/office/mac/drawingml/2011/main" val="1"/>
-            </a:ext>
-          </a:extLst>
-        </p:spPr>
-        <p:txBody>
-          <a:bodyPr/>
-          <a:lstStyle/>
-          <a:p>
-            <a:fld id="{86CB4B4D-7CA3-9044-876B-883B54F8677D}" type="slidenum">
-              <a:t>8</a:t>
-            </a:fld>
-            <a:endParaRPr/>
+          <a:lstStyle/>
+          <a:p>
+            <a:r>
+              <a:rPr lang="en-US" b="1" dirty="0">
+                <a:effectLst/>
+                <a:latin typeface="Calibri" panose="020F0502020204030204" pitchFamily="34" charset="0"/>
+                <a:cs typeface="Calibri" panose="020F0502020204030204" pitchFamily="34" charset="0"/>
+              </a:rPr>
+              <a:t>Goal: </a:t>
+            </a:r>
+            <a:r>
+              <a:rPr lang="en-US" dirty="0">
+                <a:effectLst/>
+                <a:latin typeface="Calibri" panose="020F0502020204030204" pitchFamily="34" charset="0"/>
+                <a:cs typeface="Calibri" panose="020F0502020204030204" pitchFamily="34" charset="0"/>
+              </a:rPr>
+              <a:t>Develop TTPs to counter misinformation and disinformation effectively. </a:t>
+            </a:r>
+            <a:endParaRPr lang="en-US" dirty="0">
+              <a:latin typeface="Calibri" panose="020F0502020204030204" pitchFamily="34" charset="0"/>
+              <a:cs typeface="Calibri" panose="020F0502020204030204" pitchFamily="34" charset="0"/>
+            </a:endParaRPr>
           </a:p>
         </p:txBody>
       </p:sp>
     </p:spTree>
     <p:extLst>
       <p:ext uri="{BB962C8B-B14F-4D97-AF65-F5344CB8AC3E}">
-        <p14:creationId xmlns:p14="http://schemas.microsoft.com/office/powerpoint/2010/main" val="1046359596"/>
+        <p14:creationId xmlns:p14="http://schemas.microsoft.com/office/powerpoint/2010/main" val="1075049808"/>
       </p:ext>
     </p:extLst>
   </p:cSld>
   <p:clrMapOvr>
-    <a:masterClrMapping/>
+    <a:overrideClrMapping bg1="lt1" tx1="dk1" bg2="lt2" tx2="dk2" accent1="accent1" accent2="accent2" accent3="accent3" accent4="accent4" accent5="accent5" accent6="accent6" hlink="hlink" folHlink="folHlink"/>
   </p:clrMapOvr>
-  <p:transition spd="med"/>
 </p:sld>
 </file>
 
 <file path=ppt/slides/slide9.xml><?xml version="1.0" encoding="utf-8"?>
 <p:sld xmlns:a="http://schemas.openxmlformats.org/drawingml/2006/main" xmlns:r="http://schemas.openxmlformats.org/officeDocument/2006/relationships" xmlns:p="http://schemas.openxmlformats.org/presentationml/2006/main">
   <p:cSld>
+    <p:bg>
+      <p:bgRef idx="1001">
+        <a:schemeClr val="bg1"/>
+      </p:bgRef>
+    </p:bg>
     <p:spTree>
       <p:nvGrpSpPr>
         <p:cNvPr id="1" name=""/>
@@ -8790,7 +11236,7 @@
           <a:p>
             <a:r>
               <a:rPr lang="en-US" dirty="0"/>
-              <a:t>Develop TTPs (20 Minutes)</a:t>
+              <a:t>Lesson Objectives</a:t>
             </a:r>
           </a:p>
         </p:txBody>
@@ -8811,122 +11257,45 @@
             <p:ph idx="1"/>
           </p:nvPr>
         </p:nvSpPr>
-        <p:spPr>
-          <a:xfrm>
-            <a:off x="838200" y="1825625"/>
-            <a:ext cx="10515600" cy="1139248"/>
-          </a:xfrm>
-        </p:spPr>
-        <p:txBody>
-          <a:bodyPr/>
-          <a:lstStyle/>
-          <a:p>
-            <a:r>
-              <a:rPr lang="en-US" dirty="0"/>
-              <a:t>Develop a counter strategy for a given scenario. </a:t>
-            </a:r>
-          </a:p>
-          <a:p>
-            <a:r>
-              <a:rPr lang="en-US" dirty="0"/>
-              <a:t>Work in groups to brainstorm and outline your TTPs.</a:t>
-            </a:r>
-          </a:p>
-        </p:txBody>
-      </p:sp>
-      <p:sp>
-        <p:nvSpPr>
-          <p:cNvPr id="4" name="TextBox 3">
-            <a:extLst>
-              <a:ext uri="{FF2B5EF4-FFF2-40B4-BE49-F238E27FC236}">
-                <a16:creationId xmlns:a16="http://schemas.microsoft.com/office/drawing/2014/main" id="{F2E718C6-32F5-6193-852B-D07BBF930FD7}"/>
-              </a:ext>
-            </a:extLst>
-          </p:cNvPr>
-          <p:cNvSpPr txBox="1"/>
-          <p:nvPr/>
-        </p:nvSpPr>
-        <p:spPr>
-          <a:xfrm>
-            <a:off x="387927" y="2964873"/>
-            <a:ext cx="5334000" cy="646331"/>
-          </a:xfrm>
-          <a:prstGeom prst="rect">
-            <a:avLst/>
-          </a:prstGeom>
-          <a:noFill/>
-        </p:spPr>
-        <p:txBody>
-          <a:bodyPr wrap="square" rtlCol="0">
-            <a:spAutoFit/>
+        <p:spPr/>
+        <p:txBody>
+          <a:bodyPr>
+            <a:normAutofit/>
           </a:bodyPr>
           <a:lstStyle/>
           <a:p>
             <a:r>
-              <a:rPr lang="en-US" dirty="0"/>
-              <a:t>Scenario 1:</a:t>
-            </a:r>
-          </a:p>
-          <a:p>
-            <a:pPr marL="285750" indent="-285750">
-              <a:buFont typeface="Arial" panose="020B0604020202020204" pitchFamily="34" charset="0"/>
-              <a:buChar char="•"/>
-            </a:pPr>
-            <a:endParaRPr lang="en-US" dirty="0"/>
-          </a:p>
-        </p:txBody>
-      </p:sp>
-      <p:sp>
-        <p:nvSpPr>
-          <p:cNvPr id="5" name="TextBox 4">
-            <a:extLst>
-              <a:ext uri="{FF2B5EF4-FFF2-40B4-BE49-F238E27FC236}">
-                <a16:creationId xmlns:a16="http://schemas.microsoft.com/office/drawing/2014/main" id="{0B9E14C4-BE62-051A-9961-9694EF2A3C02}"/>
-              </a:ext>
-            </a:extLst>
-          </p:cNvPr>
-          <p:cNvSpPr txBox="1"/>
-          <p:nvPr/>
-        </p:nvSpPr>
-        <p:spPr>
-          <a:xfrm>
-            <a:off x="6483929" y="2964873"/>
-            <a:ext cx="5334000" cy="646331"/>
-          </a:xfrm>
-          <a:prstGeom prst="rect">
-            <a:avLst/>
-          </a:prstGeom>
-          <a:noFill/>
-        </p:spPr>
-        <p:txBody>
-          <a:bodyPr wrap="square" rtlCol="0">
-            <a:spAutoFit/>
-          </a:bodyPr>
-          <a:lstStyle/>
-          <a:p>
-            <a:r>
-              <a:rPr lang="en-US" dirty="0"/>
-              <a:t>Scenario 2:</a:t>
-            </a:r>
-          </a:p>
-          <a:p>
-            <a:pPr marL="285750" indent="-285750">
-              <a:buFont typeface="Arial" panose="020B0604020202020204" pitchFamily="34" charset="0"/>
-              <a:buChar char="•"/>
-            </a:pPr>
-            <a:endParaRPr lang="en-US" dirty="0"/>
+              <a:rPr lang="en-US" b="1" dirty="0">
+                <a:effectLst/>
+                <a:latin typeface="Calibri" panose="020F0502020204030204" pitchFamily="34" charset="0"/>
+                <a:cs typeface="Calibri" panose="020F0502020204030204" pitchFamily="34" charset="0"/>
+              </a:rPr>
+              <a:t>Goal: </a:t>
+            </a:r>
+            <a:r>
+              <a:rPr lang="en-US" dirty="0">
+                <a:effectLst/>
+                <a:latin typeface="Calibri" panose="020F0502020204030204" pitchFamily="34" charset="0"/>
+                <a:cs typeface="Calibri" panose="020F0502020204030204" pitchFamily="34" charset="0"/>
+              </a:rPr>
+              <a:t>Develop TTPs to counter misinformation and disinformation effectively. </a:t>
+            </a:r>
+            <a:endParaRPr lang="en-US" dirty="0">
+              <a:latin typeface="Calibri" panose="020F0502020204030204" pitchFamily="34" charset="0"/>
+              <a:cs typeface="Calibri" panose="020F0502020204030204" pitchFamily="34" charset="0"/>
+            </a:endParaRPr>
           </a:p>
         </p:txBody>
       </p:sp>
     </p:spTree>
     <p:extLst>
       <p:ext uri="{BB962C8B-B14F-4D97-AF65-F5344CB8AC3E}">
-        <p14:creationId xmlns:p14="http://schemas.microsoft.com/office/powerpoint/2010/main" val="3537485946"/>
+        <p14:creationId xmlns:p14="http://schemas.microsoft.com/office/powerpoint/2010/main" val="4182719147"/>
       </p:ext>
     </p:extLst>
   </p:cSld>
   <p:clrMapOvr>
-    <a:masterClrMapping/>
+    <a:overrideClrMapping bg1="lt1" tx1="dk1" bg2="lt2" tx2="dk2" accent1="accent1" accent2="accent2" accent3="accent3" accent4="accent4" accent5="accent5" accent6="accent6" hlink="hlink" folHlink="folHlink"/>
   </p:clrMapOvr>
 </p:sld>
 </file>
@@ -9790,4 +12159,47 @@
     </a:folHlink>
   </a:clrScheme>
 </a:themeOverride>
+</file>
+
+<file path=ppt/theme/themeOverride2.xml><?xml version="1.0" encoding="utf-8"?>
+<a:themeOverride xmlns:a="http://schemas.openxmlformats.org/drawingml/2006/main">
+  <a:clrScheme name="Office">
+    <a:dk1>
+      <a:sysClr val="windowText" lastClr="000000"/>
+    </a:dk1>
+    <a:lt1>
+      <a:sysClr val="window" lastClr="FFFFFF"/>
+    </a:lt1>
+    <a:dk2>
+      <a:srgbClr val="44546A"/>
+    </a:dk2>
+    <a:lt2>
+      <a:srgbClr val="E7E6E6"/>
+    </a:lt2>
+    <a:accent1>
+      <a:srgbClr val="4472C4"/>
+    </a:accent1>
+    <a:accent2>
+      <a:srgbClr val="ED7D31"/>
+    </a:accent2>
+    <a:accent3>
+      <a:srgbClr val="A5A5A5"/>
+    </a:accent3>
+    <a:accent4>
+      <a:srgbClr val="FFC000"/>
+    </a:accent4>
+    <a:accent5>
+      <a:srgbClr val="5B9BD5"/>
+    </a:accent5>
+    <a:accent6>
+      <a:srgbClr val="70AD47"/>
+    </a:accent6>
+    <a:hlink>
+      <a:srgbClr val="0563C1"/>
+    </a:hlink>
+    <a:folHlink>
+      <a:srgbClr val="954F72"/>
+    </a:folHlink>
+  </a:clrScheme>
+</a:themeOverride>
 </file>
</xml_diff>

<commit_message>
added translations and color shading
</commit_message>
<xml_diff>
--- a/Counter_Malign_Information/4-Implement-For_Instructors/Lesson_Plans/Lesson_06-Countering_Malign_Information/Audio_Visual-Counter-Malign_Information/Instructor-Lesson_Slide-Countering_Malign_Information.pptx
+++ b/Counter_Malign_Information/4-Implement-For_Instructors/Lesson_Plans/Lesson_06-Countering_Malign_Information/Audio_Visual-Counter-Malign_Information/Instructor-Lesson_Slide-Countering_Malign_Information.pptx
@@ -6654,7 +6654,7 @@
           </a:ln>
           <a:extLst>
             <a:ext uri="{C572A759-6A51-4108-AA02-DFA0A04FC94B}">
-              <ma14:wrappingTextBoxFlag xmlns:ma14="http://schemas.microsoft.com/office/mac/drawingml/2011/main" xmlns:a14="http://schemas.microsoft.com/office/drawing/2010/main" xmlns:m="http://schemas.openxmlformats.org/officeDocument/2006/math" xmlns="" val="1"/>
+              <ma14:wrappingTextBoxFlag xmlns="" xmlns:m="http://schemas.openxmlformats.org/officeDocument/2006/math" xmlns:a14="http://schemas.microsoft.com/office/drawing/2010/main" xmlns:ma14="http://schemas.microsoft.com/office/mac/drawingml/2011/main" val="1"/>
             </a:ext>
           </a:extLst>
         </p:spPr>
@@ -6701,7 +6701,7 @@
           </a:ln>
           <a:extLst>
             <a:ext uri="{C572A759-6A51-4108-AA02-DFA0A04FC94B}">
-              <ma14:wrappingTextBoxFlag xmlns:ma14="http://schemas.microsoft.com/office/mac/drawingml/2011/main" xmlns:a14="http://schemas.microsoft.com/office/drawing/2010/main" xmlns:m="http://schemas.openxmlformats.org/officeDocument/2006/math" xmlns="" val="1"/>
+              <ma14:wrappingTextBoxFlag xmlns="" xmlns:m="http://schemas.openxmlformats.org/officeDocument/2006/math" xmlns:a14="http://schemas.microsoft.com/office/drawing/2010/main" xmlns:ma14="http://schemas.microsoft.com/office/mac/drawingml/2011/main" val="1"/>
             </a:ext>
           </a:extLst>
         </p:spPr>
@@ -6748,7 +6748,7 @@
           </a:ln>
           <a:extLst>
             <a:ext uri="{C572A759-6A51-4108-AA02-DFA0A04FC94B}">
-              <ma14:wrappingTextBoxFlag xmlns:ma14="http://schemas.microsoft.com/office/mac/drawingml/2011/main" xmlns:a14="http://schemas.microsoft.com/office/drawing/2010/main" xmlns:m="http://schemas.openxmlformats.org/officeDocument/2006/math" xmlns="" val="1"/>
+              <ma14:wrappingTextBoxFlag xmlns="" xmlns:m="http://schemas.openxmlformats.org/officeDocument/2006/math" xmlns:a14="http://schemas.microsoft.com/office/drawing/2010/main" xmlns:ma14="http://schemas.microsoft.com/office/mac/drawingml/2011/main" val="1"/>
             </a:ext>
           </a:extLst>
         </p:spPr>
@@ -6795,7 +6795,7 @@
           </a:ln>
           <a:extLst>
             <a:ext uri="{C572A759-6A51-4108-AA02-DFA0A04FC94B}">
-              <ma14:wrappingTextBoxFlag xmlns:ma14="http://schemas.microsoft.com/office/mac/drawingml/2011/main" xmlns:a14="http://schemas.microsoft.com/office/drawing/2010/main" xmlns:m="http://schemas.openxmlformats.org/officeDocument/2006/math" xmlns="" val="1"/>
+              <ma14:wrappingTextBoxFlag xmlns="" xmlns:m="http://schemas.openxmlformats.org/officeDocument/2006/math" xmlns:a14="http://schemas.microsoft.com/office/drawing/2010/main" xmlns:ma14="http://schemas.microsoft.com/office/mac/drawingml/2011/main" val="1"/>
             </a:ext>
           </a:extLst>
         </p:spPr>
@@ -6972,7 +6972,23 @@
           <a:p>
             <a:r>
               <a:rPr lang="en-US" dirty="0"/>
-              <a:t>Setting Your Goals</a:t>
+              <a:t>Los </a:t>
+            </a:r>
+            <a:r>
+              <a:rPr lang="en-US" dirty="0" err="1"/>
+              <a:t>objetivos</a:t>
+            </a:r>
+            <a:r>
+              <a:rPr lang="en-US" dirty="0"/>
+              <a:t> del </a:t>
+            </a:r>
+            <a:r>
+              <a:rPr lang="en-US" dirty="0" err="1"/>
+              <a:t>grupo</a:t>
+            </a:r>
+            <a:r>
+              <a:rPr lang="en-US" dirty="0"/>
+              <a:t>.</a:t>
             </a:r>
           </a:p>
         </p:txBody>
@@ -6999,20 +7015,176 @@
           <a:lstStyle/>
           <a:p>
             <a:r>
-              <a:rPr lang="en-US" dirty="0"/>
-              <a:t>Define what malign information looks like in your context.</a:t>
-            </a:r>
-          </a:p>
-          <a:p>
-            <a:r>
-              <a:rPr lang="en-US" dirty="0"/>
-              <a:t>Identify your goals when countering this information.</a:t>
-            </a:r>
-          </a:p>
-          <a:p>
-            <a:r>
-              <a:rPr lang="en-US" dirty="0"/>
-              <a:t>Discuss the importance of these goals in maintaining accurate information flow.</a:t>
+              <a:rPr lang="en-US" dirty="0" err="1"/>
+              <a:t>Defina</a:t>
+            </a:r>
+            <a:r>
+              <a:rPr lang="en-US" dirty="0"/>
+              <a:t> </a:t>
+            </a:r>
+            <a:r>
+              <a:rPr lang="en-US" dirty="0" err="1"/>
+              <a:t>cómo</a:t>
+            </a:r>
+            <a:r>
+              <a:rPr lang="en-US" dirty="0"/>
+              <a:t> se </a:t>
+            </a:r>
+            <a:r>
+              <a:rPr lang="en-US" dirty="0" err="1"/>
+              <a:t>ve</a:t>
+            </a:r>
+            <a:r>
+              <a:rPr lang="en-US" dirty="0"/>
+              <a:t> la </a:t>
+            </a:r>
+            <a:r>
+              <a:rPr lang="en-US" dirty="0" err="1"/>
+              <a:t>información</a:t>
+            </a:r>
+            <a:r>
+              <a:rPr lang="en-US" dirty="0"/>
+              <a:t> </a:t>
+            </a:r>
+            <a:r>
+              <a:rPr lang="en-US" dirty="0" err="1"/>
+              <a:t>maligna</a:t>
+            </a:r>
+            <a:r>
+              <a:rPr lang="en-US" dirty="0"/>
+              <a:t> </a:t>
+            </a:r>
+            <a:r>
+              <a:rPr lang="en-US" dirty="0" err="1"/>
+              <a:t>en</a:t>
+            </a:r>
+            <a:r>
+              <a:rPr lang="en-US" dirty="0"/>
+              <a:t> </a:t>
+            </a:r>
+            <a:r>
+              <a:rPr lang="en-US" dirty="0" err="1"/>
+              <a:t>su</a:t>
+            </a:r>
+            <a:r>
+              <a:rPr lang="en-US" dirty="0"/>
+              <a:t> </a:t>
+            </a:r>
+            <a:r>
+              <a:rPr lang="en-US" dirty="0" err="1"/>
+              <a:t>contexto</a:t>
+            </a:r>
+            <a:r>
+              <a:rPr lang="en-US" dirty="0"/>
+              <a:t>.</a:t>
+            </a:r>
+          </a:p>
+          <a:p>
+            <a:r>
+              <a:rPr lang="en-US" dirty="0" err="1"/>
+              <a:t>Identifique</a:t>
+            </a:r>
+            <a:r>
+              <a:rPr lang="en-US" dirty="0"/>
+              <a:t> sus </a:t>
+            </a:r>
+            <a:r>
+              <a:rPr lang="en-US" dirty="0" err="1"/>
+              <a:t>objetivos</a:t>
+            </a:r>
+            <a:r>
+              <a:rPr lang="en-US" dirty="0"/>
+              <a:t> al </a:t>
+            </a:r>
+            <a:r>
+              <a:rPr lang="en-US" dirty="0" err="1"/>
+              <a:t>contrarrestar</a:t>
+            </a:r>
+            <a:r>
+              <a:rPr lang="en-US" dirty="0"/>
+              <a:t> </a:t>
+            </a:r>
+            <a:r>
+              <a:rPr lang="en-US" dirty="0" err="1"/>
+              <a:t>esta</a:t>
+            </a:r>
+            <a:r>
+              <a:rPr lang="en-US" dirty="0"/>
+              <a:t> </a:t>
+            </a:r>
+            <a:r>
+              <a:rPr lang="en-US" dirty="0" err="1"/>
+              <a:t>información</a:t>
+            </a:r>
+            <a:r>
+              <a:rPr lang="en-US" dirty="0"/>
+              <a:t>.</a:t>
+            </a:r>
+          </a:p>
+          <a:p>
+            <a:r>
+              <a:rPr lang="en-US" dirty="0" err="1"/>
+              <a:t>Analice</a:t>
+            </a:r>
+            <a:r>
+              <a:rPr lang="en-US" dirty="0"/>
+              <a:t> la </a:t>
+            </a:r>
+            <a:r>
+              <a:rPr lang="en-US" dirty="0" err="1"/>
+              <a:t>importancia</a:t>
+            </a:r>
+            <a:r>
+              <a:rPr lang="en-US" dirty="0"/>
+              <a:t> de </a:t>
+            </a:r>
+            <a:r>
+              <a:rPr lang="en-US" dirty="0" err="1"/>
+              <a:t>estos</a:t>
+            </a:r>
+            <a:r>
+              <a:rPr lang="en-US" dirty="0"/>
+              <a:t> </a:t>
+            </a:r>
+            <a:r>
+              <a:rPr lang="en-US" dirty="0" err="1"/>
+              <a:t>objetivos</a:t>
+            </a:r>
+            <a:r>
+              <a:rPr lang="en-US" dirty="0"/>
+              <a:t> para </a:t>
+            </a:r>
+            <a:r>
+              <a:rPr lang="en-US" dirty="0" err="1"/>
+              <a:t>mantener</a:t>
+            </a:r>
+            <a:r>
+              <a:rPr lang="en-US" dirty="0"/>
+              <a:t> un </a:t>
+            </a:r>
+            <a:r>
+              <a:rPr lang="en-US" dirty="0" err="1"/>
+              <a:t>flujo</a:t>
+            </a:r>
+            <a:r>
+              <a:rPr lang="en-US" dirty="0"/>
+              <a:t> de </a:t>
+            </a:r>
+            <a:r>
+              <a:rPr lang="en-US" dirty="0" err="1"/>
+              <a:t>información</a:t>
+            </a:r>
+            <a:r>
+              <a:rPr lang="en-US" dirty="0"/>
+              <a:t> </a:t>
+            </a:r>
+            <a:r>
+              <a:rPr lang="en-US" dirty="0" err="1"/>
+              <a:t>preciso</a:t>
+            </a:r>
+            <a:r>
+              <a:rPr lang="en-US" dirty="0"/>
+              <a:t>.</a:t>
             </a:r>
           </a:p>
         </p:txBody>
@@ -7142,7 +7314,7 @@
           </a:ln>
           <a:extLst>
             <a:ext uri="{C572A759-6A51-4108-AA02-DFA0A04FC94B}">
-              <ma14:wrappingTextBoxFlag xmlns:ma14="http://schemas.microsoft.com/office/mac/drawingml/2011/main" xmlns:a14="http://schemas.microsoft.com/office/drawing/2010/main" xmlns:m="http://schemas.openxmlformats.org/officeDocument/2006/math" xmlns="" val="1"/>
+              <ma14:wrappingTextBoxFlag xmlns="" xmlns:m="http://schemas.openxmlformats.org/officeDocument/2006/math" xmlns:a14="http://schemas.microsoft.com/office/drawing/2010/main" xmlns:ma14="http://schemas.microsoft.com/office/mac/drawingml/2011/main" val="1"/>
             </a:ext>
           </a:extLst>
         </p:spPr>
@@ -7178,7 +7350,7 @@
           </a:prstGeom>
           <a:extLst>
             <a:ext uri="{C572A759-6A51-4108-AA02-DFA0A04FC94B}">
-              <ma14:wrappingTextBoxFlag xmlns:ma14="http://schemas.microsoft.com/office/mac/drawingml/2011/main" xmlns:a14="http://schemas.microsoft.com/office/drawing/2010/main" xmlns:m="http://schemas.openxmlformats.org/officeDocument/2006/math" xmlns="" val="1"/>
+              <ma14:wrappingTextBoxFlag xmlns="" xmlns:m="http://schemas.openxmlformats.org/officeDocument/2006/math" xmlns:a14="http://schemas.microsoft.com/office/drawing/2010/main" xmlns:ma14="http://schemas.microsoft.com/office/mac/drawingml/2011/main" val="1"/>
             </a:ext>
           </a:extLst>
         </p:spPr>
@@ -7210,7 +7382,7 @@
         <p:push dir="u"/>
       </p:transition>
     </mc:Choice>
-    <mc:Fallback xmlns:a14="http://schemas.microsoft.com/office/drawing/2010/main" xmlns:m="http://schemas.openxmlformats.org/officeDocument/2006/math" xmlns="">
+    <mc:Fallback xmlns="" xmlns:m="http://schemas.openxmlformats.org/officeDocument/2006/math" xmlns:a14="http://schemas.microsoft.com/office/drawing/2010/main">
       <p:transition spd="slow">
         <p:fade/>
       </p:transition>
@@ -7323,7 +7495,7 @@
           </a:ln>
           <a:extLst>
             <a:ext uri="{C572A759-6A51-4108-AA02-DFA0A04FC94B}">
-              <ma14:wrappingTextBoxFlag xmlns:ma14="http://schemas.microsoft.com/office/mac/drawingml/2011/main" xmlns:a14="http://schemas.microsoft.com/office/drawing/2010/main" xmlns:m="http://schemas.openxmlformats.org/officeDocument/2006/math" xmlns="" val="1"/>
+              <ma14:wrappingTextBoxFlag xmlns="" xmlns:m="http://schemas.openxmlformats.org/officeDocument/2006/math" xmlns:a14="http://schemas.microsoft.com/office/drawing/2010/main" xmlns:ma14="http://schemas.microsoft.com/office/mac/drawingml/2011/main" val="1"/>
             </a:ext>
           </a:extLst>
         </p:spPr>
@@ -7359,7 +7531,7 @@
           </a:prstGeom>
           <a:extLst>
             <a:ext uri="{C572A759-6A51-4108-AA02-DFA0A04FC94B}">
-              <ma14:wrappingTextBoxFlag xmlns:ma14="http://schemas.microsoft.com/office/mac/drawingml/2011/main" xmlns:a14="http://schemas.microsoft.com/office/drawing/2010/main" xmlns:m="http://schemas.openxmlformats.org/officeDocument/2006/math" xmlns="" val="1"/>
+              <ma14:wrappingTextBoxFlag xmlns="" xmlns:m="http://schemas.openxmlformats.org/officeDocument/2006/math" xmlns:a14="http://schemas.microsoft.com/office/drawing/2010/main" xmlns:ma14="http://schemas.microsoft.com/office/mac/drawingml/2011/main" val="1"/>
             </a:ext>
           </a:extLst>
         </p:spPr>
@@ -7482,10 +7654,10 @@
       </p:sp>
       <p:sp>
         <p:nvSpPr>
-          <p:cNvPr id="4" name="TextBox 3">
+          <p:cNvPr id="6" name="TextBox 5">
             <a:extLst>
               <a:ext uri="{FF2B5EF4-FFF2-40B4-BE49-F238E27FC236}">
-                <a16:creationId xmlns:a16="http://schemas.microsoft.com/office/drawing/2014/main" id="{F2E718C6-32F5-6193-852B-D07BBF930FD7}"/>
+                <a16:creationId xmlns:a16="http://schemas.microsoft.com/office/drawing/2014/main" id="{B9BEE70B-8BB3-2076-0275-A9D948CCB2E7}"/>
               </a:ext>
             </a:extLst>
           </p:cNvPr>
@@ -7494,7 +7666,7 @@
         </p:nvSpPr>
         <p:spPr>
           <a:xfrm>
-            <a:off x="387927" y="2964873"/>
+            <a:off x="374071" y="3334205"/>
             <a:ext cx="5334000" cy="646331"/>
           </a:xfrm>
           <a:prstGeom prst="rect">
@@ -7510,24 +7682,28 @@
           <a:p>
             <a:r>
               <a:rPr lang="en-US" dirty="0"/>
-              <a:t>Scenario 1:</a:t>
-            </a:r>
-          </a:p>
-          <a:p>
-            <a:pPr marL="285750" indent="-285750">
-              <a:buFont typeface="Arial" panose="020B0604020202020204" pitchFamily="34" charset="0"/>
-              <a:buChar char="•"/>
-            </a:pPr>
+              <a:t>Handout 1:</a:t>
+            </a:r>
+          </a:p>
+          <a:p>
+            <a:r>
+              <a:rPr lang="en-US" dirty="0"/>
+              <a:t>Scenario 1 - Malign Information Spread by </a:t>
+            </a:r>
+            <a:r>
+              <a:rPr lang="en-US" dirty="0" err="1"/>
+              <a:t>CountryX</a:t>
+            </a:r>
             <a:endParaRPr lang="en-US" dirty="0"/>
           </a:p>
         </p:txBody>
       </p:sp>
       <p:sp>
         <p:nvSpPr>
-          <p:cNvPr id="5" name="TextBox 4">
+          <p:cNvPr id="7" name="TextBox 6">
             <a:extLst>
               <a:ext uri="{FF2B5EF4-FFF2-40B4-BE49-F238E27FC236}">
-                <a16:creationId xmlns:a16="http://schemas.microsoft.com/office/drawing/2014/main" id="{0B9E14C4-BE62-051A-9961-9694EF2A3C02}"/>
+                <a16:creationId xmlns:a16="http://schemas.microsoft.com/office/drawing/2014/main" id="{661FF581-8605-C65B-1651-C3D97EC5D7B2}"/>
               </a:ext>
             </a:extLst>
           </p:cNvPr>
@@ -7536,7 +7712,7 @@
         </p:nvSpPr>
         <p:spPr>
           <a:xfrm>
-            <a:off x="6483929" y="2964873"/>
+            <a:off x="6483931" y="3334204"/>
             <a:ext cx="5334000" cy="646331"/>
           </a:xfrm>
           <a:prstGeom prst="rect">
@@ -7552,14 +7728,18 @@
           <a:p>
             <a:r>
               <a:rPr lang="en-US" dirty="0"/>
-              <a:t>Scenario 2:</a:t>
-            </a:r>
-          </a:p>
-          <a:p>
-            <a:pPr marL="285750" indent="-285750">
-              <a:buFont typeface="Arial" panose="020B0604020202020204" pitchFamily="34" charset="0"/>
-              <a:buChar char="•"/>
-            </a:pPr>
+              <a:t>Handout 2: </a:t>
+            </a:r>
+          </a:p>
+          <a:p>
+            <a:r>
+              <a:rPr lang="en-US" dirty="0"/>
+              <a:t>Scenario 2 - Malign Information Campaign by </a:t>
+            </a:r>
+            <a:r>
+              <a:rPr lang="en-US" dirty="0" err="1"/>
+              <a:t>CountryX</a:t>
+            </a:r>
             <a:endParaRPr lang="en-US" dirty="0"/>
           </a:p>
         </p:txBody>
@@ -7616,8 +7796,44 @@
           <a:lstStyle/>
           <a:p>
             <a:r>
-              <a:rPr lang="en-US" dirty="0"/>
-              <a:t>Develop TTPs (20 Minutes)</a:t>
+              <a:rPr lang="en-US" dirty="0" err="1"/>
+              <a:t>Desarrollar</a:t>
+            </a:r>
+            <a:r>
+              <a:rPr lang="en-US" dirty="0"/>
+              <a:t> </a:t>
+            </a:r>
+            <a:r>
+              <a:rPr lang="en-US" dirty="0" err="1"/>
+              <a:t>una</a:t>
+            </a:r>
+            <a:r>
+              <a:rPr lang="en-US" dirty="0"/>
+              <a:t> </a:t>
+            </a:r>
+            <a:r>
+              <a:rPr lang="en-US" dirty="0" err="1"/>
+              <a:t>lista</a:t>
+            </a:r>
+            <a:r>
+              <a:rPr lang="en-US" dirty="0"/>
+              <a:t> de </a:t>
+            </a:r>
+            <a:r>
+              <a:rPr lang="en-US" dirty="0" err="1"/>
+              <a:t>estrategias</a:t>
+            </a:r>
+            <a:r>
+              <a:rPr lang="en-US" dirty="0"/>
+              <a:t> (20 </a:t>
+            </a:r>
+            <a:r>
+              <a:rPr lang="en-US" dirty="0" err="1"/>
+              <a:t>minutos</a:t>
+            </a:r>
+            <a:r>
+              <a:rPr lang="en-US" dirty="0"/>
+              <a:t>)</a:t>
             </a:r>
           </a:p>
         </p:txBody>
@@ -7649,14 +7865,86 @@
           <a:lstStyle/>
           <a:p>
             <a:r>
-              <a:rPr lang="en-US" dirty="0"/>
-              <a:t>Develop a counter strategy for a given scenario. </a:t>
-            </a:r>
-          </a:p>
-          <a:p>
-            <a:r>
-              <a:rPr lang="en-US" dirty="0"/>
-              <a:t>Work in groups to brainstorm and outline your TTPs.</a:t>
+              <a:rPr lang="en-US" dirty="0" err="1"/>
+              <a:t>Desarrollar</a:t>
+            </a:r>
+            <a:r>
+              <a:rPr lang="en-US" dirty="0"/>
+              <a:t> </a:t>
+            </a:r>
+            <a:r>
+              <a:rPr lang="en-US" dirty="0" err="1"/>
+              <a:t>una</a:t>
+            </a:r>
+            <a:r>
+              <a:rPr lang="en-US" dirty="0"/>
+              <a:t> </a:t>
+            </a:r>
+            <a:r>
+              <a:rPr lang="en-US" dirty="0" err="1"/>
+              <a:t>contraestrategia</a:t>
+            </a:r>
+            <a:r>
+              <a:rPr lang="en-US" dirty="0"/>
+              <a:t> para un </a:t>
+            </a:r>
+            <a:r>
+              <a:rPr lang="en-US" dirty="0" err="1"/>
+              <a:t>escenario</a:t>
+            </a:r>
+            <a:r>
+              <a:rPr lang="en-US" dirty="0"/>
+              <a:t> </a:t>
+            </a:r>
+            <a:r>
+              <a:rPr lang="en-US" dirty="0" err="1"/>
+              <a:t>determinado</a:t>
+            </a:r>
+            <a:r>
+              <a:rPr lang="en-US" dirty="0"/>
+              <a:t>.</a:t>
+            </a:r>
+          </a:p>
+          <a:p>
+            <a:r>
+              <a:rPr lang="en-US" dirty="0" err="1"/>
+              <a:t>Trabaje</a:t>
+            </a:r>
+            <a:r>
+              <a:rPr lang="en-US" dirty="0"/>
+              <a:t> </a:t>
+            </a:r>
+            <a:r>
+              <a:rPr lang="en-US" dirty="0" err="1"/>
+              <a:t>en</a:t>
+            </a:r>
+            <a:r>
+              <a:rPr lang="en-US" dirty="0"/>
+              <a:t> </a:t>
+            </a:r>
+            <a:r>
+              <a:rPr lang="en-US" dirty="0" err="1"/>
+              <a:t>grupos</a:t>
+            </a:r>
+            <a:r>
+              <a:rPr lang="en-US" dirty="0"/>
+              <a:t> para </a:t>
+            </a:r>
+            <a:r>
+              <a:rPr lang="en-US" dirty="0" err="1"/>
+              <a:t>intercambiar</a:t>
+            </a:r>
+            <a:r>
+              <a:rPr lang="en-US" dirty="0"/>
+              <a:t> ideas y </a:t>
+            </a:r>
+            <a:r>
+              <a:rPr lang="en-US" dirty="0" err="1"/>
+              <a:t>delinear</a:t>
+            </a:r>
+            <a:r>
+              <a:rPr lang="en-US" dirty="0"/>
+              <a:t> sus TTP.</a:t>
             </a:r>
           </a:p>
         </p:txBody>
@@ -7675,8 +7963,8 @@
         </p:nvSpPr>
         <p:spPr>
           <a:xfrm>
-            <a:off x="387927" y="2964873"/>
-            <a:ext cx="5334000" cy="646331"/>
+            <a:off x="374071" y="3334205"/>
+            <a:ext cx="5601060" cy="923330"/>
           </a:xfrm>
           <a:prstGeom prst="rect">
             <a:avLst/>
@@ -7690,16 +7978,69 @@
           <a:lstStyle/>
           <a:p>
             <a:r>
-              <a:rPr lang="en-US" dirty="0"/>
-              <a:t>Scenario 1:</a:t>
-            </a:r>
-          </a:p>
-          <a:p>
-            <a:pPr marL="285750" indent="-285750">
-              <a:buFont typeface="Arial" panose="020B0604020202020204" pitchFamily="34" charset="0"/>
-              <a:buChar char="•"/>
-            </a:pPr>
-            <a:endParaRPr lang="en-US" dirty="0"/>
+              <a:rPr lang="en-US" dirty="0" err="1"/>
+              <a:t>Folleto</a:t>
+            </a:r>
+            <a:r>
+              <a:rPr lang="en-US" dirty="0"/>
+              <a:t> 1:</a:t>
+            </a:r>
+          </a:p>
+          <a:p>
+            <a:r>
+              <a:rPr lang="en-US" dirty="0" err="1"/>
+              <a:t>Escenario</a:t>
+            </a:r>
+            <a:r>
+              <a:rPr lang="en-US" dirty="0"/>
+              <a:t> 1: </a:t>
+            </a:r>
+          </a:p>
+          <a:p>
+            <a:r>
+              <a:rPr lang="en-US" dirty="0"/>
+              <a:t>“</a:t>
+            </a:r>
+            <a:r>
+              <a:rPr lang="en-US" dirty="0" err="1"/>
+              <a:t>información</a:t>
+            </a:r>
+            <a:r>
+              <a:rPr lang="en-US" dirty="0"/>
+              <a:t> </a:t>
+            </a:r>
+            <a:r>
+              <a:rPr lang="en-US" dirty="0" err="1"/>
+              <a:t>maligna</a:t>
+            </a:r>
+            <a:r>
+              <a:rPr lang="en-US" dirty="0"/>
+              <a:t> </a:t>
+            </a:r>
+            <a:r>
+              <a:rPr lang="en-US" dirty="0" err="1"/>
+              <a:t>difundida</a:t>
+            </a:r>
+            <a:r>
+              <a:rPr lang="en-US" dirty="0"/>
+              <a:t> </a:t>
+            </a:r>
+            <a:r>
+              <a:rPr lang="en-US" dirty="0" err="1"/>
+              <a:t>por</a:t>
+            </a:r>
+            <a:r>
+              <a:rPr lang="en-US" dirty="0"/>
+              <a:t> </a:t>
+            </a:r>
+            <a:r>
+              <a:rPr lang="en-US" dirty="0" err="1"/>
+              <a:t>CountryX</a:t>
+            </a:r>
+            <a:r>
+              <a:rPr lang="en-US" dirty="0"/>
+              <a:t>”</a:t>
+            </a:r>
           </a:p>
         </p:txBody>
       </p:sp>
@@ -7717,8 +8058,8 @@
         </p:nvSpPr>
         <p:spPr>
           <a:xfrm>
-            <a:off x="6483929" y="2964873"/>
-            <a:ext cx="5334000" cy="646331"/>
+            <a:off x="6216871" y="3334204"/>
+            <a:ext cx="5780688" cy="923330"/>
           </a:xfrm>
           <a:prstGeom prst="rect">
             <a:avLst/>
@@ -7732,16 +8073,69 @@
           <a:lstStyle/>
           <a:p>
             <a:r>
-              <a:rPr lang="en-US" dirty="0"/>
-              <a:t>Scenario 2:</a:t>
-            </a:r>
-          </a:p>
-          <a:p>
-            <a:pPr marL="285750" indent="-285750">
-              <a:buFont typeface="Arial" panose="020B0604020202020204" pitchFamily="34" charset="0"/>
-              <a:buChar char="•"/>
-            </a:pPr>
-            <a:endParaRPr lang="en-US" dirty="0"/>
+              <a:rPr lang="en-US" dirty="0" err="1"/>
+              <a:t>Folleto</a:t>
+            </a:r>
+            <a:r>
+              <a:rPr lang="en-US" dirty="0"/>
+              <a:t> 2:</a:t>
+            </a:r>
+          </a:p>
+          <a:p>
+            <a:r>
+              <a:rPr lang="en-US" dirty="0" err="1"/>
+              <a:t>Escenario</a:t>
+            </a:r>
+            <a:r>
+              <a:rPr lang="en-US" dirty="0"/>
+              <a:t> 2: </a:t>
+            </a:r>
+          </a:p>
+          <a:p>
+            <a:r>
+              <a:rPr lang="en-US" dirty="0"/>
+              <a:t>“</a:t>
+            </a:r>
+            <a:r>
+              <a:rPr lang="en-US" dirty="0" err="1"/>
+              <a:t>Campaña</a:t>
+            </a:r>
+            <a:r>
+              <a:rPr lang="en-US" dirty="0"/>
+              <a:t> de </a:t>
+            </a:r>
+            <a:r>
+              <a:rPr lang="en-US" dirty="0" err="1"/>
+              <a:t>información</a:t>
+            </a:r>
+            <a:r>
+              <a:rPr lang="en-US" dirty="0"/>
+              <a:t> </a:t>
+            </a:r>
+            <a:r>
+              <a:rPr lang="en-US" dirty="0" err="1"/>
+              <a:t>maligna</a:t>
+            </a:r>
+            <a:r>
+              <a:rPr lang="en-US" dirty="0"/>
+              <a:t> </a:t>
+            </a:r>
+            <a:r>
+              <a:rPr lang="en-US" dirty="0" err="1"/>
+              <a:t>por</a:t>
+            </a:r>
+            <a:r>
+              <a:rPr lang="en-US" dirty="0"/>
+              <a:t> </a:t>
+            </a:r>
+            <a:r>
+              <a:rPr lang="en-US" dirty="0" err="1"/>
+              <a:t>CountryX</a:t>
+            </a:r>
+            <a:r>
+              <a:rPr lang="en-US" dirty="0"/>
+              <a:t>”</a:t>
+            </a:r>
           </a:p>
         </p:txBody>
       </p:sp>
@@ -7806,7 +8200,7 @@
           <a:p>
             <a:r>
               <a:rPr lang="en-US" dirty="0"/>
-              <a:t>Presenting Strategies (30 Minutes)</a:t>
+              <a:t>Present Strategies (30 Minutes)</a:t>
             </a:r>
           </a:p>
         </p:txBody>
@@ -7897,8 +8291,28 @@
           <a:lstStyle/>
           <a:p>
             <a:r>
-              <a:rPr lang="en-US" dirty="0"/>
-              <a:t>Presenting Strategies (30 Minutes)</a:t>
+              <a:rPr lang="en-US" dirty="0" err="1"/>
+              <a:t>Estrategias</a:t>
+            </a:r>
+            <a:r>
+              <a:rPr lang="en-US" dirty="0"/>
+              <a:t> </a:t>
+            </a:r>
+            <a:r>
+              <a:rPr lang="en-US" dirty="0" err="1"/>
+              <a:t>actuales</a:t>
+            </a:r>
+            <a:r>
+              <a:rPr lang="en-US" dirty="0"/>
+              <a:t> (30 </a:t>
+            </a:r>
+            <a:r>
+              <a:rPr lang="en-US" dirty="0" err="1"/>
+              <a:t>minutos</a:t>
+            </a:r>
+            <a:r>
+              <a:rPr lang="en-US" dirty="0"/>
+              <a:t>)</a:t>
             </a:r>
           </a:p>
         </p:txBody>
@@ -7925,14 +8339,86 @@
           <a:lstStyle/>
           <a:p>
             <a:r>
-              <a:rPr lang="en-US" dirty="0"/>
-              <a:t>Present your developed counter strategy to the class.</a:t>
-            </a:r>
-          </a:p>
-          <a:p>
-            <a:r>
-              <a:rPr lang="en-US" dirty="0"/>
-              <a:t>Discuss the strengths and weaknesses of each strategy.</a:t>
+              <a:rPr lang="en-US" dirty="0" err="1"/>
+              <a:t>Presente</a:t>
+            </a:r>
+            <a:r>
+              <a:rPr lang="en-US" dirty="0"/>
+              <a:t> </a:t>
+            </a:r>
+            <a:r>
+              <a:rPr lang="en-US" dirty="0" err="1"/>
+              <a:t>su</a:t>
+            </a:r>
+            <a:r>
+              <a:rPr lang="en-US" dirty="0"/>
+              <a:t> </a:t>
+            </a:r>
+            <a:r>
+              <a:rPr lang="en-US" dirty="0" err="1"/>
+              <a:t>contraestrategia</a:t>
+            </a:r>
+            <a:r>
+              <a:rPr lang="en-US" dirty="0"/>
+              <a:t> </a:t>
+            </a:r>
+            <a:r>
+              <a:rPr lang="en-US" dirty="0" err="1"/>
+              <a:t>desarrollada</a:t>
+            </a:r>
+            <a:r>
+              <a:rPr lang="en-US" dirty="0"/>
+              <a:t> a la </a:t>
+            </a:r>
+            <a:r>
+              <a:rPr lang="en-US" dirty="0" err="1"/>
+              <a:t>clase</a:t>
+            </a:r>
+            <a:r>
+              <a:rPr lang="en-US" dirty="0"/>
+              <a:t>.</a:t>
+            </a:r>
+          </a:p>
+          <a:p>
+            <a:r>
+              <a:rPr lang="en-US" dirty="0" err="1"/>
+              <a:t>Discuta</a:t>
+            </a:r>
+            <a:r>
+              <a:rPr lang="en-US" dirty="0"/>
+              <a:t> las </a:t>
+            </a:r>
+            <a:r>
+              <a:rPr lang="en-US" dirty="0" err="1"/>
+              <a:t>fortalezas</a:t>
+            </a:r>
+            <a:r>
+              <a:rPr lang="en-US" dirty="0"/>
+              <a:t> y </a:t>
+            </a:r>
+            <a:r>
+              <a:rPr lang="en-US" dirty="0" err="1"/>
+              <a:t>debilidades</a:t>
+            </a:r>
+            <a:r>
+              <a:rPr lang="en-US" dirty="0"/>
+              <a:t> de </a:t>
+            </a:r>
+            <a:r>
+              <a:rPr lang="en-US" dirty="0" err="1"/>
+              <a:t>cada</a:t>
+            </a:r>
+            <a:r>
+              <a:rPr lang="en-US" dirty="0"/>
+              <a:t> </a:t>
+            </a:r>
+            <a:r>
+              <a:rPr lang="en-US" dirty="0" err="1"/>
+              <a:t>estrategia</a:t>
+            </a:r>
+            <a:r>
+              <a:rPr lang="en-US" dirty="0"/>
+              <a:t>.</a:t>
             </a:r>
           </a:p>
         </p:txBody>
@@ -8062,7 +8548,7 @@
           </a:ln>
           <a:extLst>
             <a:ext uri="{C572A759-6A51-4108-AA02-DFA0A04FC94B}">
-              <ma14:wrappingTextBoxFlag xmlns:ma14="http://schemas.microsoft.com/office/mac/drawingml/2011/main" xmlns:a14="http://schemas.microsoft.com/office/drawing/2010/main" xmlns:m="http://schemas.openxmlformats.org/officeDocument/2006/math" xmlns="" val="1"/>
+              <ma14:wrappingTextBoxFlag xmlns="" xmlns:m="http://schemas.openxmlformats.org/officeDocument/2006/math" xmlns:a14="http://schemas.microsoft.com/office/drawing/2010/main" xmlns:ma14="http://schemas.microsoft.com/office/mac/drawingml/2011/main" val="1"/>
             </a:ext>
           </a:extLst>
         </p:spPr>
@@ -8098,7 +8584,7 @@
           </a:prstGeom>
           <a:extLst>
             <a:ext uri="{C572A759-6A51-4108-AA02-DFA0A04FC94B}">
-              <ma14:wrappingTextBoxFlag xmlns:ma14="http://schemas.microsoft.com/office/mac/drawingml/2011/main" xmlns:a14="http://schemas.microsoft.com/office/drawing/2010/main" xmlns:m="http://schemas.openxmlformats.org/officeDocument/2006/math" xmlns="" val="1"/>
+              <ma14:wrappingTextBoxFlag xmlns="" xmlns:m="http://schemas.openxmlformats.org/officeDocument/2006/math" xmlns:a14="http://schemas.microsoft.com/office/drawing/2010/main" xmlns:ma14="http://schemas.microsoft.com/office/mac/drawingml/2011/main" val="1"/>
             </a:ext>
           </a:extLst>
         </p:spPr>
@@ -8130,7 +8616,7 @@
         <p:push dir="u"/>
       </p:transition>
     </mc:Choice>
-    <mc:Fallback xmlns:a14="http://schemas.microsoft.com/office/drawing/2010/main" xmlns:m="http://schemas.openxmlformats.org/officeDocument/2006/math" xmlns="">
+    <mc:Fallback xmlns="" xmlns:m="http://schemas.openxmlformats.org/officeDocument/2006/math" xmlns:a14="http://schemas.microsoft.com/office/drawing/2010/main">
       <p:transition spd="slow">
         <p:fade/>
       </p:transition>
@@ -8243,7 +8729,7 @@
           </a:ln>
           <a:extLst>
             <a:ext uri="{C572A759-6A51-4108-AA02-DFA0A04FC94B}">
-              <ma14:wrappingTextBoxFlag xmlns:ma14="http://schemas.microsoft.com/office/mac/drawingml/2011/main" xmlns:a14="http://schemas.microsoft.com/office/drawing/2010/main" xmlns:m="http://schemas.openxmlformats.org/officeDocument/2006/math" xmlns="" val="1"/>
+              <ma14:wrappingTextBoxFlag xmlns="" xmlns:m="http://schemas.openxmlformats.org/officeDocument/2006/math" xmlns:a14="http://schemas.microsoft.com/office/drawing/2010/main" xmlns:ma14="http://schemas.microsoft.com/office/mac/drawingml/2011/main" val="1"/>
             </a:ext>
           </a:extLst>
         </p:spPr>
@@ -8279,7 +8765,7 @@
           </a:prstGeom>
           <a:extLst>
             <a:ext uri="{C572A759-6A51-4108-AA02-DFA0A04FC94B}">
-              <ma14:wrappingTextBoxFlag xmlns:ma14="http://schemas.microsoft.com/office/mac/drawingml/2011/main" xmlns:a14="http://schemas.microsoft.com/office/drawing/2010/main" xmlns:m="http://schemas.openxmlformats.org/officeDocument/2006/math" xmlns="" val="1"/>
+              <ma14:wrappingTextBoxFlag xmlns="" xmlns:m="http://schemas.openxmlformats.org/officeDocument/2006/math" xmlns:a14="http://schemas.microsoft.com/office/drawing/2010/main" xmlns:ma14="http://schemas.microsoft.com/office/mac/drawingml/2011/main" val="1"/>
             </a:ext>
           </a:extLst>
         </p:spPr>
@@ -8538,8 +9024,43 @@
           <a:lstStyle/>
           <a:p>
             <a:r>
-              <a:rPr lang="en-US" dirty="0"/>
-              <a:t>Refine TTPs (20 Minutes)</a:t>
+              <a:rPr lang="en-US" dirty="0" err="1"/>
+              <a:t>Refinar</a:t>
+            </a:r>
+            <a:r>
+              <a:rPr lang="en-US" dirty="0"/>
+              <a:t> la </a:t>
+            </a:r>
+            <a:r>
+              <a:rPr lang="en-US" dirty="0" err="1"/>
+              <a:t>lista</a:t>
+            </a:r>
+            <a:r>
+              <a:rPr lang="en-US" dirty="0"/>
+              <a:t> de </a:t>
+            </a:r>
+            <a:r>
+              <a:rPr lang="en-US" dirty="0" err="1"/>
+              <a:t>estrategias</a:t>
+            </a:r>
+            <a:r>
+              <a:rPr lang="en-US" dirty="0"/>
+              <a:t> </a:t>
+            </a:r>
+            <a:br>
+              <a:rPr lang="en-US" dirty="0"/>
+            </a:br>
+            <a:r>
+              <a:rPr lang="en-US" dirty="0"/>
+              <a:t>(20 </a:t>
+            </a:r>
+            <a:r>
+              <a:rPr lang="en-US" dirty="0" err="1"/>
+              <a:t>minutos</a:t>
+            </a:r>
+            <a:r>
+              <a:rPr lang="en-US" dirty="0"/>
+              <a:t>)</a:t>
             </a:r>
           </a:p>
         </p:txBody>
@@ -8566,14 +9087,86 @@
           <a:lstStyle/>
           <a:p>
             <a:r>
-              <a:rPr lang="en-US" dirty="0"/>
-              <a:t>Develop a counter strategy for a given scenario. </a:t>
-            </a:r>
-          </a:p>
-          <a:p>
-            <a:r>
-              <a:rPr lang="en-US" dirty="0"/>
-              <a:t>Work in groups to brainstorm and outline your TTPs.</a:t>
+              <a:rPr lang="en-US" dirty="0" err="1"/>
+              <a:t>Desarrollar</a:t>
+            </a:r>
+            <a:r>
+              <a:rPr lang="en-US" dirty="0"/>
+              <a:t> </a:t>
+            </a:r>
+            <a:r>
+              <a:rPr lang="en-US" dirty="0" err="1"/>
+              <a:t>una</a:t>
+            </a:r>
+            <a:r>
+              <a:rPr lang="en-US" dirty="0"/>
+              <a:t> </a:t>
+            </a:r>
+            <a:r>
+              <a:rPr lang="en-US" dirty="0" err="1"/>
+              <a:t>contraestrategia</a:t>
+            </a:r>
+            <a:r>
+              <a:rPr lang="en-US" dirty="0"/>
+              <a:t> para un </a:t>
+            </a:r>
+            <a:r>
+              <a:rPr lang="en-US" dirty="0" err="1"/>
+              <a:t>escenario</a:t>
+            </a:r>
+            <a:r>
+              <a:rPr lang="en-US" dirty="0"/>
+              <a:t> </a:t>
+            </a:r>
+            <a:r>
+              <a:rPr lang="en-US" dirty="0" err="1"/>
+              <a:t>determinado</a:t>
+            </a:r>
+            <a:r>
+              <a:rPr lang="en-US" dirty="0"/>
+              <a:t>.</a:t>
+            </a:r>
+          </a:p>
+          <a:p>
+            <a:r>
+              <a:rPr lang="en-US" dirty="0" err="1"/>
+              <a:t>Trabaje</a:t>
+            </a:r>
+            <a:r>
+              <a:rPr lang="en-US" dirty="0"/>
+              <a:t> </a:t>
+            </a:r>
+            <a:r>
+              <a:rPr lang="en-US" dirty="0" err="1"/>
+              <a:t>en</a:t>
+            </a:r>
+            <a:r>
+              <a:rPr lang="en-US" dirty="0"/>
+              <a:t> </a:t>
+            </a:r>
+            <a:r>
+              <a:rPr lang="en-US" dirty="0" err="1"/>
+              <a:t>grupos</a:t>
+            </a:r>
+            <a:r>
+              <a:rPr lang="en-US" dirty="0"/>
+              <a:t> para </a:t>
+            </a:r>
+            <a:r>
+              <a:rPr lang="en-US" dirty="0" err="1"/>
+              <a:t>intercambiar</a:t>
+            </a:r>
+            <a:r>
+              <a:rPr lang="en-US" dirty="0"/>
+              <a:t> ideas y </a:t>
+            </a:r>
+            <a:r>
+              <a:rPr lang="en-US" dirty="0" err="1"/>
+              <a:t>delinear</a:t>
+            </a:r>
+            <a:r>
+              <a:rPr lang="en-US" dirty="0"/>
+              <a:t> sus TTP.</a:t>
             </a:r>
           </a:p>
         </p:txBody>
@@ -8730,8 +9323,28 @@
           <a:lstStyle/>
           <a:p>
             <a:r>
-              <a:rPr lang="en-US" dirty="0"/>
-              <a:t>Final TTP Presentation (30 Minutes)</a:t>
+              <a:rPr lang="en-US" dirty="0" err="1"/>
+              <a:t>Presentación</a:t>
+            </a:r>
+            <a:r>
+              <a:rPr lang="en-US" dirty="0"/>
+              <a:t> final de la </a:t>
+            </a:r>
+            <a:r>
+              <a:rPr lang="en-US" dirty="0" err="1"/>
+              <a:t>estrategia</a:t>
+            </a:r>
+            <a:r>
+              <a:rPr lang="en-US" dirty="0"/>
+              <a:t> (30 </a:t>
+            </a:r>
+            <a:r>
+              <a:rPr lang="en-US" dirty="0" err="1"/>
+              <a:t>Minutos</a:t>
+            </a:r>
+            <a:r>
+              <a:rPr lang="en-US" dirty="0"/>
+              <a:t>)</a:t>
             </a:r>
           </a:p>
         </p:txBody>
@@ -8758,14 +9371,86 @@
           <a:lstStyle/>
           <a:p>
             <a:r>
-              <a:rPr lang="en-US" dirty="0"/>
-              <a:t>Present your developed counter strategy to the class.</a:t>
-            </a:r>
-          </a:p>
-          <a:p>
-            <a:r>
-              <a:rPr lang="en-US" dirty="0"/>
-              <a:t>Discuss the strengths and weaknesses of each strategy.</a:t>
+              <a:rPr lang="en-US" dirty="0" err="1"/>
+              <a:t>Presente</a:t>
+            </a:r>
+            <a:r>
+              <a:rPr lang="en-US" dirty="0"/>
+              <a:t> </a:t>
+            </a:r>
+            <a:r>
+              <a:rPr lang="en-US" dirty="0" err="1"/>
+              <a:t>su</a:t>
+            </a:r>
+            <a:r>
+              <a:rPr lang="en-US" dirty="0"/>
+              <a:t> </a:t>
+            </a:r>
+            <a:r>
+              <a:rPr lang="en-US" dirty="0" err="1"/>
+              <a:t>contraestrategia</a:t>
+            </a:r>
+            <a:r>
+              <a:rPr lang="en-US" dirty="0"/>
+              <a:t> </a:t>
+            </a:r>
+            <a:r>
+              <a:rPr lang="en-US" dirty="0" err="1"/>
+              <a:t>desarrollada</a:t>
+            </a:r>
+            <a:r>
+              <a:rPr lang="en-US" dirty="0"/>
+              <a:t> a la </a:t>
+            </a:r>
+            <a:r>
+              <a:rPr lang="en-US" dirty="0" err="1"/>
+              <a:t>clase</a:t>
+            </a:r>
+            <a:r>
+              <a:rPr lang="en-US" dirty="0"/>
+              <a:t>.</a:t>
+            </a:r>
+          </a:p>
+          <a:p>
+            <a:r>
+              <a:rPr lang="en-US" dirty="0" err="1"/>
+              <a:t>Discuta</a:t>
+            </a:r>
+            <a:r>
+              <a:rPr lang="en-US" dirty="0"/>
+              <a:t> las </a:t>
+            </a:r>
+            <a:r>
+              <a:rPr lang="en-US" dirty="0" err="1"/>
+              <a:t>fortalezas</a:t>
+            </a:r>
+            <a:r>
+              <a:rPr lang="en-US" dirty="0"/>
+              <a:t> y </a:t>
+            </a:r>
+            <a:r>
+              <a:rPr lang="en-US" dirty="0" err="1"/>
+              <a:t>debilidades</a:t>
+            </a:r>
+            <a:r>
+              <a:rPr lang="en-US" dirty="0"/>
+              <a:t> de </a:t>
+            </a:r>
+            <a:r>
+              <a:rPr lang="en-US" dirty="0" err="1"/>
+              <a:t>cada</a:t>
+            </a:r>
+            <a:r>
+              <a:rPr lang="en-US" dirty="0"/>
+              <a:t> </a:t>
+            </a:r>
+            <a:r>
+              <a:rPr lang="en-US" dirty="0" err="1"/>
+              <a:t>estrategia</a:t>
+            </a:r>
+            <a:r>
+              <a:rPr lang="en-US" dirty="0"/>
+              <a:t>.</a:t>
             </a:r>
           </a:p>
         </p:txBody>
@@ -8895,7 +9580,7 @@
           </a:ln>
           <a:extLst>
             <a:ext uri="{C572A759-6A51-4108-AA02-DFA0A04FC94B}">
-              <ma14:wrappingTextBoxFlag xmlns:ma14="http://schemas.microsoft.com/office/mac/drawingml/2011/main" xmlns:a14="http://schemas.microsoft.com/office/drawing/2010/main" xmlns:m="http://schemas.openxmlformats.org/officeDocument/2006/math" xmlns="" val="1"/>
+              <ma14:wrappingTextBoxFlag xmlns="" xmlns:m="http://schemas.openxmlformats.org/officeDocument/2006/math" xmlns:a14="http://schemas.microsoft.com/office/drawing/2010/main" xmlns:ma14="http://schemas.microsoft.com/office/mac/drawingml/2011/main" val="1"/>
             </a:ext>
           </a:extLst>
         </p:spPr>
@@ -8931,7 +9616,7 @@
           </a:prstGeom>
           <a:extLst>
             <a:ext uri="{C572A759-6A51-4108-AA02-DFA0A04FC94B}">
-              <ma14:wrappingTextBoxFlag xmlns:ma14="http://schemas.microsoft.com/office/mac/drawingml/2011/main" xmlns:a14="http://schemas.microsoft.com/office/drawing/2010/main" xmlns:m="http://schemas.openxmlformats.org/officeDocument/2006/math" xmlns="" val="1"/>
+              <ma14:wrappingTextBoxFlag xmlns="" xmlns:m="http://schemas.openxmlformats.org/officeDocument/2006/math" xmlns:a14="http://schemas.microsoft.com/office/drawing/2010/main" xmlns:ma14="http://schemas.microsoft.com/office/mac/drawingml/2011/main" val="1"/>
             </a:ext>
           </a:extLst>
         </p:spPr>
@@ -8963,7 +9648,7 @@
         <p:push dir="u"/>
       </p:transition>
     </mc:Choice>
-    <mc:Fallback xmlns:a14="http://schemas.microsoft.com/office/drawing/2010/main" xmlns:m="http://schemas.openxmlformats.org/officeDocument/2006/math" xmlns="">
+    <mc:Fallback xmlns="" xmlns:m="http://schemas.openxmlformats.org/officeDocument/2006/math" xmlns:a14="http://schemas.microsoft.com/office/drawing/2010/main">
       <p:transition spd="slow">
         <p:fade/>
       </p:transition>
@@ -9076,7 +9761,7 @@
           </a:ln>
           <a:extLst>
             <a:ext uri="{C572A759-6A51-4108-AA02-DFA0A04FC94B}">
-              <ma14:wrappingTextBoxFlag xmlns:ma14="http://schemas.microsoft.com/office/mac/drawingml/2011/main" xmlns:a14="http://schemas.microsoft.com/office/drawing/2010/main" xmlns:m="http://schemas.openxmlformats.org/officeDocument/2006/math" xmlns="" val="1"/>
+              <ma14:wrappingTextBoxFlag xmlns="" xmlns:m="http://schemas.openxmlformats.org/officeDocument/2006/math" xmlns:a14="http://schemas.microsoft.com/office/drawing/2010/main" xmlns:ma14="http://schemas.microsoft.com/office/mac/drawingml/2011/main" val="1"/>
             </a:ext>
           </a:extLst>
         </p:spPr>
@@ -9112,7 +9797,7 @@
           </a:prstGeom>
           <a:extLst>
             <a:ext uri="{C572A759-6A51-4108-AA02-DFA0A04FC94B}">
-              <ma14:wrappingTextBoxFlag xmlns:ma14="http://schemas.microsoft.com/office/mac/drawingml/2011/main" xmlns:a14="http://schemas.microsoft.com/office/drawing/2010/main" xmlns:m="http://schemas.openxmlformats.org/officeDocument/2006/math" xmlns="" val="1"/>
+              <ma14:wrappingTextBoxFlag xmlns="" xmlns:m="http://schemas.openxmlformats.org/officeDocument/2006/math" xmlns:a14="http://schemas.microsoft.com/office/drawing/2010/main" xmlns:ma14="http://schemas.microsoft.com/office/mac/drawingml/2011/main" val="1"/>
             </a:ext>
           </a:extLst>
         </p:spPr>
@@ -9217,7 +9902,22 @@
           <a:p>
             <a:r>
               <a:rPr lang="en-US" dirty="0"/>
-              <a:t>Groups will combine strategies to a main strategy. </a:t>
+              <a:t>Groups will combine strategies to a main strategy.</a:t>
+            </a:r>
+          </a:p>
+          <a:p>
+            <a:r>
+              <a:rPr lang="en-US" dirty="0"/>
+              <a:t>The outcome will be an agreed upon strategy list. </a:t>
+            </a:r>
+          </a:p>
+          <a:p>
+            <a:pPr marL="0" indent="0">
+              <a:buNone/>
+            </a:pPr>
+            <a:r>
+              <a:rPr lang="en-US" dirty="0"/>
+              <a:t> </a:t>
             </a:r>
           </a:p>
         </p:txBody>
@@ -9275,8 +9975,21 @@
           <a:p>
             <a:r>
               <a:rPr lang="en-US" dirty="0"/>
-              <a:t>Combine TTPs</a:t>
-            </a:r>
+              <a:t>Lista de </a:t>
+            </a:r>
+            <a:r>
+              <a:rPr lang="en-US" dirty="0" err="1"/>
+              <a:t>estrategias</a:t>
+            </a:r>
+            <a:r>
+              <a:rPr lang="en-US" dirty="0"/>
+              <a:t> </a:t>
+            </a:r>
+            <a:r>
+              <a:rPr lang="en-US" dirty="0" err="1"/>
+              <a:t>combinadas</a:t>
+            </a:r>
+            <a:endParaRPr lang="en-US" dirty="0"/>
           </a:p>
         </p:txBody>
       </p:sp>
@@ -9303,7 +10016,109 @@
           <a:p>
             <a:r>
               <a:rPr lang="en-US" dirty="0"/>
-              <a:t>Groups will combine strategies to a main strategy. </a:t>
+              <a:t>Los </a:t>
+            </a:r>
+            <a:r>
+              <a:rPr lang="en-US" dirty="0" err="1"/>
+              <a:t>grupos</a:t>
+            </a:r>
+            <a:r>
+              <a:rPr lang="en-US" dirty="0"/>
+              <a:t> </a:t>
+            </a:r>
+            <a:r>
+              <a:rPr lang="en-US" dirty="0" err="1"/>
+              <a:t>combinarán</a:t>
+            </a:r>
+            <a:r>
+              <a:rPr lang="en-US" dirty="0"/>
+              <a:t> </a:t>
+            </a:r>
+            <a:r>
+              <a:rPr lang="en-US" dirty="0" err="1"/>
+              <a:t>estrategias</a:t>
+            </a:r>
+            <a:r>
+              <a:rPr lang="en-US" dirty="0"/>
+              <a:t> </a:t>
+            </a:r>
+            <a:r>
+              <a:rPr lang="en-US" dirty="0" err="1"/>
+              <a:t>en</a:t>
+            </a:r>
+            <a:r>
+              <a:rPr lang="en-US" dirty="0"/>
+              <a:t> </a:t>
+            </a:r>
+            <a:r>
+              <a:rPr lang="en-US" dirty="0" err="1"/>
+              <a:t>una</a:t>
+            </a:r>
+            <a:r>
+              <a:rPr lang="en-US" dirty="0"/>
+              <a:t> </a:t>
+            </a:r>
+            <a:r>
+              <a:rPr lang="en-US" dirty="0" err="1"/>
+              <a:t>estrategia</a:t>
+            </a:r>
+            <a:r>
+              <a:rPr lang="en-US" dirty="0"/>
+              <a:t> principal.</a:t>
+            </a:r>
+          </a:p>
+          <a:p>
+            <a:r>
+              <a:rPr lang="en-US" dirty="0"/>
+              <a:t>El </a:t>
+            </a:r>
+            <a:r>
+              <a:rPr lang="en-US" dirty="0" err="1"/>
+              <a:t>resultado</a:t>
+            </a:r>
+            <a:r>
+              <a:rPr lang="en-US" dirty="0"/>
+              <a:t> </a:t>
+            </a:r>
+            <a:r>
+              <a:rPr lang="en-US" dirty="0" err="1"/>
+              <a:t>será</a:t>
+            </a:r>
+            <a:r>
+              <a:rPr lang="en-US" dirty="0"/>
+              <a:t> </a:t>
+            </a:r>
+            <a:r>
+              <a:rPr lang="en-US" dirty="0" err="1"/>
+              <a:t>una</a:t>
+            </a:r>
+            <a:r>
+              <a:rPr lang="en-US" dirty="0"/>
+              <a:t> </a:t>
+            </a:r>
+            <a:r>
+              <a:rPr lang="en-US" dirty="0" err="1"/>
+              <a:t>lista</a:t>
+            </a:r>
+            <a:r>
+              <a:rPr lang="en-US" dirty="0"/>
+              <a:t> de </a:t>
+            </a:r>
+            <a:r>
+              <a:rPr lang="en-US" dirty="0" err="1"/>
+              <a:t>estrategias</a:t>
+            </a:r>
+            <a:r>
+              <a:rPr lang="en-US" dirty="0"/>
+              <a:t> </a:t>
+            </a:r>
+            <a:r>
+              <a:rPr lang="en-US" dirty="0" err="1"/>
+              <a:t>acordada</a:t>
+            </a:r>
+            <a:r>
+              <a:rPr lang="en-US" dirty="0"/>
+              <a:t>.</a:t>
             </a:r>
           </a:p>
         </p:txBody>
@@ -9465,9 +10280,18 @@
           <a:lstStyle/>
           <a:p>
             <a:r>
-              <a:rPr lang="en-US" dirty="0"/>
-              <a:t>Practical Exercise</a:t>
-            </a:r>
+              <a:rPr lang="en-US" dirty="0" err="1"/>
+              <a:t>Ejercicio</a:t>
+            </a:r>
+            <a:r>
+              <a:rPr lang="en-US" dirty="0"/>
+              <a:t> </a:t>
+            </a:r>
+            <a:r>
+              <a:rPr lang="en-US" dirty="0" err="1"/>
+              <a:t>práctico</a:t>
+            </a:r>
+            <a:endParaRPr lang="en-US" dirty="0"/>
           </a:p>
         </p:txBody>
       </p:sp>
@@ -9494,19 +10318,78 @@
           <a:p>
             <a:r>
               <a:rPr lang="en-US" dirty="0"/>
-              <a:t>Groups will combine strategies to a main strategy.</a:t>
-            </a:r>
-          </a:p>
-          <a:p>
-            <a:r>
-              <a:rPr lang="en-US" dirty="0"/>
-              <a:t>Follow instructions from </a:t>
-            </a:r>
-            <a:r>
-              <a:rPr lang="en-US"/>
-              <a:t>the handout. </a:t>
-            </a:r>
-            <a:endParaRPr lang="en-US" dirty="0"/>
+              <a:t>Los </a:t>
+            </a:r>
+            <a:r>
+              <a:rPr lang="en-US" dirty="0" err="1"/>
+              <a:t>grupos</a:t>
+            </a:r>
+            <a:r>
+              <a:rPr lang="en-US" dirty="0"/>
+              <a:t> </a:t>
+            </a:r>
+            <a:r>
+              <a:rPr lang="en-US" dirty="0" err="1"/>
+              <a:t>combinarán</a:t>
+            </a:r>
+            <a:r>
+              <a:rPr lang="en-US" dirty="0"/>
+              <a:t> </a:t>
+            </a:r>
+            <a:r>
+              <a:rPr lang="en-US" dirty="0" err="1"/>
+              <a:t>estrategias</a:t>
+            </a:r>
+            <a:r>
+              <a:rPr lang="en-US" dirty="0"/>
+              <a:t> </a:t>
+            </a:r>
+            <a:r>
+              <a:rPr lang="en-US" dirty="0" err="1"/>
+              <a:t>en</a:t>
+            </a:r>
+            <a:r>
+              <a:rPr lang="en-US" dirty="0"/>
+              <a:t> </a:t>
+            </a:r>
+            <a:r>
+              <a:rPr lang="en-US" dirty="0" err="1"/>
+              <a:t>una</a:t>
+            </a:r>
+            <a:r>
+              <a:rPr lang="en-US" dirty="0"/>
+              <a:t> </a:t>
+            </a:r>
+            <a:r>
+              <a:rPr lang="en-US" dirty="0" err="1"/>
+              <a:t>estrategia</a:t>
+            </a:r>
+            <a:r>
+              <a:rPr lang="en-US" dirty="0"/>
+              <a:t> principal.</a:t>
+            </a:r>
+          </a:p>
+          <a:p>
+            <a:r>
+              <a:rPr lang="en-US" dirty="0"/>
+              <a:t>Siga las </a:t>
+            </a:r>
+            <a:r>
+              <a:rPr lang="en-US" dirty="0" err="1"/>
+              <a:t>instrucciones</a:t>
+            </a:r>
+            <a:r>
+              <a:rPr lang="en-US" dirty="0"/>
+              <a:t> del </a:t>
+            </a:r>
+            <a:r>
+              <a:rPr lang="en-US" dirty="0" err="1"/>
+              <a:t>folleto</a:t>
+            </a:r>
+            <a:r>
+              <a:rPr lang="en-US" dirty="0"/>
+              <a:t>.</a:t>
+            </a:r>
           </a:p>
         </p:txBody>
       </p:sp>
@@ -9793,9 +10676,10 @@
           <a:lstStyle/>
           <a:p>
             <a:r>
-              <a:rPr lang="en-US" dirty="0"/>
-              <a:t>Check on Learning</a:t>
-            </a:r>
+              <a:rPr lang="en-US" dirty="0" err="1"/>
+              <a:t>Preguntas</a:t>
+            </a:r>
+            <a:endParaRPr lang="en-US" dirty="0"/>
           </a:p>
         </p:txBody>
       </p:sp>
@@ -9824,19 +10708,163 @@
           <a:p>
             <a:r>
               <a:rPr lang="en-US" dirty="0"/>
-              <a:t>What are the key components of an effective counter strategy?</a:t>
-            </a:r>
-          </a:p>
-          <a:p>
-            <a:r>
-              <a:rPr lang="en-US" dirty="0"/>
-              <a:t>Why is it important to counter misinformation quickly?</a:t>
-            </a:r>
-          </a:p>
-          <a:p>
-            <a:r>
-              <a:rPr lang="en-US" dirty="0"/>
-              <a:t>What techniques can be used to counter misinformation?</a:t>
+              <a:t>¿</a:t>
+            </a:r>
+            <a:r>
+              <a:rPr lang="en-US" dirty="0" err="1"/>
+              <a:t>Cuáles</a:t>
+            </a:r>
+            <a:r>
+              <a:rPr lang="en-US" dirty="0"/>
+              <a:t> son </a:t>
+            </a:r>
+            <a:r>
+              <a:rPr lang="en-US" dirty="0" err="1"/>
+              <a:t>los</a:t>
+            </a:r>
+            <a:r>
+              <a:rPr lang="en-US" dirty="0"/>
+              <a:t> </a:t>
+            </a:r>
+            <a:r>
+              <a:rPr lang="en-US" dirty="0" err="1"/>
+              <a:t>componentes</a:t>
+            </a:r>
+            <a:r>
+              <a:rPr lang="en-US" dirty="0"/>
+              <a:t> clave de </a:t>
+            </a:r>
+            <a:r>
+              <a:rPr lang="en-US" dirty="0" err="1"/>
+              <a:t>una</a:t>
+            </a:r>
+            <a:r>
+              <a:rPr lang="en-US" dirty="0"/>
+              <a:t> </a:t>
+            </a:r>
+            <a:r>
+              <a:rPr lang="en-US" dirty="0" err="1"/>
+              <a:t>contraestrategia</a:t>
+            </a:r>
+            <a:r>
+              <a:rPr lang="en-US" dirty="0"/>
+              <a:t> </a:t>
+            </a:r>
+            <a:r>
+              <a:rPr lang="en-US" dirty="0" err="1"/>
+              <a:t>eficaz</a:t>
+            </a:r>
+            <a:r>
+              <a:rPr lang="en-US" dirty="0"/>
+              <a:t>?</a:t>
+            </a:r>
+          </a:p>
+          <a:p>
+            <a:r>
+              <a:rPr lang="en-US" dirty="0"/>
+              <a:t>¿Por </a:t>
+            </a:r>
+            <a:r>
+              <a:rPr lang="en-US" dirty="0" err="1"/>
+              <a:t>qué</a:t>
+            </a:r>
+            <a:r>
+              <a:rPr lang="en-US" dirty="0"/>
+              <a:t> es </a:t>
+            </a:r>
+            <a:r>
+              <a:rPr lang="en-US" dirty="0" err="1"/>
+              <a:t>importante</a:t>
+            </a:r>
+            <a:r>
+              <a:rPr lang="en-US" dirty="0"/>
+              <a:t> </a:t>
+            </a:r>
+            <a:r>
+              <a:rPr lang="en-US" dirty="0" err="1"/>
+              <a:t>contrarrestar</a:t>
+            </a:r>
+            <a:r>
+              <a:rPr lang="en-US" dirty="0"/>
+              <a:t> </a:t>
+            </a:r>
+            <a:r>
+              <a:rPr lang="en-US" dirty="0" err="1"/>
+              <a:t>rápidamente</a:t>
+            </a:r>
+            <a:r>
+              <a:rPr lang="en-US" dirty="0"/>
+              <a:t> la </a:t>
+            </a:r>
+            <a:r>
+              <a:rPr lang="en-US" dirty="0" err="1"/>
+              <a:t>desinformación</a:t>
+            </a:r>
+            <a:r>
+              <a:rPr lang="en-US" dirty="0"/>
+              <a:t>?</a:t>
+            </a:r>
+          </a:p>
+          <a:p>
+            <a:r>
+              <a:rPr lang="en-US" dirty="0"/>
+              <a:t>¿</a:t>
+            </a:r>
+            <a:r>
+              <a:rPr lang="en-US" dirty="0" err="1"/>
+              <a:t>Qué</a:t>
+            </a:r>
+            <a:r>
+              <a:rPr lang="en-US" dirty="0"/>
+              <a:t> </a:t>
+            </a:r>
+            <a:r>
+              <a:rPr lang="en-US" dirty="0" err="1"/>
+              <a:t>técnicas</a:t>
+            </a:r>
+            <a:r>
+              <a:rPr lang="en-US" dirty="0"/>
+              <a:t> se </a:t>
+            </a:r>
+            <a:r>
+              <a:rPr lang="en-US" dirty="0" err="1"/>
+              <a:t>pueden</a:t>
+            </a:r>
+            <a:r>
+              <a:rPr lang="en-US" dirty="0"/>
+              <a:t> </a:t>
+            </a:r>
+            <a:r>
+              <a:rPr lang="en-US" dirty="0" err="1"/>
+              <a:t>utilizar</a:t>
+            </a:r>
+            <a:r>
+              <a:rPr lang="en-US" dirty="0"/>
+              <a:t> para </a:t>
+            </a:r>
+            <a:r>
+              <a:rPr lang="en-US" dirty="0" err="1"/>
+              <a:t>contrarrestar</a:t>
+            </a:r>
+            <a:r>
+              <a:rPr lang="en-US" dirty="0"/>
+              <a:t> la </a:t>
+            </a:r>
+            <a:r>
+              <a:rPr lang="en-US" dirty="0" err="1"/>
+              <a:t>información</a:t>
+            </a:r>
+            <a:r>
+              <a:rPr lang="en-US" dirty="0"/>
+              <a:t> </a:t>
+            </a:r>
+            <a:r>
+              <a:rPr lang="en-US" dirty="0" err="1"/>
+              <a:t>errónea</a:t>
+            </a:r>
+            <a:r>
+              <a:rPr lang="en-US" dirty="0"/>
+              <a:t>?</a:t>
             </a:r>
           </a:p>
         </p:txBody>
@@ -9926,37 +10954,48 @@
         <p:spPr/>
         <p:txBody>
           <a:bodyPr>
-            <a:normAutofit lnSpcReduction="10000"/>
+            <a:normAutofit/>
           </a:bodyPr>
           <a:lstStyle/>
           <a:p>
             <a:r>
-              <a:rPr lang="en-US" dirty="0"/>
-              <a:t>What would you do if the misinformation was being spread by a high-ranking official? </a:t>
-            </a:r>
-          </a:p>
-          <a:p>
-            <a:r>
-              <a:rPr lang="en-US" dirty="0"/>
-              <a:t>What would you do if the misinformation was being spread by a foreign government?</a:t>
-            </a:r>
-          </a:p>
-          <a:p>
-            <a:r>
-              <a:rPr lang="en-US" dirty="0"/>
-              <a:t>What would you do if the misinformation was being spread by both a foreign government and a high-ranking official?</a:t>
-            </a:r>
-          </a:p>
-          <a:p>
-            <a:r>
-              <a:rPr lang="en-US" dirty="0"/>
-              <a:t>What would you do if your family was being targeted by the misinformation? </a:t>
-            </a:r>
-          </a:p>
-          <a:p>
-            <a:r>
-              <a:rPr lang="en-US" dirty="0"/>
-              <a:t>What would you do if the misinformation was being spread by a friend?</a:t>
+              <a:rPr lang="en-US" sz="3200" dirty="0"/>
+              <a:t>What would you do now? </a:t>
+            </a:r>
+          </a:p>
+          <a:p>
+            <a:pPr lvl="1"/>
+            <a:r>
+              <a:rPr lang="en-US" sz="2800" dirty="0"/>
+              <a:t>misinformation was being spread by a high-ranking official? </a:t>
+            </a:r>
+          </a:p>
+          <a:p>
+            <a:pPr lvl="1"/>
+            <a:r>
+              <a:rPr lang="en-US" sz="2800" dirty="0"/>
+              <a:t>misinformation was being spread by a foreign government?</a:t>
+            </a:r>
+          </a:p>
+          <a:p>
+            <a:pPr lvl="1"/>
+            <a:r>
+              <a:rPr lang="en-US" sz="2800" dirty="0"/>
+              <a:t>misinformation was being spread by both a foreign government and a high-ranking official?</a:t>
+            </a:r>
+          </a:p>
+          <a:p>
+            <a:pPr lvl="1"/>
+            <a:r>
+              <a:rPr lang="en-US" sz="2800" dirty="0"/>
+              <a:t>your family was being targeted by the misinformation? </a:t>
+            </a:r>
+          </a:p>
+          <a:p>
+            <a:pPr lvl="1"/>
+            <a:r>
+              <a:rPr lang="en-US" sz="2800" dirty="0"/>
+              <a:t>misinformation was being spread by a friend?</a:t>
             </a:r>
           </a:p>
         </p:txBody>
@@ -10013,9 +11052,18 @@
           <a:lstStyle/>
           <a:p>
             <a:r>
-              <a:rPr lang="en-US" dirty="0"/>
-              <a:t>Check on Learning: Rapid Fire</a:t>
-            </a:r>
+              <a:rPr lang="en-US" dirty="0" err="1"/>
+              <a:t>Preguntas</a:t>
+            </a:r>
+            <a:r>
+              <a:rPr lang="en-US" dirty="0"/>
+              <a:t> </a:t>
+            </a:r>
+            <a:r>
+              <a:rPr lang="en-US"/>
+              <a:t>Rapidas</a:t>
+            </a:r>
+            <a:endParaRPr lang="en-US" dirty="0"/>
           </a:p>
         </p:txBody>
       </p:sp>
@@ -10038,38 +11086,322 @@
         <p:spPr/>
         <p:txBody>
           <a:bodyPr>
-            <a:normAutofit lnSpcReduction="10000"/>
+            <a:normAutofit/>
           </a:bodyPr>
           <a:lstStyle/>
           <a:p>
             <a:r>
-              <a:rPr lang="en-US" dirty="0"/>
-              <a:t>What would you do if the misinformation was being spread by a high-ranking official? </a:t>
-            </a:r>
-          </a:p>
-          <a:p>
-            <a:r>
-              <a:rPr lang="en-US" dirty="0"/>
-              <a:t>What would you do if the misinformation was being spread by a foreign government?</a:t>
-            </a:r>
-          </a:p>
-          <a:p>
-            <a:r>
-              <a:rPr lang="en-US" dirty="0"/>
-              <a:t>What would you do if the misinformation was being spread by both a foreign government and a high-ranking official?</a:t>
-            </a:r>
-          </a:p>
-          <a:p>
-            <a:r>
-              <a:rPr lang="en-US" dirty="0"/>
-              <a:t>What would you do if your family was being targeted by the misinformation? </a:t>
-            </a:r>
-          </a:p>
-          <a:p>
-            <a:r>
-              <a:rPr lang="en-US" dirty="0"/>
-              <a:t>What would you do if the misinformation was being spread by a friend?</a:t>
-            </a:r>
+              <a:rPr lang="en-US" sz="3200" dirty="0"/>
+              <a:t>¿</a:t>
+            </a:r>
+            <a:r>
+              <a:rPr lang="en-US" sz="3200" dirty="0" err="1"/>
+              <a:t>Qué</a:t>
+            </a:r>
+            <a:r>
+              <a:rPr lang="en-US" sz="3200" dirty="0"/>
+              <a:t> </a:t>
+            </a:r>
+            <a:r>
+              <a:rPr lang="en-US" sz="3200" dirty="0" err="1"/>
+              <a:t>harías</a:t>
+            </a:r>
+            <a:r>
+              <a:rPr lang="en-US" sz="3200" dirty="0"/>
+              <a:t> </a:t>
+            </a:r>
+            <a:r>
+              <a:rPr lang="en-US" sz="3200" dirty="0" err="1"/>
+              <a:t>ahora</a:t>
+            </a:r>
+            <a:r>
+              <a:rPr lang="en-US" sz="3200" dirty="0"/>
+              <a:t>?</a:t>
+            </a:r>
+          </a:p>
+          <a:p>
+            <a:pPr lvl="1"/>
+            <a:r>
+              <a:rPr lang="en-US" sz="2800" dirty="0"/>
+              <a:t>¿Un </a:t>
+            </a:r>
+            <a:r>
+              <a:rPr lang="en-US" sz="2800" dirty="0" err="1"/>
+              <a:t>funcionario</a:t>
+            </a:r>
+            <a:r>
+              <a:rPr lang="en-US" sz="2800" dirty="0"/>
+              <a:t> de alto </a:t>
+            </a:r>
+            <a:r>
+              <a:rPr lang="en-US" sz="2800" dirty="0" err="1"/>
+              <a:t>rango</a:t>
+            </a:r>
+            <a:r>
+              <a:rPr lang="en-US" sz="2800" dirty="0"/>
+              <a:t> </a:t>
+            </a:r>
+            <a:r>
+              <a:rPr lang="en-US" sz="2800" dirty="0" err="1"/>
+              <a:t>estaba</a:t>
+            </a:r>
+            <a:r>
+              <a:rPr lang="en-US" sz="2800" dirty="0"/>
+              <a:t> </a:t>
+            </a:r>
+            <a:r>
+              <a:rPr lang="en-US" sz="2800" dirty="0" err="1"/>
+              <a:t>difundiendo</a:t>
+            </a:r>
+            <a:r>
+              <a:rPr lang="en-US" sz="2800" dirty="0"/>
+              <a:t> </a:t>
+            </a:r>
+            <a:r>
+              <a:rPr lang="en-US" sz="2800" dirty="0" err="1"/>
+              <a:t>información</a:t>
+            </a:r>
+            <a:r>
+              <a:rPr lang="en-US" sz="2800" dirty="0"/>
+              <a:t> </a:t>
+            </a:r>
+            <a:r>
+              <a:rPr lang="en-US" sz="2800" dirty="0" err="1"/>
+              <a:t>errónea</a:t>
+            </a:r>
+            <a:r>
+              <a:rPr lang="en-US" sz="2800" dirty="0"/>
+              <a:t>?</a:t>
+            </a:r>
+          </a:p>
+          <a:p>
+            <a:pPr lvl="1"/>
+            <a:r>
+              <a:rPr lang="en-US" sz="2800" dirty="0"/>
+              <a:t>¿Un </a:t>
+            </a:r>
+            <a:r>
+              <a:rPr lang="en-US" sz="2800" dirty="0" err="1"/>
+              <a:t>gobierno</a:t>
+            </a:r>
+            <a:r>
+              <a:rPr lang="en-US" sz="2800" dirty="0"/>
+              <a:t> </a:t>
+            </a:r>
+            <a:r>
+              <a:rPr lang="en-US" sz="2800" dirty="0" err="1"/>
+              <a:t>extranjero</a:t>
+            </a:r>
+            <a:r>
+              <a:rPr lang="en-US" sz="2800" dirty="0"/>
+              <a:t> </a:t>
+            </a:r>
+            <a:r>
+              <a:rPr lang="en-US" sz="2800" dirty="0" err="1"/>
+              <a:t>estaba</a:t>
+            </a:r>
+            <a:r>
+              <a:rPr lang="en-US" sz="2800" dirty="0"/>
+              <a:t> </a:t>
+            </a:r>
+            <a:r>
+              <a:rPr lang="en-US" sz="2800" dirty="0" err="1"/>
+              <a:t>difundiendo</a:t>
+            </a:r>
+            <a:r>
+              <a:rPr lang="en-US" sz="2800" dirty="0"/>
+              <a:t> </a:t>
+            </a:r>
+            <a:r>
+              <a:rPr lang="en-US" sz="2800" dirty="0" err="1"/>
+              <a:t>información</a:t>
+            </a:r>
+            <a:r>
+              <a:rPr lang="en-US" sz="2800" dirty="0"/>
+              <a:t> </a:t>
+            </a:r>
+            <a:r>
+              <a:rPr lang="en-US" sz="2800" dirty="0" err="1"/>
+              <a:t>errónea</a:t>
+            </a:r>
+            <a:r>
+              <a:rPr lang="en-US" sz="2800" dirty="0"/>
+              <a:t>?</a:t>
+            </a:r>
+          </a:p>
+          <a:p>
+            <a:pPr lvl="1"/>
+            <a:r>
+              <a:rPr lang="en-US" sz="2800" dirty="0"/>
+              <a:t>¿</a:t>
+            </a:r>
+            <a:r>
+              <a:rPr lang="en-US" sz="2800" dirty="0" err="1"/>
+              <a:t>Estaba</a:t>
+            </a:r>
+            <a:r>
+              <a:rPr lang="en-US" sz="2800" dirty="0"/>
+              <a:t> </a:t>
+            </a:r>
+            <a:r>
+              <a:rPr lang="en-US" sz="2800" dirty="0" err="1"/>
+              <a:t>difundiendo</a:t>
+            </a:r>
+            <a:r>
+              <a:rPr lang="en-US" sz="2800" dirty="0"/>
+              <a:t> </a:t>
+            </a:r>
+            <a:r>
+              <a:rPr lang="en-US" sz="2800" dirty="0" err="1"/>
+              <a:t>información</a:t>
+            </a:r>
+            <a:r>
+              <a:rPr lang="en-US" sz="2800" dirty="0"/>
+              <a:t> </a:t>
+            </a:r>
+            <a:r>
+              <a:rPr lang="en-US" sz="2800" dirty="0" err="1"/>
+              <a:t>errónea</a:t>
+            </a:r>
+            <a:r>
+              <a:rPr lang="en-US" sz="2800" dirty="0"/>
+              <a:t> tanto un </a:t>
+            </a:r>
+            <a:r>
+              <a:rPr lang="en-US" sz="2800" dirty="0" err="1"/>
+              <a:t>gobierno</a:t>
+            </a:r>
+            <a:r>
+              <a:rPr lang="en-US" sz="2800" dirty="0"/>
+              <a:t> </a:t>
+            </a:r>
+            <a:r>
+              <a:rPr lang="en-US" sz="2800" dirty="0" err="1"/>
+              <a:t>extranjero</a:t>
+            </a:r>
+            <a:r>
+              <a:rPr lang="en-US" sz="2800" dirty="0"/>
+              <a:t> </a:t>
+            </a:r>
+            <a:r>
+              <a:rPr lang="en-US" sz="2800" dirty="0" err="1"/>
+              <a:t>como</a:t>
+            </a:r>
+            <a:r>
+              <a:rPr lang="en-US" sz="2800" dirty="0"/>
+              <a:t> un </a:t>
+            </a:r>
+            <a:r>
+              <a:rPr lang="en-US" sz="2800" dirty="0" err="1"/>
+              <a:t>funcionario</a:t>
+            </a:r>
+            <a:r>
+              <a:rPr lang="en-US" sz="2800" dirty="0"/>
+              <a:t> de alto </a:t>
+            </a:r>
+            <a:r>
+              <a:rPr lang="en-US" sz="2800" dirty="0" err="1"/>
+              <a:t>rango</a:t>
+            </a:r>
+            <a:r>
+              <a:rPr lang="en-US" sz="2800" dirty="0"/>
+              <a:t>?</a:t>
+            </a:r>
+          </a:p>
+          <a:p>
+            <a:pPr lvl="1"/>
+            <a:r>
+              <a:rPr lang="en-US" sz="2800" dirty="0"/>
+              <a:t>¿</a:t>
+            </a:r>
+            <a:r>
+              <a:rPr lang="en-US" sz="2800" dirty="0" err="1"/>
+              <a:t>Su</a:t>
+            </a:r>
+            <a:r>
+              <a:rPr lang="en-US" sz="2800" dirty="0"/>
+              <a:t> </a:t>
+            </a:r>
+            <a:r>
+              <a:rPr lang="en-US" sz="2800" dirty="0" err="1"/>
+              <a:t>familia</a:t>
+            </a:r>
+            <a:r>
+              <a:rPr lang="en-US" sz="2800" dirty="0"/>
+              <a:t> </a:t>
+            </a:r>
+            <a:r>
+              <a:rPr lang="en-US" sz="2800" dirty="0" err="1"/>
+              <a:t>estaba</a:t>
+            </a:r>
+            <a:r>
+              <a:rPr lang="en-US" sz="2800" dirty="0"/>
+              <a:t> </a:t>
+            </a:r>
+            <a:r>
+              <a:rPr lang="en-US" sz="2800" dirty="0" err="1"/>
+              <a:t>siendo</a:t>
+            </a:r>
+            <a:r>
+              <a:rPr lang="en-US" sz="2800" dirty="0"/>
+              <a:t> </a:t>
+            </a:r>
+            <a:r>
+              <a:rPr lang="en-US" sz="2800" dirty="0" err="1"/>
+              <a:t>blanco</a:t>
+            </a:r>
+            <a:r>
+              <a:rPr lang="en-US" sz="2800" dirty="0"/>
+              <a:t> de la </a:t>
+            </a:r>
+            <a:r>
+              <a:rPr lang="en-US" sz="2800" dirty="0" err="1"/>
+              <a:t>desinformación</a:t>
+            </a:r>
+            <a:r>
+              <a:rPr lang="en-US" sz="2800" dirty="0"/>
+              <a:t>?</a:t>
+            </a:r>
+          </a:p>
+          <a:p>
+            <a:pPr lvl="1"/>
+            <a:r>
+              <a:rPr lang="en-US" sz="2800" dirty="0"/>
+              <a:t>¿Un amigo </a:t>
+            </a:r>
+            <a:r>
+              <a:rPr lang="en-US" sz="2800" dirty="0" err="1"/>
+              <a:t>estaba</a:t>
+            </a:r>
+            <a:r>
+              <a:rPr lang="en-US" sz="2800" dirty="0"/>
+              <a:t> </a:t>
+            </a:r>
+            <a:r>
+              <a:rPr lang="en-US" sz="2800" dirty="0" err="1"/>
+              <a:t>difundiendo</a:t>
+            </a:r>
+            <a:r>
+              <a:rPr lang="en-US" sz="2800" dirty="0"/>
+              <a:t> </a:t>
+            </a:r>
+            <a:r>
+              <a:rPr lang="en-US" sz="2800" dirty="0" err="1"/>
+              <a:t>información</a:t>
+            </a:r>
+            <a:r>
+              <a:rPr lang="en-US" sz="2800" dirty="0"/>
+              <a:t> </a:t>
+            </a:r>
+            <a:r>
+              <a:rPr lang="en-US" sz="2800" dirty="0" err="1"/>
+              <a:t>errónea</a:t>
+            </a:r>
+            <a:r>
+              <a:rPr lang="en-US" sz="2800" dirty="0"/>
+              <a:t>?</a:t>
+            </a:r>
+            <a:endParaRPr lang="en-US" dirty="0"/>
           </a:p>
         </p:txBody>
       </p:sp>
@@ -10183,7 +11515,7 @@
           </a:prstGeom>
           <a:extLst>
             <a:ext uri="{C572A759-6A51-4108-AA02-DFA0A04FC94B}">
-              <ma14:wrappingTextBoxFlag xmlns:ma14="http://schemas.microsoft.com/office/mac/drawingml/2011/main" xmlns:a14="http://schemas.microsoft.com/office/drawing/2010/main" xmlns:m="http://schemas.openxmlformats.org/officeDocument/2006/math" xmlns="" val="1"/>
+              <ma14:wrappingTextBoxFlag xmlns="" xmlns:m="http://schemas.openxmlformats.org/officeDocument/2006/math" xmlns:a14="http://schemas.microsoft.com/office/drawing/2010/main" xmlns:ma14="http://schemas.microsoft.com/office/mac/drawingml/2011/main" val="1"/>
             </a:ext>
           </a:extLst>
         </p:spPr>
@@ -10296,7 +11628,7 @@
           </a:prstGeom>
           <a:extLst>
             <a:ext uri="{C572A759-6A51-4108-AA02-DFA0A04FC94B}">
-              <ma14:wrappingTextBoxFlag xmlns:ma14="http://schemas.microsoft.com/office/mac/drawingml/2011/main" xmlns:a14="http://schemas.microsoft.com/office/drawing/2010/main" xmlns:m="http://schemas.openxmlformats.org/officeDocument/2006/math" xmlns="" val="1"/>
+              <ma14:wrappingTextBoxFlag xmlns="" xmlns:m="http://schemas.openxmlformats.org/officeDocument/2006/math" xmlns:a14="http://schemas.microsoft.com/office/drawing/2010/main" xmlns:ma14="http://schemas.microsoft.com/office/mac/drawingml/2011/main" val="1"/>
             </a:ext>
           </a:extLst>
         </p:spPr>
@@ -10322,7 +11654,7 @@
         <p:push dir="u"/>
       </p:transition>
     </mc:Choice>
-    <mc:Fallback xmlns:a14="http://schemas.microsoft.com/office/drawing/2010/main" xmlns:m="http://schemas.openxmlformats.org/officeDocument/2006/math" xmlns="">
+    <mc:Fallback xmlns="" xmlns:m="http://schemas.openxmlformats.org/officeDocument/2006/math" xmlns:a14="http://schemas.microsoft.com/office/drawing/2010/main">
       <p:transition spd="slow">
         <p:fade/>
       </p:transition>
@@ -10443,7 +11775,7 @@
           </a:ln>
           <a:extLst>
             <a:ext uri="{C572A759-6A51-4108-AA02-DFA0A04FC94B}">
-              <ma14:wrappingTextBoxFlag xmlns:ma14="http://schemas.microsoft.com/office/mac/drawingml/2011/main" xmlns:a14="http://schemas.microsoft.com/office/drawing/2010/main" xmlns:m="http://schemas.openxmlformats.org/officeDocument/2006/math" xmlns="" val="1"/>
+              <ma14:wrappingTextBoxFlag xmlns="" xmlns:m="http://schemas.openxmlformats.org/officeDocument/2006/math" xmlns:a14="http://schemas.microsoft.com/office/drawing/2010/main" xmlns:ma14="http://schemas.microsoft.com/office/mac/drawingml/2011/main" val="1"/>
             </a:ext>
           </a:extLst>
         </p:spPr>
@@ -10479,7 +11811,7 @@
           </a:prstGeom>
           <a:extLst>
             <a:ext uri="{C572A759-6A51-4108-AA02-DFA0A04FC94B}">
-              <ma14:wrappingTextBoxFlag xmlns:ma14="http://schemas.microsoft.com/office/mac/drawingml/2011/main" xmlns:a14="http://schemas.microsoft.com/office/drawing/2010/main" xmlns:m="http://schemas.openxmlformats.org/officeDocument/2006/math" xmlns="" val="1"/>
+              <ma14:wrappingTextBoxFlag xmlns="" xmlns:m="http://schemas.openxmlformats.org/officeDocument/2006/math" xmlns:a14="http://schemas.microsoft.com/office/drawing/2010/main" xmlns:ma14="http://schemas.microsoft.com/office/mac/drawingml/2011/main" val="1"/>
             </a:ext>
           </a:extLst>
         </p:spPr>
@@ -10506,7 +11838,7 @@
         <p:push dir="u"/>
       </p:transition>
     </mc:Choice>
-    <mc:Fallback xmlns:a14="http://schemas.microsoft.com/office/drawing/2010/main" xmlns:m="http://schemas.openxmlformats.org/officeDocument/2006/math" xmlns="">
+    <mc:Fallback xmlns="" xmlns:m="http://schemas.openxmlformats.org/officeDocument/2006/math" xmlns:a14="http://schemas.microsoft.com/office/drawing/2010/main">
       <p:transition spd="slow">
         <p:fade/>
       </p:transition>
@@ -10619,7 +11951,7 @@
           </a:ln>
           <a:extLst>
             <a:ext uri="{C572A759-6A51-4108-AA02-DFA0A04FC94B}">
-              <ma14:wrappingTextBoxFlag xmlns:ma14="http://schemas.microsoft.com/office/mac/drawingml/2011/main" xmlns:a14="http://schemas.microsoft.com/office/drawing/2010/main" xmlns:m="http://schemas.openxmlformats.org/officeDocument/2006/math" xmlns="" val="1"/>
+              <ma14:wrappingTextBoxFlag xmlns="" xmlns:m="http://schemas.openxmlformats.org/officeDocument/2006/math" xmlns:a14="http://schemas.microsoft.com/office/drawing/2010/main" xmlns:ma14="http://schemas.microsoft.com/office/mac/drawingml/2011/main" val="1"/>
             </a:ext>
           </a:extLst>
         </p:spPr>
@@ -10655,7 +11987,7 @@
           </a:prstGeom>
           <a:extLst>
             <a:ext uri="{C572A759-6A51-4108-AA02-DFA0A04FC94B}">
-              <ma14:wrappingTextBoxFlag xmlns:ma14="http://schemas.microsoft.com/office/mac/drawingml/2011/main" xmlns:a14="http://schemas.microsoft.com/office/drawing/2010/main" xmlns:m="http://schemas.openxmlformats.org/officeDocument/2006/math" xmlns="" val="1"/>
+              <ma14:wrappingTextBoxFlag xmlns="" xmlns:m="http://schemas.openxmlformats.org/officeDocument/2006/math" xmlns:a14="http://schemas.microsoft.com/office/drawing/2010/main" xmlns:ma14="http://schemas.microsoft.com/office/mac/drawingml/2011/main" val="1"/>
             </a:ext>
           </a:extLst>
         </p:spPr>
@@ -10824,9 +12156,18 @@
           <a:lstStyle/>
           <a:p>
             <a:r>
-              <a:rPr lang="en-US" dirty="0"/>
-              <a:t>Reflection</a:t>
-            </a:r>
+              <a:rPr lang="en-US" dirty="0" err="1"/>
+              <a:t>Reflexiones</a:t>
+            </a:r>
+            <a:r>
+              <a:rPr lang="en-US" dirty="0"/>
+              <a:t> del </a:t>
+            </a:r>
+            <a:r>
+              <a:rPr lang="en-US" dirty="0" err="1"/>
+              <a:t>escenario</a:t>
+            </a:r>
+            <a:endParaRPr lang="en-US" dirty="0"/>
           </a:p>
         </p:txBody>
       </p:sp>
@@ -10853,19 +12194,115 @@
           <a:p>
             <a:r>
               <a:rPr lang="en-US" dirty="0"/>
-              <a:t>What did you observe in the scenario?</a:t>
-            </a:r>
-          </a:p>
-          <a:p>
-            <a:r>
-              <a:rPr lang="en-US" dirty="0"/>
-              <a:t>How did the misinformation spread?</a:t>
-            </a:r>
-          </a:p>
-          <a:p>
-            <a:r>
-              <a:rPr lang="en-US" dirty="0"/>
-              <a:t>What were the immediate reactions?</a:t>
+              <a:t>¿</a:t>
+            </a:r>
+            <a:r>
+              <a:rPr lang="en-US" dirty="0" err="1"/>
+              <a:t>Qué</a:t>
+            </a:r>
+            <a:r>
+              <a:rPr lang="en-US" dirty="0"/>
+              <a:t> </a:t>
+            </a:r>
+            <a:r>
+              <a:rPr lang="en-US" dirty="0" err="1"/>
+              <a:t>observaste</a:t>
+            </a:r>
+            <a:r>
+              <a:rPr lang="en-US" dirty="0"/>
+              <a:t> </a:t>
+            </a:r>
+            <a:r>
+              <a:rPr lang="en-US" dirty="0" err="1"/>
+              <a:t>en</a:t>
+            </a:r>
+            <a:r>
+              <a:rPr lang="en-US" dirty="0"/>
+              <a:t> </a:t>
+            </a:r>
+            <a:r>
+              <a:rPr lang="en-US" dirty="0" err="1"/>
+              <a:t>el</a:t>
+            </a:r>
+            <a:r>
+              <a:rPr lang="en-US" dirty="0"/>
+              <a:t> </a:t>
+            </a:r>
+            <a:r>
+              <a:rPr lang="en-US" dirty="0" err="1"/>
+              <a:t>escenario</a:t>
+            </a:r>
+            <a:r>
+              <a:rPr lang="en-US" dirty="0"/>
+              <a:t>?</a:t>
+            </a:r>
+          </a:p>
+          <a:p>
+            <a:r>
+              <a:rPr lang="en-US" dirty="0"/>
+              <a:t>¿</a:t>
+            </a:r>
+            <a:r>
+              <a:rPr lang="en-US" dirty="0" err="1"/>
+              <a:t>Cómo</a:t>
+            </a:r>
+            <a:r>
+              <a:rPr lang="en-US" dirty="0"/>
+              <a:t> se </a:t>
+            </a:r>
+            <a:r>
+              <a:rPr lang="en-US" dirty="0" err="1"/>
+              <a:t>difundió</a:t>
+            </a:r>
+            <a:r>
+              <a:rPr lang="en-US" dirty="0"/>
+              <a:t> la </a:t>
+            </a:r>
+            <a:r>
+              <a:rPr lang="en-US" dirty="0" err="1"/>
+              <a:t>desinformación</a:t>
+            </a:r>
+            <a:r>
+              <a:rPr lang="en-US" dirty="0"/>
+              <a:t>?</a:t>
+            </a:r>
+          </a:p>
+          <a:p>
+            <a:r>
+              <a:rPr lang="en-US" dirty="0"/>
+              <a:t>¿</a:t>
+            </a:r>
+            <a:r>
+              <a:rPr lang="en-US" dirty="0" err="1"/>
+              <a:t>Cuáles</a:t>
+            </a:r>
+            <a:r>
+              <a:rPr lang="en-US" dirty="0"/>
+              <a:t> </a:t>
+            </a:r>
+            <a:r>
+              <a:rPr lang="en-US" dirty="0" err="1"/>
+              <a:t>fueron</a:t>
+            </a:r>
+            <a:r>
+              <a:rPr lang="en-US" dirty="0"/>
+              <a:t> las </a:t>
+            </a:r>
+            <a:r>
+              <a:rPr lang="en-US" dirty="0" err="1"/>
+              <a:t>reacciones</a:t>
+            </a:r>
+            <a:r>
+              <a:rPr lang="en-US" dirty="0"/>
+              <a:t> </a:t>
+            </a:r>
+            <a:r>
+              <a:rPr lang="en-US" dirty="0" err="1"/>
+              <a:t>inmediatas</a:t>
+            </a:r>
+            <a:r>
+              <a:rPr lang="en-US" dirty="0"/>
+              <a:t>?</a:t>
             </a:r>
           </a:p>
         </p:txBody>
@@ -11021,7 +12458,7 @@
         <p:spPr>
           <a:xfrm>
             <a:off x="375127" y="2963211"/>
-            <a:ext cx="11441743" cy="1061102"/>
+            <a:ext cx="11441743" cy="1892099"/>
           </a:xfrm>
         </p:spPr>
         <p:txBody>
@@ -11031,13 +12468,45 @@
             <a:pPr marL="0" indent="0" algn="ctr">
               <a:buNone/>
             </a:pPr>
+            <a:r>
+              <a:rPr lang="en-US" sz="6000" dirty="0" err="1">
+                <a:latin typeface="Arial" panose="020B0604020202020204" pitchFamily="34" charset="0"/>
+                <a:cs typeface="Arial" panose="020B0604020202020204" pitchFamily="34" charset="0"/>
+              </a:rPr>
+              <a:t>Contrarrestar</a:t>
+            </a:r>
             <a:r>
               <a:rPr lang="en-US" sz="6000" dirty="0">
                 <a:latin typeface="Arial" panose="020B0604020202020204" pitchFamily="34" charset="0"/>
                 <a:cs typeface="Arial" panose="020B0604020202020204" pitchFamily="34" charset="0"/>
               </a:rPr>
-              <a:t>Countering Malign Information</a:t>
-            </a:r>
+              <a:t> la </a:t>
+            </a:r>
+            <a:r>
+              <a:rPr lang="en-US" sz="6000" dirty="0" err="1">
+                <a:latin typeface="Arial" panose="020B0604020202020204" pitchFamily="34" charset="0"/>
+                <a:cs typeface="Arial" panose="020B0604020202020204" pitchFamily="34" charset="0"/>
+              </a:rPr>
+              <a:t>información</a:t>
+            </a:r>
+            <a:r>
+              <a:rPr lang="en-US" sz="6000" dirty="0">
+                <a:latin typeface="Arial" panose="020B0604020202020204" pitchFamily="34" charset="0"/>
+                <a:cs typeface="Arial" panose="020B0604020202020204" pitchFamily="34" charset="0"/>
+              </a:rPr>
+              <a:t> </a:t>
+            </a:r>
+            <a:r>
+              <a:rPr lang="en-US" sz="6000" dirty="0" err="1">
+                <a:latin typeface="Arial" panose="020B0604020202020204" pitchFamily="34" charset="0"/>
+                <a:cs typeface="Arial" panose="020B0604020202020204" pitchFamily="34" charset="0"/>
+              </a:rPr>
+              <a:t>maligna</a:t>
+            </a:r>
+            <a:endParaRPr lang="en-US" sz="6000" dirty="0">
+              <a:latin typeface="Arial" panose="020B0604020202020204" pitchFamily="34" charset="0"/>
+              <a:cs typeface="Arial" panose="020B0604020202020204" pitchFamily="34" charset="0"/>
+            </a:endParaRPr>
           </a:p>
         </p:txBody>
       </p:sp>
@@ -11235,9 +12704,18 @@
           <a:lstStyle/>
           <a:p>
             <a:r>
-              <a:rPr lang="en-US" dirty="0"/>
-              <a:t>Lesson Objectives</a:t>
-            </a:r>
+              <a:rPr lang="en-US" dirty="0" err="1"/>
+              <a:t>Objetivos</a:t>
+            </a:r>
+            <a:r>
+              <a:rPr lang="en-US" dirty="0"/>
+              <a:t> de la </a:t>
+            </a:r>
+            <a:r>
+              <a:rPr lang="en-US" dirty="0" err="1"/>
+              <a:t>lección</a:t>
+            </a:r>
+            <a:endParaRPr lang="en-US" dirty="0"/>
           </a:p>
         </p:txBody>
       </p:sp>
@@ -11265,12 +12743,12 @@
           <a:lstStyle/>
           <a:p>
             <a:r>
-              <a:rPr lang="en-US" b="1" dirty="0">
+              <a:rPr lang="en-US" dirty="0" err="1">
                 <a:effectLst/>
                 <a:latin typeface="Calibri" panose="020F0502020204030204" pitchFamily="34" charset="0"/>
                 <a:cs typeface="Calibri" panose="020F0502020204030204" pitchFamily="34" charset="0"/>
               </a:rPr>
-              <a:t>Goal: </a:t>
+              <a:t>Objetivo</a:t>
             </a:r>
             <a:r>
               <a:rPr lang="en-US" dirty="0">
@@ -11278,7 +12756,103 @@
                 <a:latin typeface="Calibri" panose="020F0502020204030204" pitchFamily="34" charset="0"/>
                 <a:cs typeface="Calibri" panose="020F0502020204030204" pitchFamily="34" charset="0"/>
               </a:rPr>
-              <a:t>Develop TTPs to counter misinformation and disinformation effectively. </a:t>
+              <a:t>: </a:t>
+            </a:r>
+            <a:r>
+              <a:rPr lang="en-US" dirty="0" err="1">
+                <a:effectLst/>
+                <a:latin typeface="Calibri" panose="020F0502020204030204" pitchFamily="34" charset="0"/>
+                <a:cs typeface="Calibri" panose="020F0502020204030204" pitchFamily="34" charset="0"/>
+              </a:rPr>
+              <a:t>Desarrollar</a:t>
+            </a:r>
+            <a:r>
+              <a:rPr lang="en-US" dirty="0">
+                <a:effectLst/>
+                <a:latin typeface="Calibri" panose="020F0502020204030204" pitchFamily="34" charset="0"/>
+                <a:cs typeface="Calibri" panose="020F0502020204030204" pitchFamily="34" charset="0"/>
+              </a:rPr>
+              <a:t> TTP para </a:t>
+            </a:r>
+            <a:r>
+              <a:rPr lang="en-US" dirty="0" err="1">
+                <a:effectLst/>
+                <a:latin typeface="Calibri" panose="020F0502020204030204" pitchFamily="34" charset="0"/>
+                <a:cs typeface="Calibri" panose="020F0502020204030204" pitchFamily="34" charset="0"/>
+              </a:rPr>
+              <a:t>contrarrestar</a:t>
+            </a:r>
+            <a:r>
+              <a:rPr lang="en-US" dirty="0">
+                <a:effectLst/>
+                <a:latin typeface="Calibri" panose="020F0502020204030204" pitchFamily="34" charset="0"/>
+                <a:cs typeface="Calibri" panose="020F0502020204030204" pitchFamily="34" charset="0"/>
+              </a:rPr>
+              <a:t> </a:t>
+            </a:r>
+            <a:r>
+              <a:rPr lang="en-US" dirty="0" err="1">
+                <a:effectLst/>
+                <a:latin typeface="Calibri" panose="020F0502020204030204" pitchFamily="34" charset="0"/>
+                <a:cs typeface="Calibri" panose="020F0502020204030204" pitchFamily="34" charset="0"/>
+              </a:rPr>
+              <a:t>eficazmente</a:t>
+            </a:r>
+            <a:r>
+              <a:rPr lang="en-US" dirty="0">
+                <a:effectLst/>
+                <a:latin typeface="Calibri" panose="020F0502020204030204" pitchFamily="34" charset="0"/>
+                <a:cs typeface="Calibri" panose="020F0502020204030204" pitchFamily="34" charset="0"/>
+              </a:rPr>
+              <a:t> la </a:t>
+            </a:r>
+            <a:r>
+              <a:rPr lang="en-US" dirty="0" err="1">
+                <a:effectLst/>
+                <a:latin typeface="Calibri" panose="020F0502020204030204" pitchFamily="34" charset="0"/>
+                <a:cs typeface="Calibri" panose="020F0502020204030204" pitchFamily="34" charset="0"/>
+              </a:rPr>
+              <a:t>información</a:t>
+            </a:r>
+            <a:r>
+              <a:rPr lang="en-US" dirty="0">
+                <a:effectLst/>
+                <a:latin typeface="Calibri" panose="020F0502020204030204" pitchFamily="34" charset="0"/>
+                <a:cs typeface="Calibri" panose="020F0502020204030204" pitchFamily="34" charset="0"/>
+              </a:rPr>
+              <a:t> </a:t>
+            </a:r>
+            <a:r>
+              <a:rPr lang="en-US" dirty="0" err="1">
+                <a:effectLst/>
+                <a:latin typeface="Calibri" panose="020F0502020204030204" pitchFamily="34" charset="0"/>
+                <a:cs typeface="Calibri" panose="020F0502020204030204" pitchFamily="34" charset="0"/>
+              </a:rPr>
+              <a:t>errónea</a:t>
+            </a:r>
+            <a:r>
+              <a:rPr lang="en-US" dirty="0">
+                <a:effectLst/>
+                <a:latin typeface="Calibri" panose="020F0502020204030204" pitchFamily="34" charset="0"/>
+                <a:cs typeface="Calibri" panose="020F0502020204030204" pitchFamily="34" charset="0"/>
+              </a:rPr>
+              <a:t> y la </a:t>
+            </a:r>
+            <a:r>
+              <a:rPr lang="en-US" dirty="0" err="1">
+                <a:effectLst/>
+                <a:latin typeface="Calibri" panose="020F0502020204030204" pitchFamily="34" charset="0"/>
+                <a:cs typeface="Calibri" panose="020F0502020204030204" pitchFamily="34" charset="0"/>
+              </a:rPr>
+              <a:t>desinformación</a:t>
+            </a:r>
+            <a:r>
+              <a:rPr lang="en-US" dirty="0">
+                <a:effectLst/>
+                <a:latin typeface="Calibri" panose="020F0502020204030204" pitchFamily="34" charset="0"/>
+                <a:cs typeface="Calibri" panose="020F0502020204030204" pitchFamily="34" charset="0"/>
+              </a:rPr>
+              <a:t>.</a:t>
             </a:r>
             <a:endParaRPr lang="en-US" dirty="0">
               <a:latin typeface="Calibri" panose="020F0502020204030204" pitchFamily="34" charset="0"/>

</xml_diff>